<commit_message>
adição das configurações nas telas e nas tabelas
</commit_message>
<xml_diff>
--- a/DocumentacaoProjeto/Protótipo_Visual.pptx
+++ b/DocumentacaoProjeto/Protótipo_Visual.pptx
@@ -278,7 +278,7 @@
           <a:p>
             <a:fld id="{ED8D6B47-35E8-4B74-A8BC-163E56BA4F07}" type="datetimeFigureOut">
               <a:rPr lang="pt-BR" smtClean="0"/>
-              <a:t>02/04/2020</a:t>
+              <a:t>04/04/2020</a:t>
             </a:fld>
             <a:endParaRPr lang="pt-BR"/>
           </a:p>
@@ -448,7 +448,7 @@
           <a:p>
             <a:fld id="{ED8D6B47-35E8-4B74-A8BC-163E56BA4F07}" type="datetimeFigureOut">
               <a:rPr lang="pt-BR" smtClean="0"/>
-              <a:t>02/04/2020</a:t>
+              <a:t>04/04/2020</a:t>
             </a:fld>
             <a:endParaRPr lang="pt-BR"/>
           </a:p>
@@ -628,7 +628,7 @@
           <a:p>
             <a:fld id="{ED8D6B47-35E8-4B74-A8BC-163E56BA4F07}" type="datetimeFigureOut">
               <a:rPr lang="pt-BR" smtClean="0"/>
-              <a:t>02/04/2020</a:t>
+              <a:t>04/04/2020</a:t>
             </a:fld>
             <a:endParaRPr lang="pt-BR"/>
           </a:p>
@@ -798,7 +798,7 @@
           <a:p>
             <a:fld id="{ED8D6B47-35E8-4B74-A8BC-163E56BA4F07}" type="datetimeFigureOut">
               <a:rPr lang="pt-BR" smtClean="0"/>
-              <a:t>02/04/2020</a:t>
+              <a:t>04/04/2020</a:t>
             </a:fld>
             <a:endParaRPr lang="pt-BR"/>
           </a:p>
@@ -1044,7 +1044,7 @@
           <a:p>
             <a:fld id="{ED8D6B47-35E8-4B74-A8BC-163E56BA4F07}" type="datetimeFigureOut">
               <a:rPr lang="pt-BR" smtClean="0"/>
-              <a:t>02/04/2020</a:t>
+              <a:t>04/04/2020</a:t>
             </a:fld>
             <a:endParaRPr lang="pt-BR"/>
           </a:p>
@@ -1276,7 +1276,7 @@
           <a:p>
             <a:fld id="{ED8D6B47-35E8-4B74-A8BC-163E56BA4F07}" type="datetimeFigureOut">
               <a:rPr lang="pt-BR" smtClean="0"/>
-              <a:t>02/04/2020</a:t>
+              <a:t>04/04/2020</a:t>
             </a:fld>
             <a:endParaRPr lang="pt-BR"/>
           </a:p>
@@ -1643,7 +1643,7 @@
           <a:p>
             <a:fld id="{ED8D6B47-35E8-4B74-A8BC-163E56BA4F07}" type="datetimeFigureOut">
               <a:rPr lang="pt-BR" smtClean="0"/>
-              <a:t>02/04/2020</a:t>
+              <a:t>04/04/2020</a:t>
             </a:fld>
             <a:endParaRPr lang="pt-BR"/>
           </a:p>
@@ -1761,7 +1761,7 @@
           <a:p>
             <a:fld id="{ED8D6B47-35E8-4B74-A8BC-163E56BA4F07}" type="datetimeFigureOut">
               <a:rPr lang="pt-BR" smtClean="0"/>
-              <a:t>02/04/2020</a:t>
+              <a:t>04/04/2020</a:t>
             </a:fld>
             <a:endParaRPr lang="pt-BR"/>
           </a:p>
@@ -1856,7 +1856,7 @@
           <a:p>
             <a:fld id="{ED8D6B47-35E8-4B74-A8BC-163E56BA4F07}" type="datetimeFigureOut">
               <a:rPr lang="pt-BR" smtClean="0"/>
-              <a:t>02/04/2020</a:t>
+              <a:t>04/04/2020</a:t>
             </a:fld>
             <a:endParaRPr lang="pt-BR"/>
           </a:p>
@@ -2133,7 +2133,7 @@
           <a:p>
             <a:fld id="{ED8D6B47-35E8-4B74-A8BC-163E56BA4F07}" type="datetimeFigureOut">
               <a:rPr lang="pt-BR" smtClean="0"/>
-              <a:t>02/04/2020</a:t>
+              <a:t>04/04/2020</a:t>
             </a:fld>
             <a:endParaRPr lang="pt-BR"/>
           </a:p>
@@ -2386,7 +2386,7 @@
           <a:p>
             <a:fld id="{ED8D6B47-35E8-4B74-A8BC-163E56BA4F07}" type="datetimeFigureOut">
               <a:rPr lang="pt-BR" smtClean="0"/>
-              <a:t>02/04/2020</a:t>
+              <a:t>04/04/2020</a:t>
             </a:fld>
             <a:endParaRPr lang="pt-BR"/>
           </a:p>
@@ -2599,7 +2599,7 @@
           <a:p>
             <a:fld id="{ED8D6B47-35E8-4B74-A8BC-163E56BA4F07}" type="datetimeFigureOut">
               <a:rPr lang="pt-BR" smtClean="0"/>
-              <a:t>02/04/2020</a:t>
+              <a:t>04/04/2020</a:t>
             </a:fld>
             <a:endParaRPr lang="pt-BR"/>
           </a:p>
@@ -3545,14 +3545,14 @@
             <p:ph idx="1"/>
             <p:extLst>
               <p:ext uri="{D42A27DB-BD31-4B8C-83A1-F6EECF244321}">
-                <p14:modId xmlns:p14="http://schemas.microsoft.com/office/powerpoint/2010/main" val="569304748"/>
+                <p14:modId xmlns:p14="http://schemas.microsoft.com/office/powerpoint/2010/main" val="3359333108"/>
               </p:ext>
             </p:extLst>
           </p:nvPr>
         </p:nvGraphicFramePr>
         <p:xfrm>
-          <a:off x="838200" y="2250626"/>
-          <a:ext cx="9245959" cy="3829189"/>
+          <a:off x="838200" y="1484626"/>
+          <a:ext cx="9245959" cy="4915178"/>
         </p:xfrm>
         <a:graphic>
           <a:graphicData uri="http://schemas.openxmlformats.org/drawingml/2006/table">
@@ -3969,10 +3969,248 @@
                   <a:tcPr/>
                 </a:tc>
               </a:tr>
+              <a:tr h="445909">
+                <a:tc>
+                  <a:txBody>
+                    <a:bodyPr/>
+                    <a:lstStyle/>
+                    <a:p>
+                      <a:r>
+                        <a:rPr lang="pt-BR" dirty="0" smtClean="0"/>
+                        <a:t>4</a:t>
+                      </a:r>
+                      <a:endParaRPr lang="pt-BR" dirty="0"/>
+                    </a:p>
+                  </a:txBody>
+                  <a:tcPr/>
+                </a:tc>
+                <a:tc>
+                  <a:txBody>
+                    <a:bodyPr/>
+                    <a:lstStyle/>
+                    <a:p>
+                      <a:endParaRPr lang="pt-BR" dirty="0"/>
+                    </a:p>
+                  </a:txBody>
+                  <a:tcPr/>
+                </a:tc>
+                <a:tc>
+                  <a:txBody>
+                    <a:bodyPr/>
+                    <a:lstStyle/>
+                    <a:p>
+                      <a:endParaRPr lang="pt-BR" dirty="0"/>
+                    </a:p>
+                  </a:txBody>
+                  <a:tcPr/>
+                </a:tc>
+                <a:tc>
+                  <a:txBody>
+                    <a:bodyPr/>
+                    <a:lstStyle/>
+                    <a:p>
+                      <a:pPr marL="0" marR="0" lvl="0" indent="0" algn="l" defTabSz="914400" rtl="0" eaLnBrk="1" fontAlgn="auto" latinLnBrk="0" hangingPunct="1">
+                        <a:lnSpc>
+                          <a:spcPct val="100000"/>
+                        </a:lnSpc>
+                        <a:spcBef>
+                          <a:spcPts val="0"/>
+                        </a:spcBef>
+                        <a:spcAft>
+                          <a:spcPts val="0"/>
+                        </a:spcAft>
+                        <a:buClrTx/>
+                        <a:buSzTx/>
+                        <a:buFontTx/>
+                        <a:buNone/>
+                        <a:tabLst/>
+                        <a:defRPr/>
+                      </a:pPr>
+                      <a:r>
+                        <a:rPr lang="pt-BR" dirty="0" smtClean="0"/>
+                        <a:t>Botão</a:t>
+                      </a:r>
+                    </a:p>
+                    <a:p>
+                      <a:endParaRPr lang="pt-BR" dirty="0"/>
+                    </a:p>
+                  </a:txBody>
+                  <a:tcPr/>
+                </a:tc>
+                <a:tc>
+                  <a:txBody>
+                    <a:bodyPr/>
+                    <a:lstStyle/>
+                    <a:p>
+                      <a:r>
+                        <a:rPr lang="pt-BR" dirty="0" smtClean="0"/>
+                        <a:t>Desliga/ Liga Efeitos Sonoros</a:t>
+                      </a:r>
+                      <a:endParaRPr lang="pt-BR" dirty="0"/>
+                    </a:p>
+                  </a:txBody>
+                  <a:tcPr/>
+                </a:tc>
+              </a:tr>
+              <a:tr h="445909">
+                <a:tc>
+                  <a:txBody>
+                    <a:bodyPr/>
+                    <a:lstStyle/>
+                    <a:p>
+                      <a:r>
+                        <a:rPr lang="pt-BR" dirty="0" smtClean="0"/>
+                        <a:t>5</a:t>
+                      </a:r>
+                      <a:endParaRPr lang="pt-BR" dirty="0"/>
+                    </a:p>
+                  </a:txBody>
+                  <a:tcPr/>
+                </a:tc>
+                <a:tc>
+                  <a:txBody>
+                    <a:bodyPr/>
+                    <a:lstStyle/>
+                    <a:p>
+                      <a:endParaRPr lang="pt-BR" dirty="0"/>
+                    </a:p>
+                  </a:txBody>
+                  <a:tcPr/>
+                </a:tc>
+                <a:tc>
+                  <a:txBody>
+                    <a:bodyPr/>
+                    <a:lstStyle/>
+                    <a:p>
+                      <a:endParaRPr lang="pt-BR" dirty="0"/>
+                    </a:p>
+                  </a:txBody>
+                  <a:tcPr/>
+                </a:tc>
+                <a:tc>
+                  <a:txBody>
+                    <a:bodyPr/>
+                    <a:lstStyle/>
+                    <a:p>
+                      <a:pPr marL="0" marR="0" lvl="0" indent="0" algn="l" defTabSz="914400" rtl="0" eaLnBrk="1" fontAlgn="auto" latinLnBrk="0" hangingPunct="1">
+                        <a:lnSpc>
+                          <a:spcPct val="100000"/>
+                        </a:lnSpc>
+                        <a:spcBef>
+                          <a:spcPts val="0"/>
+                        </a:spcBef>
+                        <a:spcAft>
+                          <a:spcPts val="0"/>
+                        </a:spcAft>
+                        <a:buClrTx/>
+                        <a:buSzTx/>
+                        <a:buFontTx/>
+                        <a:buNone/>
+                        <a:tabLst/>
+                        <a:defRPr/>
+                      </a:pPr>
+                      <a:r>
+                        <a:rPr lang="pt-BR" dirty="0" smtClean="0"/>
+                        <a:t>Botão</a:t>
+                      </a:r>
+                      <a:endParaRPr lang="pt-BR" dirty="0"/>
+                    </a:p>
+                  </a:txBody>
+                  <a:tcPr/>
+                </a:tc>
+                <a:tc>
+                  <a:txBody>
+                    <a:bodyPr/>
+                    <a:lstStyle/>
+                    <a:p>
+                      <a:r>
+                        <a:rPr lang="pt-BR" dirty="0" smtClean="0"/>
+                        <a:t>Desliga/ Liga Musica</a:t>
+                      </a:r>
+                      <a:endParaRPr lang="pt-BR" dirty="0"/>
+                    </a:p>
+                  </a:txBody>
+                  <a:tcPr/>
+                </a:tc>
+              </a:tr>
             </a:tbl>
           </a:graphicData>
         </a:graphic>
       </p:graphicFrame>
+      <p:pic>
+        <p:nvPicPr>
+          <p:cNvPr id="5" name="Imagem 4"/>
+          <p:cNvPicPr>
+            <a:picLocks noChangeAspect="1"/>
+          </p:cNvPicPr>
+          <p:nvPr/>
+        </p:nvPicPr>
+        <p:blipFill>
+          <a:blip r:embed="rId2" cstate="print">
+            <a:duotone>
+              <a:schemeClr val="accent6">
+                <a:shade val="45000"/>
+                <a:satMod val="135000"/>
+              </a:schemeClr>
+              <a:prstClr val="white"/>
+            </a:duotone>
+            <a:extLst>
+              <a:ext uri="{28A0092B-C50C-407E-A947-70E740481C1C}">
+                <a14:useLocalDpi xmlns:a14="http://schemas.microsoft.com/office/drawing/2010/main" val="0"/>
+              </a:ext>
+            </a:extLst>
+          </a:blip>
+          <a:stretch>
+            <a:fillRect/>
+          </a:stretch>
+        </p:blipFill>
+        <p:spPr>
+          <a:xfrm>
+            <a:off x="1770111" y="5420610"/>
+            <a:ext cx="546115" cy="359636"/>
+          </a:xfrm>
+          <a:prstGeom prst="rect">
+            <a:avLst/>
+          </a:prstGeom>
+        </p:spPr>
+      </p:pic>
+      <p:pic>
+        <p:nvPicPr>
+          <p:cNvPr id="6" name="Imagem 5"/>
+          <p:cNvPicPr>
+            <a:picLocks noChangeAspect="1"/>
+          </p:cNvPicPr>
+          <p:nvPr/>
+        </p:nvPicPr>
+        <p:blipFill>
+          <a:blip r:embed="rId3" cstate="print">
+            <a:duotone>
+              <a:schemeClr val="accent6">
+                <a:shade val="45000"/>
+                <a:satMod val="135000"/>
+              </a:schemeClr>
+              <a:prstClr val="white"/>
+            </a:duotone>
+            <a:extLst>
+              <a:ext uri="{28A0092B-C50C-407E-A947-70E740481C1C}">
+                <a14:useLocalDpi xmlns:a14="http://schemas.microsoft.com/office/drawing/2010/main" val="0"/>
+              </a:ext>
+            </a:extLst>
+          </a:blip>
+          <a:stretch>
+            <a:fillRect/>
+          </a:stretch>
+        </p:blipFill>
+        <p:spPr>
+          <a:xfrm>
+            <a:off x="1883600" y="6029586"/>
+            <a:ext cx="393989" cy="357339"/>
+          </a:xfrm>
+          <a:prstGeom prst="rect">
+            <a:avLst/>
+          </a:prstGeom>
+        </p:spPr>
+      </p:pic>
     </p:spTree>
     <p:extLst>
       <p:ext uri="{BB962C8B-B14F-4D97-AF65-F5344CB8AC3E}">
@@ -4525,6 +4763,180 @@
           </a:p>
         </p:txBody>
       </p:sp>
+      <p:sp>
+        <p:nvSpPr>
+          <p:cNvPr id="13" name="Retângulo de cantos arredondados 12"/>
+          <p:cNvSpPr/>
+          <p:nvPr/>
+        </p:nvSpPr>
+        <p:spPr>
+          <a:xfrm>
+            <a:off x="8031107" y="749493"/>
+            <a:ext cx="2053206" cy="455194"/>
+          </a:xfrm>
+          <a:prstGeom prst="roundRect">
+            <a:avLst/>
+          </a:prstGeom>
+          <a:solidFill>
+            <a:srgbClr val="FDEBC7"/>
+          </a:solidFill>
+          <a:ln>
+            <a:noFill/>
+          </a:ln>
+          <a:effectLst>
+            <a:outerShdw blurRad="50800" dist="38100" dir="2700000" algn="tl" rotWithShape="0">
+              <a:prstClr val="black">
+                <a:alpha val="40000"/>
+              </a:prstClr>
+            </a:outerShdw>
+          </a:effectLst>
+        </p:spPr>
+        <p:style>
+          <a:lnRef idx="2">
+            <a:schemeClr val="accent1">
+              <a:shade val="50000"/>
+            </a:schemeClr>
+          </a:lnRef>
+          <a:fillRef idx="1">
+            <a:schemeClr val="accent1"/>
+          </a:fillRef>
+          <a:effectRef idx="0">
+            <a:schemeClr val="accent1"/>
+          </a:effectRef>
+          <a:fontRef idx="minor">
+            <a:schemeClr val="lt1"/>
+          </a:fontRef>
+        </p:style>
+        <p:txBody>
+          <a:bodyPr rtlCol="0" anchor="ctr"/>
+          <a:lstStyle/>
+          <a:p>
+            <a:pPr algn="ctr"/>
+            <a:endParaRPr lang="pt-BR" dirty="0">
+              <a:solidFill>
+                <a:schemeClr val="tx1"/>
+              </a:solidFill>
+            </a:endParaRPr>
+          </a:p>
+        </p:txBody>
+      </p:sp>
+      <p:pic>
+        <p:nvPicPr>
+          <p:cNvPr id="14" name="Imagem 13"/>
+          <p:cNvPicPr>
+            <a:picLocks noChangeAspect="1"/>
+          </p:cNvPicPr>
+          <p:nvPr/>
+        </p:nvPicPr>
+        <p:blipFill>
+          <a:blip r:embed="rId3" cstate="print">
+            <a:extLst>
+              <a:ext uri="{BEBA8EAE-BF5A-486C-A8C5-ECC9F3942E4B}">
+                <a14:imgProps xmlns:a14="http://schemas.microsoft.com/office/drawing/2010/main">
+                  <a14:imgLayer r:embed="rId4">
+                    <a14:imgEffect>
+                      <a14:backgroundRemoval t="9804" b="97168" l="9804" r="98475">
+                        <a14:foregroundMark x1="76688" y1="52070" x2="76688" y2="52070"/>
+                        <a14:foregroundMark x1="65577" y1="54466" x2="65577" y2="54466"/>
+                        <a14:foregroundMark x1="59477" y1="58170" x2="59477" y2="58170"/>
+                      </a14:backgroundRemoval>
+                    </a14:imgEffect>
+                  </a14:imgLayer>
+                </a14:imgProps>
+              </a:ext>
+              <a:ext uri="{28A0092B-C50C-407E-A947-70E740481C1C}">
+                <a14:useLocalDpi xmlns:a14="http://schemas.microsoft.com/office/drawing/2010/main" val="0"/>
+              </a:ext>
+            </a:extLst>
+          </a:blip>
+          <a:stretch>
+            <a:fillRect/>
+          </a:stretch>
+        </p:blipFill>
+        <p:spPr>
+          <a:xfrm>
+            <a:off x="7628046" y="437884"/>
+            <a:ext cx="1233133" cy="1233133"/>
+          </a:xfrm>
+          <a:prstGeom prst="rect">
+            <a:avLst/>
+          </a:prstGeom>
+        </p:spPr>
+      </p:pic>
+      <p:pic>
+        <p:nvPicPr>
+          <p:cNvPr id="15" name="Imagem 14"/>
+          <p:cNvPicPr>
+            <a:picLocks noChangeAspect="1"/>
+          </p:cNvPicPr>
+          <p:nvPr/>
+        </p:nvPicPr>
+        <p:blipFill>
+          <a:blip r:embed="rId5" cstate="print">
+            <a:duotone>
+              <a:schemeClr val="accent6">
+                <a:shade val="45000"/>
+                <a:satMod val="135000"/>
+              </a:schemeClr>
+              <a:prstClr val="white"/>
+            </a:duotone>
+            <a:extLst>
+              <a:ext uri="{28A0092B-C50C-407E-A947-70E740481C1C}">
+                <a14:useLocalDpi xmlns:a14="http://schemas.microsoft.com/office/drawing/2010/main" val="0"/>
+              </a:ext>
+            </a:extLst>
+          </a:blip>
+          <a:stretch>
+            <a:fillRect/>
+          </a:stretch>
+        </p:blipFill>
+        <p:spPr>
+          <a:xfrm>
+            <a:off x="9489432" y="847348"/>
+            <a:ext cx="393989" cy="357339"/>
+          </a:xfrm>
+          <a:prstGeom prst="rect">
+            <a:avLst/>
+          </a:prstGeom>
+        </p:spPr>
+      </p:pic>
+      <p:pic>
+        <p:nvPicPr>
+          <p:cNvPr id="18" name="Imagem 17"/>
+          <p:cNvPicPr>
+            <a:picLocks noChangeAspect="1"/>
+          </p:cNvPicPr>
+          <p:nvPr/>
+        </p:nvPicPr>
+        <p:blipFill>
+          <a:blip r:embed="rId6" cstate="print">
+            <a:duotone>
+              <a:schemeClr val="accent6">
+                <a:shade val="45000"/>
+                <a:satMod val="135000"/>
+              </a:schemeClr>
+              <a:prstClr val="white"/>
+            </a:duotone>
+            <a:extLst>
+              <a:ext uri="{28A0092B-C50C-407E-A947-70E740481C1C}">
+                <a14:useLocalDpi xmlns:a14="http://schemas.microsoft.com/office/drawing/2010/main" val="0"/>
+              </a:ext>
+            </a:extLst>
+          </a:blip>
+          <a:stretch>
+            <a:fillRect/>
+          </a:stretch>
+        </p:blipFill>
+        <p:spPr>
+          <a:xfrm>
+            <a:off x="8827734" y="822852"/>
+            <a:ext cx="546115" cy="359636"/>
+          </a:xfrm>
+          <a:prstGeom prst="rect">
+            <a:avLst/>
+          </a:prstGeom>
+        </p:spPr>
+      </p:pic>
     </p:spTree>
     <p:extLst>
       <p:ext uri="{BB962C8B-B14F-4D97-AF65-F5344CB8AC3E}">
@@ -4597,14 +5009,14 @@
             <p:ph idx="1"/>
             <p:extLst>
               <p:ext uri="{D42A27DB-BD31-4B8C-83A1-F6EECF244321}">
-                <p14:modId xmlns:p14="http://schemas.microsoft.com/office/powerpoint/2010/main" val="3587717150"/>
+                <p14:modId xmlns:p14="http://schemas.microsoft.com/office/powerpoint/2010/main" val="2793725866"/>
               </p:ext>
             </p:extLst>
           </p:nvPr>
         </p:nvGraphicFramePr>
         <p:xfrm>
-          <a:off x="838200" y="2250626"/>
-          <a:ext cx="7906556" cy="3006229"/>
+          <a:off x="1160171" y="1650686"/>
+          <a:ext cx="7906556" cy="4560709"/>
         </p:xfrm>
         <a:graphic>
           <a:graphicData uri="http://schemas.openxmlformats.org/drawingml/2006/table">
@@ -4971,10 +5383,250 @@
                   <a:tcPr/>
                 </a:tc>
               </a:tr>
+              <a:tr h="445909">
+                <a:tc>
+                  <a:txBody>
+                    <a:bodyPr/>
+                    <a:lstStyle/>
+                    <a:p>
+                      <a:r>
+                        <a:rPr lang="pt-BR" dirty="0" smtClean="0"/>
+                        <a:t>4</a:t>
+                      </a:r>
+                      <a:endParaRPr lang="pt-BR" dirty="0"/>
+                    </a:p>
+                  </a:txBody>
+                  <a:tcPr/>
+                </a:tc>
+                <a:tc>
+                  <a:txBody>
+                    <a:bodyPr/>
+                    <a:lstStyle/>
+                    <a:p>
+                      <a:endParaRPr lang="pt-BR" dirty="0"/>
+                    </a:p>
+                  </a:txBody>
+                  <a:tcPr/>
+                </a:tc>
+                <a:tc>
+                  <a:txBody>
+                    <a:bodyPr/>
+                    <a:lstStyle/>
+                    <a:p>
+                      <a:endParaRPr lang="pt-BR" dirty="0"/>
+                    </a:p>
+                  </a:txBody>
+                  <a:tcPr/>
+                </a:tc>
+                <a:tc>
+                  <a:txBody>
+                    <a:bodyPr/>
+                    <a:lstStyle/>
+                    <a:p>
+                      <a:r>
+                        <a:rPr lang="pt-BR" dirty="0" smtClean="0"/>
+                        <a:t>Botão</a:t>
+                      </a:r>
+                      <a:endParaRPr lang="pt-BR" dirty="0"/>
+                    </a:p>
+                  </a:txBody>
+                  <a:tcPr/>
+                </a:tc>
+                <a:tc>
+                  <a:txBody>
+                    <a:bodyPr/>
+                    <a:lstStyle/>
+                    <a:p>
+                      <a:pPr marL="0" marR="0" lvl="0" indent="0" algn="l" defTabSz="914400" rtl="0" eaLnBrk="1" fontAlgn="auto" latinLnBrk="0" hangingPunct="1">
+                        <a:lnSpc>
+                          <a:spcPct val="100000"/>
+                        </a:lnSpc>
+                        <a:spcBef>
+                          <a:spcPts val="0"/>
+                        </a:spcBef>
+                        <a:spcAft>
+                          <a:spcPts val="0"/>
+                        </a:spcAft>
+                        <a:buClrTx/>
+                        <a:buSzTx/>
+                        <a:buFontTx/>
+                        <a:buNone/>
+                        <a:tabLst/>
+                        <a:defRPr/>
+                      </a:pPr>
+                      <a:r>
+                        <a:rPr lang="pt-BR" dirty="0" smtClean="0"/>
+                        <a:t>Desliga/ Liga Efeitos Sonoros</a:t>
+                      </a:r>
+                    </a:p>
+                    <a:p>
+                      <a:endParaRPr lang="pt-BR" dirty="0"/>
+                    </a:p>
+                  </a:txBody>
+                  <a:tcPr/>
+                </a:tc>
+              </a:tr>
+              <a:tr h="445909">
+                <a:tc>
+                  <a:txBody>
+                    <a:bodyPr/>
+                    <a:lstStyle/>
+                    <a:p>
+                      <a:r>
+                        <a:rPr lang="pt-BR" dirty="0" smtClean="0"/>
+                        <a:t>5</a:t>
+                      </a:r>
+                      <a:endParaRPr lang="pt-BR" dirty="0"/>
+                    </a:p>
+                  </a:txBody>
+                  <a:tcPr/>
+                </a:tc>
+                <a:tc>
+                  <a:txBody>
+                    <a:bodyPr/>
+                    <a:lstStyle/>
+                    <a:p>
+                      <a:endParaRPr lang="pt-BR" dirty="0"/>
+                    </a:p>
+                  </a:txBody>
+                  <a:tcPr/>
+                </a:tc>
+                <a:tc>
+                  <a:txBody>
+                    <a:bodyPr/>
+                    <a:lstStyle/>
+                    <a:p>
+                      <a:endParaRPr lang="pt-BR" dirty="0"/>
+                    </a:p>
+                  </a:txBody>
+                  <a:tcPr/>
+                </a:tc>
+                <a:tc>
+                  <a:txBody>
+                    <a:bodyPr/>
+                    <a:lstStyle/>
+                    <a:p>
+                      <a:r>
+                        <a:rPr lang="pt-BR" dirty="0" smtClean="0"/>
+                        <a:t>Botão</a:t>
+                      </a:r>
+                      <a:endParaRPr lang="pt-BR" dirty="0"/>
+                    </a:p>
+                  </a:txBody>
+                  <a:tcPr/>
+                </a:tc>
+                <a:tc>
+                  <a:txBody>
+                    <a:bodyPr/>
+                    <a:lstStyle/>
+                    <a:p>
+                      <a:pPr marL="0" marR="0" lvl="0" indent="0" algn="l" defTabSz="914400" rtl="0" eaLnBrk="1" fontAlgn="auto" latinLnBrk="0" hangingPunct="1">
+                        <a:lnSpc>
+                          <a:spcPct val="100000"/>
+                        </a:lnSpc>
+                        <a:spcBef>
+                          <a:spcPts val="0"/>
+                        </a:spcBef>
+                        <a:spcAft>
+                          <a:spcPts val="0"/>
+                        </a:spcAft>
+                        <a:buClrTx/>
+                        <a:buSzTx/>
+                        <a:buFontTx/>
+                        <a:buNone/>
+                        <a:tabLst/>
+                        <a:defRPr/>
+                      </a:pPr>
+                      <a:r>
+                        <a:rPr lang="pt-BR" dirty="0" smtClean="0"/>
+                        <a:t>Desliga/ Liga Musica</a:t>
+                      </a:r>
+                    </a:p>
+                    <a:p>
+                      <a:endParaRPr lang="pt-BR" dirty="0"/>
+                    </a:p>
+                  </a:txBody>
+                  <a:tcPr/>
+                </a:tc>
+              </a:tr>
             </a:tbl>
           </a:graphicData>
         </a:graphic>
       </p:graphicFrame>
+      <p:pic>
+        <p:nvPicPr>
+          <p:cNvPr id="5" name="Imagem 4"/>
+          <p:cNvPicPr>
+            <a:picLocks noChangeAspect="1"/>
+          </p:cNvPicPr>
+          <p:nvPr/>
+        </p:nvPicPr>
+        <p:blipFill>
+          <a:blip r:embed="rId2" cstate="print">
+            <a:duotone>
+              <a:schemeClr val="accent6">
+                <a:shade val="45000"/>
+                <a:satMod val="135000"/>
+              </a:schemeClr>
+              <a:prstClr val="white"/>
+            </a:duotone>
+            <a:extLst>
+              <a:ext uri="{28A0092B-C50C-407E-A947-70E740481C1C}">
+                <a14:useLocalDpi xmlns:a14="http://schemas.microsoft.com/office/drawing/2010/main" val="0"/>
+              </a:ext>
+            </a:extLst>
+          </a:blip>
+          <a:stretch>
+            <a:fillRect/>
+          </a:stretch>
+        </p:blipFill>
+        <p:spPr>
+          <a:xfrm>
+            <a:off x="1926048" y="4841061"/>
+            <a:ext cx="546115" cy="359636"/>
+          </a:xfrm>
+          <a:prstGeom prst="rect">
+            <a:avLst/>
+          </a:prstGeom>
+        </p:spPr>
+      </p:pic>
+      <p:pic>
+        <p:nvPicPr>
+          <p:cNvPr id="6" name="Imagem 5"/>
+          <p:cNvPicPr>
+            <a:picLocks noChangeAspect="1"/>
+          </p:cNvPicPr>
+          <p:nvPr/>
+        </p:nvPicPr>
+        <p:blipFill>
+          <a:blip r:embed="rId3" cstate="print">
+            <a:duotone>
+              <a:schemeClr val="accent6">
+                <a:shade val="45000"/>
+                <a:satMod val="135000"/>
+              </a:schemeClr>
+              <a:prstClr val="white"/>
+            </a:duotone>
+            <a:extLst>
+              <a:ext uri="{28A0092B-C50C-407E-A947-70E740481C1C}">
+                <a14:useLocalDpi xmlns:a14="http://schemas.microsoft.com/office/drawing/2010/main" val="0"/>
+              </a:ext>
+            </a:extLst>
+          </a:blip>
+          <a:stretch>
+            <a:fillRect/>
+          </a:stretch>
+        </p:blipFill>
+        <p:spPr>
+          <a:xfrm>
+            <a:off x="2002110" y="5683362"/>
+            <a:ext cx="393989" cy="357339"/>
+          </a:xfrm>
+          <a:prstGeom prst="rect">
+            <a:avLst/>
+          </a:prstGeom>
+        </p:spPr>
+      </p:pic>
     </p:spTree>
     <p:extLst>
       <p:ext uri="{BB962C8B-B14F-4D97-AF65-F5344CB8AC3E}">
@@ -5759,6 +6411,180 @@
           </a:p>
         </p:txBody>
       </p:sp>
+      <p:sp>
+        <p:nvSpPr>
+          <p:cNvPr id="25" name="Retângulo de cantos arredondados 24"/>
+          <p:cNvSpPr/>
+          <p:nvPr/>
+        </p:nvSpPr>
+        <p:spPr>
+          <a:xfrm>
+            <a:off x="8031107" y="749493"/>
+            <a:ext cx="2053206" cy="455194"/>
+          </a:xfrm>
+          <a:prstGeom prst="roundRect">
+            <a:avLst/>
+          </a:prstGeom>
+          <a:solidFill>
+            <a:srgbClr val="FDEBC7"/>
+          </a:solidFill>
+          <a:ln>
+            <a:noFill/>
+          </a:ln>
+          <a:effectLst>
+            <a:outerShdw blurRad="50800" dist="38100" dir="2700000" algn="tl" rotWithShape="0">
+              <a:prstClr val="black">
+                <a:alpha val="40000"/>
+              </a:prstClr>
+            </a:outerShdw>
+          </a:effectLst>
+        </p:spPr>
+        <p:style>
+          <a:lnRef idx="2">
+            <a:schemeClr val="accent1">
+              <a:shade val="50000"/>
+            </a:schemeClr>
+          </a:lnRef>
+          <a:fillRef idx="1">
+            <a:schemeClr val="accent1"/>
+          </a:fillRef>
+          <a:effectRef idx="0">
+            <a:schemeClr val="accent1"/>
+          </a:effectRef>
+          <a:fontRef idx="minor">
+            <a:schemeClr val="lt1"/>
+          </a:fontRef>
+        </p:style>
+        <p:txBody>
+          <a:bodyPr rtlCol="0" anchor="ctr"/>
+          <a:lstStyle/>
+          <a:p>
+            <a:pPr algn="ctr"/>
+            <a:endParaRPr lang="pt-BR" dirty="0">
+              <a:solidFill>
+                <a:schemeClr val="tx1"/>
+              </a:solidFill>
+            </a:endParaRPr>
+          </a:p>
+        </p:txBody>
+      </p:sp>
+      <p:pic>
+        <p:nvPicPr>
+          <p:cNvPr id="26" name="Imagem 25"/>
+          <p:cNvPicPr>
+            <a:picLocks noChangeAspect="1"/>
+          </p:cNvPicPr>
+          <p:nvPr/>
+        </p:nvPicPr>
+        <p:blipFill>
+          <a:blip r:embed="rId3" cstate="print">
+            <a:extLst>
+              <a:ext uri="{BEBA8EAE-BF5A-486C-A8C5-ECC9F3942E4B}">
+                <a14:imgProps xmlns:a14="http://schemas.microsoft.com/office/drawing/2010/main">
+                  <a14:imgLayer r:embed="rId4">
+                    <a14:imgEffect>
+                      <a14:backgroundRemoval t="9804" b="97168" l="9804" r="98475">
+                        <a14:foregroundMark x1="76688" y1="52070" x2="76688" y2="52070"/>
+                        <a14:foregroundMark x1="65577" y1="54466" x2="65577" y2="54466"/>
+                        <a14:foregroundMark x1="59477" y1="58170" x2="59477" y2="58170"/>
+                      </a14:backgroundRemoval>
+                    </a14:imgEffect>
+                  </a14:imgLayer>
+                </a14:imgProps>
+              </a:ext>
+              <a:ext uri="{28A0092B-C50C-407E-A947-70E740481C1C}">
+                <a14:useLocalDpi xmlns:a14="http://schemas.microsoft.com/office/drawing/2010/main" val="0"/>
+              </a:ext>
+            </a:extLst>
+          </a:blip>
+          <a:stretch>
+            <a:fillRect/>
+          </a:stretch>
+        </p:blipFill>
+        <p:spPr>
+          <a:xfrm>
+            <a:off x="7628046" y="437884"/>
+            <a:ext cx="1233133" cy="1233133"/>
+          </a:xfrm>
+          <a:prstGeom prst="rect">
+            <a:avLst/>
+          </a:prstGeom>
+        </p:spPr>
+      </p:pic>
+      <p:pic>
+        <p:nvPicPr>
+          <p:cNvPr id="27" name="Imagem 26"/>
+          <p:cNvPicPr>
+            <a:picLocks noChangeAspect="1"/>
+          </p:cNvPicPr>
+          <p:nvPr/>
+        </p:nvPicPr>
+        <p:blipFill>
+          <a:blip r:embed="rId5" cstate="print">
+            <a:duotone>
+              <a:schemeClr val="accent6">
+                <a:shade val="45000"/>
+                <a:satMod val="135000"/>
+              </a:schemeClr>
+              <a:prstClr val="white"/>
+            </a:duotone>
+            <a:extLst>
+              <a:ext uri="{28A0092B-C50C-407E-A947-70E740481C1C}">
+                <a14:useLocalDpi xmlns:a14="http://schemas.microsoft.com/office/drawing/2010/main" val="0"/>
+              </a:ext>
+            </a:extLst>
+          </a:blip>
+          <a:stretch>
+            <a:fillRect/>
+          </a:stretch>
+        </p:blipFill>
+        <p:spPr>
+          <a:xfrm>
+            <a:off x="9489432" y="847348"/>
+            <a:ext cx="393989" cy="357339"/>
+          </a:xfrm>
+          <a:prstGeom prst="rect">
+            <a:avLst/>
+          </a:prstGeom>
+        </p:spPr>
+      </p:pic>
+      <p:pic>
+        <p:nvPicPr>
+          <p:cNvPr id="28" name="Imagem 27"/>
+          <p:cNvPicPr>
+            <a:picLocks noChangeAspect="1"/>
+          </p:cNvPicPr>
+          <p:nvPr/>
+        </p:nvPicPr>
+        <p:blipFill>
+          <a:blip r:embed="rId6" cstate="print">
+            <a:duotone>
+              <a:schemeClr val="accent6">
+                <a:shade val="45000"/>
+                <a:satMod val="135000"/>
+              </a:schemeClr>
+              <a:prstClr val="white"/>
+            </a:duotone>
+            <a:extLst>
+              <a:ext uri="{28A0092B-C50C-407E-A947-70E740481C1C}">
+                <a14:useLocalDpi xmlns:a14="http://schemas.microsoft.com/office/drawing/2010/main" val="0"/>
+              </a:ext>
+            </a:extLst>
+          </a:blip>
+          <a:stretch>
+            <a:fillRect/>
+          </a:stretch>
+        </p:blipFill>
+        <p:spPr>
+          <a:xfrm>
+            <a:off x="8827734" y="822852"/>
+            <a:ext cx="546115" cy="359636"/>
+          </a:xfrm>
+          <a:prstGeom prst="rect">
+            <a:avLst/>
+          </a:prstGeom>
+        </p:spPr>
+      </p:pic>
     </p:spTree>
     <p:extLst>
       <p:ext uri="{BB962C8B-B14F-4D97-AF65-F5344CB8AC3E}">
@@ -6886,6 +7712,180 @@
           </a:p>
         </p:txBody>
       </p:sp>
+      <p:sp>
+        <p:nvSpPr>
+          <p:cNvPr id="27" name="Retângulo de cantos arredondados 26"/>
+          <p:cNvSpPr/>
+          <p:nvPr/>
+        </p:nvSpPr>
+        <p:spPr>
+          <a:xfrm>
+            <a:off x="8031107" y="749493"/>
+            <a:ext cx="2053206" cy="455194"/>
+          </a:xfrm>
+          <a:prstGeom prst="roundRect">
+            <a:avLst/>
+          </a:prstGeom>
+          <a:solidFill>
+            <a:srgbClr val="FDEBC7"/>
+          </a:solidFill>
+          <a:ln>
+            <a:noFill/>
+          </a:ln>
+          <a:effectLst>
+            <a:outerShdw blurRad="50800" dist="38100" dir="2700000" algn="tl" rotWithShape="0">
+              <a:prstClr val="black">
+                <a:alpha val="40000"/>
+              </a:prstClr>
+            </a:outerShdw>
+          </a:effectLst>
+        </p:spPr>
+        <p:style>
+          <a:lnRef idx="2">
+            <a:schemeClr val="accent1">
+              <a:shade val="50000"/>
+            </a:schemeClr>
+          </a:lnRef>
+          <a:fillRef idx="1">
+            <a:schemeClr val="accent1"/>
+          </a:fillRef>
+          <a:effectRef idx="0">
+            <a:schemeClr val="accent1"/>
+          </a:effectRef>
+          <a:fontRef idx="minor">
+            <a:schemeClr val="lt1"/>
+          </a:fontRef>
+        </p:style>
+        <p:txBody>
+          <a:bodyPr rtlCol="0" anchor="ctr"/>
+          <a:lstStyle/>
+          <a:p>
+            <a:pPr algn="ctr"/>
+            <a:endParaRPr lang="pt-BR" dirty="0">
+              <a:solidFill>
+                <a:schemeClr val="tx1"/>
+              </a:solidFill>
+            </a:endParaRPr>
+          </a:p>
+        </p:txBody>
+      </p:sp>
+      <p:pic>
+        <p:nvPicPr>
+          <p:cNvPr id="28" name="Imagem 27"/>
+          <p:cNvPicPr>
+            <a:picLocks noChangeAspect="1"/>
+          </p:cNvPicPr>
+          <p:nvPr/>
+        </p:nvPicPr>
+        <p:blipFill>
+          <a:blip r:embed="rId3" cstate="print">
+            <a:extLst>
+              <a:ext uri="{BEBA8EAE-BF5A-486C-A8C5-ECC9F3942E4B}">
+                <a14:imgProps xmlns:a14="http://schemas.microsoft.com/office/drawing/2010/main">
+                  <a14:imgLayer r:embed="rId4">
+                    <a14:imgEffect>
+                      <a14:backgroundRemoval t="9804" b="97168" l="9804" r="98475">
+                        <a14:foregroundMark x1="76688" y1="52070" x2="76688" y2="52070"/>
+                        <a14:foregroundMark x1="65577" y1="54466" x2="65577" y2="54466"/>
+                        <a14:foregroundMark x1="59477" y1="58170" x2="59477" y2="58170"/>
+                      </a14:backgroundRemoval>
+                    </a14:imgEffect>
+                  </a14:imgLayer>
+                </a14:imgProps>
+              </a:ext>
+              <a:ext uri="{28A0092B-C50C-407E-A947-70E740481C1C}">
+                <a14:useLocalDpi xmlns:a14="http://schemas.microsoft.com/office/drawing/2010/main" val="0"/>
+              </a:ext>
+            </a:extLst>
+          </a:blip>
+          <a:stretch>
+            <a:fillRect/>
+          </a:stretch>
+        </p:blipFill>
+        <p:spPr>
+          <a:xfrm>
+            <a:off x="7628046" y="437884"/>
+            <a:ext cx="1233133" cy="1233133"/>
+          </a:xfrm>
+          <a:prstGeom prst="rect">
+            <a:avLst/>
+          </a:prstGeom>
+        </p:spPr>
+      </p:pic>
+      <p:pic>
+        <p:nvPicPr>
+          <p:cNvPr id="29" name="Imagem 28"/>
+          <p:cNvPicPr>
+            <a:picLocks noChangeAspect="1"/>
+          </p:cNvPicPr>
+          <p:nvPr/>
+        </p:nvPicPr>
+        <p:blipFill>
+          <a:blip r:embed="rId5" cstate="print">
+            <a:duotone>
+              <a:schemeClr val="accent6">
+                <a:shade val="45000"/>
+                <a:satMod val="135000"/>
+              </a:schemeClr>
+              <a:prstClr val="white"/>
+            </a:duotone>
+            <a:extLst>
+              <a:ext uri="{28A0092B-C50C-407E-A947-70E740481C1C}">
+                <a14:useLocalDpi xmlns:a14="http://schemas.microsoft.com/office/drawing/2010/main" val="0"/>
+              </a:ext>
+            </a:extLst>
+          </a:blip>
+          <a:stretch>
+            <a:fillRect/>
+          </a:stretch>
+        </p:blipFill>
+        <p:spPr>
+          <a:xfrm>
+            <a:off x="9489432" y="847348"/>
+            <a:ext cx="393989" cy="357339"/>
+          </a:xfrm>
+          <a:prstGeom prst="rect">
+            <a:avLst/>
+          </a:prstGeom>
+        </p:spPr>
+      </p:pic>
+      <p:pic>
+        <p:nvPicPr>
+          <p:cNvPr id="30" name="Imagem 29"/>
+          <p:cNvPicPr>
+            <a:picLocks noChangeAspect="1"/>
+          </p:cNvPicPr>
+          <p:nvPr/>
+        </p:nvPicPr>
+        <p:blipFill>
+          <a:blip r:embed="rId6" cstate="print">
+            <a:duotone>
+              <a:schemeClr val="accent6">
+                <a:shade val="45000"/>
+                <a:satMod val="135000"/>
+              </a:schemeClr>
+              <a:prstClr val="white"/>
+            </a:duotone>
+            <a:extLst>
+              <a:ext uri="{28A0092B-C50C-407E-A947-70E740481C1C}">
+                <a14:useLocalDpi xmlns:a14="http://schemas.microsoft.com/office/drawing/2010/main" val="0"/>
+              </a:ext>
+            </a:extLst>
+          </a:blip>
+          <a:stretch>
+            <a:fillRect/>
+          </a:stretch>
+        </p:blipFill>
+        <p:spPr>
+          <a:xfrm>
+            <a:off x="8827734" y="822852"/>
+            <a:ext cx="546115" cy="359636"/>
+          </a:xfrm>
+          <a:prstGeom prst="rect">
+            <a:avLst/>
+          </a:prstGeom>
+        </p:spPr>
+      </p:pic>
     </p:spTree>
     <p:extLst>
       <p:ext uri="{BB962C8B-B14F-4D97-AF65-F5344CB8AC3E}">
@@ -28613,6 +29613,180 @@
           </a:p>
         </p:txBody>
       </p:sp>
+      <p:sp>
+        <p:nvSpPr>
+          <p:cNvPr id="13" name="Retângulo de cantos arredondados 12"/>
+          <p:cNvSpPr/>
+          <p:nvPr/>
+        </p:nvSpPr>
+        <p:spPr>
+          <a:xfrm>
+            <a:off x="8031107" y="749493"/>
+            <a:ext cx="2053206" cy="455194"/>
+          </a:xfrm>
+          <a:prstGeom prst="roundRect">
+            <a:avLst/>
+          </a:prstGeom>
+          <a:solidFill>
+            <a:srgbClr val="FDEBC7"/>
+          </a:solidFill>
+          <a:ln>
+            <a:noFill/>
+          </a:ln>
+          <a:effectLst>
+            <a:outerShdw blurRad="50800" dist="38100" dir="2700000" algn="tl" rotWithShape="0">
+              <a:prstClr val="black">
+                <a:alpha val="40000"/>
+              </a:prstClr>
+            </a:outerShdw>
+          </a:effectLst>
+        </p:spPr>
+        <p:style>
+          <a:lnRef idx="2">
+            <a:schemeClr val="accent1">
+              <a:shade val="50000"/>
+            </a:schemeClr>
+          </a:lnRef>
+          <a:fillRef idx="1">
+            <a:schemeClr val="accent1"/>
+          </a:fillRef>
+          <a:effectRef idx="0">
+            <a:schemeClr val="accent1"/>
+          </a:effectRef>
+          <a:fontRef idx="minor">
+            <a:schemeClr val="lt1"/>
+          </a:fontRef>
+        </p:style>
+        <p:txBody>
+          <a:bodyPr rtlCol="0" anchor="ctr"/>
+          <a:lstStyle/>
+          <a:p>
+            <a:pPr algn="ctr"/>
+            <a:endParaRPr lang="pt-BR" dirty="0">
+              <a:solidFill>
+                <a:schemeClr val="tx1"/>
+              </a:solidFill>
+            </a:endParaRPr>
+          </a:p>
+        </p:txBody>
+      </p:sp>
+      <p:pic>
+        <p:nvPicPr>
+          <p:cNvPr id="3" name="Imagem 2"/>
+          <p:cNvPicPr>
+            <a:picLocks noChangeAspect="1"/>
+          </p:cNvPicPr>
+          <p:nvPr/>
+        </p:nvPicPr>
+        <p:blipFill>
+          <a:blip r:embed="rId3" cstate="print">
+            <a:extLst>
+              <a:ext uri="{BEBA8EAE-BF5A-486C-A8C5-ECC9F3942E4B}">
+                <a14:imgProps xmlns:a14="http://schemas.microsoft.com/office/drawing/2010/main">
+                  <a14:imgLayer r:embed="rId4">
+                    <a14:imgEffect>
+                      <a14:backgroundRemoval t="9804" b="97168" l="9804" r="98475">
+                        <a14:foregroundMark x1="76688" y1="52070" x2="76688" y2="52070"/>
+                        <a14:foregroundMark x1="65577" y1="54466" x2="65577" y2="54466"/>
+                        <a14:foregroundMark x1="59477" y1="58170" x2="59477" y2="58170"/>
+                      </a14:backgroundRemoval>
+                    </a14:imgEffect>
+                  </a14:imgLayer>
+                </a14:imgProps>
+              </a:ext>
+              <a:ext uri="{28A0092B-C50C-407E-A947-70E740481C1C}">
+                <a14:useLocalDpi xmlns:a14="http://schemas.microsoft.com/office/drawing/2010/main" val="0"/>
+              </a:ext>
+            </a:extLst>
+          </a:blip>
+          <a:stretch>
+            <a:fillRect/>
+          </a:stretch>
+        </p:blipFill>
+        <p:spPr>
+          <a:xfrm>
+            <a:off x="7628046" y="437884"/>
+            <a:ext cx="1233133" cy="1233133"/>
+          </a:xfrm>
+          <a:prstGeom prst="rect">
+            <a:avLst/>
+          </a:prstGeom>
+        </p:spPr>
+      </p:pic>
+      <p:pic>
+        <p:nvPicPr>
+          <p:cNvPr id="5" name="Imagem 4"/>
+          <p:cNvPicPr>
+            <a:picLocks noChangeAspect="1"/>
+          </p:cNvPicPr>
+          <p:nvPr/>
+        </p:nvPicPr>
+        <p:blipFill>
+          <a:blip r:embed="rId5" cstate="print">
+            <a:duotone>
+              <a:schemeClr val="accent6">
+                <a:shade val="45000"/>
+                <a:satMod val="135000"/>
+              </a:schemeClr>
+              <a:prstClr val="white"/>
+            </a:duotone>
+            <a:extLst>
+              <a:ext uri="{28A0092B-C50C-407E-A947-70E740481C1C}">
+                <a14:useLocalDpi xmlns:a14="http://schemas.microsoft.com/office/drawing/2010/main" val="0"/>
+              </a:ext>
+            </a:extLst>
+          </a:blip>
+          <a:stretch>
+            <a:fillRect/>
+          </a:stretch>
+        </p:blipFill>
+        <p:spPr>
+          <a:xfrm>
+            <a:off x="9489432" y="847348"/>
+            <a:ext cx="393989" cy="357339"/>
+          </a:xfrm>
+          <a:prstGeom prst="rect">
+            <a:avLst/>
+          </a:prstGeom>
+        </p:spPr>
+      </p:pic>
+      <p:pic>
+        <p:nvPicPr>
+          <p:cNvPr id="6" name="Imagem 5"/>
+          <p:cNvPicPr>
+            <a:picLocks noChangeAspect="1"/>
+          </p:cNvPicPr>
+          <p:nvPr/>
+        </p:nvPicPr>
+        <p:blipFill>
+          <a:blip r:embed="rId6" cstate="print">
+            <a:duotone>
+              <a:schemeClr val="accent6">
+                <a:shade val="45000"/>
+                <a:satMod val="135000"/>
+              </a:schemeClr>
+              <a:prstClr val="white"/>
+            </a:duotone>
+            <a:extLst>
+              <a:ext uri="{28A0092B-C50C-407E-A947-70E740481C1C}">
+                <a14:useLocalDpi xmlns:a14="http://schemas.microsoft.com/office/drawing/2010/main" val="0"/>
+              </a:ext>
+            </a:extLst>
+          </a:blip>
+          <a:stretch>
+            <a:fillRect/>
+          </a:stretch>
+        </p:blipFill>
+        <p:spPr>
+          <a:xfrm>
+            <a:off x="8827734" y="822852"/>
+            <a:ext cx="546115" cy="359636"/>
+          </a:xfrm>
+          <a:prstGeom prst="rect">
+            <a:avLst/>
+          </a:prstGeom>
+        </p:spPr>
+      </p:pic>
     </p:spTree>
     <p:extLst>
       <p:ext uri="{BB962C8B-B14F-4D97-AF65-F5344CB8AC3E}">

</xml_diff>

<commit_message>
tela de jogo do memória
</commit_message>
<xml_diff>
--- a/DocumentacaoProjeto/Protótipo_Visual.pptx
+++ b/DocumentacaoProjeto/Protótipo_Visual.pptx
@@ -32,15 +32,16 @@
     <p:sldId id="268" r:id="rId26"/>
     <p:sldId id="287" r:id="rId27"/>
     <p:sldId id="261" r:id="rId28"/>
-    <p:sldId id="288" r:id="rId29"/>
-    <p:sldId id="262" r:id="rId30"/>
-    <p:sldId id="289" r:id="rId31"/>
-    <p:sldId id="263" r:id="rId32"/>
-    <p:sldId id="269" r:id="rId33"/>
-    <p:sldId id="273" r:id="rId34"/>
-    <p:sldId id="290" r:id="rId35"/>
-    <p:sldId id="274" r:id="rId36"/>
-    <p:sldId id="291" r:id="rId37"/>
+    <p:sldId id="292" r:id="rId29"/>
+    <p:sldId id="288" r:id="rId30"/>
+    <p:sldId id="262" r:id="rId31"/>
+    <p:sldId id="289" r:id="rId32"/>
+    <p:sldId id="263" r:id="rId33"/>
+    <p:sldId id="269" r:id="rId34"/>
+    <p:sldId id="273" r:id="rId35"/>
+    <p:sldId id="290" r:id="rId36"/>
+    <p:sldId id="274" r:id="rId37"/>
+    <p:sldId id="291" r:id="rId38"/>
   </p:sldIdLst>
   <p:sldSz cx="12192000" cy="6858000"/>
   <p:notesSz cx="6858000" cy="9144000"/>
@@ -19261,6 +19262,2803 @@
       </p:grpSpPr>
       <p:sp>
         <p:nvSpPr>
+          <p:cNvPr id="4" name="Retângulo 3"/>
+          <p:cNvSpPr/>
+          <p:nvPr/>
+        </p:nvSpPr>
+        <p:spPr>
+          <a:xfrm>
+            <a:off x="1146749" y="441822"/>
+            <a:ext cx="9787944" cy="5911402"/>
+          </a:xfrm>
+          <a:prstGeom prst="rect">
+            <a:avLst/>
+          </a:prstGeom>
+          <a:solidFill>
+            <a:srgbClr val="A5CA97"/>
+          </a:solidFill>
+          <a:ln>
+            <a:solidFill>
+              <a:schemeClr val="accent6">
+                <a:lumMod val="60000"/>
+                <a:lumOff val="40000"/>
+              </a:schemeClr>
+            </a:solidFill>
+          </a:ln>
+          <a:effectLst/>
+        </p:spPr>
+        <p:style>
+          <a:lnRef idx="2">
+            <a:schemeClr val="accent1">
+              <a:shade val="50000"/>
+            </a:schemeClr>
+          </a:lnRef>
+          <a:fillRef idx="1">
+            <a:schemeClr val="accent1"/>
+          </a:fillRef>
+          <a:effectRef idx="0">
+            <a:schemeClr val="accent1"/>
+          </a:effectRef>
+          <a:fontRef idx="minor">
+            <a:schemeClr val="lt1"/>
+          </a:fontRef>
+        </p:style>
+        <p:txBody>
+          <a:bodyPr rtlCol="0" anchor="ctr"/>
+          <a:lstStyle/>
+          <a:p>
+            <a:pPr algn="ctr"/>
+            <a:endParaRPr lang="pt-BR"/>
+          </a:p>
+        </p:txBody>
+      </p:sp>
+      <p:grpSp>
+        <p:nvGrpSpPr>
+          <p:cNvPr id="5" name="Grupo 4"/>
+          <p:cNvGrpSpPr/>
+          <p:nvPr/>
+        </p:nvGrpSpPr>
+        <p:grpSpPr>
+          <a:xfrm>
+            <a:off x="1287887" y="1485501"/>
+            <a:ext cx="9530367" cy="3854800"/>
+            <a:chOff x="3303102" y="1578846"/>
+            <a:chExt cx="7132734" cy="4364070"/>
+          </a:xfrm>
+        </p:grpSpPr>
+        <p:sp>
+          <p:nvSpPr>
+            <p:cNvPr id="2" name="Retângulo 1"/>
+            <p:cNvSpPr/>
+            <p:nvPr/>
+          </p:nvSpPr>
+          <p:spPr>
+            <a:xfrm>
+              <a:off x="3303102" y="1578846"/>
+              <a:ext cx="7132734" cy="4364070"/>
+            </a:xfrm>
+            <a:prstGeom prst="rect">
+              <a:avLst/>
+            </a:prstGeom>
+            <a:solidFill>
+              <a:srgbClr val="8DBA62"/>
+            </a:solidFill>
+            <a:ln>
+              <a:noFill/>
+            </a:ln>
+          </p:spPr>
+          <p:style>
+            <a:lnRef idx="2">
+              <a:schemeClr val="accent1">
+                <a:shade val="50000"/>
+              </a:schemeClr>
+            </a:lnRef>
+            <a:fillRef idx="1">
+              <a:schemeClr val="accent1"/>
+            </a:fillRef>
+            <a:effectRef idx="0">
+              <a:schemeClr val="accent1"/>
+            </a:effectRef>
+            <a:fontRef idx="minor">
+              <a:schemeClr val="lt1"/>
+            </a:fontRef>
+          </p:style>
+          <p:txBody>
+            <a:bodyPr rtlCol="0" anchor="ctr"/>
+            <a:lstStyle/>
+            <a:p>
+              <a:pPr algn="ctr"/>
+              <a:endParaRPr lang="pt-BR"/>
+            </a:p>
+          </p:txBody>
+        </p:sp>
+        <p:sp>
+          <p:nvSpPr>
+            <p:cNvPr id="16" name="Retângulo de cantos arredondados 15"/>
+            <p:cNvSpPr/>
+            <p:nvPr/>
+          </p:nvSpPr>
+          <p:spPr>
+            <a:xfrm>
+              <a:off x="3400023" y="1674254"/>
+              <a:ext cx="6941711" cy="4172754"/>
+            </a:xfrm>
+            <a:prstGeom prst="roundRect">
+              <a:avLst>
+                <a:gd name="adj" fmla="val 0"/>
+              </a:avLst>
+            </a:prstGeom>
+            <a:blipFill>
+              <a:blip r:embed="rId2"/>
+              <a:tile tx="0" ty="0" sx="100000" sy="100000" flip="none" algn="tl"/>
+            </a:blipFill>
+            <a:ln>
+              <a:noFill/>
+            </a:ln>
+          </p:spPr>
+          <p:style>
+            <a:lnRef idx="2">
+              <a:schemeClr val="accent6"/>
+            </a:lnRef>
+            <a:fillRef idx="1">
+              <a:schemeClr val="lt1"/>
+            </a:fillRef>
+            <a:effectRef idx="0">
+              <a:schemeClr val="accent6"/>
+            </a:effectRef>
+            <a:fontRef idx="minor">
+              <a:schemeClr val="dk1"/>
+            </a:fontRef>
+          </p:style>
+          <p:txBody>
+            <a:bodyPr rtlCol="0" anchor="ctr"/>
+            <a:lstStyle/>
+            <a:p>
+              <a:pPr algn="ctr"/>
+              <a:endParaRPr lang="pt-BR"/>
+            </a:p>
+          </p:txBody>
+        </p:sp>
+      </p:grpSp>
+      <p:sp>
+        <p:nvSpPr>
+          <p:cNvPr id="15" name="Retângulo 14"/>
+          <p:cNvSpPr/>
+          <p:nvPr/>
+        </p:nvSpPr>
+        <p:spPr>
+          <a:xfrm>
+            <a:off x="1146749" y="445761"/>
+            <a:ext cx="9787944" cy="764853"/>
+          </a:xfrm>
+          <a:prstGeom prst="rect">
+            <a:avLst/>
+          </a:prstGeom>
+          <a:solidFill>
+            <a:srgbClr val="8DBA62"/>
+          </a:solidFill>
+          <a:ln>
+            <a:noFill/>
+          </a:ln>
+        </p:spPr>
+        <p:style>
+          <a:lnRef idx="2">
+            <a:schemeClr val="accent1">
+              <a:shade val="50000"/>
+            </a:schemeClr>
+          </a:lnRef>
+          <a:fillRef idx="1">
+            <a:schemeClr val="accent1"/>
+          </a:fillRef>
+          <a:effectRef idx="0">
+            <a:schemeClr val="accent1"/>
+          </a:effectRef>
+          <a:fontRef idx="minor">
+            <a:schemeClr val="lt1"/>
+          </a:fontRef>
+        </p:style>
+        <p:txBody>
+          <a:bodyPr rtlCol="0" anchor="ctr"/>
+          <a:lstStyle/>
+          <a:p>
+            <a:pPr algn="ctr"/>
+            <a:endParaRPr lang="pt-BR"/>
+          </a:p>
+        </p:txBody>
+      </p:sp>
+      <p:sp>
+        <p:nvSpPr>
+          <p:cNvPr id="18" name="Retângulo 17"/>
+          <p:cNvSpPr/>
+          <p:nvPr/>
+        </p:nvSpPr>
+        <p:spPr>
+          <a:xfrm>
+            <a:off x="1146749" y="5640946"/>
+            <a:ext cx="9787944" cy="712278"/>
+          </a:xfrm>
+          <a:prstGeom prst="rect">
+            <a:avLst/>
+          </a:prstGeom>
+          <a:solidFill>
+            <a:srgbClr val="8DBA62"/>
+          </a:solidFill>
+          <a:ln>
+            <a:noFill/>
+          </a:ln>
+        </p:spPr>
+        <p:style>
+          <a:lnRef idx="2">
+            <a:schemeClr val="accent1">
+              <a:shade val="50000"/>
+            </a:schemeClr>
+          </a:lnRef>
+          <a:fillRef idx="1">
+            <a:schemeClr val="accent1"/>
+          </a:fillRef>
+          <a:effectRef idx="0">
+            <a:schemeClr val="accent1"/>
+          </a:effectRef>
+          <a:fontRef idx="minor">
+            <a:schemeClr val="lt1"/>
+          </a:fontRef>
+        </p:style>
+        <p:txBody>
+          <a:bodyPr rtlCol="0" anchor="ctr"/>
+          <a:lstStyle/>
+          <a:p>
+            <a:pPr algn="ctr"/>
+            <a:endParaRPr lang="pt-BR"/>
+          </a:p>
+        </p:txBody>
+      </p:sp>
+      <p:sp>
+        <p:nvSpPr>
+          <p:cNvPr id="24" name="Retângulo de cantos arredondados 23"/>
+          <p:cNvSpPr/>
+          <p:nvPr/>
+        </p:nvSpPr>
+        <p:spPr>
+          <a:xfrm>
+            <a:off x="1930424" y="728000"/>
+            <a:ext cx="1290702" cy="301406"/>
+          </a:xfrm>
+          <a:prstGeom prst="roundRect">
+            <a:avLst/>
+          </a:prstGeom>
+          <a:solidFill>
+            <a:srgbClr val="FDEBC7"/>
+          </a:solidFill>
+          <a:ln>
+            <a:noFill/>
+          </a:ln>
+          <a:effectLst>
+            <a:outerShdw blurRad="50800" dist="38100" dir="2700000" algn="tl" rotWithShape="0">
+              <a:prstClr val="black">
+                <a:alpha val="40000"/>
+              </a:prstClr>
+            </a:outerShdw>
+          </a:effectLst>
+        </p:spPr>
+        <p:style>
+          <a:lnRef idx="2">
+            <a:schemeClr val="accent1">
+              <a:shade val="50000"/>
+            </a:schemeClr>
+          </a:lnRef>
+          <a:fillRef idx="1">
+            <a:schemeClr val="accent1"/>
+          </a:fillRef>
+          <a:effectRef idx="0">
+            <a:schemeClr val="accent1"/>
+          </a:effectRef>
+          <a:fontRef idx="minor">
+            <a:schemeClr val="lt1"/>
+          </a:fontRef>
+        </p:style>
+        <p:txBody>
+          <a:bodyPr rtlCol="0" anchor="ctr"/>
+          <a:lstStyle/>
+          <a:p>
+            <a:pPr algn="ctr"/>
+            <a:r>
+              <a:rPr lang="pt-BR" dirty="0" smtClean="0">
+                <a:solidFill>
+                  <a:schemeClr val="tx1"/>
+                </a:solidFill>
+              </a:rPr>
+              <a:t>150</a:t>
+            </a:r>
+            <a:endParaRPr lang="pt-BR" dirty="0">
+              <a:solidFill>
+                <a:schemeClr val="tx1"/>
+              </a:solidFill>
+            </a:endParaRPr>
+          </a:p>
+        </p:txBody>
+      </p:sp>
+      <p:pic>
+        <p:nvPicPr>
+          <p:cNvPr id="6" name="Imagem 5"/>
+          <p:cNvPicPr>
+            <a:picLocks noChangeAspect="1"/>
+          </p:cNvPicPr>
+          <p:nvPr/>
+        </p:nvPicPr>
+        <p:blipFill>
+          <a:blip r:embed="rId3" cstate="print">
+            <a:extLst>
+              <a:ext uri="{28A0092B-C50C-407E-A947-70E740481C1C}">
+                <a14:useLocalDpi xmlns:a14="http://schemas.microsoft.com/office/drawing/2010/main" val="0"/>
+              </a:ext>
+            </a:extLst>
+          </a:blip>
+          <a:stretch>
+            <a:fillRect/>
+          </a:stretch>
+        </p:blipFill>
+        <p:spPr>
+          <a:xfrm>
+            <a:off x="1630819" y="553340"/>
+            <a:ext cx="639397" cy="639397"/>
+          </a:xfrm>
+          <a:prstGeom prst="rect">
+            <a:avLst/>
+          </a:prstGeom>
+        </p:spPr>
+      </p:pic>
+      <p:sp>
+        <p:nvSpPr>
+          <p:cNvPr id="25" name="Retângulo de cantos arredondados 24"/>
+          <p:cNvSpPr/>
+          <p:nvPr/>
+        </p:nvSpPr>
+        <p:spPr>
+          <a:xfrm>
+            <a:off x="5668875" y="818587"/>
+            <a:ext cx="1290702" cy="301406"/>
+          </a:xfrm>
+          <a:prstGeom prst="roundRect">
+            <a:avLst/>
+          </a:prstGeom>
+          <a:solidFill>
+            <a:srgbClr val="FDEBC7"/>
+          </a:solidFill>
+          <a:ln>
+            <a:noFill/>
+          </a:ln>
+          <a:effectLst>
+            <a:outerShdw blurRad="50800" dist="38100" dir="2700000" algn="tl" rotWithShape="0">
+              <a:prstClr val="black">
+                <a:alpha val="40000"/>
+              </a:prstClr>
+            </a:outerShdw>
+          </a:effectLst>
+        </p:spPr>
+        <p:style>
+          <a:lnRef idx="2">
+            <a:schemeClr val="accent1">
+              <a:shade val="50000"/>
+            </a:schemeClr>
+          </a:lnRef>
+          <a:fillRef idx="1">
+            <a:schemeClr val="accent1"/>
+          </a:fillRef>
+          <a:effectRef idx="0">
+            <a:schemeClr val="accent1"/>
+          </a:effectRef>
+          <a:fontRef idx="minor">
+            <a:schemeClr val="lt1"/>
+          </a:fontRef>
+        </p:style>
+        <p:txBody>
+          <a:bodyPr rtlCol="0" anchor="ctr"/>
+          <a:lstStyle/>
+          <a:p>
+            <a:pPr algn="ctr"/>
+            <a:r>
+              <a:rPr lang="pt-BR" dirty="0" smtClean="0">
+                <a:solidFill>
+                  <a:schemeClr val="tx1"/>
+                </a:solidFill>
+              </a:rPr>
+              <a:t>1:35</a:t>
+            </a:r>
+            <a:endParaRPr lang="pt-BR" dirty="0">
+              <a:solidFill>
+                <a:schemeClr val="tx1"/>
+              </a:solidFill>
+            </a:endParaRPr>
+          </a:p>
+        </p:txBody>
+      </p:sp>
+      <p:pic>
+        <p:nvPicPr>
+          <p:cNvPr id="7" name="Imagem 6"/>
+          <p:cNvPicPr>
+            <a:picLocks noChangeAspect="1"/>
+          </p:cNvPicPr>
+          <p:nvPr/>
+        </p:nvPicPr>
+        <p:blipFill rotWithShape="1">
+          <a:blip r:embed="rId4" cstate="print">
+            <a:extLst>
+              <a:ext uri="{28A0092B-C50C-407E-A947-70E740481C1C}">
+                <a14:useLocalDpi xmlns:a14="http://schemas.microsoft.com/office/drawing/2010/main" val="0"/>
+              </a:ext>
+            </a:extLst>
+          </a:blip>
+          <a:srcRect l="30573" r="27361"/>
+          <a:stretch/>
+        </p:blipFill>
+        <p:spPr>
+          <a:xfrm>
+            <a:off x="5253303" y="435945"/>
+            <a:ext cx="831143" cy="987910"/>
+          </a:xfrm>
+          <a:prstGeom prst="rect">
+            <a:avLst/>
+          </a:prstGeom>
+        </p:spPr>
+      </p:pic>
+      <p:sp>
+        <p:nvSpPr>
+          <p:cNvPr id="26" name="Retângulo de cantos arredondados 25"/>
+          <p:cNvSpPr/>
+          <p:nvPr/>
+        </p:nvSpPr>
+        <p:spPr>
+          <a:xfrm>
+            <a:off x="9259910" y="722334"/>
+            <a:ext cx="1183430" cy="307071"/>
+          </a:xfrm>
+          <a:prstGeom prst="roundRect">
+            <a:avLst/>
+          </a:prstGeom>
+          <a:solidFill>
+            <a:srgbClr val="FDEBC7"/>
+          </a:solidFill>
+          <a:ln>
+            <a:noFill/>
+          </a:ln>
+          <a:effectLst>
+            <a:outerShdw blurRad="50800" dist="38100" dir="2700000" algn="tl" rotWithShape="0">
+              <a:prstClr val="black">
+                <a:alpha val="40000"/>
+              </a:prstClr>
+            </a:outerShdw>
+          </a:effectLst>
+        </p:spPr>
+        <p:style>
+          <a:lnRef idx="2">
+            <a:schemeClr val="accent1">
+              <a:shade val="50000"/>
+            </a:schemeClr>
+          </a:lnRef>
+          <a:fillRef idx="1">
+            <a:schemeClr val="accent1"/>
+          </a:fillRef>
+          <a:effectRef idx="0">
+            <a:schemeClr val="accent1"/>
+          </a:effectRef>
+          <a:fontRef idx="minor">
+            <a:schemeClr val="lt1"/>
+          </a:fontRef>
+        </p:style>
+        <p:txBody>
+          <a:bodyPr rtlCol="0" anchor="ctr"/>
+          <a:lstStyle/>
+          <a:p>
+            <a:pPr algn="ctr"/>
+            <a:r>
+              <a:rPr lang="pt-BR" dirty="0" smtClean="0">
+                <a:solidFill>
+                  <a:schemeClr val="tx1"/>
+                </a:solidFill>
+              </a:rPr>
+              <a:t>2º</a:t>
+            </a:r>
+            <a:endParaRPr lang="pt-BR" dirty="0">
+              <a:solidFill>
+                <a:schemeClr val="tx1"/>
+              </a:solidFill>
+            </a:endParaRPr>
+          </a:p>
+        </p:txBody>
+      </p:sp>
+      <p:pic>
+        <p:nvPicPr>
+          <p:cNvPr id="8" name="Imagem 7"/>
+          <p:cNvPicPr>
+            <a:picLocks noChangeAspect="1"/>
+          </p:cNvPicPr>
+          <p:nvPr/>
+        </p:nvPicPr>
+        <p:blipFill>
+          <a:blip r:embed="rId5" cstate="print">
+            <a:extLst>
+              <a:ext uri="{28A0092B-C50C-407E-A947-70E740481C1C}">
+                <a14:useLocalDpi xmlns:a14="http://schemas.microsoft.com/office/drawing/2010/main" val="0"/>
+              </a:ext>
+            </a:extLst>
+          </a:blip>
+          <a:stretch>
+            <a:fillRect/>
+          </a:stretch>
+        </p:blipFill>
+        <p:spPr>
+          <a:xfrm>
+            <a:off x="8894093" y="489681"/>
+            <a:ext cx="748911" cy="748911"/>
+          </a:xfrm>
+          <a:prstGeom prst="rect">
+            <a:avLst/>
+          </a:prstGeom>
+        </p:spPr>
+      </p:pic>
+      <p:sp>
+        <p:nvSpPr>
+          <p:cNvPr id="28" name="Retângulo de cantos arredondados 27"/>
+          <p:cNvSpPr/>
+          <p:nvPr/>
+        </p:nvSpPr>
+        <p:spPr>
+          <a:xfrm>
+            <a:off x="5395370" y="5587210"/>
+            <a:ext cx="1290702" cy="715877"/>
+          </a:xfrm>
+          <a:prstGeom prst="roundRect">
+            <a:avLst/>
+          </a:prstGeom>
+          <a:solidFill>
+            <a:srgbClr val="FDEBC7"/>
+          </a:solidFill>
+          <a:ln>
+            <a:noFill/>
+          </a:ln>
+          <a:effectLst>
+            <a:outerShdw blurRad="50800" dist="38100" dir="2700000" algn="tl" rotWithShape="0">
+              <a:prstClr val="black">
+                <a:alpha val="40000"/>
+              </a:prstClr>
+            </a:outerShdw>
+          </a:effectLst>
+        </p:spPr>
+        <p:style>
+          <a:lnRef idx="2">
+            <a:schemeClr val="accent1">
+              <a:shade val="50000"/>
+            </a:schemeClr>
+          </a:lnRef>
+          <a:fillRef idx="1">
+            <a:schemeClr val="accent1"/>
+          </a:fillRef>
+          <a:effectRef idx="0">
+            <a:schemeClr val="accent1"/>
+          </a:effectRef>
+          <a:fontRef idx="minor">
+            <a:schemeClr val="lt1"/>
+          </a:fontRef>
+        </p:style>
+        <p:txBody>
+          <a:bodyPr rtlCol="0" anchor="ctr"/>
+          <a:lstStyle/>
+          <a:p>
+            <a:pPr algn="ctr"/>
+            <a:r>
+              <a:rPr lang="pt-BR" dirty="0" smtClean="0">
+                <a:solidFill>
+                  <a:schemeClr val="tx1"/>
+                </a:solidFill>
+              </a:rPr>
+              <a:t>150</a:t>
+            </a:r>
+            <a:endParaRPr lang="pt-BR" dirty="0">
+              <a:solidFill>
+                <a:schemeClr val="tx1"/>
+              </a:solidFill>
+            </a:endParaRPr>
+          </a:p>
+        </p:txBody>
+      </p:sp>
+      <p:sp>
+        <p:nvSpPr>
+          <p:cNvPr id="30" name="Retângulo 29"/>
+          <p:cNvSpPr/>
+          <p:nvPr/>
+        </p:nvSpPr>
+        <p:spPr>
+          <a:xfrm>
+            <a:off x="5499123" y="5409996"/>
+            <a:ext cx="1083196" cy="378657"/>
+          </a:xfrm>
+          <a:prstGeom prst="rect">
+            <a:avLst/>
+          </a:prstGeom>
+          <a:solidFill>
+            <a:srgbClr val="8DBA62"/>
+          </a:solidFill>
+          <a:ln>
+            <a:solidFill>
+              <a:srgbClr val="73D54A"/>
+            </a:solidFill>
+          </a:ln>
+          <a:effectLst>
+            <a:outerShdw blurRad="50800" dist="38100" dir="2700000" algn="tl" rotWithShape="0">
+              <a:prstClr val="black">
+                <a:alpha val="40000"/>
+              </a:prstClr>
+            </a:outerShdw>
+            <a:softEdge rad="0"/>
+          </a:effectLst>
+        </p:spPr>
+        <p:style>
+          <a:lnRef idx="2">
+            <a:schemeClr val="accent1">
+              <a:shade val="50000"/>
+            </a:schemeClr>
+          </a:lnRef>
+          <a:fillRef idx="1">
+            <a:schemeClr val="accent1"/>
+          </a:fillRef>
+          <a:effectRef idx="0">
+            <a:schemeClr val="accent1"/>
+          </a:effectRef>
+          <a:fontRef idx="minor">
+            <a:schemeClr val="lt1"/>
+          </a:fontRef>
+        </p:style>
+        <p:txBody>
+          <a:bodyPr rtlCol="0" anchor="ctr"/>
+          <a:lstStyle/>
+          <a:p>
+            <a:pPr algn="ctr"/>
+            <a:r>
+              <a:rPr lang="pt-BR" dirty="0" smtClean="0"/>
+              <a:t>Score</a:t>
+            </a:r>
+            <a:endParaRPr lang="pt-BR" dirty="0"/>
+          </a:p>
+        </p:txBody>
+      </p:sp>
+      <p:sp>
+        <p:nvSpPr>
+          <p:cNvPr id="40" name="Retângulo de cantos arredondados 39"/>
+          <p:cNvSpPr/>
+          <p:nvPr/>
+        </p:nvSpPr>
+        <p:spPr>
+          <a:xfrm>
+            <a:off x="1560817" y="5792058"/>
+            <a:ext cx="2341963" cy="449141"/>
+          </a:xfrm>
+          <a:prstGeom prst="roundRect">
+            <a:avLst/>
+          </a:prstGeom>
+          <a:solidFill>
+            <a:srgbClr val="FDEBC7"/>
+          </a:solidFill>
+          <a:ln>
+            <a:noFill/>
+          </a:ln>
+          <a:effectLst>
+            <a:outerShdw blurRad="50800" dist="38100" dir="2700000" algn="tl" rotWithShape="0">
+              <a:prstClr val="black">
+                <a:alpha val="40000"/>
+              </a:prstClr>
+            </a:outerShdw>
+          </a:effectLst>
+        </p:spPr>
+        <p:style>
+          <a:lnRef idx="2">
+            <a:schemeClr val="accent1">
+              <a:shade val="50000"/>
+            </a:schemeClr>
+          </a:lnRef>
+          <a:fillRef idx="1">
+            <a:schemeClr val="accent1"/>
+          </a:fillRef>
+          <a:effectRef idx="0">
+            <a:schemeClr val="accent1"/>
+          </a:effectRef>
+          <a:fontRef idx="minor">
+            <a:schemeClr val="lt1"/>
+          </a:fontRef>
+        </p:style>
+        <p:txBody>
+          <a:bodyPr rtlCol="0" anchor="ctr"/>
+          <a:lstStyle/>
+          <a:p>
+            <a:pPr algn="ctr"/>
+            <a:endParaRPr lang="pt-BR" dirty="0">
+              <a:solidFill>
+                <a:schemeClr val="tx1"/>
+              </a:solidFill>
+            </a:endParaRPr>
+          </a:p>
+        </p:txBody>
+      </p:sp>
+      <p:pic>
+        <p:nvPicPr>
+          <p:cNvPr id="41" name="Imagem 40"/>
+          <p:cNvPicPr>
+            <a:picLocks noChangeAspect="1"/>
+          </p:cNvPicPr>
+          <p:nvPr/>
+        </p:nvPicPr>
+        <p:blipFill>
+          <a:blip r:embed="rId6" cstate="print">
+            <a:extLst>
+              <a:ext uri="{28A0092B-C50C-407E-A947-70E740481C1C}">
+                <a14:useLocalDpi xmlns:a14="http://schemas.microsoft.com/office/drawing/2010/main" val="0"/>
+              </a:ext>
+            </a:extLst>
+          </a:blip>
+          <a:stretch>
+            <a:fillRect/>
+          </a:stretch>
+        </p:blipFill>
+        <p:spPr>
+          <a:xfrm>
+            <a:off x="1745659" y="5801056"/>
+            <a:ext cx="587403" cy="440143"/>
+          </a:xfrm>
+          <a:prstGeom prst="rect">
+            <a:avLst/>
+          </a:prstGeom>
+        </p:spPr>
+      </p:pic>
+      <p:pic>
+        <p:nvPicPr>
+          <p:cNvPr id="42" name="Imagem 41"/>
+          <p:cNvPicPr>
+            <a:picLocks noChangeAspect="1"/>
+          </p:cNvPicPr>
+          <p:nvPr/>
+        </p:nvPicPr>
+        <p:blipFill>
+          <a:blip r:embed="rId7" cstate="print">
+            <a:extLst>
+              <a:ext uri="{BEBA8EAE-BF5A-486C-A8C5-ECC9F3942E4B}">
+                <a14:imgProps xmlns:a14="http://schemas.microsoft.com/office/drawing/2010/main">
+                  <a14:imgLayer r:embed="rId8">
+                    <a14:imgEffect>
+                      <a14:backgroundRemoval t="10000" b="90000" l="10000" r="90000">
+                        <a14:foregroundMark x1="34725" y1="55385" x2="39780" y2="60440"/>
+                      </a14:backgroundRemoval>
+                    </a14:imgEffect>
+                  </a14:imgLayer>
+                </a14:imgProps>
+              </a:ext>
+              <a:ext uri="{28A0092B-C50C-407E-A947-70E740481C1C}">
+                <a14:useLocalDpi xmlns:a14="http://schemas.microsoft.com/office/drawing/2010/main" val="0"/>
+              </a:ext>
+            </a:extLst>
+          </a:blip>
+          <a:stretch>
+            <a:fillRect/>
+          </a:stretch>
+        </p:blipFill>
+        <p:spPr>
+          <a:xfrm>
+            <a:off x="2333062" y="5801056"/>
+            <a:ext cx="476272" cy="476272"/>
+          </a:xfrm>
+          <a:prstGeom prst="rect">
+            <a:avLst/>
+          </a:prstGeom>
+        </p:spPr>
+      </p:pic>
+      <p:sp>
+        <p:nvSpPr>
+          <p:cNvPr id="43" name="CaixaDeTexto 42"/>
+          <p:cNvSpPr txBox="1"/>
+          <p:nvPr/>
+        </p:nvSpPr>
+        <p:spPr>
+          <a:xfrm>
+            <a:off x="2961206" y="5779534"/>
+            <a:ext cx="806891" cy="461665"/>
+          </a:xfrm>
+          <a:prstGeom prst="rect">
+            <a:avLst/>
+          </a:prstGeom>
+          <a:noFill/>
+        </p:spPr>
+        <p:txBody>
+          <a:bodyPr wrap="square" rtlCol="0">
+            <a:spAutoFit/>
+          </a:bodyPr>
+          <a:lstStyle/>
+          <a:p>
+            <a:r>
+              <a:rPr lang="pt-BR" sz="2400" dirty="0" smtClean="0">
+                <a:solidFill>
+                  <a:srgbClr val="5DB427"/>
+                </a:solidFill>
+                <a:latin typeface="Bahnschrift" panose="020B0502040204020203" pitchFamily="34" charset="0"/>
+              </a:rPr>
+              <a:t>2 x</a:t>
+            </a:r>
+            <a:endParaRPr lang="pt-BR" sz="2400" dirty="0">
+              <a:solidFill>
+                <a:srgbClr val="5DB427"/>
+              </a:solidFill>
+              <a:latin typeface="Bahnschrift" panose="020B0502040204020203" pitchFamily="34" charset="0"/>
+            </a:endParaRPr>
+          </a:p>
+        </p:txBody>
+      </p:sp>
+      <p:pic>
+        <p:nvPicPr>
+          <p:cNvPr id="3" name="Imagem 2"/>
+          <p:cNvPicPr>
+            <a:picLocks noChangeAspect="1"/>
+          </p:cNvPicPr>
+          <p:nvPr/>
+        </p:nvPicPr>
+        <p:blipFill>
+          <a:blip r:embed="rId9" cstate="print">
+            <a:extLst>
+              <a:ext uri="{BEBA8EAE-BF5A-486C-A8C5-ECC9F3942E4B}">
+                <a14:imgProps xmlns:a14="http://schemas.microsoft.com/office/drawing/2010/main">
+                  <a14:imgLayer r:embed="rId10">
+                    <a14:imgEffect>
+                      <a14:backgroundRemoval t="10000" b="90000" l="10000" r="90000"/>
+                    </a14:imgEffect>
+                  </a14:imgLayer>
+                </a14:imgProps>
+              </a:ext>
+              <a:ext uri="{28A0092B-C50C-407E-A947-70E740481C1C}">
+                <a14:useLocalDpi xmlns:a14="http://schemas.microsoft.com/office/drawing/2010/main" val="0"/>
+              </a:ext>
+            </a:extLst>
+          </a:blip>
+          <a:stretch>
+            <a:fillRect/>
+          </a:stretch>
+        </p:blipFill>
+        <p:spPr>
+          <a:xfrm>
+            <a:off x="1146749" y="5589785"/>
+            <a:ext cx="826207" cy="826207"/>
+          </a:xfrm>
+          <a:prstGeom prst="rect">
+            <a:avLst/>
+          </a:prstGeom>
+        </p:spPr>
+      </p:pic>
+      <p:grpSp>
+        <p:nvGrpSpPr>
+          <p:cNvPr id="19" name="Grupo 18"/>
+          <p:cNvGrpSpPr/>
+          <p:nvPr/>
+        </p:nvGrpSpPr>
+        <p:grpSpPr>
+          <a:xfrm>
+            <a:off x="2222500" y="1720849"/>
+            <a:ext cx="1133476" cy="1514757"/>
+            <a:chOff x="2222500" y="1720849"/>
+            <a:chExt cx="1133476" cy="1514757"/>
+          </a:xfrm>
+        </p:grpSpPr>
+        <p:sp>
+          <p:nvSpPr>
+            <p:cNvPr id="48" name="Retângulo 47"/>
+            <p:cNvSpPr/>
+            <p:nvPr/>
+          </p:nvSpPr>
+          <p:spPr>
+            <a:xfrm>
+              <a:off x="2222500" y="1720849"/>
+              <a:ext cx="1133476" cy="1514757"/>
+            </a:xfrm>
+            <a:prstGeom prst="rect">
+              <a:avLst/>
+            </a:prstGeom>
+            <a:solidFill>
+              <a:srgbClr val="FDEBC7"/>
+            </a:solidFill>
+            <a:ln>
+              <a:solidFill>
+                <a:srgbClr val="8DBA62"/>
+              </a:solidFill>
+            </a:ln>
+          </p:spPr>
+          <p:style>
+            <a:lnRef idx="2">
+              <a:schemeClr val="accent1">
+                <a:shade val="50000"/>
+              </a:schemeClr>
+            </a:lnRef>
+            <a:fillRef idx="1">
+              <a:schemeClr val="accent1"/>
+            </a:fillRef>
+            <a:effectRef idx="0">
+              <a:schemeClr val="accent1"/>
+            </a:effectRef>
+            <a:fontRef idx="minor">
+              <a:schemeClr val="lt1"/>
+            </a:fontRef>
+          </p:style>
+          <p:txBody>
+            <a:bodyPr rtlCol="0" anchor="ctr"/>
+            <a:lstStyle/>
+            <a:p>
+              <a:pPr algn="ctr"/>
+              <a:endParaRPr lang="pt-BR"/>
+            </a:p>
+          </p:txBody>
+        </p:sp>
+        <p:sp>
+          <p:nvSpPr>
+            <p:cNvPr id="10" name="Retângulo 9"/>
+            <p:cNvSpPr/>
+            <p:nvPr/>
+          </p:nvSpPr>
+          <p:spPr>
+            <a:xfrm>
+              <a:off x="2274979" y="1772529"/>
+              <a:ext cx="1027638" cy="1411916"/>
+            </a:xfrm>
+            <a:prstGeom prst="rect">
+              <a:avLst/>
+            </a:prstGeom>
+            <a:solidFill>
+              <a:srgbClr val="8DBA62"/>
+            </a:solidFill>
+            <a:ln>
+              <a:solidFill>
+                <a:srgbClr val="8DBA62"/>
+              </a:solidFill>
+            </a:ln>
+          </p:spPr>
+          <p:style>
+            <a:lnRef idx="2">
+              <a:schemeClr val="accent1">
+                <a:shade val="50000"/>
+              </a:schemeClr>
+            </a:lnRef>
+            <a:fillRef idx="1">
+              <a:schemeClr val="accent1"/>
+            </a:fillRef>
+            <a:effectRef idx="0">
+              <a:schemeClr val="accent1"/>
+            </a:effectRef>
+            <a:fontRef idx="minor">
+              <a:schemeClr val="lt1"/>
+            </a:fontRef>
+          </p:style>
+          <p:txBody>
+            <a:bodyPr rtlCol="0" anchor="ctr"/>
+            <a:lstStyle/>
+            <a:p>
+              <a:pPr algn="ctr"/>
+              <a:endParaRPr lang="pt-BR"/>
+            </a:p>
+          </p:txBody>
+        </p:sp>
+        <p:sp>
+          <p:nvSpPr>
+            <p:cNvPr id="13" name="Elipse 12"/>
+            <p:cNvSpPr/>
+            <p:nvPr/>
+          </p:nvSpPr>
+          <p:spPr>
+            <a:xfrm>
+              <a:off x="2341225" y="1872436"/>
+              <a:ext cx="895145" cy="1211582"/>
+            </a:xfrm>
+            <a:prstGeom prst="ellipse">
+              <a:avLst/>
+            </a:prstGeom>
+            <a:solidFill>
+              <a:srgbClr val="FDEBC7"/>
+            </a:solidFill>
+            <a:ln>
+              <a:solidFill>
+                <a:srgbClr val="FDEBC7"/>
+              </a:solidFill>
+            </a:ln>
+          </p:spPr>
+          <p:style>
+            <a:lnRef idx="2">
+              <a:schemeClr val="accent1">
+                <a:shade val="50000"/>
+              </a:schemeClr>
+            </a:lnRef>
+            <a:fillRef idx="1">
+              <a:schemeClr val="accent1"/>
+            </a:fillRef>
+            <a:effectRef idx="0">
+              <a:schemeClr val="accent1"/>
+            </a:effectRef>
+            <a:fontRef idx="minor">
+              <a:schemeClr val="lt1"/>
+            </a:fontRef>
+          </p:style>
+          <p:txBody>
+            <a:bodyPr rtlCol="0" anchor="ctr"/>
+            <a:lstStyle/>
+            <a:p>
+              <a:pPr algn="ctr"/>
+              <a:endParaRPr lang="pt-BR"/>
+            </a:p>
+          </p:txBody>
+        </p:sp>
+        <p:pic>
+          <p:nvPicPr>
+            <p:cNvPr id="12" name="Imagem 11"/>
+            <p:cNvPicPr>
+              <a:picLocks noChangeAspect="1"/>
+            </p:cNvPicPr>
+            <p:nvPr/>
+          </p:nvPicPr>
+          <p:blipFill rotWithShape="1">
+            <a:blip r:embed="rId11" cstate="print">
+              <a:extLst>
+                <a:ext uri="{28A0092B-C50C-407E-A947-70E740481C1C}">
+                  <a14:useLocalDpi xmlns:a14="http://schemas.microsoft.com/office/drawing/2010/main" val="0"/>
+                </a:ext>
+              </a:extLst>
+            </a:blip>
+            <a:srcRect l="19090" t="18911" r="17886" b="17557"/>
+            <a:stretch/>
+          </p:blipFill>
+          <p:spPr>
+            <a:xfrm>
+              <a:off x="2400300" y="2101850"/>
+              <a:ext cx="787400" cy="793750"/>
+            </a:xfrm>
+            <a:prstGeom prst="rect">
+              <a:avLst/>
+            </a:prstGeom>
+          </p:spPr>
+        </p:pic>
+      </p:grpSp>
+      <p:grpSp>
+        <p:nvGrpSpPr>
+          <p:cNvPr id="50" name="Grupo 49"/>
+          <p:cNvGrpSpPr/>
+          <p:nvPr/>
+        </p:nvGrpSpPr>
+        <p:grpSpPr>
+          <a:xfrm>
+            <a:off x="3732884" y="1720848"/>
+            <a:ext cx="1133476" cy="1514757"/>
+            <a:chOff x="2222500" y="1720849"/>
+            <a:chExt cx="1133476" cy="1514757"/>
+          </a:xfrm>
+        </p:grpSpPr>
+        <p:sp>
+          <p:nvSpPr>
+            <p:cNvPr id="51" name="Retângulo 50"/>
+            <p:cNvSpPr/>
+            <p:nvPr/>
+          </p:nvSpPr>
+          <p:spPr>
+            <a:xfrm>
+              <a:off x="2222500" y="1720849"/>
+              <a:ext cx="1133476" cy="1514757"/>
+            </a:xfrm>
+            <a:prstGeom prst="rect">
+              <a:avLst/>
+            </a:prstGeom>
+            <a:solidFill>
+              <a:srgbClr val="FDEBC7"/>
+            </a:solidFill>
+            <a:ln>
+              <a:solidFill>
+                <a:srgbClr val="8DBA62"/>
+              </a:solidFill>
+            </a:ln>
+          </p:spPr>
+          <p:style>
+            <a:lnRef idx="2">
+              <a:schemeClr val="accent1">
+                <a:shade val="50000"/>
+              </a:schemeClr>
+            </a:lnRef>
+            <a:fillRef idx="1">
+              <a:schemeClr val="accent1"/>
+            </a:fillRef>
+            <a:effectRef idx="0">
+              <a:schemeClr val="accent1"/>
+            </a:effectRef>
+            <a:fontRef idx="minor">
+              <a:schemeClr val="lt1"/>
+            </a:fontRef>
+          </p:style>
+          <p:txBody>
+            <a:bodyPr rtlCol="0" anchor="ctr"/>
+            <a:lstStyle/>
+            <a:p>
+              <a:pPr algn="ctr"/>
+              <a:endParaRPr lang="pt-BR"/>
+            </a:p>
+          </p:txBody>
+        </p:sp>
+        <p:sp>
+          <p:nvSpPr>
+            <p:cNvPr id="52" name="Retângulo 51"/>
+            <p:cNvSpPr/>
+            <p:nvPr/>
+          </p:nvSpPr>
+          <p:spPr>
+            <a:xfrm>
+              <a:off x="2274979" y="1772529"/>
+              <a:ext cx="1027638" cy="1411916"/>
+            </a:xfrm>
+            <a:prstGeom prst="rect">
+              <a:avLst/>
+            </a:prstGeom>
+            <a:solidFill>
+              <a:srgbClr val="8DBA62"/>
+            </a:solidFill>
+            <a:ln>
+              <a:solidFill>
+                <a:srgbClr val="8DBA62"/>
+              </a:solidFill>
+            </a:ln>
+          </p:spPr>
+          <p:style>
+            <a:lnRef idx="2">
+              <a:schemeClr val="accent1">
+                <a:shade val="50000"/>
+              </a:schemeClr>
+            </a:lnRef>
+            <a:fillRef idx="1">
+              <a:schemeClr val="accent1"/>
+            </a:fillRef>
+            <a:effectRef idx="0">
+              <a:schemeClr val="accent1"/>
+            </a:effectRef>
+            <a:fontRef idx="minor">
+              <a:schemeClr val="lt1"/>
+            </a:fontRef>
+          </p:style>
+          <p:txBody>
+            <a:bodyPr rtlCol="0" anchor="ctr"/>
+            <a:lstStyle/>
+            <a:p>
+              <a:pPr algn="ctr"/>
+              <a:endParaRPr lang="pt-BR"/>
+            </a:p>
+          </p:txBody>
+        </p:sp>
+        <p:sp>
+          <p:nvSpPr>
+            <p:cNvPr id="53" name="Elipse 52"/>
+            <p:cNvSpPr/>
+            <p:nvPr/>
+          </p:nvSpPr>
+          <p:spPr>
+            <a:xfrm>
+              <a:off x="2341225" y="1872436"/>
+              <a:ext cx="895145" cy="1211582"/>
+            </a:xfrm>
+            <a:prstGeom prst="ellipse">
+              <a:avLst/>
+            </a:prstGeom>
+            <a:solidFill>
+              <a:srgbClr val="FDEBC7"/>
+            </a:solidFill>
+            <a:ln>
+              <a:solidFill>
+                <a:srgbClr val="FDEBC7"/>
+              </a:solidFill>
+            </a:ln>
+          </p:spPr>
+          <p:style>
+            <a:lnRef idx="2">
+              <a:schemeClr val="accent1">
+                <a:shade val="50000"/>
+              </a:schemeClr>
+            </a:lnRef>
+            <a:fillRef idx="1">
+              <a:schemeClr val="accent1"/>
+            </a:fillRef>
+            <a:effectRef idx="0">
+              <a:schemeClr val="accent1"/>
+            </a:effectRef>
+            <a:fontRef idx="minor">
+              <a:schemeClr val="lt1"/>
+            </a:fontRef>
+          </p:style>
+          <p:txBody>
+            <a:bodyPr rtlCol="0" anchor="ctr"/>
+            <a:lstStyle/>
+            <a:p>
+              <a:pPr algn="ctr"/>
+              <a:endParaRPr lang="pt-BR"/>
+            </a:p>
+          </p:txBody>
+        </p:sp>
+        <p:pic>
+          <p:nvPicPr>
+            <p:cNvPr id="54" name="Imagem 53"/>
+            <p:cNvPicPr>
+              <a:picLocks noChangeAspect="1"/>
+            </p:cNvPicPr>
+            <p:nvPr/>
+          </p:nvPicPr>
+          <p:blipFill rotWithShape="1">
+            <a:blip r:embed="rId12" cstate="print">
+              <a:extLst>
+                <a:ext uri="{BEBA8EAE-BF5A-486C-A8C5-ECC9F3942E4B}">
+                  <a14:imgProps xmlns:a14="http://schemas.microsoft.com/office/drawing/2010/main">
+                    <a14:imgLayer r:embed="rId13">
+                      <a14:imgEffect>
+                        <a14:backgroundRemoval t="10000" b="90000" l="10000" r="90000">
+                          <a14:foregroundMark x1="54142" y1="68935" x2="59763" y2="67456"/>
+                          <a14:foregroundMark x1="27515" y1="52367" x2="27811" y2="44675"/>
+                        </a14:backgroundRemoval>
+                      </a14:imgEffect>
+                    </a14:imgLayer>
+                  </a14:imgProps>
+                </a:ext>
+                <a:ext uri="{28A0092B-C50C-407E-A947-70E740481C1C}">
+                  <a14:useLocalDpi xmlns:a14="http://schemas.microsoft.com/office/drawing/2010/main" val="0"/>
+                </a:ext>
+              </a:extLst>
+            </a:blip>
+            <a:srcRect l="19090" t="18911" r="17886" b="17557"/>
+            <a:stretch/>
+          </p:blipFill>
+          <p:spPr>
+            <a:xfrm>
+              <a:off x="2400300" y="2101850"/>
+              <a:ext cx="787400" cy="793750"/>
+            </a:xfrm>
+            <a:prstGeom prst="rect">
+              <a:avLst/>
+            </a:prstGeom>
+          </p:spPr>
+        </p:pic>
+      </p:grpSp>
+      <p:grpSp>
+        <p:nvGrpSpPr>
+          <p:cNvPr id="55" name="Grupo 54"/>
+          <p:cNvGrpSpPr/>
+          <p:nvPr/>
+        </p:nvGrpSpPr>
+        <p:grpSpPr>
+          <a:xfrm>
+            <a:off x="5205168" y="1720126"/>
+            <a:ext cx="1133476" cy="1514757"/>
+            <a:chOff x="2222500" y="1720849"/>
+            <a:chExt cx="1133476" cy="1514757"/>
+          </a:xfrm>
+        </p:grpSpPr>
+        <p:sp>
+          <p:nvSpPr>
+            <p:cNvPr id="56" name="Retângulo 55"/>
+            <p:cNvSpPr/>
+            <p:nvPr/>
+          </p:nvSpPr>
+          <p:spPr>
+            <a:xfrm>
+              <a:off x="2222500" y="1720849"/>
+              <a:ext cx="1133476" cy="1514757"/>
+            </a:xfrm>
+            <a:prstGeom prst="rect">
+              <a:avLst/>
+            </a:prstGeom>
+            <a:solidFill>
+              <a:srgbClr val="FDEBC7"/>
+            </a:solidFill>
+            <a:ln>
+              <a:solidFill>
+                <a:srgbClr val="8DBA62"/>
+              </a:solidFill>
+            </a:ln>
+          </p:spPr>
+          <p:style>
+            <a:lnRef idx="2">
+              <a:schemeClr val="accent1">
+                <a:shade val="50000"/>
+              </a:schemeClr>
+            </a:lnRef>
+            <a:fillRef idx="1">
+              <a:schemeClr val="accent1"/>
+            </a:fillRef>
+            <a:effectRef idx="0">
+              <a:schemeClr val="accent1"/>
+            </a:effectRef>
+            <a:fontRef idx="minor">
+              <a:schemeClr val="lt1"/>
+            </a:fontRef>
+          </p:style>
+          <p:txBody>
+            <a:bodyPr rtlCol="0" anchor="ctr"/>
+            <a:lstStyle/>
+            <a:p>
+              <a:pPr algn="ctr"/>
+              <a:endParaRPr lang="pt-BR"/>
+            </a:p>
+          </p:txBody>
+        </p:sp>
+        <p:sp>
+          <p:nvSpPr>
+            <p:cNvPr id="57" name="Retângulo 56"/>
+            <p:cNvSpPr/>
+            <p:nvPr/>
+          </p:nvSpPr>
+          <p:spPr>
+            <a:xfrm>
+              <a:off x="2274979" y="1772529"/>
+              <a:ext cx="1027638" cy="1411916"/>
+            </a:xfrm>
+            <a:prstGeom prst="rect">
+              <a:avLst/>
+            </a:prstGeom>
+            <a:solidFill>
+              <a:srgbClr val="8DBA62"/>
+            </a:solidFill>
+            <a:ln>
+              <a:solidFill>
+                <a:srgbClr val="8DBA62"/>
+              </a:solidFill>
+            </a:ln>
+          </p:spPr>
+          <p:style>
+            <a:lnRef idx="2">
+              <a:schemeClr val="accent1">
+                <a:shade val="50000"/>
+              </a:schemeClr>
+            </a:lnRef>
+            <a:fillRef idx="1">
+              <a:schemeClr val="accent1"/>
+            </a:fillRef>
+            <a:effectRef idx="0">
+              <a:schemeClr val="accent1"/>
+            </a:effectRef>
+            <a:fontRef idx="minor">
+              <a:schemeClr val="lt1"/>
+            </a:fontRef>
+          </p:style>
+          <p:txBody>
+            <a:bodyPr rtlCol="0" anchor="ctr"/>
+            <a:lstStyle/>
+            <a:p>
+              <a:pPr algn="ctr"/>
+              <a:endParaRPr lang="pt-BR"/>
+            </a:p>
+          </p:txBody>
+        </p:sp>
+        <p:sp>
+          <p:nvSpPr>
+            <p:cNvPr id="58" name="Elipse 57"/>
+            <p:cNvSpPr/>
+            <p:nvPr/>
+          </p:nvSpPr>
+          <p:spPr>
+            <a:xfrm>
+              <a:off x="2341225" y="1872436"/>
+              <a:ext cx="895145" cy="1211582"/>
+            </a:xfrm>
+            <a:prstGeom prst="ellipse">
+              <a:avLst/>
+            </a:prstGeom>
+            <a:solidFill>
+              <a:srgbClr val="FDEBC7"/>
+            </a:solidFill>
+            <a:ln>
+              <a:solidFill>
+                <a:srgbClr val="FDEBC7"/>
+              </a:solidFill>
+            </a:ln>
+          </p:spPr>
+          <p:style>
+            <a:lnRef idx="2">
+              <a:schemeClr val="accent1">
+                <a:shade val="50000"/>
+              </a:schemeClr>
+            </a:lnRef>
+            <a:fillRef idx="1">
+              <a:schemeClr val="accent1"/>
+            </a:fillRef>
+            <a:effectRef idx="0">
+              <a:schemeClr val="accent1"/>
+            </a:effectRef>
+            <a:fontRef idx="minor">
+              <a:schemeClr val="lt1"/>
+            </a:fontRef>
+          </p:style>
+          <p:txBody>
+            <a:bodyPr rtlCol="0" anchor="ctr"/>
+            <a:lstStyle/>
+            <a:p>
+              <a:pPr algn="ctr"/>
+              <a:endParaRPr lang="pt-BR"/>
+            </a:p>
+          </p:txBody>
+        </p:sp>
+        <p:pic>
+          <p:nvPicPr>
+            <p:cNvPr id="59" name="Imagem 58"/>
+            <p:cNvPicPr>
+              <a:picLocks noChangeAspect="1"/>
+            </p:cNvPicPr>
+            <p:nvPr/>
+          </p:nvPicPr>
+          <p:blipFill rotWithShape="1">
+            <a:blip r:embed="rId12" cstate="print">
+              <a:extLst>
+                <a:ext uri="{28A0092B-C50C-407E-A947-70E740481C1C}">
+                  <a14:useLocalDpi xmlns:a14="http://schemas.microsoft.com/office/drawing/2010/main" val="0"/>
+                </a:ext>
+              </a:extLst>
+            </a:blip>
+            <a:srcRect l="19090" t="18911" r="17886" b="17557"/>
+            <a:stretch/>
+          </p:blipFill>
+          <p:spPr>
+            <a:xfrm>
+              <a:off x="2400300" y="2101850"/>
+              <a:ext cx="787400" cy="793750"/>
+            </a:xfrm>
+            <a:prstGeom prst="rect">
+              <a:avLst/>
+            </a:prstGeom>
+          </p:spPr>
+        </p:pic>
+      </p:grpSp>
+      <p:grpSp>
+        <p:nvGrpSpPr>
+          <p:cNvPr id="60" name="Grupo 59"/>
+          <p:cNvGrpSpPr/>
+          <p:nvPr/>
+        </p:nvGrpSpPr>
+        <p:grpSpPr>
+          <a:xfrm>
+            <a:off x="6814593" y="1720125"/>
+            <a:ext cx="1133476" cy="1514757"/>
+            <a:chOff x="2222500" y="1720849"/>
+            <a:chExt cx="1133476" cy="1514757"/>
+          </a:xfrm>
+        </p:grpSpPr>
+        <p:sp>
+          <p:nvSpPr>
+            <p:cNvPr id="61" name="Retângulo 60"/>
+            <p:cNvSpPr/>
+            <p:nvPr/>
+          </p:nvSpPr>
+          <p:spPr>
+            <a:xfrm>
+              <a:off x="2222500" y="1720849"/>
+              <a:ext cx="1133476" cy="1514757"/>
+            </a:xfrm>
+            <a:prstGeom prst="rect">
+              <a:avLst/>
+            </a:prstGeom>
+            <a:solidFill>
+              <a:srgbClr val="FDEBC7"/>
+            </a:solidFill>
+            <a:ln>
+              <a:solidFill>
+                <a:srgbClr val="8DBA62"/>
+              </a:solidFill>
+            </a:ln>
+          </p:spPr>
+          <p:style>
+            <a:lnRef idx="2">
+              <a:schemeClr val="accent1">
+                <a:shade val="50000"/>
+              </a:schemeClr>
+            </a:lnRef>
+            <a:fillRef idx="1">
+              <a:schemeClr val="accent1"/>
+            </a:fillRef>
+            <a:effectRef idx="0">
+              <a:schemeClr val="accent1"/>
+            </a:effectRef>
+            <a:fontRef idx="minor">
+              <a:schemeClr val="lt1"/>
+            </a:fontRef>
+          </p:style>
+          <p:txBody>
+            <a:bodyPr rtlCol="0" anchor="ctr"/>
+            <a:lstStyle/>
+            <a:p>
+              <a:pPr algn="ctr"/>
+              <a:endParaRPr lang="pt-BR"/>
+            </a:p>
+          </p:txBody>
+        </p:sp>
+        <p:sp>
+          <p:nvSpPr>
+            <p:cNvPr id="62" name="Retângulo 61"/>
+            <p:cNvSpPr/>
+            <p:nvPr/>
+          </p:nvSpPr>
+          <p:spPr>
+            <a:xfrm>
+              <a:off x="2274979" y="1772529"/>
+              <a:ext cx="1027638" cy="1411916"/>
+            </a:xfrm>
+            <a:prstGeom prst="rect">
+              <a:avLst/>
+            </a:prstGeom>
+            <a:solidFill>
+              <a:srgbClr val="8DBA62"/>
+            </a:solidFill>
+            <a:ln>
+              <a:solidFill>
+                <a:srgbClr val="8DBA62"/>
+              </a:solidFill>
+            </a:ln>
+          </p:spPr>
+          <p:style>
+            <a:lnRef idx="2">
+              <a:schemeClr val="accent1">
+                <a:shade val="50000"/>
+              </a:schemeClr>
+            </a:lnRef>
+            <a:fillRef idx="1">
+              <a:schemeClr val="accent1"/>
+            </a:fillRef>
+            <a:effectRef idx="0">
+              <a:schemeClr val="accent1"/>
+            </a:effectRef>
+            <a:fontRef idx="minor">
+              <a:schemeClr val="lt1"/>
+            </a:fontRef>
+          </p:style>
+          <p:txBody>
+            <a:bodyPr rtlCol="0" anchor="ctr"/>
+            <a:lstStyle/>
+            <a:p>
+              <a:pPr algn="ctr"/>
+              <a:endParaRPr lang="pt-BR"/>
+            </a:p>
+          </p:txBody>
+        </p:sp>
+        <p:sp>
+          <p:nvSpPr>
+            <p:cNvPr id="63" name="Elipse 62"/>
+            <p:cNvSpPr/>
+            <p:nvPr/>
+          </p:nvSpPr>
+          <p:spPr>
+            <a:xfrm>
+              <a:off x="2341225" y="1872436"/>
+              <a:ext cx="895145" cy="1211582"/>
+            </a:xfrm>
+            <a:prstGeom prst="ellipse">
+              <a:avLst/>
+            </a:prstGeom>
+            <a:solidFill>
+              <a:srgbClr val="FDEBC7"/>
+            </a:solidFill>
+            <a:ln>
+              <a:solidFill>
+                <a:srgbClr val="FDEBC7"/>
+              </a:solidFill>
+            </a:ln>
+          </p:spPr>
+          <p:style>
+            <a:lnRef idx="2">
+              <a:schemeClr val="accent1">
+                <a:shade val="50000"/>
+              </a:schemeClr>
+            </a:lnRef>
+            <a:fillRef idx="1">
+              <a:schemeClr val="accent1"/>
+            </a:fillRef>
+            <a:effectRef idx="0">
+              <a:schemeClr val="accent1"/>
+            </a:effectRef>
+            <a:fontRef idx="minor">
+              <a:schemeClr val="lt1"/>
+            </a:fontRef>
+          </p:style>
+          <p:txBody>
+            <a:bodyPr rtlCol="0" anchor="ctr"/>
+            <a:lstStyle/>
+            <a:p>
+              <a:pPr algn="ctr"/>
+              <a:endParaRPr lang="pt-BR"/>
+            </a:p>
+          </p:txBody>
+        </p:sp>
+        <p:pic>
+          <p:nvPicPr>
+            <p:cNvPr id="64" name="Imagem 63"/>
+            <p:cNvPicPr>
+              <a:picLocks noChangeAspect="1"/>
+            </p:cNvPicPr>
+            <p:nvPr/>
+          </p:nvPicPr>
+          <p:blipFill rotWithShape="1">
+            <a:blip r:embed="rId12" cstate="print">
+              <a:extLst>
+                <a:ext uri="{28A0092B-C50C-407E-A947-70E740481C1C}">
+                  <a14:useLocalDpi xmlns:a14="http://schemas.microsoft.com/office/drawing/2010/main" val="0"/>
+                </a:ext>
+              </a:extLst>
+            </a:blip>
+            <a:srcRect l="19090" t="18911" r="17886" b="17557"/>
+            <a:stretch/>
+          </p:blipFill>
+          <p:spPr>
+            <a:xfrm>
+              <a:off x="2400300" y="2101850"/>
+              <a:ext cx="787400" cy="793750"/>
+            </a:xfrm>
+            <a:prstGeom prst="rect">
+              <a:avLst/>
+            </a:prstGeom>
+          </p:spPr>
+        </p:pic>
+      </p:grpSp>
+      <p:grpSp>
+        <p:nvGrpSpPr>
+          <p:cNvPr id="65" name="Grupo 64"/>
+          <p:cNvGrpSpPr/>
+          <p:nvPr/>
+        </p:nvGrpSpPr>
+        <p:grpSpPr>
+          <a:xfrm>
+            <a:off x="8352110" y="1720124"/>
+            <a:ext cx="1133476" cy="1514757"/>
+            <a:chOff x="2222500" y="1720849"/>
+            <a:chExt cx="1133476" cy="1514757"/>
+          </a:xfrm>
+        </p:grpSpPr>
+        <p:sp>
+          <p:nvSpPr>
+            <p:cNvPr id="66" name="Retângulo 65"/>
+            <p:cNvSpPr/>
+            <p:nvPr/>
+          </p:nvSpPr>
+          <p:spPr>
+            <a:xfrm>
+              <a:off x="2222500" y="1720849"/>
+              <a:ext cx="1133476" cy="1514757"/>
+            </a:xfrm>
+            <a:prstGeom prst="rect">
+              <a:avLst/>
+            </a:prstGeom>
+            <a:solidFill>
+              <a:srgbClr val="FDEBC7"/>
+            </a:solidFill>
+            <a:ln>
+              <a:solidFill>
+                <a:srgbClr val="8DBA62"/>
+              </a:solidFill>
+            </a:ln>
+          </p:spPr>
+          <p:style>
+            <a:lnRef idx="2">
+              <a:schemeClr val="accent1">
+                <a:shade val="50000"/>
+              </a:schemeClr>
+            </a:lnRef>
+            <a:fillRef idx="1">
+              <a:schemeClr val="accent1"/>
+            </a:fillRef>
+            <a:effectRef idx="0">
+              <a:schemeClr val="accent1"/>
+            </a:effectRef>
+            <a:fontRef idx="minor">
+              <a:schemeClr val="lt1"/>
+            </a:fontRef>
+          </p:style>
+          <p:txBody>
+            <a:bodyPr rtlCol="0" anchor="ctr"/>
+            <a:lstStyle/>
+            <a:p>
+              <a:pPr algn="ctr"/>
+              <a:endParaRPr lang="pt-BR"/>
+            </a:p>
+          </p:txBody>
+        </p:sp>
+        <p:sp>
+          <p:nvSpPr>
+            <p:cNvPr id="67" name="Retângulo 66"/>
+            <p:cNvSpPr/>
+            <p:nvPr/>
+          </p:nvSpPr>
+          <p:spPr>
+            <a:xfrm>
+              <a:off x="2274979" y="1772529"/>
+              <a:ext cx="1027638" cy="1411916"/>
+            </a:xfrm>
+            <a:prstGeom prst="rect">
+              <a:avLst/>
+            </a:prstGeom>
+            <a:solidFill>
+              <a:srgbClr val="8DBA62"/>
+            </a:solidFill>
+            <a:ln>
+              <a:solidFill>
+                <a:srgbClr val="8DBA62"/>
+              </a:solidFill>
+            </a:ln>
+          </p:spPr>
+          <p:style>
+            <a:lnRef idx="2">
+              <a:schemeClr val="accent1">
+                <a:shade val="50000"/>
+              </a:schemeClr>
+            </a:lnRef>
+            <a:fillRef idx="1">
+              <a:schemeClr val="accent1"/>
+            </a:fillRef>
+            <a:effectRef idx="0">
+              <a:schemeClr val="accent1"/>
+            </a:effectRef>
+            <a:fontRef idx="minor">
+              <a:schemeClr val="lt1"/>
+            </a:fontRef>
+          </p:style>
+          <p:txBody>
+            <a:bodyPr rtlCol="0" anchor="ctr"/>
+            <a:lstStyle/>
+            <a:p>
+              <a:pPr algn="ctr"/>
+              <a:endParaRPr lang="pt-BR"/>
+            </a:p>
+          </p:txBody>
+        </p:sp>
+        <p:sp>
+          <p:nvSpPr>
+            <p:cNvPr id="68" name="Elipse 67"/>
+            <p:cNvSpPr/>
+            <p:nvPr/>
+          </p:nvSpPr>
+          <p:spPr>
+            <a:xfrm>
+              <a:off x="2341225" y="1872436"/>
+              <a:ext cx="895145" cy="1211582"/>
+            </a:xfrm>
+            <a:prstGeom prst="ellipse">
+              <a:avLst/>
+            </a:prstGeom>
+            <a:solidFill>
+              <a:srgbClr val="FDEBC7"/>
+            </a:solidFill>
+            <a:ln>
+              <a:solidFill>
+                <a:srgbClr val="FDEBC7"/>
+              </a:solidFill>
+            </a:ln>
+          </p:spPr>
+          <p:style>
+            <a:lnRef idx="2">
+              <a:schemeClr val="accent1">
+                <a:shade val="50000"/>
+              </a:schemeClr>
+            </a:lnRef>
+            <a:fillRef idx="1">
+              <a:schemeClr val="accent1"/>
+            </a:fillRef>
+            <a:effectRef idx="0">
+              <a:schemeClr val="accent1"/>
+            </a:effectRef>
+            <a:fontRef idx="minor">
+              <a:schemeClr val="lt1"/>
+            </a:fontRef>
+          </p:style>
+          <p:txBody>
+            <a:bodyPr rtlCol="0" anchor="ctr"/>
+            <a:lstStyle/>
+            <a:p>
+              <a:pPr algn="ctr"/>
+              <a:endParaRPr lang="pt-BR"/>
+            </a:p>
+          </p:txBody>
+        </p:sp>
+        <p:pic>
+          <p:nvPicPr>
+            <p:cNvPr id="69" name="Imagem 68"/>
+            <p:cNvPicPr>
+              <a:picLocks noChangeAspect="1"/>
+            </p:cNvPicPr>
+            <p:nvPr/>
+          </p:nvPicPr>
+          <p:blipFill rotWithShape="1">
+            <a:blip r:embed="rId12" cstate="print">
+              <a:extLst>
+                <a:ext uri="{28A0092B-C50C-407E-A947-70E740481C1C}">
+                  <a14:useLocalDpi xmlns:a14="http://schemas.microsoft.com/office/drawing/2010/main" val="0"/>
+                </a:ext>
+              </a:extLst>
+            </a:blip>
+            <a:srcRect l="19090" t="18911" r="17886" b="17557"/>
+            <a:stretch/>
+          </p:blipFill>
+          <p:spPr>
+            <a:xfrm>
+              <a:off x="2400300" y="2101850"/>
+              <a:ext cx="787400" cy="793750"/>
+            </a:xfrm>
+            <a:prstGeom prst="rect">
+              <a:avLst/>
+            </a:prstGeom>
+          </p:spPr>
+        </p:pic>
+      </p:grpSp>
+      <p:grpSp>
+        <p:nvGrpSpPr>
+          <p:cNvPr id="70" name="Grupo 69"/>
+          <p:cNvGrpSpPr/>
+          <p:nvPr/>
+        </p:nvGrpSpPr>
+        <p:grpSpPr>
+          <a:xfrm>
+            <a:off x="2222059" y="3501137"/>
+            <a:ext cx="1133476" cy="1514757"/>
+            <a:chOff x="2222500" y="1720849"/>
+            <a:chExt cx="1133476" cy="1514757"/>
+          </a:xfrm>
+        </p:grpSpPr>
+        <p:sp>
+          <p:nvSpPr>
+            <p:cNvPr id="71" name="Retângulo 70"/>
+            <p:cNvSpPr/>
+            <p:nvPr/>
+          </p:nvSpPr>
+          <p:spPr>
+            <a:xfrm>
+              <a:off x="2222500" y="1720849"/>
+              <a:ext cx="1133476" cy="1514757"/>
+            </a:xfrm>
+            <a:prstGeom prst="rect">
+              <a:avLst/>
+            </a:prstGeom>
+            <a:solidFill>
+              <a:srgbClr val="FDEBC7"/>
+            </a:solidFill>
+            <a:ln>
+              <a:solidFill>
+                <a:srgbClr val="8DBA62"/>
+              </a:solidFill>
+            </a:ln>
+          </p:spPr>
+          <p:style>
+            <a:lnRef idx="2">
+              <a:schemeClr val="accent1">
+                <a:shade val="50000"/>
+              </a:schemeClr>
+            </a:lnRef>
+            <a:fillRef idx="1">
+              <a:schemeClr val="accent1"/>
+            </a:fillRef>
+            <a:effectRef idx="0">
+              <a:schemeClr val="accent1"/>
+            </a:effectRef>
+            <a:fontRef idx="minor">
+              <a:schemeClr val="lt1"/>
+            </a:fontRef>
+          </p:style>
+          <p:txBody>
+            <a:bodyPr rtlCol="0" anchor="ctr"/>
+            <a:lstStyle/>
+            <a:p>
+              <a:pPr algn="ctr"/>
+              <a:endParaRPr lang="pt-BR"/>
+            </a:p>
+          </p:txBody>
+        </p:sp>
+        <p:sp>
+          <p:nvSpPr>
+            <p:cNvPr id="72" name="Retângulo 71"/>
+            <p:cNvSpPr/>
+            <p:nvPr/>
+          </p:nvSpPr>
+          <p:spPr>
+            <a:xfrm>
+              <a:off x="2274979" y="1772529"/>
+              <a:ext cx="1027638" cy="1411916"/>
+            </a:xfrm>
+            <a:prstGeom prst="rect">
+              <a:avLst/>
+            </a:prstGeom>
+            <a:solidFill>
+              <a:srgbClr val="8DBA62"/>
+            </a:solidFill>
+            <a:ln>
+              <a:solidFill>
+                <a:srgbClr val="8DBA62"/>
+              </a:solidFill>
+            </a:ln>
+          </p:spPr>
+          <p:style>
+            <a:lnRef idx="2">
+              <a:schemeClr val="accent1">
+                <a:shade val="50000"/>
+              </a:schemeClr>
+            </a:lnRef>
+            <a:fillRef idx="1">
+              <a:schemeClr val="accent1"/>
+            </a:fillRef>
+            <a:effectRef idx="0">
+              <a:schemeClr val="accent1"/>
+            </a:effectRef>
+            <a:fontRef idx="minor">
+              <a:schemeClr val="lt1"/>
+            </a:fontRef>
+          </p:style>
+          <p:txBody>
+            <a:bodyPr rtlCol="0" anchor="ctr"/>
+            <a:lstStyle/>
+            <a:p>
+              <a:pPr algn="ctr"/>
+              <a:endParaRPr lang="pt-BR"/>
+            </a:p>
+          </p:txBody>
+        </p:sp>
+        <p:sp>
+          <p:nvSpPr>
+            <p:cNvPr id="73" name="Elipse 72"/>
+            <p:cNvSpPr/>
+            <p:nvPr/>
+          </p:nvSpPr>
+          <p:spPr>
+            <a:xfrm>
+              <a:off x="2341225" y="1872436"/>
+              <a:ext cx="895145" cy="1211582"/>
+            </a:xfrm>
+            <a:prstGeom prst="ellipse">
+              <a:avLst/>
+            </a:prstGeom>
+            <a:solidFill>
+              <a:srgbClr val="FDEBC7"/>
+            </a:solidFill>
+            <a:ln>
+              <a:solidFill>
+                <a:srgbClr val="FDEBC7"/>
+              </a:solidFill>
+            </a:ln>
+          </p:spPr>
+          <p:style>
+            <a:lnRef idx="2">
+              <a:schemeClr val="accent1">
+                <a:shade val="50000"/>
+              </a:schemeClr>
+            </a:lnRef>
+            <a:fillRef idx="1">
+              <a:schemeClr val="accent1"/>
+            </a:fillRef>
+            <a:effectRef idx="0">
+              <a:schemeClr val="accent1"/>
+            </a:effectRef>
+            <a:fontRef idx="minor">
+              <a:schemeClr val="lt1"/>
+            </a:fontRef>
+          </p:style>
+          <p:txBody>
+            <a:bodyPr rtlCol="0" anchor="ctr"/>
+            <a:lstStyle/>
+            <a:p>
+              <a:pPr algn="ctr"/>
+              <a:endParaRPr lang="pt-BR"/>
+            </a:p>
+          </p:txBody>
+        </p:sp>
+        <p:pic>
+          <p:nvPicPr>
+            <p:cNvPr id="74" name="Imagem 73"/>
+            <p:cNvPicPr>
+              <a:picLocks noChangeAspect="1"/>
+            </p:cNvPicPr>
+            <p:nvPr/>
+          </p:nvPicPr>
+          <p:blipFill rotWithShape="1">
+            <a:blip r:embed="rId14" cstate="print">
+              <a:extLst>
+                <a:ext uri="{28A0092B-C50C-407E-A947-70E740481C1C}">
+                  <a14:useLocalDpi xmlns:a14="http://schemas.microsoft.com/office/drawing/2010/main" val="0"/>
+                </a:ext>
+              </a:extLst>
+            </a:blip>
+            <a:srcRect l="19090" t="18911" r="17886" b="17557"/>
+            <a:stretch/>
+          </p:blipFill>
+          <p:spPr>
+            <a:xfrm>
+              <a:off x="2400300" y="2101850"/>
+              <a:ext cx="787400" cy="793750"/>
+            </a:xfrm>
+            <a:prstGeom prst="rect">
+              <a:avLst/>
+            </a:prstGeom>
+          </p:spPr>
+        </p:pic>
+      </p:grpSp>
+      <p:grpSp>
+        <p:nvGrpSpPr>
+          <p:cNvPr id="75" name="Grupo 74"/>
+          <p:cNvGrpSpPr/>
+          <p:nvPr/>
+        </p:nvGrpSpPr>
+        <p:grpSpPr>
+          <a:xfrm>
+            <a:off x="3732443" y="3499251"/>
+            <a:ext cx="1133476" cy="1514757"/>
+            <a:chOff x="2222500" y="1720849"/>
+            <a:chExt cx="1133476" cy="1514757"/>
+          </a:xfrm>
+        </p:grpSpPr>
+        <p:sp>
+          <p:nvSpPr>
+            <p:cNvPr id="76" name="Retângulo 75"/>
+            <p:cNvSpPr/>
+            <p:nvPr/>
+          </p:nvSpPr>
+          <p:spPr>
+            <a:xfrm>
+              <a:off x="2222500" y="1720849"/>
+              <a:ext cx="1133476" cy="1514757"/>
+            </a:xfrm>
+            <a:prstGeom prst="rect">
+              <a:avLst/>
+            </a:prstGeom>
+            <a:solidFill>
+              <a:srgbClr val="FDEBC7"/>
+            </a:solidFill>
+            <a:ln>
+              <a:solidFill>
+                <a:srgbClr val="8DBA62"/>
+              </a:solidFill>
+            </a:ln>
+          </p:spPr>
+          <p:style>
+            <a:lnRef idx="2">
+              <a:schemeClr val="accent1">
+                <a:shade val="50000"/>
+              </a:schemeClr>
+            </a:lnRef>
+            <a:fillRef idx="1">
+              <a:schemeClr val="accent1"/>
+            </a:fillRef>
+            <a:effectRef idx="0">
+              <a:schemeClr val="accent1"/>
+            </a:effectRef>
+            <a:fontRef idx="minor">
+              <a:schemeClr val="lt1"/>
+            </a:fontRef>
+          </p:style>
+          <p:txBody>
+            <a:bodyPr rtlCol="0" anchor="ctr"/>
+            <a:lstStyle/>
+            <a:p>
+              <a:pPr algn="ctr"/>
+              <a:endParaRPr lang="pt-BR"/>
+            </a:p>
+          </p:txBody>
+        </p:sp>
+        <p:sp>
+          <p:nvSpPr>
+            <p:cNvPr id="77" name="Retângulo 76"/>
+            <p:cNvSpPr/>
+            <p:nvPr/>
+          </p:nvSpPr>
+          <p:spPr>
+            <a:xfrm>
+              <a:off x="2274979" y="1772529"/>
+              <a:ext cx="1027638" cy="1411916"/>
+            </a:xfrm>
+            <a:prstGeom prst="rect">
+              <a:avLst/>
+            </a:prstGeom>
+            <a:solidFill>
+              <a:srgbClr val="8DBA62"/>
+            </a:solidFill>
+            <a:ln>
+              <a:solidFill>
+                <a:srgbClr val="8DBA62"/>
+              </a:solidFill>
+            </a:ln>
+          </p:spPr>
+          <p:style>
+            <a:lnRef idx="2">
+              <a:schemeClr val="accent1">
+                <a:shade val="50000"/>
+              </a:schemeClr>
+            </a:lnRef>
+            <a:fillRef idx="1">
+              <a:schemeClr val="accent1"/>
+            </a:fillRef>
+            <a:effectRef idx="0">
+              <a:schemeClr val="accent1"/>
+            </a:effectRef>
+            <a:fontRef idx="minor">
+              <a:schemeClr val="lt1"/>
+            </a:fontRef>
+          </p:style>
+          <p:txBody>
+            <a:bodyPr rtlCol="0" anchor="ctr"/>
+            <a:lstStyle/>
+            <a:p>
+              <a:pPr algn="ctr"/>
+              <a:endParaRPr lang="pt-BR"/>
+            </a:p>
+          </p:txBody>
+        </p:sp>
+        <p:sp>
+          <p:nvSpPr>
+            <p:cNvPr id="78" name="Elipse 77"/>
+            <p:cNvSpPr/>
+            <p:nvPr/>
+          </p:nvSpPr>
+          <p:spPr>
+            <a:xfrm>
+              <a:off x="2341225" y="1872436"/>
+              <a:ext cx="895145" cy="1211582"/>
+            </a:xfrm>
+            <a:prstGeom prst="ellipse">
+              <a:avLst/>
+            </a:prstGeom>
+            <a:solidFill>
+              <a:srgbClr val="FDEBC7"/>
+            </a:solidFill>
+            <a:ln>
+              <a:solidFill>
+                <a:srgbClr val="FDEBC7"/>
+              </a:solidFill>
+            </a:ln>
+          </p:spPr>
+          <p:style>
+            <a:lnRef idx="2">
+              <a:schemeClr val="accent1">
+                <a:shade val="50000"/>
+              </a:schemeClr>
+            </a:lnRef>
+            <a:fillRef idx="1">
+              <a:schemeClr val="accent1"/>
+            </a:fillRef>
+            <a:effectRef idx="0">
+              <a:schemeClr val="accent1"/>
+            </a:effectRef>
+            <a:fontRef idx="minor">
+              <a:schemeClr val="lt1"/>
+            </a:fontRef>
+          </p:style>
+          <p:txBody>
+            <a:bodyPr rtlCol="0" anchor="ctr"/>
+            <a:lstStyle/>
+            <a:p>
+              <a:pPr algn="ctr"/>
+              <a:endParaRPr lang="pt-BR"/>
+            </a:p>
+          </p:txBody>
+        </p:sp>
+        <p:pic>
+          <p:nvPicPr>
+            <p:cNvPr id="79" name="Imagem 78"/>
+            <p:cNvPicPr>
+              <a:picLocks noChangeAspect="1"/>
+            </p:cNvPicPr>
+            <p:nvPr/>
+          </p:nvPicPr>
+          <p:blipFill rotWithShape="1">
+            <a:blip r:embed="rId14" cstate="print">
+              <a:extLst>
+                <a:ext uri="{28A0092B-C50C-407E-A947-70E740481C1C}">
+                  <a14:useLocalDpi xmlns:a14="http://schemas.microsoft.com/office/drawing/2010/main" val="0"/>
+                </a:ext>
+              </a:extLst>
+            </a:blip>
+            <a:srcRect l="19090" t="18911" r="17886" b="17557"/>
+            <a:stretch/>
+          </p:blipFill>
+          <p:spPr>
+            <a:xfrm>
+              <a:off x="2400300" y="2101850"/>
+              <a:ext cx="787400" cy="793750"/>
+            </a:xfrm>
+            <a:prstGeom prst="rect">
+              <a:avLst/>
+            </a:prstGeom>
+          </p:spPr>
+        </p:pic>
+      </p:grpSp>
+      <p:grpSp>
+        <p:nvGrpSpPr>
+          <p:cNvPr id="80" name="Grupo 79"/>
+          <p:cNvGrpSpPr/>
+          <p:nvPr/>
+        </p:nvGrpSpPr>
+        <p:grpSpPr>
+          <a:xfrm>
+            <a:off x="5205168" y="3535526"/>
+            <a:ext cx="1133476" cy="1514757"/>
+            <a:chOff x="2222500" y="1720849"/>
+            <a:chExt cx="1133476" cy="1514757"/>
+          </a:xfrm>
+        </p:grpSpPr>
+        <p:sp>
+          <p:nvSpPr>
+            <p:cNvPr id="81" name="Retângulo 80"/>
+            <p:cNvSpPr/>
+            <p:nvPr/>
+          </p:nvSpPr>
+          <p:spPr>
+            <a:xfrm>
+              <a:off x="2222500" y="1720849"/>
+              <a:ext cx="1133476" cy="1514757"/>
+            </a:xfrm>
+            <a:prstGeom prst="rect">
+              <a:avLst/>
+            </a:prstGeom>
+            <a:solidFill>
+              <a:srgbClr val="FDEBC7"/>
+            </a:solidFill>
+            <a:ln>
+              <a:solidFill>
+                <a:srgbClr val="8DBA62"/>
+              </a:solidFill>
+            </a:ln>
+          </p:spPr>
+          <p:style>
+            <a:lnRef idx="2">
+              <a:schemeClr val="accent1">
+                <a:shade val="50000"/>
+              </a:schemeClr>
+            </a:lnRef>
+            <a:fillRef idx="1">
+              <a:schemeClr val="accent1"/>
+            </a:fillRef>
+            <a:effectRef idx="0">
+              <a:schemeClr val="accent1"/>
+            </a:effectRef>
+            <a:fontRef idx="minor">
+              <a:schemeClr val="lt1"/>
+            </a:fontRef>
+          </p:style>
+          <p:txBody>
+            <a:bodyPr rtlCol="0" anchor="ctr"/>
+            <a:lstStyle/>
+            <a:p>
+              <a:pPr algn="ctr"/>
+              <a:endParaRPr lang="pt-BR"/>
+            </a:p>
+          </p:txBody>
+        </p:sp>
+        <p:sp>
+          <p:nvSpPr>
+            <p:cNvPr id="82" name="Retângulo 81"/>
+            <p:cNvSpPr/>
+            <p:nvPr/>
+          </p:nvSpPr>
+          <p:spPr>
+            <a:xfrm>
+              <a:off x="2274979" y="1772529"/>
+              <a:ext cx="1027638" cy="1411916"/>
+            </a:xfrm>
+            <a:prstGeom prst="rect">
+              <a:avLst/>
+            </a:prstGeom>
+            <a:solidFill>
+              <a:srgbClr val="8DBA62"/>
+            </a:solidFill>
+            <a:ln>
+              <a:solidFill>
+                <a:srgbClr val="8DBA62"/>
+              </a:solidFill>
+            </a:ln>
+          </p:spPr>
+          <p:style>
+            <a:lnRef idx="2">
+              <a:schemeClr val="accent1">
+                <a:shade val="50000"/>
+              </a:schemeClr>
+            </a:lnRef>
+            <a:fillRef idx="1">
+              <a:schemeClr val="accent1"/>
+            </a:fillRef>
+            <a:effectRef idx="0">
+              <a:schemeClr val="accent1"/>
+            </a:effectRef>
+            <a:fontRef idx="minor">
+              <a:schemeClr val="lt1"/>
+            </a:fontRef>
+          </p:style>
+          <p:txBody>
+            <a:bodyPr rtlCol="0" anchor="ctr"/>
+            <a:lstStyle/>
+            <a:p>
+              <a:pPr algn="ctr"/>
+              <a:endParaRPr lang="pt-BR"/>
+            </a:p>
+          </p:txBody>
+        </p:sp>
+        <p:sp>
+          <p:nvSpPr>
+            <p:cNvPr id="83" name="Elipse 82"/>
+            <p:cNvSpPr/>
+            <p:nvPr/>
+          </p:nvSpPr>
+          <p:spPr>
+            <a:xfrm>
+              <a:off x="2341225" y="1872436"/>
+              <a:ext cx="895145" cy="1211582"/>
+            </a:xfrm>
+            <a:prstGeom prst="ellipse">
+              <a:avLst/>
+            </a:prstGeom>
+            <a:solidFill>
+              <a:srgbClr val="FDEBC7"/>
+            </a:solidFill>
+            <a:ln>
+              <a:solidFill>
+                <a:srgbClr val="FDEBC7"/>
+              </a:solidFill>
+            </a:ln>
+          </p:spPr>
+          <p:style>
+            <a:lnRef idx="2">
+              <a:schemeClr val="accent1">
+                <a:shade val="50000"/>
+              </a:schemeClr>
+            </a:lnRef>
+            <a:fillRef idx="1">
+              <a:schemeClr val="accent1"/>
+            </a:fillRef>
+            <a:effectRef idx="0">
+              <a:schemeClr val="accent1"/>
+            </a:effectRef>
+            <a:fontRef idx="minor">
+              <a:schemeClr val="lt1"/>
+            </a:fontRef>
+          </p:style>
+          <p:txBody>
+            <a:bodyPr rtlCol="0" anchor="ctr"/>
+            <a:lstStyle/>
+            <a:p>
+              <a:pPr algn="ctr"/>
+              <a:endParaRPr lang="pt-BR"/>
+            </a:p>
+          </p:txBody>
+        </p:sp>
+        <p:pic>
+          <p:nvPicPr>
+            <p:cNvPr id="84" name="Imagem 83"/>
+            <p:cNvPicPr>
+              <a:picLocks noChangeAspect="1"/>
+            </p:cNvPicPr>
+            <p:nvPr/>
+          </p:nvPicPr>
+          <p:blipFill rotWithShape="1">
+            <a:blip r:embed="rId14" cstate="print">
+              <a:extLst>
+                <a:ext uri="{28A0092B-C50C-407E-A947-70E740481C1C}">
+                  <a14:useLocalDpi xmlns:a14="http://schemas.microsoft.com/office/drawing/2010/main" val="0"/>
+                </a:ext>
+              </a:extLst>
+            </a:blip>
+            <a:srcRect l="19090" t="18911" r="17886" b="17557"/>
+            <a:stretch/>
+          </p:blipFill>
+          <p:spPr>
+            <a:xfrm>
+              <a:off x="2400300" y="2101850"/>
+              <a:ext cx="787400" cy="793750"/>
+            </a:xfrm>
+            <a:prstGeom prst="rect">
+              <a:avLst/>
+            </a:prstGeom>
+          </p:spPr>
+        </p:pic>
+      </p:grpSp>
+      <p:grpSp>
+        <p:nvGrpSpPr>
+          <p:cNvPr id="85" name="Grupo 84"/>
+          <p:cNvGrpSpPr/>
+          <p:nvPr/>
+        </p:nvGrpSpPr>
+        <p:grpSpPr>
+          <a:xfrm>
+            <a:off x="6814593" y="3512830"/>
+            <a:ext cx="1133476" cy="1514757"/>
+            <a:chOff x="2222500" y="1720849"/>
+            <a:chExt cx="1133476" cy="1514757"/>
+          </a:xfrm>
+        </p:grpSpPr>
+        <p:sp>
+          <p:nvSpPr>
+            <p:cNvPr id="86" name="Retângulo 85"/>
+            <p:cNvSpPr/>
+            <p:nvPr/>
+          </p:nvSpPr>
+          <p:spPr>
+            <a:xfrm>
+              <a:off x="2222500" y="1720849"/>
+              <a:ext cx="1133476" cy="1514757"/>
+            </a:xfrm>
+            <a:prstGeom prst="rect">
+              <a:avLst/>
+            </a:prstGeom>
+            <a:solidFill>
+              <a:srgbClr val="FDEBC7"/>
+            </a:solidFill>
+            <a:ln>
+              <a:solidFill>
+                <a:srgbClr val="8DBA62"/>
+              </a:solidFill>
+            </a:ln>
+          </p:spPr>
+          <p:style>
+            <a:lnRef idx="2">
+              <a:schemeClr val="accent1">
+                <a:shade val="50000"/>
+              </a:schemeClr>
+            </a:lnRef>
+            <a:fillRef idx="1">
+              <a:schemeClr val="accent1"/>
+            </a:fillRef>
+            <a:effectRef idx="0">
+              <a:schemeClr val="accent1"/>
+            </a:effectRef>
+            <a:fontRef idx="minor">
+              <a:schemeClr val="lt1"/>
+            </a:fontRef>
+          </p:style>
+          <p:txBody>
+            <a:bodyPr rtlCol="0" anchor="ctr"/>
+            <a:lstStyle/>
+            <a:p>
+              <a:pPr algn="ctr"/>
+              <a:endParaRPr lang="pt-BR"/>
+            </a:p>
+          </p:txBody>
+        </p:sp>
+        <p:sp>
+          <p:nvSpPr>
+            <p:cNvPr id="87" name="Retângulo 86"/>
+            <p:cNvSpPr/>
+            <p:nvPr/>
+          </p:nvSpPr>
+          <p:spPr>
+            <a:xfrm>
+              <a:off x="2274979" y="1772529"/>
+              <a:ext cx="1027638" cy="1411916"/>
+            </a:xfrm>
+            <a:prstGeom prst="rect">
+              <a:avLst/>
+            </a:prstGeom>
+            <a:solidFill>
+              <a:srgbClr val="8DBA62"/>
+            </a:solidFill>
+            <a:ln>
+              <a:solidFill>
+                <a:srgbClr val="8DBA62"/>
+              </a:solidFill>
+            </a:ln>
+          </p:spPr>
+          <p:style>
+            <a:lnRef idx="2">
+              <a:schemeClr val="accent1">
+                <a:shade val="50000"/>
+              </a:schemeClr>
+            </a:lnRef>
+            <a:fillRef idx="1">
+              <a:schemeClr val="accent1"/>
+            </a:fillRef>
+            <a:effectRef idx="0">
+              <a:schemeClr val="accent1"/>
+            </a:effectRef>
+            <a:fontRef idx="minor">
+              <a:schemeClr val="lt1"/>
+            </a:fontRef>
+          </p:style>
+          <p:txBody>
+            <a:bodyPr rtlCol="0" anchor="ctr"/>
+            <a:lstStyle/>
+            <a:p>
+              <a:pPr algn="ctr"/>
+              <a:endParaRPr lang="pt-BR"/>
+            </a:p>
+          </p:txBody>
+        </p:sp>
+        <p:sp>
+          <p:nvSpPr>
+            <p:cNvPr id="88" name="Elipse 87"/>
+            <p:cNvSpPr/>
+            <p:nvPr/>
+          </p:nvSpPr>
+          <p:spPr>
+            <a:xfrm>
+              <a:off x="2341225" y="1872436"/>
+              <a:ext cx="895145" cy="1211582"/>
+            </a:xfrm>
+            <a:prstGeom prst="ellipse">
+              <a:avLst/>
+            </a:prstGeom>
+            <a:solidFill>
+              <a:srgbClr val="FDEBC7"/>
+            </a:solidFill>
+            <a:ln>
+              <a:solidFill>
+                <a:srgbClr val="FDEBC7"/>
+              </a:solidFill>
+            </a:ln>
+          </p:spPr>
+          <p:style>
+            <a:lnRef idx="2">
+              <a:schemeClr val="accent1">
+                <a:shade val="50000"/>
+              </a:schemeClr>
+            </a:lnRef>
+            <a:fillRef idx="1">
+              <a:schemeClr val="accent1"/>
+            </a:fillRef>
+            <a:effectRef idx="0">
+              <a:schemeClr val="accent1"/>
+            </a:effectRef>
+            <a:fontRef idx="minor">
+              <a:schemeClr val="lt1"/>
+            </a:fontRef>
+          </p:style>
+          <p:txBody>
+            <a:bodyPr rtlCol="0" anchor="ctr"/>
+            <a:lstStyle/>
+            <a:p>
+              <a:pPr algn="ctr"/>
+              <a:endParaRPr lang="pt-BR"/>
+            </a:p>
+          </p:txBody>
+        </p:sp>
+        <p:pic>
+          <p:nvPicPr>
+            <p:cNvPr id="89" name="Imagem 88"/>
+            <p:cNvPicPr>
+              <a:picLocks noChangeAspect="1"/>
+            </p:cNvPicPr>
+            <p:nvPr/>
+          </p:nvPicPr>
+          <p:blipFill rotWithShape="1">
+            <a:blip r:embed="rId14" cstate="print">
+              <a:extLst>
+                <a:ext uri="{28A0092B-C50C-407E-A947-70E740481C1C}">
+                  <a14:useLocalDpi xmlns:a14="http://schemas.microsoft.com/office/drawing/2010/main" val="0"/>
+                </a:ext>
+              </a:extLst>
+            </a:blip>
+            <a:srcRect l="19090" t="18911" r="17886" b="17557"/>
+            <a:stretch/>
+          </p:blipFill>
+          <p:spPr>
+            <a:xfrm>
+              <a:off x="2400300" y="2101850"/>
+              <a:ext cx="787400" cy="793750"/>
+            </a:xfrm>
+            <a:prstGeom prst="rect">
+              <a:avLst/>
+            </a:prstGeom>
+          </p:spPr>
+        </p:pic>
+      </p:grpSp>
+      <p:grpSp>
+        <p:nvGrpSpPr>
+          <p:cNvPr id="90" name="Grupo 89"/>
+          <p:cNvGrpSpPr/>
+          <p:nvPr/>
+        </p:nvGrpSpPr>
+        <p:grpSpPr>
+          <a:xfrm>
+            <a:off x="8351669" y="3535526"/>
+            <a:ext cx="1133476" cy="1514757"/>
+            <a:chOff x="2222500" y="1720849"/>
+            <a:chExt cx="1133476" cy="1514757"/>
+          </a:xfrm>
+        </p:grpSpPr>
+        <p:sp>
+          <p:nvSpPr>
+            <p:cNvPr id="91" name="Retângulo 90"/>
+            <p:cNvSpPr/>
+            <p:nvPr/>
+          </p:nvSpPr>
+          <p:spPr>
+            <a:xfrm>
+              <a:off x="2222500" y="1720849"/>
+              <a:ext cx="1133476" cy="1514757"/>
+            </a:xfrm>
+            <a:prstGeom prst="rect">
+              <a:avLst/>
+            </a:prstGeom>
+            <a:solidFill>
+              <a:srgbClr val="FDEBC7"/>
+            </a:solidFill>
+            <a:ln>
+              <a:solidFill>
+                <a:srgbClr val="8DBA62"/>
+              </a:solidFill>
+            </a:ln>
+          </p:spPr>
+          <p:style>
+            <a:lnRef idx="2">
+              <a:schemeClr val="accent1">
+                <a:shade val="50000"/>
+              </a:schemeClr>
+            </a:lnRef>
+            <a:fillRef idx="1">
+              <a:schemeClr val="accent1"/>
+            </a:fillRef>
+            <a:effectRef idx="0">
+              <a:schemeClr val="accent1"/>
+            </a:effectRef>
+            <a:fontRef idx="minor">
+              <a:schemeClr val="lt1"/>
+            </a:fontRef>
+          </p:style>
+          <p:txBody>
+            <a:bodyPr rtlCol="0" anchor="ctr"/>
+            <a:lstStyle/>
+            <a:p>
+              <a:pPr algn="ctr"/>
+              <a:endParaRPr lang="pt-BR"/>
+            </a:p>
+          </p:txBody>
+        </p:sp>
+        <p:sp>
+          <p:nvSpPr>
+            <p:cNvPr id="92" name="Retângulo 91"/>
+            <p:cNvSpPr/>
+            <p:nvPr/>
+          </p:nvSpPr>
+          <p:spPr>
+            <a:xfrm>
+              <a:off x="2274979" y="1772529"/>
+              <a:ext cx="1027638" cy="1411916"/>
+            </a:xfrm>
+            <a:prstGeom prst="rect">
+              <a:avLst/>
+            </a:prstGeom>
+            <a:solidFill>
+              <a:srgbClr val="8DBA62"/>
+            </a:solidFill>
+            <a:ln>
+              <a:solidFill>
+                <a:srgbClr val="8DBA62"/>
+              </a:solidFill>
+            </a:ln>
+          </p:spPr>
+          <p:style>
+            <a:lnRef idx="2">
+              <a:schemeClr val="accent1">
+                <a:shade val="50000"/>
+              </a:schemeClr>
+            </a:lnRef>
+            <a:fillRef idx="1">
+              <a:schemeClr val="accent1"/>
+            </a:fillRef>
+            <a:effectRef idx="0">
+              <a:schemeClr val="accent1"/>
+            </a:effectRef>
+            <a:fontRef idx="minor">
+              <a:schemeClr val="lt1"/>
+            </a:fontRef>
+          </p:style>
+          <p:txBody>
+            <a:bodyPr rtlCol="0" anchor="ctr"/>
+            <a:lstStyle/>
+            <a:p>
+              <a:pPr algn="ctr"/>
+              <a:endParaRPr lang="pt-BR"/>
+            </a:p>
+          </p:txBody>
+        </p:sp>
+        <p:sp>
+          <p:nvSpPr>
+            <p:cNvPr id="93" name="Elipse 92"/>
+            <p:cNvSpPr/>
+            <p:nvPr/>
+          </p:nvSpPr>
+          <p:spPr>
+            <a:xfrm>
+              <a:off x="2341225" y="1872436"/>
+              <a:ext cx="895145" cy="1211582"/>
+            </a:xfrm>
+            <a:prstGeom prst="ellipse">
+              <a:avLst/>
+            </a:prstGeom>
+            <a:solidFill>
+              <a:srgbClr val="FDEBC7"/>
+            </a:solidFill>
+            <a:ln>
+              <a:solidFill>
+                <a:srgbClr val="FDEBC7"/>
+              </a:solidFill>
+            </a:ln>
+          </p:spPr>
+          <p:style>
+            <a:lnRef idx="2">
+              <a:schemeClr val="accent1">
+                <a:shade val="50000"/>
+              </a:schemeClr>
+            </a:lnRef>
+            <a:fillRef idx="1">
+              <a:schemeClr val="accent1"/>
+            </a:fillRef>
+            <a:effectRef idx="0">
+              <a:schemeClr val="accent1"/>
+            </a:effectRef>
+            <a:fontRef idx="minor">
+              <a:schemeClr val="lt1"/>
+            </a:fontRef>
+          </p:style>
+          <p:txBody>
+            <a:bodyPr rtlCol="0" anchor="ctr"/>
+            <a:lstStyle/>
+            <a:p>
+              <a:pPr algn="ctr"/>
+              <a:endParaRPr lang="pt-BR"/>
+            </a:p>
+          </p:txBody>
+        </p:sp>
+        <p:pic>
+          <p:nvPicPr>
+            <p:cNvPr id="94" name="Imagem 93"/>
+            <p:cNvPicPr>
+              <a:picLocks noChangeAspect="1"/>
+            </p:cNvPicPr>
+            <p:nvPr/>
+          </p:nvPicPr>
+          <p:blipFill rotWithShape="1">
+            <a:blip r:embed="rId14" cstate="print">
+              <a:extLst>
+                <a:ext uri="{28A0092B-C50C-407E-A947-70E740481C1C}">
+                  <a14:useLocalDpi xmlns:a14="http://schemas.microsoft.com/office/drawing/2010/main" val="0"/>
+                </a:ext>
+              </a:extLst>
+            </a:blip>
+            <a:srcRect l="19090" t="18911" r="17886" b="17557"/>
+            <a:stretch/>
+          </p:blipFill>
+          <p:spPr>
+            <a:xfrm>
+              <a:off x="2400300" y="2101850"/>
+              <a:ext cx="787400" cy="793750"/>
+            </a:xfrm>
+            <a:prstGeom prst="rect">
+              <a:avLst/>
+            </a:prstGeom>
+          </p:spPr>
+        </p:pic>
+      </p:grpSp>
+    </p:spTree>
+    <p:extLst>
+      <p:ext uri="{BB962C8B-B14F-4D97-AF65-F5344CB8AC3E}">
+        <p14:creationId xmlns:p14="http://schemas.microsoft.com/office/powerpoint/2010/main" val="234433919"/>
+      </p:ext>
+    </p:extLst>
+  </p:cSld>
+  <p:clrMapOvr>
+    <a:masterClrMapping/>
+  </p:clrMapOvr>
+  <p:timing>
+    <p:tnLst>
+      <p:par>
+        <p:cTn id="1" dur="indefinite" restart="never" nodeType="tmRoot"/>
+      </p:par>
+    </p:tnLst>
+  </p:timing>
+</p:sld>
+</file>
+
+<file path=ppt/slides/slide29.xml><?xml version="1.0" encoding="utf-8"?>
+<p:sld xmlns:a="http://schemas.openxmlformats.org/drawingml/2006/main" xmlns:r="http://schemas.openxmlformats.org/officeDocument/2006/relationships" xmlns:p="http://schemas.openxmlformats.org/presentationml/2006/main">
+  <p:cSld>
+    <p:spTree>
+      <p:nvGrpSpPr>
+        <p:cNvPr id="1" name=""/>
+        <p:cNvGrpSpPr/>
+        <p:nvPr/>
+      </p:nvGrpSpPr>
+      <p:grpSpPr>
+        <a:xfrm>
+          <a:off x="0" y="0"/>
+          <a:ext cx="0" cy="0"/>
+          <a:chOff x="0" y="0"/>
+          <a:chExt cx="0" cy="0"/>
+        </a:xfrm>
+      </p:grpSpPr>
+      <p:sp>
+        <p:nvSpPr>
           <p:cNvPr id="2" name="Título 1"/>
           <p:cNvSpPr>
             <a:spLocks noGrp="1"/>
@@ -19721,10 +22519,671 @@
   <p:clrMapOvr>
     <a:masterClrMapping/>
   </p:clrMapOvr>
+  <p:timing>
+    <p:tnLst>
+      <p:par>
+        <p:cTn id="1" dur="indefinite" restart="never" nodeType="tmRoot"/>
+      </p:par>
+    </p:tnLst>
+  </p:timing>
 </p:sld>
 </file>
 
-<file path=ppt/slides/slide29.xml><?xml version="1.0" encoding="utf-8"?>
+<file path=ppt/slides/slide3.xml><?xml version="1.0" encoding="utf-8"?>
+<p:sld xmlns:a="http://schemas.openxmlformats.org/drawingml/2006/main" xmlns:r="http://schemas.openxmlformats.org/officeDocument/2006/relationships" xmlns:p="http://schemas.openxmlformats.org/presentationml/2006/main">
+  <p:cSld>
+    <p:spTree>
+      <p:nvGrpSpPr>
+        <p:cNvPr id="1" name=""/>
+        <p:cNvGrpSpPr/>
+        <p:nvPr/>
+      </p:nvGrpSpPr>
+      <p:grpSpPr>
+        <a:xfrm>
+          <a:off x="0" y="0"/>
+          <a:ext cx="0" cy="0"/>
+          <a:chOff x="0" y="0"/>
+          <a:chExt cx="0" cy="0"/>
+        </a:xfrm>
+      </p:grpSpPr>
+      <p:sp>
+        <p:nvSpPr>
+          <p:cNvPr id="4" name="Retângulo 3"/>
+          <p:cNvSpPr/>
+          <p:nvPr/>
+        </p:nvSpPr>
+        <p:spPr>
+          <a:xfrm>
+            <a:off x="1146749" y="441822"/>
+            <a:ext cx="9787944" cy="5911402"/>
+          </a:xfrm>
+          <a:prstGeom prst="rect">
+            <a:avLst/>
+          </a:prstGeom>
+          <a:solidFill>
+            <a:srgbClr val="86B161"/>
+          </a:solidFill>
+          <a:ln>
+            <a:solidFill>
+              <a:schemeClr val="accent6">
+                <a:lumMod val="60000"/>
+                <a:lumOff val="40000"/>
+              </a:schemeClr>
+            </a:solidFill>
+          </a:ln>
+          <a:effectLst/>
+        </p:spPr>
+        <p:style>
+          <a:lnRef idx="2">
+            <a:schemeClr val="accent1">
+              <a:shade val="50000"/>
+            </a:schemeClr>
+          </a:lnRef>
+          <a:fillRef idx="1">
+            <a:schemeClr val="accent1"/>
+          </a:fillRef>
+          <a:effectRef idx="0">
+            <a:schemeClr val="accent1"/>
+          </a:effectRef>
+          <a:fontRef idx="minor">
+            <a:schemeClr val="lt1"/>
+          </a:fontRef>
+        </p:style>
+        <p:txBody>
+          <a:bodyPr rtlCol="0" anchor="ctr"/>
+          <a:lstStyle/>
+          <a:p>
+            <a:pPr algn="ctr"/>
+            <a:endParaRPr lang="pt-BR"/>
+          </a:p>
+        </p:txBody>
+      </p:sp>
+      <p:sp>
+        <p:nvSpPr>
+          <p:cNvPr id="12" name="Retângulo 11"/>
+          <p:cNvSpPr/>
+          <p:nvPr/>
+        </p:nvSpPr>
+        <p:spPr>
+          <a:xfrm>
+            <a:off x="1146749" y="441822"/>
+            <a:ext cx="8461708" cy="2193702"/>
+          </a:xfrm>
+          <a:custGeom>
+            <a:avLst/>
+            <a:gdLst>
+              <a:gd name="connsiteX0" fmla="*/ 0 w 4531235"/>
+              <a:gd name="connsiteY0" fmla="*/ 0 h 2177143"/>
+              <a:gd name="connsiteX1" fmla="*/ 4531235 w 4531235"/>
+              <a:gd name="connsiteY1" fmla="*/ 0 h 2177143"/>
+              <a:gd name="connsiteX2" fmla="*/ 4531235 w 4531235"/>
+              <a:gd name="connsiteY2" fmla="*/ 2177143 h 2177143"/>
+              <a:gd name="connsiteX3" fmla="*/ 0 w 4531235"/>
+              <a:gd name="connsiteY3" fmla="*/ 2177143 h 2177143"/>
+              <a:gd name="connsiteX4" fmla="*/ 0 w 4531235"/>
+              <a:gd name="connsiteY4" fmla="*/ 0 h 2177143"/>
+              <a:gd name="connsiteX0" fmla="*/ 0 w 4531235"/>
+              <a:gd name="connsiteY0" fmla="*/ 0 h 2177143"/>
+              <a:gd name="connsiteX1" fmla="*/ 4531235 w 4531235"/>
+              <a:gd name="connsiteY1" fmla="*/ 0 h 2177143"/>
+              <a:gd name="connsiteX2" fmla="*/ 4531235 w 4531235"/>
+              <a:gd name="connsiteY2" fmla="*/ 2177143 h 2177143"/>
+              <a:gd name="connsiteX3" fmla="*/ 1494971 w 4531235"/>
+              <a:gd name="connsiteY3" fmla="*/ 1973943 h 2177143"/>
+              <a:gd name="connsiteX4" fmla="*/ 0 w 4531235"/>
+              <a:gd name="connsiteY4" fmla="*/ 0 h 2177143"/>
+              <a:gd name="connsiteX0" fmla="*/ 0 w 4531235"/>
+              <a:gd name="connsiteY0" fmla="*/ 0 h 2191658"/>
+              <a:gd name="connsiteX1" fmla="*/ 4531235 w 4531235"/>
+              <a:gd name="connsiteY1" fmla="*/ 0 h 2191658"/>
+              <a:gd name="connsiteX2" fmla="*/ 4531235 w 4531235"/>
+              <a:gd name="connsiteY2" fmla="*/ 2177143 h 2191658"/>
+              <a:gd name="connsiteX3" fmla="*/ 0 w 4531235"/>
+              <a:gd name="connsiteY3" fmla="*/ 2191658 h 2191658"/>
+              <a:gd name="connsiteX4" fmla="*/ 0 w 4531235"/>
+              <a:gd name="connsiteY4" fmla="*/ 0 h 2191658"/>
+              <a:gd name="connsiteX0" fmla="*/ 0 w 6809978"/>
+              <a:gd name="connsiteY0" fmla="*/ 0 h 2191658"/>
+              <a:gd name="connsiteX1" fmla="*/ 4531235 w 6809978"/>
+              <a:gd name="connsiteY1" fmla="*/ 0 h 2191658"/>
+              <a:gd name="connsiteX2" fmla="*/ 6809978 w 6809978"/>
+              <a:gd name="connsiteY2" fmla="*/ 0 h 2191658"/>
+              <a:gd name="connsiteX3" fmla="*/ 0 w 6809978"/>
+              <a:gd name="connsiteY3" fmla="*/ 2191658 h 2191658"/>
+              <a:gd name="connsiteX4" fmla="*/ 0 w 6809978"/>
+              <a:gd name="connsiteY4" fmla="*/ 0 h 2191658"/>
+            </a:gdLst>
+            <a:ahLst/>
+            <a:cxnLst>
+              <a:cxn ang="0">
+                <a:pos x="connsiteX0" y="connsiteY0"/>
+              </a:cxn>
+              <a:cxn ang="0">
+                <a:pos x="connsiteX1" y="connsiteY1"/>
+              </a:cxn>
+              <a:cxn ang="0">
+                <a:pos x="connsiteX2" y="connsiteY2"/>
+              </a:cxn>
+              <a:cxn ang="0">
+                <a:pos x="connsiteX3" y="connsiteY3"/>
+              </a:cxn>
+              <a:cxn ang="0">
+                <a:pos x="connsiteX4" y="connsiteY4"/>
+              </a:cxn>
+            </a:cxnLst>
+            <a:rect l="l" t="t" r="r" b="b"/>
+            <a:pathLst>
+              <a:path w="6809978" h="2191658">
+                <a:moveTo>
+                  <a:pt x="0" y="0"/>
+                </a:moveTo>
+                <a:lnTo>
+                  <a:pt x="4531235" y="0"/>
+                </a:lnTo>
+                <a:lnTo>
+                  <a:pt x="6809978" y="0"/>
+                </a:lnTo>
+                <a:lnTo>
+                  <a:pt x="0" y="2191658"/>
+                </a:lnTo>
+                <a:lnTo>
+                  <a:pt x="0" y="0"/>
+                </a:lnTo>
+                <a:close/>
+              </a:path>
+            </a:pathLst>
+          </a:custGeom>
+          <a:solidFill>
+            <a:srgbClr val="A5CA97"/>
+          </a:solidFill>
+          <a:ln>
+            <a:noFill/>
+          </a:ln>
+        </p:spPr>
+        <p:style>
+          <a:lnRef idx="2">
+            <a:schemeClr val="accent1">
+              <a:shade val="50000"/>
+            </a:schemeClr>
+          </a:lnRef>
+          <a:fillRef idx="1">
+            <a:schemeClr val="accent1"/>
+          </a:fillRef>
+          <a:effectRef idx="0">
+            <a:schemeClr val="accent1"/>
+          </a:effectRef>
+          <a:fontRef idx="minor">
+            <a:schemeClr val="lt1"/>
+          </a:fontRef>
+        </p:style>
+        <p:txBody>
+          <a:bodyPr rtlCol="0" anchor="ctr"/>
+          <a:lstStyle/>
+          <a:p>
+            <a:pPr algn="ctr"/>
+            <a:endParaRPr lang="pt-BR"/>
+          </a:p>
+        </p:txBody>
+      </p:sp>
+      <p:sp>
+        <p:nvSpPr>
+          <p:cNvPr id="14" name="Retângulo 11"/>
+          <p:cNvSpPr/>
+          <p:nvPr/>
+        </p:nvSpPr>
+        <p:spPr>
+          <a:xfrm rot="10800000">
+            <a:off x="2460290" y="4155328"/>
+            <a:ext cx="8461708" cy="2193702"/>
+          </a:xfrm>
+          <a:custGeom>
+            <a:avLst/>
+            <a:gdLst>
+              <a:gd name="connsiteX0" fmla="*/ 0 w 4531235"/>
+              <a:gd name="connsiteY0" fmla="*/ 0 h 2177143"/>
+              <a:gd name="connsiteX1" fmla="*/ 4531235 w 4531235"/>
+              <a:gd name="connsiteY1" fmla="*/ 0 h 2177143"/>
+              <a:gd name="connsiteX2" fmla="*/ 4531235 w 4531235"/>
+              <a:gd name="connsiteY2" fmla="*/ 2177143 h 2177143"/>
+              <a:gd name="connsiteX3" fmla="*/ 0 w 4531235"/>
+              <a:gd name="connsiteY3" fmla="*/ 2177143 h 2177143"/>
+              <a:gd name="connsiteX4" fmla="*/ 0 w 4531235"/>
+              <a:gd name="connsiteY4" fmla="*/ 0 h 2177143"/>
+              <a:gd name="connsiteX0" fmla="*/ 0 w 4531235"/>
+              <a:gd name="connsiteY0" fmla="*/ 0 h 2177143"/>
+              <a:gd name="connsiteX1" fmla="*/ 4531235 w 4531235"/>
+              <a:gd name="connsiteY1" fmla="*/ 0 h 2177143"/>
+              <a:gd name="connsiteX2" fmla="*/ 4531235 w 4531235"/>
+              <a:gd name="connsiteY2" fmla="*/ 2177143 h 2177143"/>
+              <a:gd name="connsiteX3" fmla="*/ 1494971 w 4531235"/>
+              <a:gd name="connsiteY3" fmla="*/ 1973943 h 2177143"/>
+              <a:gd name="connsiteX4" fmla="*/ 0 w 4531235"/>
+              <a:gd name="connsiteY4" fmla="*/ 0 h 2177143"/>
+              <a:gd name="connsiteX0" fmla="*/ 0 w 4531235"/>
+              <a:gd name="connsiteY0" fmla="*/ 0 h 2191658"/>
+              <a:gd name="connsiteX1" fmla="*/ 4531235 w 4531235"/>
+              <a:gd name="connsiteY1" fmla="*/ 0 h 2191658"/>
+              <a:gd name="connsiteX2" fmla="*/ 4531235 w 4531235"/>
+              <a:gd name="connsiteY2" fmla="*/ 2177143 h 2191658"/>
+              <a:gd name="connsiteX3" fmla="*/ 0 w 4531235"/>
+              <a:gd name="connsiteY3" fmla="*/ 2191658 h 2191658"/>
+              <a:gd name="connsiteX4" fmla="*/ 0 w 4531235"/>
+              <a:gd name="connsiteY4" fmla="*/ 0 h 2191658"/>
+              <a:gd name="connsiteX0" fmla="*/ 0 w 6809978"/>
+              <a:gd name="connsiteY0" fmla="*/ 0 h 2191658"/>
+              <a:gd name="connsiteX1" fmla="*/ 4531235 w 6809978"/>
+              <a:gd name="connsiteY1" fmla="*/ 0 h 2191658"/>
+              <a:gd name="connsiteX2" fmla="*/ 6809978 w 6809978"/>
+              <a:gd name="connsiteY2" fmla="*/ 0 h 2191658"/>
+              <a:gd name="connsiteX3" fmla="*/ 0 w 6809978"/>
+              <a:gd name="connsiteY3" fmla="*/ 2191658 h 2191658"/>
+              <a:gd name="connsiteX4" fmla="*/ 0 w 6809978"/>
+              <a:gd name="connsiteY4" fmla="*/ 0 h 2191658"/>
+            </a:gdLst>
+            <a:ahLst/>
+            <a:cxnLst>
+              <a:cxn ang="0">
+                <a:pos x="connsiteX0" y="connsiteY0"/>
+              </a:cxn>
+              <a:cxn ang="0">
+                <a:pos x="connsiteX1" y="connsiteY1"/>
+              </a:cxn>
+              <a:cxn ang="0">
+                <a:pos x="connsiteX2" y="connsiteY2"/>
+              </a:cxn>
+              <a:cxn ang="0">
+                <a:pos x="connsiteX3" y="connsiteY3"/>
+              </a:cxn>
+              <a:cxn ang="0">
+                <a:pos x="connsiteX4" y="connsiteY4"/>
+              </a:cxn>
+            </a:cxnLst>
+            <a:rect l="l" t="t" r="r" b="b"/>
+            <a:pathLst>
+              <a:path w="6809978" h="2191658">
+                <a:moveTo>
+                  <a:pt x="0" y="0"/>
+                </a:moveTo>
+                <a:lnTo>
+                  <a:pt x="4531235" y="0"/>
+                </a:lnTo>
+                <a:lnTo>
+                  <a:pt x="6809978" y="0"/>
+                </a:lnTo>
+                <a:lnTo>
+                  <a:pt x="0" y="2191658"/>
+                </a:lnTo>
+                <a:lnTo>
+                  <a:pt x="0" y="0"/>
+                </a:lnTo>
+                <a:close/>
+              </a:path>
+            </a:pathLst>
+          </a:custGeom>
+          <a:solidFill>
+            <a:srgbClr val="A5CA97"/>
+          </a:solidFill>
+          <a:ln>
+            <a:noFill/>
+          </a:ln>
+        </p:spPr>
+        <p:style>
+          <a:lnRef idx="2">
+            <a:schemeClr val="accent1">
+              <a:shade val="50000"/>
+            </a:schemeClr>
+          </a:lnRef>
+          <a:fillRef idx="1">
+            <a:schemeClr val="accent1"/>
+          </a:fillRef>
+          <a:effectRef idx="0">
+            <a:schemeClr val="accent1"/>
+          </a:effectRef>
+          <a:fontRef idx="minor">
+            <a:schemeClr val="lt1"/>
+          </a:fontRef>
+        </p:style>
+        <p:txBody>
+          <a:bodyPr rtlCol="0" anchor="ctr"/>
+          <a:lstStyle/>
+          <a:p>
+            <a:pPr algn="ctr"/>
+            <a:endParaRPr lang="pt-BR"/>
+          </a:p>
+        </p:txBody>
+      </p:sp>
+      <p:sp>
+        <p:nvSpPr>
+          <p:cNvPr id="11" name="Retângulo de cantos arredondados 10"/>
+          <p:cNvSpPr/>
+          <p:nvPr/>
+        </p:nvSpPr>
+        <p:spPr>
+          <a:xfrm>
+            <a:off x="3850392" y="1093785"/>
+            <a:ext cx="4074408" cy="4789713"/>
+          </a:xfrm>
+          <a:prstGeom prst="roundRect">
+            <a:avLst/>
+          </a:prstGeom>
+          <a:solidFill>
+            <a:srgbClr val="FDEBC7"/>
+          </a:solidFill>
+          <a:ln>
+            <a:noFill/>
+          </a:ln>
+          <a:effectLst>
+            <a:outerShdw blurRad="50800" dist="38100" dir="2700000" algn="tl" rotWithShape="0">
+              <a:prstClr val="black">
+                <a:alpha val="40000"/>
+              </a:prstClr>
+            </a:outerShdw>
+          </a:effectLst>
+        </p:spPr>
+        <p:style>
+          <a:lnRef idx="2">
+            <a:schemeClr val="accent1">
+              <a:shade val="50000"/>
+            </a:schemeClr>
+          </a:lnRef>
+          <a:fillRef idx="1">
+            <a:schemeClr val="accent1"/>
+          </a:fillRef>
+          <a:effectRef idx="0">
+            <a:schemeClr val="accent1"/>
+          </a:effectRef>
+          <a:fontRef idx="minor">
+            <a:schemeClr val="lt1"/>
+          </a:fontRef>
+        </p:style>
+        <p:txBody>
+          <a:bodyPr rtlCol="0" anchor="ctr"/>
+          <a:lstStyle/>
+          <a:p>
+            <a:pPr algn="ctr"/>
+            <a:endParaRPr lang="pt-BR"/>
+          </a:p>
+        </p:txBody>
+      </p:sp>
+      <p:sp>
+        <p:nvSpPr>
+          <p:cNvPr id="15" name="CaixaDeTexto 14"/>
+          <p:cNvSpPr txBox="1"/>
+          <p:nvPr/>
+        </p:nvSpPr>
+        <p:spPr>
+          <a:xfrm>
+            <a:off x="4315805" y="2123814"/>
+            <a:ext cx="4578359" cy="400110"/>
+          </a:xfrm>
+          <a:prstGeom prst="rect">
+            <a:avLst/>
+          </a:prstGeom>
+          <a:noFill/>
+        </p:spPr>
+        <p:txBody>
+          <a:bodyPr wrap="square" rtlCol="0">
+            <a:spAutoFit/>
+          </a:bodyPr>
+          <a:lstStyle/>
+          <a:p>
+            <a:r>
+              <a:rPr lang="pt-BR" sz="2000" dirty="0" smtClean="0">
+                <a:solidFill>
+                  <a:srgbClr val="447E43"/>
+                </a:solidFill>
+                <a:latin typeface="Bahnschrift" panose="020B0502040204020203" pitchFamily="34" charset="0"/>
+              </a:rPr>
+              <a:t>Login</a:t>
+            </a:r>
+            <a:endParaRPr lang="pt-BR" sz="2000" dirty="0">
+              <a:solidFill>
+                <a:srgbClr val="447E43"/>
+              </a:solidFill>
+              <a:latin typeface="Bahnschrift" panose="020B0502040204020203" pitchFamily="34" charset="0"/>
+            </a:endParaRPr>
+          </a:p>
+        </p:txBody>
+      </p:sp>
+      <p:sp>
+        <p:nvSpPr>
+          <p:cNvPr id="16" name="Retângulo de cantos arredondados 15"/>
+          <p:cNvSpPr/>
+          <p:nvPr/>
+        </p:nvSpPr>
+        <p:spPr>
+          <a:xfrm>
+            <a:off x="4315805" y="2553483"/>
+            <a:ext cx="3106057" cy="526210"/>
+          </a:xfrm>
+          <a:prstGeom prst="roundRect">
+            <a:avLst/>
+          </a:prstGeom>
+          <a:noFill/>
+        </p:spPr>
+        <p:style>
+          <a:lnRef idx="2">
+            <a:schemeClr val="accent6"/>
+          </a:lnRef>
+          <a:fillRef idx="1">
+            <a:schemeClr val="lt1"/>
+          </a:fillRef>
+          <a:effectRef idx="0">
+            <a:schemeClr val="accent6"/>
+          </a:effectRef>
+          <a:fontRef idx="minor">
+            <a:schemeClr val="dk1"/>
+          </a:fontRef>
+        </p:style>
+        <p:txBody>
+          <a:bodyPr rtlCol="0" anchor="ctr"/>
+          <a:lstStyle/>
+          <a:p>
+            <a:pPr algn="ctr"/>
+            <a:endParaRPr lang="pt-BR"/>
+          </a:p>
+        </p:txBody>
+      </p:sp>
+      <p:sp>
+        <p:nvSpPr>
+          <p:cNvPr id="17" name="Retângulo de cantos arredondados 16"/>
+          <p:cNvSpPr/>
+          <p:nvPr/>
+        </p:nvSpPr>
+        <p:spPr>
+          <a:xfrm>
+            <a:off x="4315805" y="3727766"/>
+            <a:ext cx="3106057" cy="526210"/>
+          </a:xfrm>
+          <a:prstGeom prst="roundRect">
+            <a:avLst/>
+          </a:prstGeom>
+          <a:noFill/>
+        </p:spPr>
+        <p:style>
+          <a:lnRef idx="2">
+            <a:schemeClr val="accent6"/>
+          </a:lnRef>
+          <a:fillRef idx="1">
+            <a:schemeClr val="lt1"/>
+          </a:fillRef>
+          <a:effectRef idx="0">
+            <a:schemeClr val="accent6"/>
+          </a:effectRef>
+          <a:fontRef idx="minor">
+            <a:schemeClr val="dk1"/>
+          </a:fontRef>
+        </p:style>
+        <p:txBody>
+          <a:bodyPr rtlCol="0" anchor="ctr"/>
+          <a:lstStyle/>
+          <a:p>
+            <a:pPr algn="ctr"/>
+            <a:endParaRPr lang="pt-BR"/>
+          </a:p>
+        </p:txBody>
+      </p:sp>
+      <p:sp>
+        <p:nvSpPr>
+          <p:cNvPr id="18" name="CaixaDeTexto 17"/>
+          <p:cNvSpPr txBox="1"/>
+          <p:nvPr/>
+        </p:nvSpPr>
+        <p:spPr>
+          <a:xfrm>
+            <a:off x="4315805" y="3327656"/>
+            <a:ext cx="4578359" cy="400110"/>
+          </a:xfrm>
+          <a:prstGeom prst="rect">
+            <a:avLst/>
+          </a:prstGeom>
+          <a:noFill/>
+        </p:spPr>
+        <p:txBody>
+          <a:bodyPr wrap="square" rtlCol="0">
+            <a:spAutoFit/>
+          </a:bodyPr>
+          <a:lstStyle/>
+          <a:p>
+            <a:r>
+              <a:rPr lang="pt-BR" sz="2000" dirty="0" smtClean="0">
+                <a:solidFill>
+                  <a:srgbClr val="447E43"/>
+                </a:solidFill>
+                <a:latin typeface="Bahnschrift" panose="020B0502040204020203" pitchFamily="34" charset="0"/>
+              </a:rPr>
+              <a:t>Senha</a:t>
+            </a:r>
+            <a:endParaRPr lang="pt-BR" sz="2000" dirty="0">
+              <a:solidFill>
+                <a:srgbClr val="447E43"/>
+              </a:solidFill>
+              <a:latin typeface="Bahnschrift" panose="020B0502040204020203" pitchFamily="34" charset="0"/>
+            </a:endParaRPr>
+          </a:p>
+        </p:txBody>
+      </p:sp>
+      <p:sp>
+        <p:nvSpPr>
+          <p:cNvPr id="19" name="Retângulo 18"/>
+          <p:cNvSpPr/>
+          <p:nvPr/>
+        </p:nvSpPr>
+        <p:spPr>
+          <a:xfrm>
+            <a:off x="4315805" y="4753282"/>
+            <a:ext cx="3106057" cy="378657"/>
+          </a:xfrm>
+          <a:prstGeom prst="rect">
+            <a:avLst/>
+          </a:prstGeom>
+          <a:solidFill>
+            <a:srgbClr val="73D54A"/>
+          </a:solidFill>
+          <a:ln>
+            <a:solidFill>
+              <a:srgbClr val="73D54A"/>
+            </a:solidFill>
+          </a:ln>
+          <a:effectLst>
+            <a:outerShdw blurRad="50800" dist="38100" dir="2700000" algn="tl" rotWithShape="0">
+              <a:prstClr val="black">
+                <a:alpha val="40000"/>
+              </a:prstClr>
+            </a:outerShdw>
+            <a:softEdge rad="0"/>
+          </a:effectLst>
+        </p:spPr>
+        <p:style>
+          <a:lnRef idx="2">
+            <a:schemeClr val="accent1">
+              <a:shade val="50000"/>
+            </a:schemeClr>
+          </a:lnRef>
+          <a:fillRef idx="1">
+            <a:schemeClr val="accent1"/>
+          </a:fillRef>
+          <a:effectRef idx="0">
+            <a:schemeClr val="accent1"/>
+          </a:effectRef>
+          <a:fontRef idx="minor">
+            <a:schemeClr val="lt1"/>
+          </a:fontRef>
+        </p:style>
+        <p:txBody>
+          <a:bodyPr rtlCol="0" anchor="ctr"/>
+          <a:lstStyle/>
+          <a:p>
+            <a:pPr algn="ctr"/>
+            <a:r>
+              <a:rPr lang="pt-BR" dirty="0" smtClean="0"/>
+              <a:t>Entrar</a:t>
+            </a:r>
+            <a:endParaRPr lang="pt-BR" dirty="0"/>
+          </a:p>
+        </p:txBody>
+      </p:sp>
+      <p:sp>
+        <p:nvSpPr>
+          <p:cNvPr id="20" name="CaixaDeTexto 19"/>
+          <p:cNvSpPr txBox="1"/>
+          <p:nvPr/>
+        </p:nvSpPr>
+        <p:spPr>
+          <a:xfrm>
+            <a:off x="5030098" y="1240161"/>
+            <a:ext cx="4578359" cy="461665"/>
+          </a:xfrm>
+          <a:prstGeom prst="rect">
+            <a:avLst/>
+          </a:prstGeom>
+          <a:noFill/>
+        </p:spPr>
+        <p:txBody>
+          <a:bodyPr wrap="square" rtlCol="0">
+            <a:spAutoFit/>
+          </a:bodyPr>
+          <a:lstStyle/>
+          <a:p>
+            <a:r>
+              <a:rPr lang="pt-BR" sz="2400" dirty="0" smtClean="0">
+                <a:solidFill>
+                  <a:srgbClr val="447E43"/>
+                </a:solidFill>
+                <a:latin typeface="Bahnschrift" panose="020B0502040204020203" pitchFamily="34" charset="0"/>
+              </a:rPr>
+              <a:t>Professor</a:t>
+            </a:r>
+            <a:endParaRPr lang="pt-BR" sz="2400" dirty="0">
+              <a:solidFill>
+                <a:srgbClr val="447E43"/>
+              </a:solidFill>
+              <a:latin typeface="Bahnschrift" panose="020B0502040204020203" pitchFamily="34" charset="0"/>
+            </a:endParaRPr>
+          </a:p>
+        </p:txBody>
+      </p:sp>
+    </p:spTree>
+    <p:extLst>
+      <p:ext uri="{BB962C8B-B14F-4D97-AF65-F5344CB8AC3E}">
+        <p14:creationId xmlns:p14="http://schemas.microsoft.com/office/powerpoint/2010/main" val="2338417493"/>
+      </p:ext>
+    </p:extLst>
+  </p:cSld>
+  <p:clrMapOvr>
+    <a:masterClrMapping/>
+  </p:clrMapOvr>
+  <p:timing>
+    <p:tnLst>
+      <p:par>
+        <p:cTn id="1" dur="indefinite" restart="never" nodeType="tmRoot"/>
+      </p:par>
+    </p:tnLst>
+  </p:timing>
+</p:sld>
+</file>
+
+<file path=ppt/slides/slide30.xml><?xml version="1.0" encoding="utf-8"?>
 <p:sld xmlns:a="http://schemas.openxmlformats.org/drawingml/2006/main" xmlns:r="http://schemas.openxmlformats.org/officeDocument/2006/relationships" xmlns:p="http://schemas.openxmlformats.org/presentationml/2006/main">
   <p:cSld>
     <p:spTree>
@@ -21381,661 +24840,7 @@
 </p:sld>
 </file>
 
-<file path=ppt/slides/slide3.xml><?xml version="1.0" encoding="utf-8"?>
-<p:sld xmlns:a="http://schemas.openxmlformats.org/drawingml/2006/main" xmlns:r="http://schemas.openxmlformats.org/officeDocument/2006/relationships" xmlns:p="http://schemas.openxmlformats.org/presentationml/2006/main">
-  <p:cSld>
-    <p:spTree>
-      <p:nvGrpSpPr>
-        <p:cNvPr id="1" name=""/>
-        <p:cNvGrpSpPr/>
-        <p:nvPr/>
-      </p:nvGrpSpPr>
-      <p:grpSpPr>
-        <a:xfrm>
-          <a:off x="0" y="0"/>
-          <a:ext cx="0" cy="0"/>
-          <a:chOff x="0" y="0"/>
-          <a:chExt cx="0" cy="0"/>
-        </a:xfrm>
-      </p:grpSpPr>
-      <p:sp>
-        <p:nvSpPr>
-          <p:cNvPr id="4" name="Retângulo 3"/>
-          <p:cNvSpPr/>
-          <p:nvPr/>
-        </p:nvSpPr>
-        <p:spPr>
-          <a:xfrm>
-            <a:off x="1146749" y="441822"/>
-            <a:ext cx="9787944" cy="5911402"/>
-          </a:xfrm>
-          <a:prstGeom prst="rect">
-            <a:avLst/>
-          </a:prstGeom>
-          <a:solidFill>
-            <a:srgbClr val="86B161"/>
-          </a:solidFill>
-          <a:ln>
-            <a:solidFill>
-              <a:schemeClr val="accent6">
-                <a:lumMod val="60000"/>
-                <a:lumOff val="40000"/>
-              </a:schemeClr>
-            </a:solidFill>
-          </a:ln>
-          <a:effectLst/>
-        </p:spPr>
-        <p:style>
-          <a:lnRef idx="2">
-            <a:schemeClr val="accent1">
-              <a:shade val="50000"/>
-            </a:schemeClr>
-          </a:lnRef>
-          <a:fillRef idx="1">
-            <a:schemeClr val="accent1"/>
-          </a:fillRef>
-          <a:effectRef idx="0">
-            <a:schemeClr val="accent1"/>
-          </a:effectRef>
-          <a:fontRef idx="minor">
-            <a:schemeClr val="lt1"/>
-          </a:fontRef>
-        </p:style>
-        <p:txBody>
-          <a:bodyPr rtlCol="0" anchor="ctr"/>
-          <a:lstStyle/>
-          <a:p>
-            <a:pPr algn="ctr"/>
-            <a:endParaRPr lang="pt-BR"/>
-          </a:p>
-        </p:txBody>
-      </p:sp>
-      <p:sp>
-        <p:nvSpPr>
-          <p:cNvPr id="12" name="Retângulo 11"/>
-          <p:cNvSpPr/>
-          <p:nvPr/>
-        </p:nvSpPr>
-        <p:spPr>
-          <a:xfrm>
-            <a:off x="1146749" y="441822"/>
-            <a:ext cx="8461708" cy="2193702"/>
-          </a:xfrm>
-          <a:custGeom>
-            <a:avLst/>
-            <a:gdLst>
-              <a:gd name="connsiteX0" fmla="*/ 0 w 4531235"/>
-              <a:gd name="connsiteY0" fmla="*/ 0 h 2177143"/>
-              <a:gd name="connsiteX1" fmla="*/ 4531235 w 4531235"/>
-              <a:gd name="connsiteY1" fmla="*/ 0 h 2177143"/>
-              <a:gd name="connsiteX2" fmla="*/ 4531235 w 4531235"/>
-              <a:gd name="connsiteY2" fmla="*/ 2177143 h 2177143"/>
-              <a:gd name="connsiteX3" fmla="*/ 0 w 4531235"/>
-              <a:gd name="connsiteY3" fmla="*/ 2177143 h 2177143"/>
-              <a:gd name="connsiteX4" fmla="*/ 0 w 4531235"/>
-              <a:gd name="connsiteY4" fmla="*/ 0 h 2177143"/>
-              <a:gd name="connsiteX0" fmla="*/ 0 w 4531235"/>
-              <a:gd name="connsiteY0" fmla="*/ 0 h 2177143"/>
-              <a:gd name="connsiteX1" fmla="*/ 4531235 w 4531235"/>
-              <a:gd name="connsiteY1" fmla="*/ 0 h 2177143"/>
-              <a:gd name="connsiteX2" fmla="*/ 4531235 w 4531235"/>
-              <a:gd name="connsiteY2" fmla="*/ 2177143 h 2177143"/>
-              <a:gd name="connsiteX3" fmla="*/ 1494971 w 4531235"/>
-              <a:gd name="connsiteY3" fmla="*/ 1973943 h 2177143"/>
-              <a:gd name="connsiteX4" fmla="*/ 0 w 4531235"/>
-              <a:gd name="connsiteY4" fmla="*/ 0 h 2177143"/>
-              <a:gd name="connsiteX0" fmla="*/ 0 w 4531235"/>
-              <a:gd name="connsiteY0" fmla="*/ 0 h 2191658"/>
-              <a:gd name="connsiteX1" fmla="*/ 4531235 w 4531235"/>
-              <a:gd name="connsiteY1" fmla="*/ 0 h 2191658"/>
-              <a:gd name="connsiteX2" fmla="*/ 4531235 w 4531235"/>
-              <a:gd name="connsiteY2" fmla="*/ 2177143 h 2191658"/>
-              <a:gd name="connsiteX3" fmla="*/ 0 w 4531235"/>
-              <a:gd name="connsiteY3" fmla="*/ 2191658 h 2191658"/>
-              <a:gd name="connsiteX4" fmla="*/ 0 w 4531235"/>
-              <a:gd name="connsiteY4" fmla="*/ 0 h 2191658"/>
-              <a:gd name="connsiteX0" fmla="*/ 0 w 6809978"/>
-              <a:gd name="connsiteY0" fmla="*/ 0 h 2191658"/>
-              <a:gd name="connsiteX1" fmla="*/ 4531235 w 6809978"/>
-              <a:gd name="connsiteY1" fmla="*/ 0 h 2191658"/>
-              <a:gd name="connsiteX2" fmla="*/ 6809978 w 6809978"/>
-              <a:gd name="connsiteY2" fmla="*/ 0 h 2191658"/>
-              <a:gd name="connsiteX3" fmla="*/ 0 w 6809978"/>
-              <a:gd name="connsiteY3" fmla="*/ 2191658 h 2191658"/>
-              <a:gd name="connsiteX4" fmla="*/ 0 w 6809978"/>
-              <a:gd name="connsiteY4" fmla="*/ 0 h 2191658"/>
-            </a:gdLst>
-            <a:ahLst/>
-            <a:cxnLst>
-              <a:cxn ang="0">
-                <a:pos x="connsiteX0" y="connsiteY0"/>
-              </a:cxn>
-              <a:cxn ang="0">
-                <a:pos x="connsiteX1" y="connsiteY1"/>
-              </a:cxn>
-              <a:cxn ang="0">
-                <a:pos x="connsiteX2" y="connsiteY2"/>
-              </a:cxn>
-              <a:cxn ang="0">
-                <a:pos x="connsiteX3" y="connsiteY3"/>
-              </a:cxn>
-              <a:cxn ang="0">
-                <a:pos x="connsiteX4" y="connsiteY4"/>
-              </a:cxn>
-            </a:cxnLst>
-            <a:rect l="l" t="t" r="r" b="b"/>
-            <a:pathLst>
-              <a:path w="6809978" h="2191658">
-                <a:moveTo>
-                  <a:pt x="0" y="0"/>
-                </a:moveTo>
-                <a:lnTo>
-                  <a:pt x="4531235" y="0"/>
-                </a:lnTo>
-                <a:lnTo>
-                  <a:pt x="6809978" y="0"/>
-                </a:lnTo>
-                <a:lnTo>
-                  <a:pt x="0" y="2191658"/>
-                </a:lnTo>
-                <a:lnTo>
-                  <a:pt x="0" y="0"/>
-                </a:lnTo>
-                <a:close/>
-              </a:path>
-            </a:pathLst>
-          </a:custGeom>
-          <a:solidFill>
-            <a:srgbClr val="A5CA97"/>
-          </a:solidFill>
-          <a:ln>
-            <a:noFill/>
-          </a:ln>
-        </p:spPr>
-        <p:style>
-          <a:lnRef idx="2">
-            <a:schemeClr val="accent1">
-              <a:shade val="50000"/>
-            </a:schemeClr>
-          </a:lnRef>
-          <a:fillRef idx="1">
-            <a:schemeClr val="accent1"/>
-          </a:fillRef>
-          <a:effectRef idx="0">
-            <a:schemeClr val="accent1"/>
-          </a:effectRef>
-          <a:fontRef idx="minor">
-            <a:schemeClr val="lt1"/>
-          </a:fontRef>
-        </p:style>
-        <p:txBody>
-          <a:bodyPr rtlCol="0" anchor="ctr"/>
-          <a:lstStyle/>
-          <a:p>
-            <a:pPr algn="ctr"/>
-            <a:endParaRPr lang="pt-BR"/>
-          </a:p>
-        </p:txBody>
-      </p:sp>
-      <p:sp>
-        <p:nvSpPr>
-          <p:cNvPr id="14" name="Retângulo 11"/>
-          <p:cNvSpPr/>
-          <p:nvPr/>
-        </p:nvSpPr>
-        <p:spPr>
-          <a:xfrm rot="10800000">
-            <a:off x="2460290" y="4155328"/>
-            <a:ext cx="8461708" cy="2193702"/>
-          </a:xfrm>
-          <a:custGeom>
-            <a:avLst/>
-            <a:gdLst>
-              <a:gd name="connsiteX0" fmla="*/ 0 w 4531235"/>
-              <a:gd name="connsiteY0" fmla="*/ 0 h 2177143"/>
-              <a:gd name="connsiteX1" fmla="*/ 4531235 w 4531235"/>
-              <a:gd name="connsiteY1" fmla="*/ 0 h 2177143"/>
-              <a:gd name="connsiteX2" fmla="*/ 4531235 w 4531235"/>
-              <a:gd name="connsiteY2" fmla="*/ 2177143 h 2177143"/>
-              <a:gd name="connsiteX3" fmla="*/ 0 w 4531235"/>
-              <a:gd name="connsiteY3" fmla="*/ 2177143 h 2177143"/>
-              <a:gd name="connsiteX4" fmla="*/ 0 w 4531235"/>
-              <a:gd name="connsiteY4" fmla="*/ 0 h 2177143"/>
-              <a:gd name="connsiteX0" fmla="*/ 0 w 4531235"/>
-              <a:gd name="connsiteY0" fmla="*/ 0 h 2177143"/>
-              <a:gd name="connsiteX1" fmla="*/ 4531235 w 4531235"/>
-              <a:gd name="connsiteY1" fmla="*/ 0 h 2177143"/>
-              <a:gd name="connsiteX2" fmla="*/ 4531235 w 4531235"/>
-              <a:gd name="connsiteY2" fmla="*/ 2177143 h 2177143"/>
-              <a:gd name="connsiteX3" fmla="*/ 1494971 w 4531235"/>
-              <a:gd name="connsiteY3" fmla="*/ 1973943 h 2177143"/>
-              <a:gd name="connsiteX4" fmla="*/ 0 w 4531235"/>
-              <a:gd name="connsiteY4" fmla="*/ 0 h 2177143"/>
-              <a:gd name="connsiteX0" fmla="*/ 0 w 4531235"/>
-              <a:gd name="connsiteY0" fmla="*/ 0 h 2191658"/>
-              <a:gd name="connsiteX1" fmla="*/ 4531235 w 4531235"/>
-              <a:gd name="connsiteY1" fmla="*/ 0 h 2191658"/>
-              <a:gd name="connsiteX2" fmla="*/ 4531235 w 4531235"/>
-              <a:gd name="connsiteY2" fmla="*/ 2177143 h 2191658"/>
-              <a:gd name="connsiteX3" fmla="*/ 0 w 4531235"/>
-              <a:gd name="connsiteY3" fmla="*/ 2191658 h 2191658"/>
-              <a:gd name="connsiteX4" fmla="*/ 0 w 4531235"/>
-              <a:gd name="connsiteY4" fmla="*/ 0 h 2191658"/>
-              <a:gd name="connsiteX0" fmla="*/ 0 w 6809978"/>
-              <a:gd name="connsiteY0" fmla="*/ 0 h 2191658"/>
-              <a:gd name="connsiteX1" fmla="*/ 4531235 w 6809978"/>
-              <a:gd name="connsiteY1" fmla="*/ 0 h 2191658"/>
-              <a:gd name="connsiteX2" fmla="*/ 6809978 w 6809978"/>
-              <a:gd name="connsiteY2" fmla="*/ 0 h 2191658"/>
-              <a:gd name="connsiteX3" fmla="*/ 0 w 6809978"/>
-              <a:gd name="connsiteY3" fmla="*/ 2191658 h 2191658"/>
-              <a:gd name="connsiteX4" fmla="*/ 0 w 6809978"/>
-              <a:gd name="connsiteY4" fmla="*/ 0 h 2191658"/>
-            </a:gdLst>
-            <a:ahLst/>
-            <a:cxnLst>
-              <a:cxn ang="0">
-                <a:pos x="connsiteX0" y="connsiteY0"/>
-              </a:cxn>
-              <a:cxn ang="0">
-                <a:pos x="connsiteX1" y="connsiteY1"/>
-              </a:cxn>
-              <a:cxn ang="0">
-                <a:pos x="connsiteX2" y="connsiteY2"/>
-              </a:cxn>
-              <a:cxn ang="0">
-                <a:pos x="connsiteX3" y="connsiteY3"/>
-              </a:cxn>
-              <a:cxn ang="0">
-                <a:pos x="connsiteX4" y="connsiteY4"/>
-              </a:cxn>
-            </a:cxnLst>
-            <a:rect l="l" t="t" r="r" b="b"/>
-            <a:pathLst>
-              <a:path w="6809978" h="2191658">
-                <a:moveTo>
-                  <a:pt x="0" y="0"/>
-                </a:moveTo>
-                <a:lnTo>
-                  <a:pt x="4531235" y="0"/>
-                </a:lnTo>
-                <a:lnTo>
-                  <a:pt x="6809978" y="0"/>
-                </a:lnTo>
-                <a:lnTo>
-                  <a:pt x="0" y="2191658"/>
-                </a:lnTo>
-                <a:lnTo>
-                  <a:pt x="0" y="0"/>
-                </a:lnTo>
-                <a:close/>
-              </a:path>
-            </a:pathLst>
-          </a:custGeom>
-          <a:solidFill>
-            <a:srgbClr val="A5CA97"/>
-          </a:solidFill>
-          <a:ln>
-            <a:noFill/>
-          </a:ln>
-        </p:spPr>
-        <p:style>
-          <a:lnRef idx="2">
-            <a:schemeClr val="accent1">
-              <a:shade val="50000"/>
-            </a:schemeClr>
-          </a:lnRef>
-          <a:fillRef idx="1">
-            <a:schemeClr val="accent1"/>
-          </a:fillRef>
-          <a:effectRef idx="0">
-            <a:schemeClr val="accent1"/>
-          </a:effectRef>
-          <a:fontRef idx="minor">
-            <a:schemeClr val="lt1"/>
-          </a:fontRef>
-        </p:style>
-        <p:txBody>
-          <a:bodyPr rtlCol="0" anchor="ctr"/>
-          <a:lstStyle/>
-          <a:p>
-            <a:pPr algn="ctr"/>
-            <a:endParaRPr lang="pt-BR"/>
-          </a:p>
-        </p:txBody>
-      </p:sp>
-      <p:sp>
-        <p:nvSpPr>
-          <p:cNvPr id="11" name="Retângulo de cantos arredondados 10"/>
-          <p:cNvSpPr/>
-          <p:nvPr/>
-        </p:nvSpPr>
-        <p:spPr>
-          <a:xfrm>
-            <a:off x="3850392" y="1093785"/>
-            <a:ext cx="4074408" cy="4789713"/>
-          </a:xfrm>
-          <a:prstGeom prst="roundRect">
-            <a:avLst/>
-          </a:prstGeom>
-          <a:solidFill>
-            <a:srgbClr val="FDEBC7"/>
-          </a:solidFill>
-          <a:ln>
-            <a:noFill/>
-          </a:ln>
-          <a:effectLst>
-            <a:outerShdw blurRad="50800" dist="38100" dir="2700000" algn="tl" rotWithShape="0">
-              <a:prstClr val="black">
-                <a:alpha val="40000"/>
-              </a:prstClr>
-            </a:outerShdw>
-          </a:effectLst>
-        </p:spPr>
-        <p:style>
-          <a:lnRef idx="2">
-            <a:schemeClr val="accent1">
-              <a:shade val="50000"/>
-            </a:schemeClr>
-          </a:lnRef>
-          <a:fillRef idx="1">
-            <a:schemeClr val="accent1"/>
-          </a:fillRef>
-          <a:effectRef idx="0">
-            <a:schemeClr val="accent1"/>
-          </a:effectRef>
-          <a:fontRef idx="minor">
-            <a:schemeClr val="lt1"/>
-          </a:fontRef>
-        </p:style>
-        <p:txBody>
-          <a:bodyPr rtlCol="0" anchor="ctr"/>
-          <a:lstStyle/>
-          <a:p>
-            <a:pPr algn="ctr"/>
-            <a:endParaRPr lang="pt-BR"/>
-          </a:p>
-        </p:txBody>
-      </p:sp>
-      <p:sp>
-        <p:nvSpPr>
-          <p:cNvPr id="15" name="CaixaDeTexto 14"/>
-          <p:cNvSpPr txBox="1"/>
-          <p:nvPr/>
-        </p:nvSpPr>
-        <p:spPr>
-          <a:xfrm>
-            <a:off x="4315805" y="2123814"/>
-            <a:ext cx="4578359" cy="400110"/>
-          </a:xfrm>
-          <a:prstGeom prst="rect">
-            <a:avLst/>
-          </a:prstGeom>
-          <a:noFill/>
-        </p:spPr>
-        <p:txBody>
-          <a:bodyPr wrap="square" rtlCol="0">
-            <a:spAutoFit/>
-          </a:bodyPr>
-          <a:lstStyle/>
-          <a:p>
-            <a:r>
-              <a:rPr lang="pt-BR" sz="2000" dirty="0" smtClean="0">
-                <a:solidFill>
-                  <a:srgbClr val="447E43"/>
-                </a:solidFill>
-                <a:latin typeface="Bahnschrift" panose="020B0502040204020203" pitchFamily="34" charset="0"/>
-              </a:rPr>
-              <a:t>Login</a:t>
-            </a:r>
-            <a:endParaRPr lang="pt-BR" sz="2000" dirty="0">
-              <a:solidFill>
-                <a:srgbClr val="447E43"/>
-              </a:solidFill>
-              <a:latin typeface="Bahnschrift" panose="020B0502040204020203" pitchFamily="34" charset="0"/>
-            </a:endParaRPr>
-          </a:p>
-        </p:txBody>
-      </p:sp>
-      <p:sp>
-        <p:nvSpPr>
-          <p:cNvPr id="16" name="Retângulo de cantos arredondados 15"/>
-          <p:cNvSpPr/>
-          <p:nvPr/>
-        </p:nvSpPr>
-        <p:spPr>
-          <a:xfrm>
-            <a:off x="4315805" y="2553483"/>
-            <a:ext cx="3106057" cy="526210"/>
-          </a:xfrm>
-          <a:prstGeom prst="roundRect">
-            <a:avLst/>
-          </a:prstGeom>
-          <a:noFill/>
-        </p:spPr>
-        <p:style>
-          <a:lnRef idx="2">
-            <a:schemeClr val="accent6"/>
-          </a:lnRef>
-          <a:fillRef idx="1">
-            <a:schemeClr val="lt1"/>
-          </a:fillRef>
-          <a:effectRef idx="0">
-            <a:schemeClr val="accent6"/>
-          </a:effectRef>
-          <a:fontRef idx="minor">
-            <a:schemeClr val="dk1"/>
-          </a:fontRef>
-        </p:style>
-        <p:txBody>
-          <a:bodyPr rtlCol="0" anchor="ctr"/>
-          <a:lstStyle/>
-          <a:p>
-            <a:pPr algn="ctr"/>
-            <a:endParaRPr lang="pt-BR"/>
-          </a:p>
-        </p:txBody>
-      </p:sp>
-      <p:sp>
-        <p:nvSpPr>
-          <p:cNvPr id="17" name="Retângulo de cantos arredondados 16"/>
-          <p:cNvSpPr/>
-          <p:nvPr/>
-        </p:nvSpPr>
-        <p:spPr>
-          <a:xfrm>
-            <a:off x="4315805" y="3727766"/>
-            <a:ext cx="3106057" cy="526210"/>
-          </a:xfrm>
-          <a:prstGeom prst="roundRect">
-            <a:avLst/>
-          </a:prstGeom>
-          <a:noFill/>
-        </p:spPr>
-        <p:style>
-          <a:lnRef idx="2">
-            <a:schemeClr val="accent6"/>
-          </a:lnRef>
-          <a:fillRef idx="1">
-            <a:schemeClr val="lt1"/>
-          </a:fillRef>
-          <a:effectRef idx="0">
-            <a:schemeClr val="accent6"/>
-          </a:effectRef>
-          <a:fontRef idx="minor">
-            <a:schemeClr val="dk1"/>
-          </a:fontRef>
-        </p:style>
-        <p:txBody>
-          <a:bodyPr rtlCol="0" anchor="ctr"/>
-          <a:lstStyle/>
-          <a:p>
-            <a:pPr algn="ctr"/>
-            <a:endParaRPr lang="pt-BR"/>
-          </a:p>
-        </p:txBody>
-      </p:sp>
-      <p:sp>
-        <p:nvSpPr>
-          <p:cNvPr id="18" name="CaixaDeTexto 17"/>
-          <p:cNvSpPr txBox="1"/>
-          <p:nvPr/>
-        </p:nvSpPr>
-        <p:spPr>
-          <a:xfrm>
-            <a:off x="4315805" y="3327656"/>
-            <a:ext cx="4578359" cy="400110"/>
-          </a:xfrm>
-          <a:prstGeom prst="rect">
-            <a:avLst/>
-          </a:prstGeom>
-          <a:noFill/>
-        </p:spPr>
-        <p:txBody>
-          <a:bodyPr wrap="square" rtlCol="0">
-            <a:spAutoFit/>
-          </a:bodyPr>
-          <a:lstStyle/>
-          <a:p>
-            <a:r>
-              <a:rPr lang="pt-BR" sz="2000" dirty="0" smtClean="0">
-                <a:solidFill>
-                  <a:srgbClr val="447E43"/>
-                </a:solidFill>
-                <a:latin typeface="Bahnschrift" panose="020B0502040204020203" pitchFamily="34" charset="0"/>
-              </a:rPr>
-              <a:t>Senha</a:t>
-            </a:r>
-            <a:endParaRPr lang="pt-BR" sz="2000" dirty="0">
-              <a:solidFill>
-                <a:srgbClr val="447E43"/>
-              </a:solidFill>
-              <a:latin typeface="Bahnschrift" panose="020B0502040204020203" pitchFamily="34" charset="0"/>
-            </a:endParaRPr>
-          </a:p>
-        </p:txBody>
-      </p:sp>
-      <p:sp>
-        <p:nvSpPr>
-          <p:cNvPr id="19" name="Retângulo 18"/>
-          <p:cNvSpPr/>
-          <p:nvPr/>
-        </p:nvSpPr>
-        <p:spPr>
-          <a:xfrm>
-            <a:off x="4315805" y="4753282"/>
-            <a:ext cx="3106057" cy="378657"/>
-          </a:xfrm>
-          <a:prstGeom prst="rect">
-            <a:avLst/>
-          </a:prstGeom>
-          <a:solidFill>
-            <a:srgbClr val="73D54A"/>
-          </a:solidFill>
-          <a:ln>
-            <a:solidFill>
-              <a:srgbClr val="73D54A"/>
-            </a:solidFill>
-          </a:ln>
-          <a:effectLst>
-            <a:outerShdw blurRad="50800" dist="38100" dir="2700000" algn="tl" rotWithShape="0">
-              <a:prstClr val="black">
-                <a:alpha val="40000"/>
-              </a:prstClr>
-            </a:outerShdw>
-            <a:softEdge rad="0"/>
-          </a:effectLst>
-        </p:spPr>
-        <p:style>
-          <a:lnRef idx="2">
-            <a:schemeClr val="accent1">
-              <a:shade val="50000"/>
-            </a:schemeClr>
-          </a:lnRef>
-          <a:fillRef idx="1">
-            <a:schemeClr val="accent1"/>
-          </a:fillRef>
-          <a:effectRef idx="0">
-            <a:schemeClr val="accent1"/>
-          </a:effectRef>
-          <a:fontRef idx="minor">
-            <a:schemeClr val="lt1"/>
-          </a:fontRef>
-        </p:style>
-        <p:txBody>
-          <a:bodyPr rtlCol="0" anchor="ctr"/>
-          <a:lstStyle/>
-          <a:p>
-            <a:pPr algn="ctr"/>
-            <a:r>
-              <a:rPr lang="pt-BR" dirty="0" smtClean="0"/>
-              <a:t>Entrar</a:t>
-            </a:r>
-            <a:endParaRPr lang="pt-BR" dirty="0"/>
-          </a:p>
-        </p:txBody>
-      </p:sp>
-      <p:sp>
-        <p:nvSpPr>
-          <p:cNvPr id="20" name="CaixaDeTexto 19"/>
-          <p:cNvSpPr txBox="1"/>
-          <p:nvPr/>
-        </p:nvSpPr>
-        <p:spPr>
-          <a:xfrm>
-            <a:off x="5030098" y="1240161"/>
-            <a:ext cx="4578359" cy="461665"/>
-          </a:xfrm>
-          <a:prstGeom prst="rect">
-            <a:avLst/>
-          </a:prstGeom>
-          <a:noFill/>
-        </p:spPr>
-        <p:txBody>
-          <a:bodyPr wrap="square" rtlCol="0">
-            <a:spAutoFit/>
-          </a:bodyPr>
-          <a:lstStyle/>
-          <a:p>
-            <a:r>
-              <a:rPr lang="pt-BR" sz="2400" dirty="0" smtClean="0">
-                <a:solidFill>
-                  <a:srgbClr val="447E43"/>
-                </a:solidFill>
-                <a:latin typeface="Bahnschrift" panose="020B0502040204020203" pitchFamily="34" charset="0"/>
-              </a:rPr>
-              <a:t>Professor</a:t>
-            </a:r>
-            <a:endParaRPr lang="pt-BR" sz="2400" dirty="0">
-              <a:solidFill>
-                <a:srgbClr val="447E43"/>
-              </a:solidFill>
-              <a:latin typeface="Bahnschrift" panose="020B0502040204020203" pitchFamily="34" charset="0"/>
-            </a:endParaRPr>
-          </a:p>
-        </p:txBody>
-      </p:sp>
-    </p:spTree>
-    <p:extLst>
-      <p:ext uri="{BB962C8B-B14F-4D97-AF65-F5344CB8AC3E}">
-        <p14:creationId xmlns:p14="http://schemas.microsoft.com/office/powerpoint/2010/main" val="2338417493"/>
-      </p:ext>
-    </p:extLst>
-  </p:cSld>
-  <p:clrMapOvr>
-    <a:masterClrMapping/>
-  </p:clrMapOvr>
-  <p:timing>
-    <p:tnLst>
-      <p:par>
-        <p:cTn id="1" dur="indefinite" restart="never" nodeType="tmRoot"/>
-      </p:par>
-    </p:tnLst>
-  </p:timing>
-</p:sld>
-</file>
-
-<file path=ppt/slides/slide30.xml><?xml version="1.0" encoding="utf-8"?>
+<file path=ppt/slides/slide31.xml><?xml version="1.0" encoding="utf-8"?>
 <p:sld xmlns:a="http://schemas.openxmlformats.org/drawingml/2006/main" xmlns:r="http://schemas.openxmlformats.org/officeDocument/2006/relationships" xmlns:p="http://schemas.openxmlformats.org/presentationml/2006/main">
   <p:cSld>
     <p:spTree>
@@ -22436,7 +25241,7 @@
 </p:sld>
 </file>
 
-<file path=ppt/slides/slide31.xml><?xml version="1.0" encoding="utf-8"?>
+<file path=ppt/slides/slide32.xml><?xml version="1.0" encoding="utf-8"?>
 <p:sld xmlns:a="http://schemas.openxmlformats.org/drawingml/2006/main" xmlns:r="http://schemas.openxmlformats.org/officeDocument/2006/relationships" xmlns:p="http://schemas.openxmlformats.org/presentationml/2006/main">
   <p:cSld>
     <p:spTree>
@@ -23715,7 +26520,7 @@
 </p:sld>
 </file>
 
-<file path=ppt/slides/slide32.xml><?xml version="1.0" encoding="utf-8"?>
+<file path=ppt/slides/slide33.xml><?xml version="1.0" encoding="utf-8"?>
 <p:sld xmlns:a="http://schemas.openxmlformats.org/drawingml/2006/main" xmlns:r="http://schemas.openxmlformats.org/officeDocument/2006/relationships" xmlns:p="http://schemas.openxmlformats.org/presentationml/2006/main">
   <p:cSld>
     <p:spTree>
@@ -24041,7 +26846,7 @@
 </p:sld>
 </file>
 
-<file path=ppt/slides/slide33.xml><?xml version="1.0" encoding="utf-8"?>
+<file path=ppt/slides/slide34.xml><?xml version="1.0" encoding="utf-8"?>
 <p:sld xmlns:a="http://schemas.openxmlformats.org/drawingml/2006/main" xmlns:r="http://schemas.openxmlformats.org/officeDocument/2006/relationships" xmlns:p="http://schemas.openxmlformats.org/presentationml/2006/main">
   <p:cSld>
     <p:spTree>
@@ -24828,7 +27633,7 @@
 </p:sld>
 </file>
 
-<file path=ppt/slides/slide34.xml><?xml version="1.0" encoding="utf-8"?>
+<file path=ppt/slides/slide35.xml><?xml version="1.0" encoding="utf-8"?>
 <p:sld xmlns:a="http://schemas.openxmlformats.org/drawingml/2006/main" xmlns:r="http://schemas.openxmlformats.org/officeDocument/2006/relationships" xmlns:p="http://schemas.openxmlformats.org/presentationml/2006/main">
   <p:cSld>
     <p:spTree>
@@ -25059,7 +27864,7 @@
 </p:sld>
 </file>
 
-<file path=ppt/slides/slide35.xml><?xml version="1.0" encoding="utf-8"?>
+<file path=ppt/slides/slide36.xml><?xml version="1.0" encoding="utf-8"?>
 <p:sld xmlns:a="http://schemas.openxmlformats.org/drawingml/2006/main" xmlns:r="http://schemas.openxmlformats.org/officeDocument/2006/relationships" xmlns:p="http://schemas.openxmlformats.org/presentationml/2006/main">
   <p:cSld>
     <p:spTree>
@@ -26080,7 +28885,7 @@
 </p:sld>
 </file>
 
-<file path=ppt/slides/slide36.xml><?xml version="1.0" encoding="utf-8"?>
+<file path=ppt/slides/slide37.xml><?xml version="1.0" encoding="utf-8"?>
 <p:sld xmlns:a="http://schemas.openxmlformats.org/drawingml/2006/main" xmlns:r="http://schemas.openxmlformats.org/officeDocument/2006/relationships" xmlns:p="http://schemas.openxmlformats.org/presentationml/2006/main">
   <p:cSld>
     <p:spTree>

</xml_diff>

<commit_message>
criação das imagens do jogo da memória
</commit_message>
<xml_diff>
--- a/DocumentacaoProjeto/Protótipo_Visual.pptx
+++ b/DocumentacaoProjeto/Protótipo_Visual.pptx
@@ -34,17 +34,18 @@
     <p:sldId id="261" r:id="rId28"/>
     <p:sldId id="288" r:id="rId29"/>
     <p:sldId id="292" r:id="rId30"/>
-    <p:sldId id="294" r:id="rId31"/>
-    <p:sldId id="293" r:id="rId32"/>
-    <p:sldId id="295" r:id="rId33"/>
-    <p:sldId id="262" r:id="rId34"/>
-    <p:sldId id="289" r:id="rId35"/>
-    <p:sldId id="263" r:id="rId36"/>
-    <p:sldId id="269" r:id="rId37"/>
-    <p:sldId id="273" r:id="rId38"/>
-    <p:sldId id="290" r:id="rId39"/>
-    <p:sldId id="274" r:id="rId40"/>
-    <p:sldId id="291" r:id="rId41"/>
+    <p:sldId id="296" r:id="rId31"/>
+    <p:sldId id="294" r:id="rId32"/>
+    <p:sldId id="293" r:id="rId33"/>
+    <p:sldId id="295" r:id="rId34"/>
+    <p:sldId id="262" r:id="rId35"/>
+    <p:sldId id="289" r:id="rId36"/>
+    <p:sldId id="263" r:id="rId37"/>
+    <p:sldId id="269" r:id="rId38"/>
+    <p:sldId id="273" r:id="rId39"/>
+    <p:sldId id="290" r:id="rId40"/>
+    <p:sldId id="274" r:id="rId41"/>
+    <p:sldId id="291" r:id="rId42"/>
   </p:sldIdLst>
   <p:sldSz cx="12192000" cy="6858000"/>
   <p:notesSz cx="6858000" cy="9144000"/>
@@ -282,7 +283,7 @@
           <a:p>
             <a:fld id="{ED8D6B47-35E8-4B74-A8BC-163E56BA4F07}" type="datetimeFigureOut">
               <a:rPr lang="pt-BR" smtClean="0"/>
-              <a:t>05/04/2020</a:t>
+              <a:t>01/05/2020</a:t>
             </a:fld>
             <a:endParaRPr lang="pt-BR"/>
           </a:p>
@@ -452,7 +453,7 @@
           <a:p>
             <a:fld id="{ED8D6B47-35E8-4B74-A8BC-163E56BA4F07}" type="datetimeFigureOut">
               <a:rPr lang="pt-BR" smtClean="0"/>
-              <a:t>05/04/2020</a:t>
+              <a:t>01/05/2020</a:t>
             </a:fld>
             <a:endParaRPr lang="pt-BR"/>
           </a:p>
@@ -632,7 +633,7 @@
           <a:p>
             <a:fld id="{ED8D6B47-35E8-4B74-A8BC-163E56BA4F07}" type="datetimeFigureOut">
               <a:rPr lang="pt-BR" smtClean="0"/>
-              <a:t>05/04/2020</a:t>
+              <a:t>01/05/2020</a:t>
             </a:fld>
             <a:endParaRPr lang="pt-BR"/>
           </a:p>
@@ -802,7 +803,7 @@
           <a:p>
             <a:fld id="{ED8D6B47-35E8-4B74-A8BC-163E56BA4F07}" type="datetimeFigureOut">
               <a:rPr lang="pt-BR" smtClean="0"/>
-              <a:t>05/04/2020</a:t>
+              <a:t>01/05/2020</a:t>
             </a:fld>
             <a:endParaRPr lang="pt-BR"/>
           </a:p>
@@ -1048,7 +1049,7 @@
           <a:p>
             <a:fld id="{ED8D6B47-35E8-4B74-A8BC-163E56BA4F07}" type="datetimeFigureOut">
               <a:rPr lang="pt-BR" smtClean="0"/>
-              <a:t>05/04/2020</a:t>
+              <a:t>01/05/2020</a:t>
             </a:fld>
             <a:endParaRPr lang="pt-BR"/>
           </a:p>
@@ -1280,7 +1281,7 @@
           <a:p>
             <a:fld id="{ED8D6B47-35E8-4B74-A8BC-163E56BA4F07}" type="datetimeFigureOut">
               <a:rPr lang="pt-BR" smtClean="0"/>
-              <a:t>05/04/2020</a:t>
+              <a:t>01/05/2020</a:t>
             </a:fld>
             <a:endParaRPr lang="pt-BR"/>
           </a:p>
@@ -1647,7 +1648,7 @@
           <a:p>
             <a:fld id="{ED8D6B47-35E8-4B74-A8BC-163E56BA4F07}" type="datetimeFigureOut">
               <a:rPr lang="pt-BR" smtClean="0"/>
-              <a:t>05/04/2020</a:t>
+              <a:t>01/05/2020</a:t>
             </a:fld>
             <a:endParaRPr lang="pt-BR"/>
           </a:p>
@@ -1765,7 +1766,7 @@
           <a:p>
             <a:fld id="{ED8D6B47-35E8-4B74-A8BC-163E56BA4F07}" type="datetimeFigureOut">
               <a:rPr lang="pt-BR" smtClean="0"/>
-              <a:t>05/04/2020</a:t>
+              <a:t>01/05/2020</a:t>
             </a:fld>
             <a:endParaRPr lang="pt-BR"/>
           </a:p>
@@ -1860,7 +1861,7 @@
           <a:p>
             <a:fld id="{ED8D6B47-35E8-4B74-A8BC-163E56BA4F07}" type="datetimeFigureOut">
               <a:rPr lang="pt-BR" smtClean="0"/>
-              <a:t>05/04/2020</a:t>
+              <a:t>01/05/2020</a:t>
             </a:fld>
             <a:endParaRPr lang="pt-BR"/>
           </a:p>
@@ -2137,7 +2138,7 @@
           <a:p>
             <a:fld id="{ED8D6B47-35E8-4B74-A8BC-163E56BA4F07}" type="datetimeFigureOut">
               <a:rPr lang="pt-BR" smtClean="0"/>
-              <a:t>05/04/2020</a:t>
+              <a:t>01/05/2020</a:t>
             </a:fld>
             <a:endParaRPr lang="pt-BR"/>
           </a:p>
@@ -2390,7 +2391,7 @@
           <a:p>
             <a:fld id="{ED8D6B47-35E8-4B74-A8BC-163E56BA4F07}" type="datetimeFigureOut">
               <a:rPr lang="pt-BR" smtClean="0"/>
-              <a:t>05/04/2020</a:t>
+              <a:t>01/05/2020</a:t>
             </a:fld>
             <a:endParaRPr lang="pt-BR"/>
           </a:p>
@@ -2603,7 +2604,7 @@
           <a:p>
             <a:fld id="{ED8D6B47-35E8-4B74-A8BC-163E56BA4F07}" type="datetimeFigureOut">
               <a:rPr lang="pt-BR" smtClean="0"/>
-              <a:t>05/04/2020</a:t>
+              <a:t>01/05/2020</a:t>
             </a:fld>
             <a:endParaRPr lang="pt-BR"/>
           </a:p>
@@ -23203,6 +23204,870 @@
           <a:chExt cx="0" cy="0"/>
         </a:xfrm>
       </p:grpSpPr>
+      <p:grpSp>
+        <p:nvGrpSpPr>
+          <p:cNvPr id="9" name="Grupo 8"/>
+          <p:cNvGrpSpPr/>
+          <p:nvPr/>
+        </p:nvGrpSpPr>
+        <p:grpSpPr>
+          <a:xfrm>
+            <a:off x="1243392" y="1297965"/>
+            <a:ext cx="1133476" cy="1514757"/>
+            <a:chOff x="1814892" y="1431315"/>
+            <a:chExt cx="1133476" cy="1514757"/>
+          </a:xfrm>
+        </p:grpSpPr>
+        <p:sp>
+          <p:nvSpPr>
+            <p:cNvPr id="5" name="Retângulo 4"/>
+            <p:cNvSpPr/>
+            <p:nvPr/>
+          </p:nvSpPr>
+          <p:spPr>
+            <a:xfrm>
+              <a:off x="1814892" y="1431315"/>
+              <a:ext cx="1133476" cy="1514757"/>
+            </a:xfrm>
+            <a:prstGeom prst="rect">
+              <a:avLst/>
+            </a:prstGeom>
+            <a:solidFill>
+              <a:srgbClr val="8DBA62"/>
+            </a:solidFill>
+            <a:ln>
+              <a:solidFill>
+                <a:srgbClr val="8DBA62"/>
+              </a:solidFill>
+            </a:ln>
+          </p:spPr>
+          <p:style>
+            <a:lnRef idx="2">
+              <a:schemeClr val="accent1">
+                <a:shade val="50000"/>
+              </a:schemeClr>
+            </a:lnRef>
+            <a:fillRef idx="1">
+              <a:schemeClr val="accent1"/>
+            </a:fillRef>
+            <a:effectRef idx="0">
+              <a:schemeClr val="accent1"/>
+            </a:effectRef>
+            <a:fontRef idx="minor">
+              <a:schemeClr val="lt1"/>
+            </a:fontRef>
+          </p:style>
+          <p:txBody>
+            <a:bodyPr rtlCol="0" anchor="ctr"/>
+            <a:lstStyle/>
+            <a:p>
+              <a:pPr algn="ctr"/>
+              <a:endParaRPr lang="pt-BR"/>
+            </a:p>
+          </p:txBody>
+        </p:sp>
+        <p:sp>
+          <p:nvSpPr>
+            <p:cNvPr id="10" name="Retângulo 9"/>
+            <p:cNvSpPr/>
+            <p:nvPr/>
+          </p:nvSpPr>
+          <p:spPr>
+            <a:xfrm>
+              <a:off x="1835944" y="1450182"/>
+              <a:ext cx="1092994" cy="1478756"/>
+            </a:xfrm>
+            <a:prstGeom prst="rect">
+              <a:avLst/>
+            </a:prstGeom>
+            <a:solidFill>
+              <a:srgbClr val="FDEBC7"/>
+            </a:solidFill>
+            <a:ln>
+              <a:solidFill>
+                <a:srgbClr val="8DBA62"/>
+              </a:solidFill>
+            </a:ln>
+          </p:spPr>
+          <p:style>
+            <a:lnRef idx="2">
+              <a:schemeClr val="accent1">
+                <a:shade val="50000"/>
+              </a:schemeClr>
+            </a:lnRef>
+            <a:fillRef idx="1">
+              <a:schemeClr val="accent1"/>
+            </a:fillRef>
+            <a:effectRef idx="0">
+              <a:schemeClr val="accent1"/>
+            </a:effectRef>
+            <a:fontRef idx="minor">
+              <a:schemeClr val="lt1"/>
+            </a:fontRef>
+          </p:style>
+          <p:txBody>
+            <a:bodyPr rtlCol="0" anchor="ctr"/>
+            <a:lstStyle/>
+            <a:p>
+              <a:pPr algn="ctr"/>
+              <a:endParaRPr lang="pt-BR"/>
+            </a:p>
+          </p:txBody>
+        </p:sp>
+        <p:pic>
+          <p:nvPicPr>
+            <p:cNvPr id="1026" name="Picture 2" descr="Recycle trash icon. Ecology design. Vector graphic — Stock Vector ..."/>
+            <p:cNvPicPr>
+              <a:picLocks noChangeAspect="1" noChangeArrowheads="1"/>
+            </p:cNvPicPr>
+            <p:nvPr/>
+          </p:nvPicPr>
+          <p:blipFill>
+            <a:blip r:embed="rId2" cstate="print">
+              <a:extLst>
+                <a:ext uri="{28A0092B-C50C-407E-A947-70E740481C1C}">
+                  <a14:useLocalDpi xmlns:a14="http://schemas.microsoft.com/office/drawing/2010/main" val="0"/>
+                </a:ext>
+              </a:extLst>
+            </a:blip>
+            <a:srcRect/>
+            <a:stretch>
+              <a:fillRect/>
+            </a:stretch>
+          </p:blipFill>
+          <p:spPr bwMode="auto">
+            <a:xfrm>
+              <a:off x="1916801" y="1605140"/>
+              <a:ext cx="928897" cy="1167105"/>
+            </a:xfrm>
+            <a:prstGeom prst="rect">
+              <a:avLst/>
+            </a:prstGeom>
+            <a:noFill/>
+            <a:effectLst>
+              <a:glow rad="127000">
+                <a:schemeClr val="accent1">
+                  <a:alpha val="0"/>
+                </a:schemeClr>
+              </a:glow>
+            </a:effectLst>
+            <a:extLst>
+              <a:ext uri="{909E8E84-426E-40DD-AFC4-6F175D3DCCD1}">
+                <a14:hiddenFill xmlns:a14="http://schemas.microsoft.com/office/drawing/2010/main">
+                  <a:solidFill>
+                    <a:srgbClr val="FFFFFF"/>
+                  </a:solidFill>
+                </a14:hiddenFill>
+              </a:ext>
+            </a:extLst>
+          </p:spPr>
+        </p:pic>
+      </p:grpSp>
+      <p:grpSp>
+        <p:nvGrpSpPr>
+          <p:cNvPr id="11" name="Grupo 10"/>
+          <p:cNvGrpSpPr/>
+          <p:nvPr/>
+        </p:nvGrpSpPr>
+        <p:grpSpPr>
+          <a:xfrm>
+            <a:off x="2929317" y="1297965"/>
+            <a:ext cx="1133476" cy="1514757"/>
+            <a:chOff x="3386517" y="1393032"/>
+            <a:chExt cx="1133476" cy="1514757"/>
+          </a:xfrm>
+        </p:grpSpPr>
+        <p:grpSp>
+          <p:nvGrpSpPr>
+            <p:cNvPr id="13" name="Grupo 12"/>
+            <p:cNvGrpSpPr/>
+            <p:nvPr/>
+          </p:nvGrpSpPr>
+          <p:grpSpPr>
+            <a:xfrm>
+              <a:off x="3386517" y="1393032"/>
+              <a:ext cx="1133476" cy="1514757"/>
+              <a:chOff x="1814892" y="1431315"/>
+              <a:chExt cx="1133476" cy="1514757"/>
+            </a:xfrm>
+          </p:grpSpPr>
+          <p:sp>
+            <p:nvSpPr>
+              <p:cNvPr id="14" name="Retângulo 13"/>
+              <p:cNvSpPr/>
+              <p:nvPr/>
+            </p:nvSpPr>
+            <p:spPr>
+              <a:xfrm>
+                <a:off x="1814892" y="1431315"/>
+                <a:ext cx="1133476" cy="1514757"/>
+              </a:xfrm>
+              <a:prstGeom prst="rect">
+                <a:avLst/>
+              </a:prstGeom>
+              <a:solidFill>
+                <a:srgbClr val="8DBA62"/>
+              </a:solidFill>
+              <a:ln>
+                <a:solidFill>
+                  <a:srgbClr val="8DBA62"/>
+                </a:solidFill>
+              </a:ln>
+            </p:spPr>
+            <p:style>
+              <a:lnRef idx="2">
+                <a:schemeClr val="accent1">
+                  <a:shade val="50000"/>
+                </a:schemeClr>
+              </a:lnRef>
+              <a:fillRef idx="1">
+                <a:schemeClr val="accent1"/>
+              </a:fillRef>
+              <a:effectRef idx="0">
+                <a:schemeClr val="accent1"/>
+              </a:effectRef>
+              <a:fontRef idx="minor">
+                <a:schemeClr val="lt1"/>
+              </a:fontRef>
+            </p:style>
+            <p:txBody>
+              <a:bodyPr rtlCol="0" anchor="ctr"/>
+              <a:lstStyle/>
+              <a:p>
+                <a:pPr algn="ctr"/>
+                <a:endParaRPr lang="pt-BR"/>
+              </a:p>
+            </p:txBody>
+          </p:sp>
+          <p:sp>
+            <p:nvSpPr>
+              <p:cNvPr id="15" name="Retângulo 14"/>
+              <p:cNvSpPr/>
+              <p:nvPr/>
+            </p:nvSpPr>
+            <p:spPr>
+              <a:xfrm>
+                <a:off x="1835944" y="1450182"/>
+                <a:ext cx="1092994" cy="1478756"/>
+              </a:xfrm>
+              <a:prstGeom prst="rect">
+                <a:avLst/>
+              </a:prstGeom>
+              <a:solidFill>
+                <a:srgbClr val="FDEBC7"/>
+              </a:solidFill>
+              <a:ln>
+                <a:solidFill>
+                  <a:srgbClr val="8DBA62"/>
+                </a:solidFill>
+              </a:ln>
+            </p:spPr>
+            <p:style>
+              <a:lnRef idx="2">
+                <a:schemeClr val="accent1">
+                  <a:shade val="50000"/>
+                </a:schemeClr>
+              </a:lnRef>
+              <a:fillRef idx="1">
+                <a:schemeClr val="accent1"/>
+              </a:fillRef>
+              <a:effectRef idx="0">
+                <a:schemeClr val="accent1"/>
+              </a:effectRef>
+              <a:fontRef idx="minor">
+                <a:schemeClr val="lt1"/>
+              </a:fontRef>
+            </p:style>
+            <p:txBody>
+              <a:bodyPr rtlCol="0" anchor="ctr"/>
+              <a:lstStyle/>
+              <a:p>
+                <a:pPr algn="ctr"/>
+                <a:endParaRPr lang="pt-BR"/>
+              </a:p>
+            </p:txBody>
+          </p:sp>
+        </p:grpSp>
+        <p:pic>
+          <p:nvPicPr>
+            <p:cNvPr id="1030" name="Picture 6" descr="Handprint Recycle. Vector Illustration Royalty Free Cliparts ..."/>
+            <p:cNvPicPr>
+              <a:picLocks noChangeAspect="1" noChangeArrowheads="1"/>
+            </p:cNvPicPr>
+            <p:nvPr/>
+          </p:nvPicPr>
+          <p:blipFill>
+            <a:blip r:embed="rId3" cstate="print">
+              <a:extLst>
+                <a:ext uri="{28A0092B-C50C-407E-A947-70E740481C1C}">
+                  <a14:useLocalDpi xmlns:a14="http://schemas.microsoft.com/office/drawing/2010/main" val="0"/>
+                </a:ext>
+              </a:extLst>
+            </a:blip>
+            <a:srcRect/>
+            <a:stretch>
+              <a:fillRect/>
+            </a:stretch>
+          </p:blipFill>
+          <p:spPr bwMode="auto">
+            <a:xfrm>
+              <a:off x="3528060" y="1665649"/>
+              <a:ext cx="843767" cy="897625"/>
+            </a:xfrm>
+            <a:prstGeom prst="rect">
+              <a:avLst/>
+            </a:prstGeom>
+            <a:noFill/>
+            <a:extLst>
+              <a:ext uri="{909E8E84-426E-40DD-AFC4-6F175D3DCCD1}">
+                <a14:hiddenFill xmlns:a14="http://schemas.microsoft.com/office/drawing/2010/main">
+                  <a:solidFill>
+                    <a:srgbClr val="FFFFFF"/>
+                  </a:solidFill>
+                </a14:hiddenFill>
+              </a:ext>
+            </a:extLst>
+          </p:spPr>
+        </p:pic>
+      </p:grpSp>
+      <p:grpSp>
+        <p:nvGrpSpPr>
+          <p:cNvPr id="12" name="Grupo 11"/>
+          <p:cNvGrpSpPr/>
+          <p:nvPr/>
+        </p:nvGrpSpPr>
+        <p:grpSpPr>
+          <a:xfrm>
+            <a:off x="4592783" y="1297965"/>
+            <a:ext cx="1162476" cy="1514757"/>
+            <a:chOff x="4592783" y="1297965"/>
+            <a:chExt cx="1162476" cy="1514757"/>
+          </a:xfrm>
+        </p:grpSpPr>
+        <p:grpSp>
+          <p:nvGrpSpPr>
+            <p:cNvPr id="21" name="Grupo 20"/>
+            <p:cNvGrpSpPr/>
+            <p:nvPr/>
+          </p:nvGrpSpPr>
+          <p:grpSpPr>
+            <a:xfrm>
+              <a:off x="4592783" y="1297965"/>
+              <a:ext cx="1133476" cy="1514757"/>
+              <a:chOff x="1814892" y="1431315"/>
+              <a:chExt cx="1133476" cy="1514757"/>
+            </a:xfrm>
+          </p:grpSpPr>
+          <p:sp>
+            <p:nvSpPr>
+              <p:cNvPr id="23" name="Retângulo 22"/>
+              <p:cNvSpPr/>
+              <p:nvPr/>
+            </p:nvSpPr>
+            <p:spPr>
+              <a:xfrm>
+                <a:off x="1814892" y="1431315"/>
+                <a:ext cx="1133476" cy="1514757"/>
+              </a:xfrm>
+              <a:prstGeom prst="rect">
+                <a:avLst/>
+              </a:prstGeom>
+              <a:solidFill>
+                <a:srgbClr val="8DBA62"/>
+              </a:solidFill>
+              <a:ln>
+                <a:solidFill>
+                  <a:srgbClr val="8DBA62"/>
+                </a:solidFill>
+              </a:ln>
+            </p:spPr>
+            <p:style>
+              <a:lnRef idx="2">
+                <a:schemeClr val="accent1">
+                  <a:shade val="50000"/>
+                </a:schemeClr>
+              </a:lnRef>
+              <a:fillRef idx="1">
+                <a:schemeClr val="accent1"/>
+              </a:fillRef>
+              <a:effectRef idx="0">
+                <a:schemeClr val="accent1"/>
+              </a:effectRef>
+              <a:fontRef idx="minor">
+                <a:schemeClr val="lt1"/>
+              </a:fontRef>
+            </p:style>
+            <p:txBody>
+              <a:bodyPr rtlCol="0" anchor="ctr"/>
+              <a:lstStyle/>
+              <a:p>
+                <a:pPr algn="ctr"/>
+                <a:endParaRPr lang="pt-BR"/>
+              </a:p>
+            </p:txBody>
+          </p:sp>
+          <p:sp>
+            <p:nvSpPr>
+              <p:cNvPr id="24" name="Retângulo 23"/>
+              <p:cNvSpPr/>
+              <p:nvPr/>
+            </p:nvSpPr>
+            <p:spPr>
+              <a:xfrm>
+                <a:off x="1835944" y="1450182"/>
+                <a:ext cx="1092994" cy="1478756"/>
+              </a:xfrm>
+              <a:prstGeom prst="rect">
+                <a:avLst/>
+              </a:prstGeom>
+              <a:solidFill>
+                <a:srgbClr val="FDEBC7"/>
+              </a:solidFill>
+              <a:ln>
+                <a:solidFill>
+                  <a:srgbClr val="8DBA62"/>
+                </a:solidFill>
+              </a:ln>
+            </p:spPr>
+            <p:style>
+              <a:lnRef idx="2">
+                <a:schemeClr val="accent1">
+                  <a:shade val="50000"/>
+                </a:schemeClr>
+              </a:lnRef>
+              <a:fillRef idx="1">
+                <a:schemeClr val="accent1"/>
+              </a:fillRef>
+              <a:effectRef idx="0">
+                <a:schemeClr val="accent1"/>
+              </a:effectRef>
+              <a:fontRef idx="minor">
+                <a:schemeClr val="lt1"/>
+              </a:fontRef>
+            </p:style>
+            <p:txBody>
+              <a:bodyPr rtlCol="0" anchor="ctr"/>
+              <a:lstStyle/>
+              <a:p>
+                <a:pPr algn="ctr"/>
+                <a:endParaRPr lang="pt-BR"/>
+              </a:p>
+            </p:txBody>
+          </p:sp>
+        </p:grpSp>
+        <p:pic>
+          <p:nvPicPr>
+            <p:cNvPr id="1032" name="Picture 8" descr="Recycling and Green World-Illustration vector art illustration ..."/>
+            <p:cNvPicPr>
+              <a:picLocks noChangeAspect="1" noChangeArrowheads="1"/>
+            </p:cNvPicPr>
+            <p:nvPr/>
+          </p:nvPicPr>
+          <p:blipFill>
+            <a:blip r:embed="rId4" cstate="print">
+              <a:extLst>
+                <a:ext uri="{28A0092B-C50C-407E-A947-70E740481C1C}">
+                  <a14:useLocalDpi xmlns:a14="http://schemas.microsoft.com/office/drawing/2010/main" val="0"/>
+                </a:ext>
+              </a:extLst>
+            </a:blip>
+            <a:srcRect/>
+            <a:stretch>
+              <a:fillRect/>
+            </a:stretch>
+          </p:blipFill>
+          <p:spPr bwMode="auto">
+            <a:xfrm>
+              <a:off x="4613835" y="1463629"/>
+              <a:ext cx="1141424" cy="1111529"/>
+            </a:xfrm>
+            <a:prstGeom prst="rect">
+              <a:avLst/>
+            </a:prstGeom>
+            <a:noFill/>
+          </p:spPr>
+        </p:pic>
+      </p:grpSp>
+      <p:grpSp>
+        <p:nvGrpSpPr>
+          <p:cNvPr id="17" name="Grupo 16"/>
+          <p:cNvGrpSpPr/>
+          <p:nvPr/>
+        </p:nvGrpSpPr>
+        <p:grpSpPr>
+          <a:xfrm>
+            <a:off x="6128887" y="1316832"/>
+            <a:ext cx="1133476" cy="1514757"/>
+            <a:chOff x="2750687" y="3795665"/>
+            <a:chExt cx="1133476" cy="1514757"/>
+          </a:xfrm>
+        </p:grpSpPr>
+        <p:grpSp>
+          <p:nvGrpSpPr>
+            <p:cNvPr id="28" name="Grupo 27"/>
+            <p:cNvGrpSpPr/>
+            <p:nvPr/>
+          </p:nvGrpSpPr>
+          <p:grpSpPr>
+            <a:xfrm>
+              <a:off x="2750687" y="3795665"/>
+              <a:ext cx="1133476" cy="1514757"/>
+              <a:chOff x="1814892" y="1431315"/>
+              <a:chExt cx="1133476" cy="1514757"/>
+            </a:xfrm>
+          </p:grpSpPr>
+          <p:sp>
+            <p:nvSpPr>
+              <p:cNvPr id="30" name="Retângulo 29"/>
+              <p:cNvSpPr/>
+              <p:nvPr/>
+            </p:nvSpPr>
+            <p:spPr>
+              <a:xfrm>
+                <a:off x="1814892" y="1431315"/>
+                <a:ext cx="1133476" cy="1514757"/>
+              </a:xfrm>
+              <a:prstGeom prst="rect">
+                <a:avLst/>
+              </a:prstGeom>
+              <a:solidFill>
+                <a:srgbClr val="8DBA62"/>
+              </a:solidFill>
+              <a:ln>
+                <a:solidFill>
+                  <a:srgbClr val="8DBA62"/>
+                </a:solidFill>
+              </a:ln>
+            </p:spPr>
+            <p:style>
+              <a:lnRef idx="2">
+                <a:schemeClr val="accent1">
+                  <a:shade val="50000"/>
+                </a:schemeClr>
+              </a:lnRef>
+              <a:fillRef idx="1">
+                <a:schemeClr val="accent1"/>
+              </a:fillRef>
+              <a:effectRef idx="0">
+                <a:schemeClr val="accent1"/>
+              </a:effectRef>
+              <a:fontRef idx="minor">
+                <a:schemeClr val="lt1"/>
+              </a:fontRef>
+            </p:style>
+            <p:txBody>
+              <a:bodyPr rtlCol="0" anchor="ctr"/>
+              <a:lstStyle/>
+              <a:p>
+                <a:pPr algn="ctr"/>
+                <a:endParaRPr lang="pt-BR"/>
+              </a:p>
+            </p:txBody>
+          </p:sp>
+          <p:sp>
+            <p:nvSpPr>
+              <p:cNvPr id="31" name="Retângulo 30"/>
+              <p:cNvSpPr/>
+              <p:nvPr/>
+            </p:nvSpPr>
+            <p:spPr>
+              <a:xfrm>
+                <a:off x="1835944" y="1450182"/>
+                <a:ext cx="1092994" cy="1478756"/>
+              </a:xfrm>
+              <a:prstGeom prst="rect">
+                <a:avLst/>
+              </a:prstGeom>
+              <a:solidFill>
+                <a:srgbClr val="FDEBC7"/>
+              </a:solidFill>
+              <a:ln>
+                <a:solidFill>
+                  <a:srgbClr val="8DBA62"/>
+                </a:solidFill>
+              </a:ln>
+            </p:spPr>
+            <p:style>
+              <a:lnRef idx="2">
+                <a:schemeClr val="accent1">
+                  <a:shade val="50000"/>
+                </a:schemeClr>
+              </a:lnRef>
+              <a:fillRef idx="1">
+                <a:schemeClr val="accent1"/>
+              </a:fillRef>
+              <a:effectRef idx="0">
+                <a:schemeClr val="accent1"/>
+              </a:effectRef>
+              <a:fontRef idx="minor">
+                <a:schemeClr val="lt1"/>
+              </a:fontRef>
+            </p:style>
+            <p:txBody>
+              <a:bodyPr rtlCol="0" anchor="ctr"/>
+              <a:lstStyle/>
+              <a:p>
+                <a:pPr algn="ctr"/>
+                <a:endParaRPr lang="pt-BR"/>
+              </a:p>
+            </p:txBody>
+          </p:sp>
+        </p:grpSp>
+        <p:pic>
+          <p:nvPicPr>
+            <p:cNvPr id="1034" name="Picture 10" descr="EarthCare - City of Thunder Bay"/>
+            <p:cNvPicPr>
+              <a:picLocks noChangeAspect="1" noChangeArrowheads="1"/>
+            </p:cNvPicPr>
+            <p:nvPr/>
+          </p:nvPicPr>
+          <p:blipFill>
+            <a:blip r:embed="rId5" cstate="print">
+              <a:extLst>
+                <a:ext uri="{28A0092B-C50C-407E-A947-70E740481C1C}">
+                  <a14:useLocalDpi xmlns:a14="http://schemas.microsoft.com/office/drawing/2010/main" val="0"/>
+                </a:ext>
+              </a:extLst>
+            </a:blip>
+            <a:srcRect/>
+            <a:stretch>
+              <a:fillRect/>
+            </a:stretch>
+          </p:blipFill>
+          <p:spPr bwMode="auto">
+            <a:xfrm>
+              <a:off x="2981960" y="4086459"/>
+              <a:ext cx="660818" cy="930041"/>
+            </a:xfrm>
+            <a:prstGeom prst="rect">
+              <a:avLst/>
+            </a:prstGeom>
+            <a:noFill/>
+            <a:extLst>
+              <a:ext uri="{909E8E84-426E-40DD-AFC4-6F175D3DCCD1}">
+                <a14:hiddenFill xmlns:a14="http://schemas.microsoft.com/office/drawing/2010/main">
+                  <a:solidFill>
+                    <a:srgbClr val="FFFFFF"/>
+                  </a:solidFill>
+                </a14:hiddenFill>
+              </a:ext>
+            </a:extLst>
+          </p:spPr>
+        </p:pic>
+      </p:grpSp>
+      <p:grpSp>
+        <p:nvGrpSpPr>
+          <p:cNvPr id="18" name="Grupo 17"/>
+          <p:cNvGrpSpPr/>
+          <p:nvPr/>
+        </p:nvGrpSpPr>
+        <p:grpSpPr>
+          <a:xfrm>
+            <a:off x="7594266" y="1335699"/>
+            <a:ext cx="1133476" cy="1514757"/>
+            <a:chOff x="7678287" y="3642567"/>
+            <a:chExt cx="1133476" cy="1514757"/>
+          </a:xfrm>
+        </p:grpSpPr>
+        <p:grpSp>
+          <p:nvGrpSpPr>
+            <p:cNvPr id="36" name="Grupo 35"/>
+            <p:cNvGrpSpPr/>
+            <p:nvPr/>
+          </p:nvGrpSpPr>
+          <p:grpSpPr>
+            <a:xfrm>
+              <a:off x="7678287" y="3642567"/>
+              <a:ext cx="1133476" cy="1514757"/>
+              <a:chOff x="1814892" y="1431315"/>
+              <a:chExt cx="1133476" cy="1514757"/>
+            </a:xfrm>
+          </p:grpSpPr>
+          <p:sp>
+            <p:nvSpPr>
+              <p:cNvPr id="38" name="Retângulo 37"/>
+              <p:cNvSpPr/>
+              <p:nvPr/>
+            </p:nvSpPr>
+            <p:spPr>
+              <a:xfrm>
+                <a:off x="1814892" y="1431315"/>
+                <a:ext cx="1133476" cy="1514757"/>
+              </a:xfrm>
+              <a:prstGeom prst="rect">
+                <a:avLst/>
+              </a:prstGeom>
+              <a:solidFill>
+                <a:srgbClr val="8DBA62"/>
+              </a:solidFill>
+              <a:ln>
+                <a:solidFill>
+                  <a:srgbClr val="8DBA62"/>
+                </a:solidFill>
+              </a:ln>
+            </p:spPr>
+            <p:style>
+              <a:lnRef idx="2">
+                <a:schemeClr val="accent1">
+                  <a:shade val="50000"/>
+                </a:schemeClr>
+              </a:lnRef>
+              <a:fillRef idx="1">
+                <a:schemeClr val="accent1"/>
+              </a:fillRef>
+              <a:effectRef idx="0">
+                <a:schemeClr val="accent1"/>
+              </a:effectRef>
+              <a:fontRef idx="minor">
+                <a:schemeClr val="lt1"/>
+              </a:fontRef>
+            </p:style>
+            <p:txBody>
+              <a:bodyPr rtlCol="0" anchor="ctr"/>
+              <a:lstStyle/>
+              <a:p>
+                <a:pPr algn="ctr"/>
+                <a:endParaRPr lang="pt-BR"/>
+              </a:p>
+            </p:txBody>
+          </p:sp>
+          <p:sp>
+            <p:nvSpPr>
+              <p:cNvPr id="39" name="Retângulo 38"/>
+              <p:cNvSpPr/>
+              <p:nvPr/>
+            </p:nvSpPr>
+            <p:spPr>
+              <a:xfrm>
+                <a:off x="1835944" y="1450182"/>
+                <a:ext cx="1092994" cy="1478756"/>
+              </a:xfrm>
+              <a:prstGeom prst="rect">
+                <a:avLst/>
+              </a:prstGeom>
+              <a:solidFill>
+                <a:srgbClr val="FDEBC7"/>
+              </a:solidFill>
+              <a:ln>
+                <a:solidFill>
+                  <a:srgbClr val="8DBA62"/>
+                </a:solidFill>
+              </a:ln>
+            </p:spPr>
+            <p:style>
+              <a:lnRef idx="2">
+                <a:schemeClr val="accent1">
+                  <a:shade val="50000"/>
+                </a:schemeClr>
+              </a:lnRef>
+              <a:fillRef idx="1">
+                <a:schemeClr val="accent1"/>
+              </a:fillRef>
+              <a:effectRef idx="0">
+                <a:schemeClr val="accent1"/>
+              </a:effectRef>
+              <a:fontRef idx="minor">
+                <a:schemeClr val="lt1"/>
+              </a:fontRef>
+            </p:style>
+            <p:txBody>
+              <a:bodyPr rtlCol="0" anchor="ctr"/>
+              <a:lstStyle/>
+              <a:p>
+                <a:pPr algn="ctr"/>
+                <a:endParaRPr lang="pt-BR"/>
+              </a:p>
+            </p:txBody>
+          </p:sp>
+        </p:grpSp>
+        <p:pic>
+          <p:nvPicPr>
+            <p:cNvPr id="1038" name="Picture 14" descr="Safety Lessons from Earth Day—when NOT to recycle | Sustainable ..."/>
+            <p:cNvPicPr>
+              <a:picLocks noChangeAspect="1" noChangeArrowheads="1"/>
+            </p:cNvPicPr>
+            <p:nvPr/>
+          </p:nvPicPr>
+          <p:blipFill>
+            <a:blip r:embed="rId6" cstate="print">
+              <a:extLst>
+                <a:ext uri="{BEBA8EAE-BF5A-486C-A8C5-ECC9F3942E4B}">
+                  <a14:imgProps xmlns:a14="http://schemas.microsoft.com/office/drawing/2010/main">
+                    <a14:imgLayer r:embed="rId7">
+                      <a14:imgEffect>
+                        <a14:backgroundRemoval t="0" b="100000" l="0" r="100000">
+                          <a14:foregroundMark x1="16301" y1="11170" x2="17555" y2="10106"/>
+                          <a14:foregroundMark x1="80564" y1="12234" x2="80564" y2="11968"/>
+                          <a14:foregroundMark x1="78683" y1="12234" x2="79624" y2="12234"/>
+                          <a14:foregroundMark x1="77743" y1="78191" x2="77743" y2="78191"/>
+                          <a14:foregroundMark x1="12226" y1="74202" x2="12226" y2="74202"/>
+                          <a14:foregroundMark x1="9404" y1="77128" x2="9404" y2="77128"/>
+                        </a14:backgroundRemoval>
+                      </a14:imgEffect>
+                    </a14:imgLayer>
+                  </a14:imgProps>
+                </a:ext>
+                <a:ext uri="{28A0092B-C50C-407E-A947-70E740481C1C}">
+                  <a14:useLocalDpi xmlns:a14="http://schemas.microsoft.com/office/drawing/2010/main" val="0"/>
+                </a:ext>
+              </a:extLst>
+            </a:blip>
+            <a:srcRect/>
+            <a:stretch>
+              <a:fillRect/>
+            </a:stretch>
+          </p:blipFill>
+          <p:spPr bwMode="auto">
+            <a:xfrm>
+              <a:off x="7699339" y="3749470"/>
+              <a:ext cx="1103730" cy="1300949"/>
+            </a:xfrm>
+            <a:prstGeom prst="rect">
+              <a:avLst/>
+            </a:prstGeom>
+            <a:noFill/>
+            <a:extLst>
+              <a:ext uri="{909E8E84-426E-40DD-AFC4-6F175D3DCCD1}">
+                <a14:hiddenFill xmlns:a14="http://schemas.microsoft.com/office/drawing/2010/main">
+                  <a:solidFill>
+                    <a:srgbClr val="FFFFFF"/>
+                  </a:solidFill>
+                </a14:hiddenFill>
+              </a:ext>
+            </a:extLst>
+          </p:spPr>
+        </p:pic>
+      </p:grpSp>
+    </p:spTree>
+    <p:extLst>
+      <p:ext uri="{BB962C8B-B14F-4D97-AF65-F5344CB8AC3E}">
+        <p14:creationId xmlns:p14="http://schemas.microsoft.com/office/powerpoint/2010/main" val="1462357319"/>
+      </p:ext>
+    </p:extLst>
+  </p:cSld>
+  <p:clrMapOvr>
+    <a:masterClrMapping/>
+  </p:clrMapOvr>
+</p:sld>
+</file>
+
+<file path=ppt/slides/slide31.xml><?xml version="1.0" encoding="utf-8"?>
+<p:sld xmlns:a="http://schemas.openxmlformats.org/drawingml/2006/main" xmlns:r="http://schemas.openxmlformats.org/officeDocument/2006/relationships" xmlns:p="http://schemas.openxmlformats.org/presentationml/2006/main">
+  <p:cSld>
+    <p:spTree>
+      <p:nvGrpSpPr>
+        <p:cNvPr id="1" name=""/>
+        <p:cNvGrpSpPr/>
+        <p:nvPr/>
+      </p:nvGrpSpPr>
+      <p:grpSpPr>
+        <a:xfrm>
+          <a:off x="0" y="0"/>
+          <a:ext cx="0" cy="0"/>
+          <a:chOff x="0" y="0"/>
+          <a:chExt cx="0" cy="0"/>
+        </a:xfrm>
+      </p:grpSpPr>
       <p:sp>
         <p:nvSpPr>
           <p:cNvPr id="2" name="Título 1"/>
@@ -23230,11 +24095,7 @@
             </a:r>
             <a:r>
               <a:rPr lang="pt-BR" sz="3200" dirty="0" smtClean="0"/>
-              <a:t> Game </a:t>
-            </a:r>
-            <a:r>
-              <a:rPr lang="pt-BR" sz="3200" dirty="0" smtClean="0"/>
-              <a:t>(Jogo da Memória)</a:t>
+              <a:t> Game (Jogo da Memória)</a:t>
             </a:r>
             <a:endParaRPr lang="pt-BR" sz="3200" dirty="0"/>
           </a:p>
@@ -23671,7 +24532,7 @@
 </p:sld>
 </file>
 
-<file path=ppt/slides/slide31.xml><?xml version="1.0" encoding="utf-8"?>
+<file path=ppt/slides/slide32.xml><?xml version="1.0" encoding="utf-8"?>
 <p:sld xmlns:a="http://schemas.openxmlformats.org/drawingml/2006/main" xmlns:r="http://schemas.openxmlformats.org/officeDocument/2006/relationships" xmlns:p="http://schemas.openxmlformats.org/presentationml/2006/main">
   <p:cSld>
     <p:spTree>
@@ -24634,7 +25495,7 @@
 </p:sld>
 </file>
 
-<file path=ppt/slides/slide32.xml><?xml version="1.0" encoding="utf-8"?>
+<file path=ppt/slides/slide33.xml><?xml version="1.0" encoding="utf-8"?>
 <p:sld xmlns:a="http://schemas.openxmlformats.org/drawingml/2006/main" xmlns:r="http://schemas.openxmlformats.org/officeDocument/2006/relationships" xmlns:p="http://schemas.openxmlformats.org/presentationml/2006/main">
   <p:cSld>
     <p:spTree>
@@ -24678,11 +25539,7 @@
             </a:r>
             <a:r>
               <a:rPr lang="pt-BR" sz="3200" dirty="0" smtClean="0"/>
-              <a:t> Game </a:t>
-            </a:r>
-            <a:r>
-              <a:rPr lang="pt-BR" sz="3200" dirty="0" smtClean="0"/>
-              <a:t>(Acerte ao Alvo)</a:t>
+              <a:t> Game (Acerte ao Alvo)</a:t>
             </a:r>
             <a:endParaRPr lang="pt-BR" sz="3200" dirty="0"/>
           </a:p>
@@ -25119,7 +25976,7 @@
 </p:sld>
 </file>
 
-<file path=ppt/slides/slide33.xml><?xml version="1.0" encoding="utf-8"?>
+<file path=ppt/slides/slide34.xml><?xml version="1.0" encoding="utf-8"?>
 <p:sld xmlns:a="http://schemas.openxmlformats.org/drawingml/2006/main" xmlns:r="http://schemas.openxmlformats.org/officeDocument/2006/relationships" xmlns:p="http://schemas.openxmlformats.org/presentationml/2006/main">
   <p:cSld>
     <p:spTree>
@@ -26776,7 +27633,7 @@
 </p:sld>
 </file>
 
-<file path=ppt/slides/slide34.xml><?xml version="1.0" encoding="utf-8"?>
+<file path=ppt/slides/slide35.xml><?xml version="1.0" encoding="utf-8"?>
 <p:sld xmlns:a="http://schemas.openxmlformats.org/drawingml/2006/main" xmlns:r="http://schemas.openxmlformats.org/officeDocument/2006/relationships" xmlns:p="http://schemas.openxmlformats.org/presentationml/2006/main">
   <p:cSld>
     <p:spTree>
@@ -27177,7 +28034,7 @@
 </p:sld>
 </file>
 
-<file path=ppt/slides/slide35.xml><?xml version="1.0" encoding="utf-8"?>
+<file path=ppt/slides/slide36.xml><?xml version="1.0" encoding="utf-8"?>
 <p:sld xmlns:a="http://schemas.openxmlformats.org/drawingml/2006/main" xmlns:r="http://schemas.openxmlformats.org/officeDocument/2006/relationships" xmlns:p="http://schemas.openxmlformats.org/presentationml/2006/main">
   <p:cSld>
     <p:spTree>
@@ -28456,7 +29313,7 @@
 </p:sld>
 </file>
 
-<file path=ppt/slides/slide36.xml><?xml version="1.0" encoding="utf-8"?>
+<file path=ppt/slides/slide37.xml><?xml version="1.0" encoding="utf-8"?>
 <p:sld xmlns:a="http://schemas.openxmlformats.org/drawingml/2006/main" xmlns:r="http://schemas.openxmlformats.org/officeDocument/2006/relationships" xmlns:p="http://schemas.openxmlformats.org/presentationml/2006/main">
   <p:cSld>
     <p:spTree>
@@ -28782,7 +29639,7 @@
 </p:sld>
 </file>
 
-<file path=ppt/slides/slide37.xml><?xml version="1.0" encoding="utf-8"?>
+<file path=ppt/slides/slide38.xml><?xml version="1.0" encoding="utf-8"?>
 <p:sld xmlns:a="http://schemas.openxmlformats.org/drawingml/2006/main" xmlns:r="http://schemas.openxmlformats.org/officeDocument/2006/relationships" xmlns:p="http://schemas.openxmlformats.org/presentationml/2006/main">
   <p:cSld>
     <p:spTree>
@@ -29569,7 +30426,7 @@
 </p:sld>
 </file>
 
-<file path=ppt/slides/slide38.xml><?xml version="1.0" encoding="utf-8"?>
+<file path=ppt/slides/slide39.xml><?xml version="1.0" encoding="utf-8"?>
 <p:sld xmlns:a="http://schemas.openxmlformats.org/drawingml/2006/main" xmlns:r="http://schemas.openxmlformats.org/officeDocument/2006/relationships" xmlns:p="http://schemas.openxmlformats.org/presentationml/2006/main">
   <p:cSld>
     <p:spTree>
@@ -29800,7 +30657,378 @@
 </p:sld>
 </file>
 
-<file path=ppt/slides/slide39.xml><?xml version="1.0" encoding="utf-8"?>
+<file path=ppt/slides/slide4.xml><?xml version="1.0" encoding="utf-8"?>
+<p:sld xmlns:a="http://schemas.openxmlformats.org/drawingml/2006/main" xmlns:r="http://schemas.openxmlformats.org/officeDocument/2006/relationships" xmlns:p="http://schemas.openxmlformats.org/presentationml/2006/main">
+  <p:cSld>
+    <p:spTree>
+      <p:nvGrpSpPr>
+        <p:cNvPr id="1" name=""/>
+        <p:cNvGrpSpPr/>
+        <p:nvPr/>
+      </p:nvGrpSpPr>
+      <p:grpSpPr>
+        <a:xfrm>
+          <a:off x="0" y="0"/>
+          <a:ext cx="0" cy="0"/>
+          <a:chOff x="0" y="0"/>
+          <a:chExt cx="0" cy="0"/>
+        </a:xfrm>
+      </p:grpSpPr>
+      <p:sp>
+        <p:nvSpPr>
+          <p:cNvPr id="2" name="Título 1"/>
+          <p:cNvSpPr>
+            <a:spLocks noGrp="1"/>
+          </p:cNvSpPr>
+          <p:nvPr>
+            <p:ph type="title"/>
+          </p:nvPr>
+        </p:nvSpPr>
+        <p:spPr/>
+        <p:txBody>
+          <a:bodyPr>
+            <a:normAutofit/>
+          </a:bodyPr>
+          <a:lstStyle/>
+          <a:p>
+            <a:r>
+              <a:rPr lang="pt-BR" sz="3200" dirty="0" smtClean="0"/>
+              <a:t>Tabela de Elementos – Tela </a:t>
+            </a:r>
+            <a:r>
+              <a:rPr lang="pt-BR" sz="3200" dirty="0" err="1" smtClean="0"/>
+              <a:t>Login</a:t>
+            </a:r>
+            <a:r>
+              <a:rPr lang="pt-BR" sz="3200" dirty="0" smtClean="0"/>
+              <a:t> Professor</a:t>
+            </a:r>
+            <a:endParaRPr lang="pt-BR" sz="3200" dirty="0"/>
+          </a:p>
+        </p:txBody>
+      </p:sp>
+      <p:graphicFrame>
+        <p:nvGraphicFramePr>
+          <p:cNvPr id="4" name="Espaço Reservado para Conteúdo 3"/>
+          <p:cNvGraphicFramePr>
+            <a:graphicFrameLocks noGrp="1"/>
+          </p:cNvGraphicFramePr>
+          <p:nvPr>
+            <p:ph idx="1"/>
+            <p:extLst>
+              <p:ext uri="{D42A27DB-BD31-4B8C-83A1-F6EECF244321}">
+                <p14:modId xmlns:p14="http://schemas.microsoft.com/office/powerpoint/2010/main" val="3380286900"/>
+              </p:ext>
+            </p:extLst>
+          </p:nvPr>
+        </p:nvGraphicFramePr>
+        <p:xfrm>
+          <a:off x="838200" y="2250626"/>
+          <a:ext cx="8923985" cy="1977807"/>
+        </p:xfrm>
+        <a:graphic>
+          <a:graphicData uri="http://schemas.openxmlformats.org/drawingml/2006/table">
+            <a:tbl>
+              <a:tblPr firstRow="1" bandRow="1">
+                <a:tableStyleId>{93296810-A885-4BE3-A3E7-6D5BEEA58F35}</a:tableStyleId>
+              </a:tblPr>
+              <a:tblGrid>
+                <a:gridCol w="554127"/>
+                <a:gridCol w="1586198"/>
+                <a:gridCol w="1695590"/>
+                <a:gridCol w="2544035"/>
+                <a:gridCol w="2544035"/>
+              </a:tblGrid>
+              <a:tr h="445909">
+                <a:tc>
+                  <a:txBody>
+                    <a:bodyPr/>
+                    <a:lstStyle/>
+                    <a:p>
+                      <a:endParaRPr lang="pt-BR" dirty="0"/>
+                    </a:p>
+                  </a:txBody>
+                  <a:tcPr/>
+                </a:tc>
+                <a:tc>
+                  <a:txBody>
+                    <a:bodyPr/>
+                    <a:lstStyle/>
+                    <a:p>
+                      <a:r>
+                        <a:rPr lang="pt-BR" dirty="0" smtClean="0"/>
+                        <a:t>Nome Campo</a:t>
+                      </a:r>
+                      <a:endParaRPr lang="pt-BR" dirty="0"/>
+                    </a:p>
+                  </a:txBody>
+                  <a:tcPr/>
+                </a:tc>
+                <a:tc>
+                  <a:txBody>
+                    <a:bodyPr/>
+                    <a:lstStyle/>
+                    <a:p>
+                      <a:r>
+                        <a:rPr lang="pt-BR" dirty="0" smtClean="0"/>
+                        <a:t>Origem</a:t>
+                      </a:r>
+                      <a:endParaRPr lang="pt-BR" dirty="0"/>
+                    </a:p>
+                  </a:txBody>
+                  <a:tcPr/>
+                </a:tc>
+                <a:tc>
+                  <a:txBody>
+                    <a:bodyPr/>
+                    <a:lstStyle/>
+                    <a:p>
+                      <a:r>
+                        <a:rPr lang="pt-BR" dirty="0" smtClean="0"/>
+                        <a:t>Tipo</a:t>
+                      </a:r>
+                      <a:endParaRPr lang="pt-BR" dirty="0"/>
+                    </a:p>
+                  </a:txBody>
+                  <a:tcPr/>
+                </a:tc>
+                <a:tc>
+                  <a:txBody>
+                    <a:bodyPr/>
+                    <a:lstStyle/>
+                    <a:p>
+                      <a:r>
+                        <a:rPr lang="pt-BR" dirty="0" smtClean="0"/>
+                        <a:t>Função</a:t>
+                      </a:r>
+                      <a:endParaRPr lang="pt-BR" dirty="0"/>
+                    </a:p>
+                  </a:txBody>
+                  <a:tcPr/>
+                </a:tc>
+              </a:tr>
+              <a:tr h="445909">
+                <a:tc>
+                  <a:txBody>
+                    <a:bodyPr/>
+                    <a:lstStyle/>
+                    <a:p>
+                      <a:r>
+                        <a:rPr lang="pt-BR" dirty="0" smtClean="0"/>
+                        <a:t>0</a:t>
+                      </a:r>
+                      <a:endParaRPr lang="pt-BR" dirty="0"/>
+                    </a:p>
+                  </a:txBody>
+                  <a:tcPr/>
+                </a:tc>
+                <a:tc>
+                  <a:txBody>
+                    <a:bodyPr/>
+                    <a:lstStyle/>
+                    <a:p>
+                      <a:r>
+                        <a:rPr lang="pt-BR" dirty="0" err="1" smtClean="0"/>
+                        <a:t>Login</a:t>
+                      </a:r>
+                      <a:endParaRPr lang="pt-BR" dirty="0"/>
+                    </a:p>
+                  </a:txBody>
+                  <a:tcPr/>
+                </a:tc>
+                <a:tc>
+                  <a:txBody>
+                    <a:bodyPr/>
+                    <a:lstStyle/>
+                    <a:p>
+                      <a:r>
+                        <a:rPr lang="pt-BR" dirty="0" smtClean="0"/>
+                        <a:t>Digitado</a:t>
+                      </a:r>
+                      <a:endParaRPr lang="pt-BR" dirty="0"/>
+                    </a:p>
+                  </a:txBody>
+                  <a:tcPr/>
+                </a:tc>
+                <a:tc>
+                  <a:txBody>
+                    <a:bodyPr/>
+                    <a:lstStyle/>
+                    <a:p>
+                      <a:r>
+                        <a:rPr lang="pt-BR" dirty="0" err="1" smtClean="0"/>
+                        <a:t>string</a:t>
+                      </a:r>
+                      <a:endParaRPr lang="pt-BR" dirty="0"/>
+                    </a:p>
+                  </a:txBody>
+                  <a:tcPr/>
+                </a:tc>
+                <a:tc>
+                  <a:txBody>
+                    <a:bodyPr/>
+                    <a:lstStyle/>
+                    <a:p>
+                      <a:endParaRPr lang="pt-BR" dirty="0"/>
+                    </a:p>
+                  </a:txBody>
+                  <a:tcPr/>
+                </a:tc>
+              </a:tr>
+              <a:tr h="445909">
+                <a:tc>
+                  <a:txBody>
+                    <a:bodyPr/>
+                    <a:lstStyle/>
+                    <a:p>
+                      <a:r>
+                        <a:rPr lang="pt-BR" dirty="0" smtClean="0"/>
+                        <a:t>1</a:t>
+                      </a:r>
+                      <a:endParaRPr lang="pt-BR" dirty="0"/>
+                    </a:p>
+                  </a:txBody>
+                  <a:tcPr/>
+                </a:tc>
+                <a:tc>
+                  <a:txBody>
+                    <a:bodyPr/>
+                    <a:lstStyle/>
+                    <a:p>
+                      <a:r>
+                        <a:rPr lang="pt-BR" dirty="0" smtClean="0"/>
+                        <a:t>Senha</a:t>
+                      </a:r>
+                      <a:endParaRPr lang="pt-BR" dirty="0"/>
+                    </a:p>
+                  </a:txBody>
+                  <a:tcPr/>
+                </a:tc>
+                <a:tc>
+                  <a:txBody>
+                    <a:bodyPr/>
+                    <a:lstStyle/>
+                    <a:p>
+                      <a:r>
+                        <a:rPr lang="pt-BR" dirty="0" smtClean="0"/>
+                        <a:t>Digitado</a:t>
+                      </a:r>
+                      <a:endParaRPr lang="pt-BR" dirty="0"/>
+                    </a:p>
+                  </a:txBody>
+                  <a:tcPr/>
+                </a:tc>
+                <a:tc>
+                  <a:txBody>
+                    <a:bodyPr/>
+                    <a:lstStyle/>
+                    <a:p>
+                      <a:r>
+                        <a:rPr lang="pt-BR" dirty="0" err="1" smtClean="0"/>
+                        <a:t>string</a:t>
+                      </a:r>
+                      <a:endParaRPr lang="pt-BR" dirty="0"/>
+                    </a:p>
+                  </a:txBody>
+                  <a:tcPr/>
+                </a:tc>
+                <a:tc>
+                  <a:txBody>
+                    <a:bodyPr/>
+                    <a:lstStyle/>
+                    <a:p>
+                      <a:endParaRPr lang="pt-BR" dirty="0"/>
+                    </a:p>
+                  </a:txBody>
+                  <a:tcPr/>
+                </a:tc>
+              </a:tr>
+              <a:tr h="445909">
+                <a:tc>
+                  <a:txBody>
+                    <a:bodyPr/>
+                    <a:lstStyle/>
+                    <a:p>
+                      <a:r>
+                        <a:rPr lang="pt-BR" dirty="0" smtClean="0"/>
+                        <a:t>2</a:t>
+                      </a:r>
+                      <a:endParaRPr lang="pt-BR" dirty="0"/>
+                    </a:p>
+                  </a:txBody>
+                  <a:tcPr/>
+                </a:tc>
+                <a:tc>
+                  <a:txBody>
+                    <a:bodyPr/>
+                    <a:lstStyle/>
+                    <a:p>
+                      <a:r>
+                        <a:rPr lang="pt-BR" dirty="0" smtClean="0"/>
+                        <a:t>Entrar</a:t>
+                      </a:r>
+                      <a:endParaRPr lang="pt-BR" dirty="0"/>
+                    </a:p>
+                  </a:txBody>
+                  <a:tcPr/>
+                </a:tc>
+                <a:tc>
+                  <a:txBody>
+                    <a:bodyPr/>
+                    <a:lstStyle/>
+                    <a:p>
+                      <a:endParaRPr lang="pt-BR" dirty="0"/>
+                    </a:p>
+                  </a:txBody>
+                  <a:tcPr/>
+                </a:tc>
+                <a:tc>
+                  <a:txBody>
+                    <a:bodyPr/>
+                    <a:lstStyle/>
+                    <a:p>
+                      <a:r>
+                        <a:rPr lang="pt-BR" dirty="0" smtClean="0"/>
+                        <a:t>Botão</a:t>
+                      </a:r>
+                      <a:endParaRPr lang="pt-BR" dirty="0"/>
+                    </a:p>
+                  </a:txBody>
+                  <a:tcPr/>
+                </a:tc>
+                <a:tc>
+                  <a:txBody>
+                    <a:bodyPr/>
+                    <a:lstStyle/>
+                    <a:p>
+                      <a:r>
+                        <a:rPr lang="pt-BR" dirty="0" smtClean="0"/>
+                        <a:t>Valida/ Direciona para tela Home Professor</a:t>
+                      </a:r>
+                      <a:endParaRPr lang="pt-BR" dirty="0"/>
+                    </a:p>
+                  </a:txBody>
+                  <a:tcPr/>
+                </a:tc>
+              </a:tr>
+            </a:tbl>
+          </a:graphicData>
+        </a:graphic>
+      </p:graphicFrame>
+    </p:spTree>
+    <p:extLst>
+      <p:ext uri="{BB962C8B-B14F-4D97-AF65-F5344CB8AC3E}">
+        <p14:creationId xmlns:p14="http://schemas.microsoft.com/office/powerpoint/2010/main" val="857581726"/>
+      </p:ext>
+    </p:extLst>
+  </p:cSld>
+  <p:clrMapOvr>
+    <a:masterClrMapping/>
+  </p:clrMapOvr>
+</p:sld>
+</file>
+
+<file path=ppt/slides/slide40.xml><?xml version="1.0" encoding="utf-8"?>
 <p:sld xmlns:a="http://schemas.openxmlformats.org/drawingml/2006/main" xmlns:r="http://schemas.openxmlformats.org/officeDocument/2006/relationships" xmlns:p="http://schemas.openxmlformats.org/presentationml/2006/main">
   <p:cSld>
     <p:spTree>
@@ -30821,378 +32049,7 @@
 </p:sld>
 </file>
 
-<file path=ppt/slides/slide4.xml><?xml version="1.0" encoding="utf-8"?>
-<p:sld xmlns:a="http://schemas.openxmlformats.org/drawingml/2006/main" xmlns:r="http://schemas.openxmlformats.org/officeDocument/2006/relationships" xmlns:p="http://schemas.openxmlformats.org/presentationml/2006/main">
-  <p:cSld>
-    <p:spTree>
-      <p:nvGrpSpPr>
-        <p:cNvPr id="1" name=""/>
-        <p:cNvGrpSpPr/>
-        <p:nvPr/>
-      </p:nvGrpSpPr>
-      <p:grpSpPr>
-        <a:xfrm>
-          <a:off x="0" y="0"/>
-          <a:ext cx="0" cy="0"/>
-          <a:chOff x="0" y="0"/>
-          <a:chExt cx="0" cy="0"/>
-        </a:xfrm>
-      </p:grpSpPr>
-      <p:sp>
-        <p:nvSpPr>
-          <p:cNvPr id="2" name="Título 1"/>
-          <p:cNvSpPr>
-            <a:spLocks noGrp="1"/>
-          </p:cNvSpPr>
-          <p:nvPr>
-            <p:ph type="title"/>
-          </p:nvPr>
-        </p:nvSpPr>
-        <p:spPr/>
-        <p:txBody>
-          <a:bodyPr>
-            <a:normAutofit/>
-          </a:bodyPr>
-          <a:lstStyle/>
-          <a:p>
-            <a:r>
-              <a:rPr lang="pt-BR" sz="3200" dirty="0" smtClean="0"/>
-              <a:t>Tabela de Elementos – Tela </a:t>
-            </a:r>
-            <a:r>
-              <a:rPr lang="pt-BR" sz="3200" dirty="0" err="1" smtClean="0"/>
-              <a:t>Login</a:t>
-            </a:r>
-            <a:r>
-              <a:rPr lang="pt-BR" sz="3200" dirty="0" smtClean="0"/>
-              <a:t> Professor</a:t>
-            </a:r>
-            <a:endParaRPr lang="pt-BR" sz="3200" dirty="0"/>
-          </a:p>
-        </p:txBody>
-      </p:sp>
-      <p:graphicFrame>
-        <p:nvGraphicFramePr>
-          <p:cNvPr id="4" name="Espaço Reservado para Conteúdo 3"/>
-          <p:cNvGraphicFramePr>
-            <a:graphicFrameLocks noGrp="1"/>
-          </p:cNvGraphicFramePr>
-          <p:nvPr>
-            <p:ph idx="1"/>
-            <p:extLst>
-              <p:ext uri="{D42A27DB-BD31-4B8C-83A1-F6EECF244321}">
-                <p14:modId xmlns:p14="http://schemas.microsoft.com/office/powerpoint/2010/main" val="3380286900"/>
-              </p:ext>
-            </p:extLst>
-          </p:nvPr>
-        </p:nvGraphicFramePr>
-        <p:xfrm>
-          <a:off x="838200" y="2250626"/>
-          <a:ext cx="8923985" cy="1977807"/>
-        </p:xfrm>
-        <a:graphic>
-          <a:graphicData uri="http://schemas.openxmlformats.org/drawingml/2006/table">
-            <a:tbl>
-              <a:tblPr firstRow="1" bandRow="1">
-                <a:tableStyleId>{93296810-A885-4BE3-A3E7-6D5BEEA58F35}</a:tableStyleId>
-              </a:tblPr>
-              <a:tblGrid>
-                <a:gridCol w="554127"/>
-                <a:gridCol w="1586198"/>
-                <a:gridCol w="1695590"/>
-                <a:gridCol w="2544035"/>
-                <a:gridCol w="2544035"/>
-              </a:tblGrid>
-              <a:tr h="445909">
-                <a:tc>
-                  <a:txBody>
-                    <a:bodyPr/>
-                    <a:lstStyle/>
-                    <a:p>
-                      <a:endParaRPr lang="pt-BR" dirty="0"/>
-                    </a:p>
-                  </a:txBody>
-                  <a:tcPr/>
-                </a:tc>
-                <a:tc>
-                  <a:txBody>
-                    <a:bodyPr/>
-                    <a:lstStyle/>
-                    <a:p>
-                      <a:r>
-                        <a:rPr lang="pt-BR" dirty="0" smtClean="0"/>
-                        <a:t>Nome Campo</a:t>
-                      </a:r>
-                      <a:endParaRPr lang="pt-BR" dirty="0"/>
-                    </a:p>
-                  </a:txBody>
-                  <a:tcPr/>
-                </a:tc>
-                <a:tc>
-                  <a:txBody>
-                    <a:bodyPr/>
-                    <a:lstStyle/>
-                    <a:p>
-                      <a:r>
-                        <a:rPr lang="pt-BR" dirty="0" smtClean="0"/>
-                        <a:t>Origem</a:t>
-                      </a:r>
-                      <a:endParaRPr lang="pt-BR" dirty="0"/>
-                    </a:p>
-                  </a:txBody>
-                  <a:tcPr/>
-                </a:tc>
-                <a:tc>
-                  <a:txBody>
-                    <a:bodyPr/>
-                    <a:lstStyle/>
-                    <a:p>
-                      <a:r>
-                        <a:rPr lang="pt-BR" dirty="0" smtClean="0"/>
-                        <a:t>Tipo</a:t>
-                      </a:r>
-                      <a:endParaRPr lang="pt-BR" dirty="0"/>
-                    </a:p>
-                  </a:txBody>
-                  <a:tcPr/>
-                </a:tc>
-                <a:tc>
-                  <a:txBody>
-                    <a:bodyPr/>
-                    <a:lstStyle/>
-                    <a:p>
-                      <a:r>
-                        <a:rPr lang="pt-BR" dirty="0" smtClean="0"/>
-                        <a:t>Função</a:t>
-                      </a:r>
-                      <a:endParaRPr lang="pt-BR" dirty="0"/>
-                    </a:p>
-                  </a:txBody>
-                  <a:tcPr/>
-                </a:tc>
-              </a:tr>
-              <a:tr h="445909">
-                <a:tc>
-                  <a:txBody>
-                    <a:bodyPr/>
-                    <a:lstStyle/>
-                    <a:p>
-                      <a:r>
-                        <a:rPr lang="pt-BR" dirty="0" smtClean="0"/>
-                        <a:t>0</a:t>
-                      </a:r>
-                      <a:endParaRPr lang="pt-BR" dirty="0"/>
-                    </a:p>
-                  </a:txBody>
-                  <a:tcPr/>
-                </a:tc>
-                <a:tc>
-                  <a:txBody>
-                    <a:bodyPr/>
-                    <a:lstStyle/>
-                    <a:p>
-                      <a:r>
-                        <a:rPr lang="pt-BR" dirty="0" err="1" smtClean="0"/>
-                        <a:t>Login</a:t>
-                      </a:r>
-                      <a:endParaRPr lang="pt-BR" dirty="0"/>
-                    </a:p>
-                  </a:txBody>
-                  <a:tcPr/>
-                </a:tc>
-                <a:tc>
-                  <a:txBody>
-                    <a:bodyPr/>
-                    <a:lstStyle/>
-                    <a:p>
-                      <a:r>
-                        <a:rPr lang="pt-BR" dirty="0" smtClean="0"/>
-                        <a:t>Digitado</a:t>
-                      </a:r>
-                      <a:endParaRPr lang="pt-BR" dirty="0"/>
-                    </a:p>
-                  </a:txBody>
-                  <a:tcPr/>
-                </a:tc>
-                <a:tc>
-                  <a:txBody>
-                    <a:bodyPr/>
-                    <a:lstStyle/>
-                    <a:p>
-                      <a:r>
-                        <a:rPr lang="pt-BR" dirty="0" err="1" smtClean="0"/>
-                        <a:t>string</a:t>
-                      </a:r>
-                      <a:endParaRPr lang="pt-BR" dirty="0"/>
-                    </a:p>
-                  </a:txBody>
-                  <a:tcPr/>
-                </a:tc>
-                <a:tc>
-                  <a:txBody>
-                    <a:bodyPr/>
-                    <a:lstStyle/>
-                    <a:p>
-                      <a:endParaRPr lang="pt-BR" dirty="0"/>
-                    </a:p>
-                  </a:txBody>
-                  <a:tcPr/>
-                </a:tc>
-              </a:tr>
-              <a:tr h="445909">
-                <a:tc>
-                  <a:txBody>
-                    <a:bodyPr/>
-                    <a:lstStyle/>
-                    <a:p>
-                      <a:r>
-                        <a:rPr lang="pt-BR" dirty="0" smtClean="0"/>
-                        <a:t>1</a:t>
-                      </a:r>
-                      <a:endParaRPr lang="pt-BR" dirty="0"/>
-                    </a:p>
-                  </a:txBody>
-                  <a:tcPr/>
-                </a:tc>
-                <a:tc>
-                  <a:txBody>
-                    <a:bodyPr/>
-                    <a:lstStyle/>
-                    <a:p>
-                      <a:r>
-                        <a:rPr lang="pt-BR" dirty="0" smtClean="0"/>
-                        <a:t>Senha</a:t>
-                      </a:r>
-                      <a:endParaRPr lang="pt-BR" dirty="0"/>
-                    </a:p>
-                  </a:txBody>
-                  <a:tcPr/>
-                </a:tc>
-                <a:tc>
-                  <a:txBody>
-                    <a:bodyPr/>
-                    <a:lstStyle/>
-                    <a:p>
-                      <a:r>
-                        <a:rPr lang="pt-BR" dirty="0" smtClean="0"/>
-                        <a:t>Digitado</a:t>
-                      </a:r>
-                      <a:endParaRPr lang="pt-BR" dirty="0"/>
-                    </a:p>
-                  </a:txBody>
-                  <a:tcPr/>
-                </a:tc>
-                <a:tc>
-                  <a:txBody>
-                    <a:bodyPr/>
-                    <a:lstStyle/>
-                    <a:p>
-                      <a:r>
-                        <a:rPr lang="pt-BR" dirty="0" err="1" smtClean="0"/>
-                        <a:t>string</a:t>
-                      </a:r>
-                      <a:endParaRPr lang="pt-BR" dirty="0"/>
-                    </a:p>
-                  </a:txBody>
-                  <a:tcPr/>
-                </a:tc>
-                <a:tc>
-                  <a:txBody>
-                    <a:bodyPr/>
-                    <a:lstStyle/>
-                    <a:p>
-                      <a:endParaRPr lang="pt-BR" dirty="0"/>
-                    </a:p>
-                  </a:txBody>
-                  <a:tcPr/>
-                </a:tc>
-              </a:tr>
-              <a:tr h="445909">
-                <a:tc>
-                  <a:txBody>
-                    <a:bodyPr/>
-                    <a:lstStyle/>
-                    <a:p>
-                      <a:r>
-                        <a:rPr lang="pt-BR" dirty="0" smtClean="0"/>
-                        <a:t>2</a:t>
-                      </a:r>
-                      <a:endParaRPr lang="pt-BR" dirty="0"/>
-                    </a:p>
-                  </a:txBody>
-                  <a:tcPr/>
-                </a:tc>
-                <a:tc>
-                  <a:txBody>
-                    <a:bodyPr/>
-                    <a:lstStyle/>
-                    <a:p>
-                      <a:r>
-                        <a:rPr lang="pt-BR" dirty="0" smtClean="0"/>
-                        <a:t>Entrar</a:t>
-                      </a:r>
-                      <a:endParaRPr lang="pt-BR" dirty="0"/>
-                    </a:p>
-                  </a:txBody>
-                  <a:tcPr/>
-                </a:tc>
-                <a:tc>
-                  <a:txBody>
-                    <a:bodyPr/>
-                    <a:lstStyle/>
-                    <a:p>
-                      <a:endParaRPr lang="pt-BR" dirty="0"/>
-                    </a:p>
-                  </a:txBody>
-                  <a:tcPr/>
-                </a:tc>
-                <a:tc>
-                  <a:txBody>
-                    <a:bodyPr/>
-                    <a:lstStyle/>
-                    <a:p>
-                      <a:r>
-                        <a:rPr lang="pt-BR" dirty="0" smtClean="0"/>
-                        <a:t>Botão</a:t>
-                      </a:r>
-                      <a:endParaRPr lang="pt-BR" dirty="0"/>
-                    </a:p>
-                  </a:txBody>
-                  <a:tcPr/>
-                </a:tc>
-                <a:tc>
-                  <a:txBody>
-                    <a:bodyPr/>
-                    <a:lstStyle/>
-                    <a:p>
-                      <a:r>
-                        <a:rPr lang="pt-BR" dirty="0" smtClean="0"/>
-                        <a:t>Valida/ Direciona para tela Home Professor</a:t>
-                      </a:r>
-                      <a:endParaRPr lang="pt-BR" dirty="0"/>
-                    </a:p>
-                  </a:txBody>
-                  <a:tcPr/>
-                </a:tc>
-              </a:tr>
-            </a:tbl>
-          </a:graphicData>
-        </a:graphic>
-      </p:graphicFrame>
-    </p:spTree>
-    <p:extLst>
-      <p:ext uri="{BB962C8B-B14F-4D97-AF65-F5344CB8AC3E}">
-        <p14:creationId xmlns:p14="http://schemas.microsoft.com/office/powerpoint/2010/main" val="857581726"/>
-      </p:ext>
-    </p:extLst>
-  </p:cSld>
-  <p:clrMapOvr>
-    <a:masterClrMapping/>
-  </p:clrMapOvr>
-</p:sld>
-</file>
-
-<file path=ppt/slides/slide40.xml><?xml version="1.0" encoding="utf-8"?>
+<file path=ppt/slides/slide41.xml><?xml version="1.0" encoding="utf-8"?>
 <p:sld xmlns:a="http://schemas.openxmlformats.org/drawingml/2006/main" xmlns:r="http://schemas.openxmlformats.org/officeDocument/2006/relationships" xmlns:p="http://schemas.openxmlformats.org/presentationml/2006/main">
   <p:cSld>
     <p:spTree>

</xml_diff>

<commit_message>
Restruturação do caso de uso textual
</commit_message>
<xml_diff>
--- a/DocumentacaoProjeto/Protótipo_Visual.pptx
+++ b/DocumentacaoProjeto/Protótipo_Visual.pptx
@@ -283,7 +283,7 @@
           <a:p>
             <a:fld id="{ED8D6B47-35E8-4B74-A8BC-163E56BA4F07}" type="datetimeFigureOut">
               <a:rPr lang="pt-BR" smtClean="0"/>
-              <a:t>01/05/2020</a:t>
+              <a:t>17/05/2020</a:t>
             </a:fld>
             <a:endParaRPr lang="pt-BR"/>
           </a:p>
@@ -453,7 +453,7 @@
           <a:p>
             <a:fld id="{ED8D6B47-35E8-4B74-A8BC-163E56BA4F07}" type="datetimeFigureOut">
               <a:rPr lang="pt-BR" smtClean="0"/>
-              <a:t>01/05/2020</a:t>
+              <a:t>17/05/2020</a:t>
             </a:fld>
             <a:endParaRPr lang="pt-BR"/>
           </a:p>
@@ -633,7 +633,7 @@
           <a:p>
             <a:fld id="{ED8D6B47-35E8-4B74-A8BC-163E56BA4F07}" type="datetimeFigureOut">
               <a:rPr lang="pt-BR" smtClean="0"/>
-              <a:t>01/05/2020</a:t>
+              <a:t>17/05/2020</a:t>
             </a:fld>
             <a:endParaRPr lang="pt-BR"/>
           </a:p>
@@ -803,7 +803,7 @@
           <a:p>
             <a:fld id="{ED8D6B47-35E8-4B74-A8BC-163E56BA4F07}" type="datetimeFigureOut">
               <a:rPr lang="pt-BR" smtClean="0"/>
-              <a:t>01/05/2020</a:t>
+              <a:t>17/05/2020</a:t>
             </a:fld>
             <a:endParaRPr lang="pt-BR"/>
           </a:p>
@@ -1049,7 +1049,7 @@
           <a:p>
             <a:fld id="{ED8D6B47-35E8-4B74-A8BC-163E56BA4F07}" type="datetimeFigureOut">
               <a:rPr lang="pt-BR" smtClean="0"/>
-              <a:t>01/05/2020</a:t>
+              <a:t>17/05/2020</a:t>
             </a:fld>
             <a:endParaRPr lang="pt-BR"/>
           </a:p>
@@ -1281,7 +1281,7 @@
           <a:p>
             <a:fld id="{ED8D6B47-35E8-4B74-A8BC-163E56BA4F07}" type="datetimeFigureOut">
               <a:rPr lang="pt-BR" smtClean="0"/>
-              <a:t>01/05/2020</a:t>
+              <a:t>17/05/2020</a:t>
             </a:fld>
             <a:endParaRPr lang="pt-BR"/>
           </a:p>
@@ -1648,7 +1648,7 @@
           <a:p>
             <a:fld id="{ED8D6B47-35E8-4B74-A8BC-163E56BA4F07}" type="datetimeFigureOut">
               <a:rPr lang="pt-BR" smtClean="0"/>
-              <a:t>01/05/2020</a:t>
+              <a:t>17/05/2020</a:t>
             </a:fld>
             <a:endParaRPr lang="pt-BR"/>
           </a:p>
@@ -1766,7 +1766,7 @@
           <a:p>
             <a:fld id="{ED8D6B47-35E8-4B74-A8BC-163E56BA4F07}" type="datetimeFigureOut">
               <a:rPr lang="pt-BR" smtClean="0"/>
-              <a:t>01/05/2020</a:t>
+              <a:t>17/05/2020</a:t>
             </a:fld>
             <a:endParaRPr lang="pt-BR"/>
           </a:p>
@@ -1861,7 +1861,7 @@
           <a:p>
             <a:fld id="{ED8D6B47-35E8-4B74-A8BC-163E56BA4F07}" type="datetimeFigureOut">
               <a:rPr lang="pt-BR" smtClean="0"/>
-              <a:t>01/05/2020</a:t>
+              <a:t>17/05/2020</a:t>
             </a:fld>
             <a:endParaRPr lang="pt-BR"/>
           </a:p>
@@ -2138,7 +2138,7 @@
           <a:p>
             <a:fld id="{ED8D6B47-35E8-4B74-A8BC-163E56BA4F07}" type="datetimeFigureOut">
               <a:rPr lang="pt-BR" smtClean="0"/>
-              <a:t>01/05/2020</a:t>
+              <a:t>17/05/2020</a:t>
             </a:fld>
             <a:endParaRPr lang="pt-BR"/>
           </a:p>
@@ -2391,7 +2391,7 @@
           <a:p>
             <a:fld id="{ED8D6B47-35E8-4B74-A8BC-163E56BA4F07}" type="datetimeFigureOut">
               <a:rPr lang="pt-BR" smtClean="0"/>
-              <a:t>01/05/2020</a:t>
+              <a:t>17/05/2020</a:t>
             </a:fld>
             <a:endParaRPr lang="pt-BR"/>
           </a:p>
@@ -2604,7 +2604,7 @@
           <a:p>
             <a:fld id="{ED8D6B47-35E8-4B74-A8BC-163E56BA4F07}" type="datetimeFigureOut">
               <a:rPr lang="pt-BR" smtClean="0"/>
-              <a:t>01/05/2020</a:t>
+              <a:t>17/05/2020</a:t>
             </a:fld>
             <a:endParaRPr lang="pt-BR"/>
           </a:p>
@@ -17628,6 +17628,66 @@
               </a:solidFill>
               <a:latin typeface="Bahnschrift" panose="020B0502040204020203" pitchFamily="34" charset="0"/>
             </a:endParaRPr>
+          </a:p>
+        </p:txBody>
+      </p:sp>
+      <p:sp>
+        <p:nvSpPr>
+          <p:cNvPr id="46" name="Retângulo 45"/>
+          <p:cNvSpPr/>
+          <p:nvPr/>
+        </p:nvSpPr>
+        <p:spPr>
+          <a:xfrm>
+            <a:off x="6011251" y="5509015"/>
+            <a:ext cx="1175160" cy="378657"/>
+          </a:xfrm>
+          <a:prstGeom prst="rect">
+            <a:avLst/>
+          </a:prstGeom>
+          <a:solidFill>
+            <a:srgbClr val="73D54A"/>
+          </a:solidFill>
+          <a:ln>
+            <a:solidFill>
+              <a:srgbClr val="73D54A"/>
+            </a:solidFill>
+          </a:ln>
+          <a:effectLst>
+            <a:outerShdw blurRad="50800" dist="38100" dir="2700000" algn="tl" rotWithShape="0">
+              <a:prstClr val="black">
+                <a:alpha val="40000"/>
+              </a:prstClr>
+            </a:outerShdw>
+            <a:softEdge rad="0"/>
+          </a:effectLst>
+        </p:spPr>
+        <p:style>
+          <a:lnRef idx="2">
+            <a:schemeClr val="accent1">
+              <a:shade val="50000"/>
+            </a:schemeClr>
+          </a:lnRef>
+          <a:fillRef idx="1">
+            <a:schemeClr val="accent1"/>
+          </a:fillRef>
+          <a:effectRef idx="0">
+            <a:schemeClr val="accent1"/>
+          </a:effectRef>
+          <a:fontRef idx="minor">
+            <a:schemeClr val="lt1"/>
+          </a:fontRef>
+        </p:style>
+        <p:txBody>
+          <a:bodyPr rtlCol="0" anchor="ctr"/>
+          <a:lstStyle/>
+          <a:p>
+            <a:pPr algn="ctr"/>
+            <a:r>
+              <a:rPr lang="pt-BR" dirty="0" smtClean="0"/>
+              <a:t>Salvar</a:t>
+            </a:r>
+            <a:endParaRPr lang="pt-BR" dirty="0"/>
           </a:p>
         </p:txBody>
       </p:sp>

</xml_diff>

<commit_message>
Atualização caso de uso textual e protótipo de tela
</commit_message>
<xml_diff>
--- a/DocumentacaoProjeto/Protótipo_Visual.pptx
+++ b/DocumentacaoProjeto/Protótipo_Visual.pptx
@@ -140,7 +140,18 @@
   </p:defaultTextStyle>
   <p:extLst>
     <p:ext uri="{EFAFB233-063F-42B5-8137-9DF3F51BA10A}">
-      <p15:sldGuideLst xmlns:p15="http://schemas.microsoft.com/office/powerpoint/2012/main" xmlns=""/>
+      <p15:sldGuideLst xmlns:p15="http://schemas.microsoft.com/office/powerpoint/2012/main">
+        <p15:guide id="1" orient="horz" pos="2160">
+          <p15:clr>
+            <a:srgbClr val="A4A3A4"/>
+          </p15:clr>
+        </p15:guide>
+        <p15:guide id="2" pos="3840">
+          <p15:clr>
+            <a:srgbClr val="A4A3A4"/>
+          </p15:clr>
+        </p15:guide>
+      </p15:sldGuideLst>
     </p:ext>
   </p:extLst>
 </p:presentation>
@@ -275,7 +286,7 @@
           <a:p>
             <a:fld id="{ED8D6B47-35E8-4B74-A8BC-163E56BA4F07}" type="datetimeFigureOut">
               <a:rPr lang="pt-BR" smtClean="0"/>
-              <a:t>24/06/2020</a:t>
+              <a:t>25/06/2020</a:t>
             </a:fld>
             <a:endParaRPr lang="pt-BR"/>
           </a:p>
@@ -443,7 +454,7 @@
           <a:p>
             <a:fld id="{ED8D6B47-35E8-4B74-A8BC-163E56BA4F07}" type="datetimeFigureOut">
               <a:rPr lang="pt-BR" smtClean="0"/>
-              <a:t>24/06/2020</a:t>
+              <a:t>25/06/2020</a:t>
             </a:fld>
             <a:endParaRPr lang="pt-BR"/>
           </a:p>
@@ -621,7 +632,7 @@
           <a:p>
             <a:fld id="{ED8D6B47-35E8-4B74-A8BC-163E56BA4F07}" type="datetimeFigureOut">
               <a:rPr lang="pt-BR" smtClean="0"/>
-              <a:t>24/06/2020</a:t>
+              <a:t>25/06/2020</a:t>
             </a:fld>
             <a:endParaRPr lang="pt-BR"/>
           </a:p>
@@ -789,7 +800,7 @@
           <a:p>
             <a:fld id="{ED8D6B47-35E8-4B74-A8BC-163E56BA4F07}" type="datetimeFigureOut">
               <a:rPr lang="pt-BR" smtClean="0"/>
-              <a:t>24/06/2020</a:t>
+              <a:t>25/06/2020</a:t>
             </a:fld>
             <a:endParaRPr lang="pt-BR"/>
           </a:p>
@@ -1034,7 +1045,7 @@
           <a:p>
             <a:fld id="{ED8D6B47-35E8-4B74-A8BC-163E56BA4F07}" type="datetimeFigureOut">
               <a:rPr lang="pt-BR" smtClean="0"/>
-              <a:t>24/06/2020</a:t>
+              <a:t>25/06/2020</a:t>
             </a:fld>
             <a:endParaRPr lang="pt-BR"/>
           </a:p>
@@ -1263,7 +1274,7 @@
           <a:p>
             <a:fld id="{ED8D6B47-35E8-4B74-A8BC-163E56BA4F07}" type="datetimeFigureOut">
               <a:rPr lang="pt-BR" smtClean="0"/>
-              <a:t>24/06/2020</a:t>
+              <a:t>25/06/2020</a:t>
             </a:fld>
             <a:endParaRPr lang="pt-BR"/>
           </a:p>
@@ -1627,7 +1638,7 @@
           <a:p>
             <a:fld id="{ED8D6B47-35E8-4B74-A8BC-163E56BA4F07}" type="datetimeFigureOut">
               <a:rPr lang="pt-BR" smtClean="0"/>
-              <a:t>24/06/2020</a:t>
+              <a:t>25/06/2020</a:t>
             </a:fld>
             <a:endParaRPr lang="pt-BR"/>
           </a:p>
@@ -1744,7 +1755,7 @@
           <a:p>
             <a:fld id="{ED8D6B47-35E8-4B74-A8BC-163E56BA4F07}" type="datetimeFigureOut">
               <a:rPr lang="pt-BR" smtClean="0"/>
-              <a:t>24/06/2020</a:t>
+              <a:t>25/06/2020</a:t>
             </a:fld>
             <a:endParaRPr lang="pt-BR"/>
           </a:p>
@@ -1839,7 +1850,7 @@
           <a:p>
             <a:fld id="{ED8D6B47-35E8-4B74-A8BC-163E56BA4F07}" type="datetimeFigureOut">
               <a:rPr lang="pt-BR" smtClean="0"/>
-              <a:t>24/06/2020</a:t>
+              <a:t>25/06/2020</a:t>
             </a:fld>
             <a:endParaRPr lang="pt-BR"/>
           </a:p>
@@ -2114,7 +2125,7 @@
           <a:p>
             <a:fld id="{ED8D6B47-35E8-4B74-A8BC-163E56BA4F07}" type="datetimeFigureOut">
               <a:rPr lang="pt-BR" smtClean="0"/>
-              <a:t>24/06/2020</a:t>
+              <a:t>25/06/2020</a:t>
             </a:fld>
             <a:endParaRPr lang="pt-BR"/>
           </a:p>
@@ -2366,7 +2377,7 @@
           <a:p>
             <a:fld id="{ED8D6B47-35E8-4B74-A8BC-163E56BA4F07}" type="datetimeFigureOut">
               <a:rPr lang="pt-BR" smtClean="0"/>
-              <a:t>24/06/2020</a:t>
+              <a:t>25/06/2020</a:t>
             </a:fld>
             <a:endParaRPr lang="pt-BR"/>
           </a:p>
@@ -2577,7 +2588,7 @@
           <a:p>
             <a:fld id="{ED8D6B47-35E8-4B74-A8BC-163E56BA4F07}" type="datetimeFigureOut">
               <a:rPr lang="pt-BR" smtClean="0"/>
-              <a:t>24/06/2020</a:t>
+              <a:t>25/06/2020</a:t>
             </a:fld>
             <a:endParaRPr lang="pt-BR"/>
           </a:p>
@@ -3520,35 +3531,35 @@
                 <a:gridCol w="574120">
                   <a:extLst>
                     <a:ext uri="{9D8B030D-6E8A-4147-A177-3AD203B41FA5}">
-                      <a16:colId xmlns:a16="http://schemas.microsoft.com/office/drawing/2014/main" xmlns="" val="20000"/>
+                      <a16:colId xmlns:a16="http://schemas.microsoft.com/office/drawing/2014/main" val="20000"/>
                     </a:ext>
                   </a:extLst>
                 </a:gridCol>
                 <a:gridCol w="1643427">
                   <a:extLst>
                     <a:ext uri="{9D8B030D-6E8A-4147-A177-3AD203B41FA5}">
-                      <a16:colId xmlns:a16="http://schemas.microsoft.com/office/drawing/2014/main" xmlns="" val="20001"/>
+                      <a16:colId xmlns:a16="http://schemas.microsoft.com/office/drawing/2014/main" val="20001"/>
                     </a:ext>
                   </a:extLst>
                 </a:gridCol>
                 <a:gridCol w="1756766">
                   <a:extLst>
                     <a:ext uri="{9D8B030D-6E8A-4147-A177-3AD203B41FA5}">
-                      <a16:colId xmlns:a16="http://schemas.microsoft.com/office/drawing/2014/main" xmlns="" val="20002"/>
+                      <a16:colId xmlns:a16="http://schemas.microsoft.com/office/drawing/2014/main" val="20002"/>
                     </a:ext>
                   </a:extLst>
                 </a:gridCol>
                 <a:gridCol w="2635823">
                   <a:extLst>
                     <a:ext uri="{9D8B030D-6E8A-4147-A177-3AD203B41FA5}">
-                      <a16:colId xmlns:a16="http://schemas.microsoft.com/office/drawing/2014/main" xmlns="" val="20003"/>
+                      <a16:colId xmlns:a16="http://schemas.microsoft.com/office/drawing/2014/main" val="20003"/>
                     </a:ext>
                   </a:extLst>
                 </a:gridCol>
                 <a:gridCol w="2635823">
                   <a:extLst>
                     <a:ext uri="{9D8B030D-6E8A-4147-A177-3AD203B41FA5}">
-                      <a16:colId xmlns:a16="http://schemas.microsoft.com/office/drawing/2014/main" xmlns="" val="20004"/>
+                      <a16:colId xmlns:a16="http://schemas.microsoft.com/office/drawing/2014/main" val="20004"/>
                     </a:ext>
                   </a:extLst>
                 </a:gridCol>
@@ -3618,7 +3629,7 @@
                 </a:tc>
                 <a:extLst>
                   <a:ext uri="{0D108BD9-81ED-4DB2-BD59-A6C34878D82A}">
-                    <a16:rowId xmlns:a16="http://schemas.microsoft.com/office/drawing/2014/main" xmlns="" val="10000"/>
+                    <a16:rowId xmlns:a16="http://schemas.microsoft.com/office/drawing/2014/main" val="10000"/>
                   </a:ext>
                 </a:extLst>
               </a:tr>
@@ -3687,7 +3698,7 @@
                 </a:tc>
                 <a:extLst>
                   <a:ext uri="{0D108BD9-81ED-4DB2-BD59-A6C34878D82A}">
-                    <a16:rowId xmlns:a16="http://schemas.microsoft.com/office/drawing/2014/main" xmlns="" val="10001"/>
+                    <a16:rowId xmlns:a16="http://schemas.microsoft.com/office/drawing/2014/main" val="10001"/>
                   </a:ext>
                 </a:extLst>
               </a:tr>
@@ -3781,7 +3792,7 @@
                 </a:tc>
                 <a:extLst>
                   <a:ext uri="{0D108BD9-81ED-4DB2-BD59-A6C34878D82A}">
-                    <a16:rowId xmlns:a16="http://schemas.microsoft.com/office/drawing/2014/main" xmlns="" val="10002"/>
+                    <a16:rowId xmlns:a16="http://schemas.microsoft.com/office/drawing/2014/main" val="10002"/>
                   </a:ext>
                 </a:extLst>
               </a:tr>
@@ -3870,7 +3881,7 @@
                 </a:tc>
                 <a:extLst>
                   <a:ext uri="{0D108BD9-81ED-4DB2-BD59-A6C34878D82A}">
-                    <a16:rowId xmlns:a16="http://schemas.microsoft.com/office/drawing/2014/main" xmlns="" val="10003"/>
+                    <a16:rowId xmlns:a16="http://schemas.microsoft.com/office/drawing/2014/main" val="10003"/>
                   </a:ext>
                 </a:extLst>
               </a:tr>
@@ -3959,7 +3970,7 @@
                 </a:tc>
                 <a:extLst>
                   <a:ext uri="{0D108BD9-81ED-4DB2-BD59-A6C34878D82A}">
-                    <a16:rowId xmlns:a16="http://schemas.microsoft.com/office/drawing/2014/main" xmlns="" val="10004"/>
+                    <a16:rowId xmlns:a16="http://schemas.microsoft.com/office/drawing/2014/main" val="10004"/>
                   </a:ext>
                 </a:extLst>
               </a:tr>
@@ -4045,7 +4056,7 @@
                 </a:tc>
                 <a:extLst>
                   <a:ext uri="{0D108BD9-81ED-4DB2-BD59-A6C34878D82A}">
-                    <a16:rowId xmlns:a16="http://schemas.microsoft.com/office/drawing/2014/main" xmlns="" val="10005"/>
+                    <a16:rowId xmlns:a16="http://schemas.microsoft.com/office/drawing/2014/main" val="10005"/>
                   </a:ext>
                 </a:extLst>
               </a:tr>
@@ -4128,7 +4139,7 @@
                 </a:tc>
                 <a:extLst>
                   <a:ext uri="{0D108BD9-81ED-4DB2-BD59-A6C34878D82A}">
-                    <a16:rowId xmlns:a16="http://schemas.microsoft.com/office/drawing/2014/main" xmlns="" val="10006"/>
+                    <a16:rowId xmlns:a16="http://schemas.microsoft.com/office/drawing/2014/main" val="10006"/>
                   </a:ext>
                 </a:extLst>
               </a:tr>
@@ -4987,35 +4998,35 @@
                 <a:gridCol w="490951">
                   <a:extLst>
                     <a:ext uri="{9D8B030D-6E8A-4147-A177-3AD203B41FA5}">
-                      <a16:colId xmlns:a16="http://schemas.microsoft.com/office/drawing/2014/main" xmlns="" val="20000"/>
+                      <a16:colId xmlns:a16="http://schemas.microsoft.com/office/drawing/2014/main" val="20000"/>
                     </a:ext>
                   </a:extLst>
                 </a:gridCol>
                 <a:gridCol w="1405354">
                   <a:extLst>
                     <a:ext uri="{9D8B030D-6E8A-4147-A177-3AD203B41FA5}">
-                      <a16:colId xmlns:a16="http://schemas.microsoft.com/office/drawing/2014/main" xmlns="" val="20001"/>
+                      <a16:colId xmlns:a16="http://schemas.microsoft.com/office/drawing/2014/main" val="20001"/>
                     </a:ext>
                   </a:extLst>
                 </a:gridCol>
                 <a:gridCol w="1502275">
                   <a:extLst>
                     <a:ext uri="{9D8B030D-6E8A-4147-A177-3AD203B41FA5}">
-                      <a16:colId xmlns:a16="http://schemas.microsoft.com/office/drawing/2014/main" xmlns="" val="20002"/>
+                      <a16:colId xmlns:a16="http://schemas.microsoft.com/office/drawing/2014/main" val="20002"/>
                     </a:ext>
                   </a:extLst>
                 </a:gridCol>
                 <a:gridCol w="2253988">
                   <a:extLst>
                     <a:ext uri="{9D8B030D-6E8A-4147-A177-3AD203B41FA5}">
-                      <a16:colId xmlns:a16="http://schemas.microsoft.com/office/drawing/2014/main" xmlns="" val="20003"/>
+                      <a16:colId xmlns:a16="http://schemas.microsoft.com/office/drawing/2014/main" val="20003"/>
                     </a:ext>
                   </a:extLst>
                 </a:gridCol>
                 <a:gridCol w="2253988">
                   <a:extLst>
                     <a:ext uri="{9D8B030D-6E8A-4147-A177-3AD203B41FA5}">
-                      <a16:colId xmlns:a16="http://schemas.microsoft.com/office/drawing/2014/main" xmlns="" val="20004"/>
+                      <a16:colId xmlns:a16="http://schemas.microsoft.com/office/drawing/2014/main" val="20004"/>
                     </a:ext>
                   </a:extLst>
                 </a:gridCol>
@@ -5085,7 +5096,7 @@
                 </a:tc>
                 <a:extLst>
                   <a:ext uri="{0D108BD9-81ED-4DB2-BD59-A6C34878D82A}">
-                    <a16:rowId xmlns:a16="http://schemas.microsoft.com/office/drawing/2014/main" xmlns="" val="10000"/>
+                    <a16:rowId xmlns:a16="http://schemas.microsoft.com/office/drawing/2014/main" val="10000"/>
                   </a:ext>
                 </a:extLst>
               </a:tr>
@@ -5159,7 +5170,7 @@
                 </a:tc>
                 <a:extLst>
                   <a:ext uri="{0D108BD9-81ED-4DB2-BD59-A6C34878D82A}">
-                    <a16:rowId xmlns:a16="http://schemas.microsoft.com/office/drawing/2014/main" xmlns="" val="10001"/>
+                    <a16:rowId xmlns:a16="http://schemas.microsoft.com/office/drawing/2014/main" val="10001"/>
                   </a:ext>
                 </a:extLst>
               </a:tr>
@@ -5233,7 +5244,7 @@
                 </a:tc>
                 <a:extLst>
                   <a:ext uri="{0D108BD9-81ED-4DB2-BD59-A6C34878D82A}">
-                    <a16:rowId xmlns:a16="http://schemas.microsoft.com/office/drawing/2014/main" xmlns="" val="10002"/>
+                    <a16:rowId xmlns:a16="http://schemas.microsoft.com/office/drawing/2014/main" val="10002"/>
                   </a:ext>
                 </a:extLst>
               </a:tr>
@@ -5302,7 +5313,7 @@
                 </a:tc>
                 <a:extLst>
                   <a:ext uri="{0D108BD9-81ED-4DB2-BD59-A6C34878D82A}">
-                    <a16:rowId xmlns:a16="http://schemas.microsoft.com/office/drawing/2014/main" xmlns="" val="10003"/>
+                    <a16:rowId xmlns:a16="http://schemas.microsoft.com/office/drawing/2014/main" val="10003"/>
                   </a:ext>
                 </a:extLst>
               </a:tr>
@@ -5376,7 +5387,7 @@
                 </a:tc>
                 <a:extLst>
                   <a:ext uri="{0D108BD9-81ED-4DB2-BD59-A6C34878D82A}">
-                    <a16:rowId xmlns:a16="http://schemas.microsoft.com/office/drawing/2014/main" xmlns="" val="10004"/>
+                    <a16:rowId xmlns:a16="http://schemas.microsoft.com/office/drawing/2014/main" val="10004"/>
                   </a:ext>
                 </a:extLst>
               </a:tr>
@@ -5462,7 +5473,7 @@
                 </a:tc>
                 <a:extLst>
                   <a:ext uri="{0D108BD9-81ED-4DB2-BD59-A6C34878D82A}">
-                    <a16:rowId xmlns:a16="http://schemas.microsoft.com/office/drawing/2014/main" xmlns="" val="10005"/>
+                    <a16:rowId xmlns:a16="http://schemas.microsoft.com/office/drawing/2014/main" val="10005"/>
                   </a:ext>
                 </a:extLst>
               </a:tr>
@@ -5548,7 +5559,7 @@
                 </a:tc>
                 <a:extLst>
                   <a:ext uri="{0D108BD9-81ED-4DB2-BD59-A6C34878D82A}">
-                    <a16:rowId xmlns:a16="http://schemas.microsoft.com/office/drawing/2014/main" xmlns="" val="10006"/>
+                    <a16:rowId xmlns:a16="http://schemas.microsoft.com/office/drawing/2014/main" val="10006"/>
                   </a:ext>
                 </a:extLst>
               </a:tr>
@@ -6626,35 +6637,35 @@
                 <a:gridCol w="546130">
                   <a:extLst>
                     <a:ext uri="{9D8B030D-6E8A-4147-A177-3AD203B41FA5}">
-                      <a16:colId xmlns:a16="http://schemas.microsoft.com/office/drawing/2014/main" xmlns="" val="20000"/>
+                      <a16:colId xmlns:a16="http://schemas.microsoft.com/office/drawing/2014/main" val="20000"/>
                     </a:ext>
                   </a:extLst>
                 </a:gridCol>
                 <a:gridCol w="1563306">
                   <a:extLst>
                     <a:ext uri="{9D8B030D-6E8A-4147-A177-3AD203B41FA5}">
-                      <a16:colId xmlns:a16="http://schemas.microsoft.com/office/drawing/2014/main" xmlns="" val="20001"/>
+                      <a16:colId xmlns:a16="http://schemas.microsoft.com/office/drawing/2014/main" val="20001"/>
                     </a:ext>
                   </a:extLst>
                 </a:gridCol>
                 <a:gridCol w="1671120">
                   <a:extLst>
                     <a:ext uri="{9D8B030D-6E8A-4147-A177-3AD203B41FA5}">
-                      <a16:colId xmlns:a16="http://schemas.microsoft.com/office/drawing/2014/main" xmlns="" val="20002"/>
+                      <a16:colId xmlns:a16="http://schemas.microsoft.com/office/drawing/2014/main" val="20002"/>
                     </a:ext>
                   </a:extLst>
                 </a:gridCol>
                 <a:gridCol w="2507320">
                   <a:extLst>
                     <a:ext uri="{9D8B030D-6E8A-4147-A177-3AD203B41FA5}">
-                      <a16:colId xmlns:a16="http://schemas.microsoft.com/office/drawing/2014/main" xmlns="" val="20003"/>
+                      <a16:colId xmlns:a16="http://schemas.microsoft.com/office/drawing/2014/main" val="20003"/>
                     </a:ext>
                   </a:extLst>
                 </a:gridCol>
                 <a:gridCol w="2507320">
                   <a:extLst>
                     <a:ext uri="{9D8B030D-6E8A-4147-A177-3AD203B41FA5}">
-                      <a16:colId xmlns:a16="http://schemas.microsoft.com/office/drawing/2014/main" xmlns="" val="20004"/>
+                      <a16:colId xmlns:a16="http://schemas.microsoft.com/office/drawing/2014/main" val="20004"/>
                     </a:ext>
                   </a:extLst>
                 </a:gridCol>
@@ -6724,7 +6735,7 @@
                 </a:tc>
                 <a:extLst>
                   <a:ext uri="{0D108BD9-81ED-4DB2-BD59-A6C34878D82A}">
-                    <a16:rowId xmlns:a16="http://schemas.microsoft.com/office/drawing/2014/main" xmlns="" val="10000"/>
+                    <a16:rowId xmlns:a16="http://schemas.microsoft.com/office/drawing/2014/main" val="10000"/>
                   </a:ext>
                 </a:extLst>
               </a:tr>
@@ -6794,7 +6805,7 @@
                 </a:tc>
                 <a:extLst>
                   <a:ext uri="{0D108BD9-81ED-4DB2-BD59-A6C34878D82A}">
-                    <a16:rowId xmlns:a16="http://schemas.microsoft.com/office/drawing/2014/main" xmlns="" val="10001"/>
+                    <a16:rowId xmlns:a16="http://schemas.microsoft.com/office/drawing/2014/main" val="10001"/>
                   </a:ext>
                 </a:extLst>
               </a:tr>
@@ -6863,7 +6874,7 @@
                 </a:tc>
                 <a:extLst>
                   <a:ext uri="{0D108BD9-81ED-4DB2-BD59-A6C34878D82A}">
-                    <a16:rowId xmlns:a16="http://schemas.microsoft.com/office/drawing/2014/main" xmlns="" val="10002"/>
+                    <a16:rowId xmlns:a16="http://schemas.microsoft.com/office/drawing/2014/main" val="10002"/>
                   </a:ext>
                 </a:extLst>
               </a:tr>
@@ -7912,35 +7923,35 @@
                 <a:gridCol w="559725">
                   <a:extLst>
                     <a:ext uri="{9D8B030D-6E8A-4147-A177-3AD203B41FA5}">
-                      <a16:colId xmlns:a16="http://schemas.microsoft.com/office/drawing/2014/main" xmlns="" val="20000"/>
+                      <a16:colId xmlns:a16="http://schemas.microsoft.com/office/drawing/2014/main" val="20000"/>
                     </a:ext>
                   </a:extLst>
                 </a:gridCol>
                 <a:gridCol w="1602222">
                   <a:extLst>
                     <a:ext uri="{9D8B030D-6E8A-4147-A177-3AD203B41FA5}">
-                      <a16:colId xmlns:a16="http://schemas.microsoft.com/office/drawing/2014/main" xmlns="" val="20001"/>
+                      <a16:colId xmlns:a16="http://schemas.microsoft.com/office/drawing/2014/main" val="20001"/>
                     </a:ext>
                   </a:extLst>
                 </a:gridCol>
                 <a:gridCol w="1712720">
                   <a:extLst>
                     <a:ext uri="{9D8B030D-6E8A-4147-A177-3AD203B41FA5}">
-                      <a16:colId xmlns:a16="http://schemas.microsoft.com/office/drawing/2014/main" xmlns="" val="20002"/>
+                      <a16:colId xmlns:a16="http://schemas.microsoft.com/office/drawing/2014/main" val="20002"/>
                     </a:ext>
                   </a:extLst>
                 </a:gridCol>
                 <a:gridCol w="2569736">
                   <a:extLst>
                     <a:ext uri="{9D8B030D-6E8A-4147-A177-3AD203B41FA5}">
-                      <a16:colId xmlns:a16="http://schemas.microsoft.com/office/drawing/2014/main" xmlns="" val="20003"/>
+                      <a16:colId xmlns:a16="http://schemas.microsoft.com/office/drawing/2014/main" val="20003"/>
                     </a:ext>
                   </a:extLst>
                 </a:gridCol>
                 <a:gridCol w="2569736">
                   <a:extLst>
                     <a:ext uri="{9D8B030D-6E8A-4147-A177-3AD203B41FA5}">
-                      <a16:colId xmlns:a16="http://schemas.microsoft.com/office/drawing/2014/main" xmlns="" val="20004"/>
+                      <a16:colId xmlns:a16="http://schemas.microsoft.com/office/drawing/2014/main" val="20004"/>
                     </a:ext>
                   </a:extLst>
                 </a:gridCol>
@@ -8010,7 +8021,7 @@
                 </a:tc>
                 <a:extLst>
                   <a:ext uri="{0D108BD9-81ED-4DB2-BD59-A6C34878D82A}">
-                    <a16:rowId xmlns:a16="http://schemas.microsoft.com/office/drawing/2014/main" xmlns="" val="10000"/>
+                    <a16:rowId xmlns:a16="http://schemas.microsoft.com/office/drawing/2014/main" val="10000"/>
                   </a:ext>
                 </a:extLst>
               </a:tr>
@@ -8079,7 +8090,7 @@
                 </a:tc>
                 <a:extLst>
                   <a:ext uri="{0D108BD9-81ED-4DB2-BD59-A6C34878D82A}">
-                    <a16:rowId xmlns:a16="http://schemas.microsoft.com/office/drawing/2014/main" xmlns="" val="10001"/>
+                    <a16:rowId xmlns:a16="http://schemas.microsoft.com/office/drawing/2014/main" val="10001"/>
                   </a:ext>
                 </a:extLst>
               </a:tr>
@@ -8168,7 +8179,7 @@
                 </a:tc>
                 <a:extLst>
                   <a:ext uri="{0D108BD9-81ED-4DB2-BD59-A6C34878D82A}">
-                    <a16:rowId xmlns:a16="http://schemas.microsoft.com/office/drawing/2014/main" xmlns="" val="10002"/>
+                    <a16:rowId xmlns:a16="http://schemas.microsoft.com/office/drawing/2014/main" val="10002"/>
                   </a:ext>
                 </a:extLst>
               </a:tr>
@@ -8257,7 +8268,7 @@
                 </a:tc>
                 <a:extLst>
                   <a:ext uri="{0D108BD9-81ED-4DB2-BD59-A6C34878D82A}">
-                    <a16:rowId xmlns:a16="http://schemas.microsoft.com/office/drawing/2014/main" xmlns="" val="10003"/>
+                    <a16:rowId xmlns:a16="http://schemas.microsoft.com/office/drawing/2014/main" val="10003"/>
                   </a:ext>
                 </a:extLst>
               </a:tr>
@@ -9601,35 +9612,35 @@
                 <a:gridCol w="490951">
                   <a:extLst>
                     <a:ext uri="{9D8B030D-6E8A-4147-A177-3AD203B41FA5}">
-                      <a16:colId xmlns:a16="http://schemas.microsoft.com/office/drawing/2014/main" xmlns="" val="20000"/>
+                      <a16:colId xmlns:a16="http://schemas.microsoft.com/office/drawing/2014/main" val="20000"/>
                     </a:ext>
                   </a:extLst>
                 </a:gridCol>
                 <a:gridCol w="1405354">
                   <a:extLst>
                     <a:ext uri="{9D8B030D-6E8A-4147-A177-3AD203B41FA5}">
-                      <a16:colId xmlns:a16="http://schemas.microsoft.com/office/drawing/2014/main" xmlns="" val="20001"/>
+                      <a16:colId xmlns:a16="http://schemas.microsoft.com/office/drawing/2014/main" val="20001"/>
                     </a:ext>
                   </a:extLst>
                 </a:gridCol>
                 <a:gridCol w="1502275">
                   <a:extLst>
                     <a:ext uri="{9D8B030D-6E8A-4147-A177-3AD203B41FA5}">
-                      <a16:colId xmlns:a16="http://schemas.microsoft.com/office/drawing/2014/main" xmlns="" val="20002"/>
+                      <a16:colId xmlns:a16="http://schemas.microsoft.com/office/drawing/2014/main" val="20002"/>
                     </a:ext>
                   </a:extLst>
                 </a:gridCol>
                 <a:gridCol w="2253988">
                   <a:extLst>
                     <a:ext uri="{9D8B030D-6E8A-4147-A177-3AD203B41FA5}">
-                      <a16:colId xmlns:a16="http://schemas.microsoft.com/office/drawing/2014/main" xmlns="" val="20003"/>
+                      <a16:colId xmlns:a16="http://schemas.microsoft.com/office/drawing/2014/main" val="20003"/>
                     </a:ext>
                   </a:extLst>
                 </a:gridCol>
                 <a:gridCol w="2253988">
                   <a:extLst>
                     <a:ext uri="{9D8B030D-6E8A-4147-A177-3AD203B41FA5}">
-                      <a16:colId xmlns:a16="http://schemas.microsoft.com/office/drawing/2014/main" xmlns="" val="20004"/>
+                      <a16:colId xmlns:a16="http://schemas.microsoft.com/office/drawing/2014/main" val="20004"/>
                     </a:ext>
                   </a:extLst>
                 </a:gridCol>
@@ -9699,7 +9710,7 @@
                 </a:tc>
                 <a:extLst>
                   <a:ext uri="{0D108BD9-81ED-4DB2-BD59-A6C34878D82A}">
-                    <a16:rowId xmlns:a16="http://schemas.microsoft.com/office/drawing/2014/main" xmlns="" val="10000"/>
+                    <a16:rowId xmlns:a16="http://schemas.microsoft.com/office/drawing/2014/main" val="10000"/>
                   </a:ext>
                 </a:extLst>
               </a:tr>
@@ -9773,7 +9784,7 @@
                 </a:tc>
                 <a:extLst>
                   <a:ext uri="{0D108BD9-81ED-4DB2-BD59-A6C34878D82A}">
-                    <a16:rowId xmlns:a16="http://schemas.microsoft.com/office/drawing/2014/main" xmlns="" val="10001"/>
+                    <a16:rowId xmlns:a16="http://schemas.microsoft.com/office/drawing/2014/main" val="10001"/>
                   </a:ext>
                 </a:extLst>
               </a:tr>
@@ -9842,7 +9853,7 @@
                 </a:tc>
                 <a:extLst>
                   <a:ext uri="{0D108BD9-81ED-4DB2-BD59-A6C34878D82A}">
-                    <a16:rowId xmlns:a16="http://schemas.microsoft.com/office/drawing/2014/main" xmlns="" val="10002"/>
+                    <a16:rowId xmlns:a16="http://schemas.microsoft.com/office/drawing/2014/main" val="10002"/>
                   </a:ext>
                 </a:extLst>
               </a:tr>
@@ -9911,7 +9922,7 @@
                 </a:tc>
                 <a:extLst>
                   <a:ext uri="{0D108BD9-81ED-4DB2-BD59-A6C34878D82A}">
-                    <a16:rowId xmlns:a16="http://schemas.microsoft.com/office/drawing/2014/main" xmlns="" val="10003"/>
+                    <a16:rowId xmlns:a16="http://schemas.microsoft.com/office/drawing/2014/main" val="10003"/>
                   </a:ext>
                 </a:extLst>
               </a:tr>
@@ -11243,7 +11254,7 @@
                 </a:solidFill>
                 <a:latin typeface="Bahnschrift" panose="020B0502040204020203" pitchFamily="34" charset="0"/>
               </a:rPr>
-              <a:t>Descrição</a:t>
+              <a:t>Pergunta</a:t>
             </a:r>
           </a:p>
         </p:txBody>
@@ -11375,7 +11386,7 @@
                 </a:solidFill>
                 <a:latin typeface="Bahnschrift" panose="020B0502040204020203" pitchFamily="34" charset="0"/>
               </a:rPr>
-              <a:t>Cadastro de Pergunta</a:t>
+              <a:t>Cadastro de pergunta</a:t>
             </a:r>
           </a:p>
         </p:txBody>
@@ -11755,35 +11766,35 @@
                 <a:gridCol w="490951">
                   <a:extLst>
                     <a:ext uri="{9D8B030D-6E8A-4147-A177-3AD203B41FA5}">
-                      <a16:colId xmlns:a16="http://schemas.microsoft.com/office/drawing/2014/main" xmlns="" val="20000"/>
+                      <a16:colId xmlns:a16="http://schemas.microsoft.com/office/drawing/2014/main" val="20000"/>
                     </a:ext>
                   </a:extLst>
                 </a:gridCol>
                 <a:gridCol w="1405354">
                   <a:extLst>
                     <a:ext uri="{9D8B030D-6E8A-4147-A177-3AD203B41FA5}">
-                      <a16:colId xmlns:a16="http://schemas.microsoft.com/office/drawing/2014/main" xmlns="" val="20001"/>
+                      <a16:colId xmlns:a16="http://schemas.microsoft.com/office/drawing/2014/main" val="20001"/>
                     </a:ext>
                   </a:extLst>
                 </a:gridCol>
                 <a:gridCol w="1502275">
                   <a:extLst>
                     <a:ext uri="{9D8B030D-6E8A-4147-A177-3AD203B41FA5}">
-                      <a16:colId xmlns:a16="http://schemas.microsoft.com/office/drawing/2014/main" xmlns="" val="20002"/>
+                      <a16:colId xmlns:a16="http://schemas.microsoft.com/office/drawing/2014/main" val="20002"/>
                     </a:ext>
                   </a:extLst>
                 </a:gridCol>
                 <a:gridCol w="2253988">
                   <a:extLst>
                     <a:ext uri="{9D8B030D-6E8A-4147-A177-3AD203B41FA5}">
-                      <a16:colId xmlns:a16="http://schemas.microsoft.com/office/drawing/2014/main" xmlns="" val="20003"/>
+                      <a16:colId xmlns:a16="http://schemas.microsoft.com/office/drawing/2014/main" val="20003"/>
                     </a:ext>
                   </a:extLst>
                 </a:gridCol>
                 <a:gridCol w="2253988">
                   <a:extLst>
                     <a:ext uri="{9D8B030D-6E8A-4147-A177-3AD203B41FA5}">
-                      <a16:colId xmlns:a16="http://schemas.microsoft.com/office/drawing/2014/main" xmlns="" val="20004"/>
+                      <a16:colId xmlns:a16="http://schemas.microsoft.com/office/drawing/2014/main" val="20004"/>
                     </a:ext>
                   </a:extLst>
                 </a:gridCol>
@@ -11853,7 +11864,7 @@
                 </a:tc>
                 <a:extLst>
                   <a:ext uri="{0D108BD9-81ED-4DB2-BD59-A6C34878D82A}">
-                    <a16:rowId xmlns:a16="http://schemas.microsoft.com/office/drawing/2014/main" xmlns="" val="10000"/>
+                    <a16:rowId xmlns:a16="http://schemas.microsoft.com/office/drawing/2014/main" val="10000"/>
                   </a:ext>
                 </a:extLst>
               </a:tr>
@@ -11935,7 +11946,7 @@
                 </a:tc>
                 <a:extLst>
                   <a:ext uri="{0D108BD9-81ED-4DB2-BD59-A6C34878D82A}">
-                    <a16:rowId xmlns:a16="http://schemas.microsoft.com/office/drawing/2014/main" xmlns="" val="10001"/>
+                    <a16:rowId xmlns:a16="http://schemas.microsoft.com/office/drawing/2014/main" val="10001"/>
                   </a:ext>
                 </a:extLst>
               </a:tr>
@@ -12034,7 +12045,7 @@
                 </a:tc>
                 <a:extLst>
                   <a:ext uri="{0D108BD9-81ED-4DB2-BD59-A6C34878D82A}">
-                    <a16:rowId xmlns:a16="http://schemas.microsoft.com/office/drawing/2014/main" xmlns="" val="10002"/>
+                    <a16:rowId xmlns:a16="http://schemas.microsoft.com/office/drawing/2014/main" val="10002"/>
                   </a:ext>
                 </a:extLst>
               </a:tr>
@@ -12125,35 +12136,35 @@
                 <a:gridCol w="536534">
                   <a:extLst>
                     <a:ext uri="{9D8B030D-6E8A-4147-A177-3AD203B41FA5}">
-                      <a16:colId xmlns:a16="http://schemas.microsoft.com/office/drawing/2014/main" xmlns="" val="20000"/>
+                      <a16:colId xmlns:a16="http://schemas.microsoft.com/office/drawing/2014/main" val="20000"/>
                     </a:ext>
                   </a:extLst>
                 </a:gridCol>
                 <a:gridCol w="1535836">
                   <a:extLst>
                     <a:ext uri="{9D8B030D-6E8A-4147-A177-3AD203B41FA5}">
-                      <a16:colId xmlns:a16="http://schemas.microsoft.com/office/drawing/2014/main" xmlns="" val="20001"/>
+                      <a16:colId xmlns:a16="http://schemas.microsoft.com/office/drawing/2014/main" val="20001"/>
                     </a:ext>
                   </a:extLst>
                 </a:gridCol>
                 <a:gridCol w="1641756">
                   <a:extLst>
                     <a:ext uri="{9D8B030D-6E8A-4147-A177-3AD203B41FA5}">
-                      <a16:colId xmlns:a16="http://schemas.microsoft.com/office/drawing/2014/main" xmlns="" val="20002"/>
+                      <a16:colId xmlns:a16="http://schemas.microsoft.com/office/drawing/2014/main" val="20002"/>
                     </a:ext>
                   </a:extLst>
                 </a:gridCol>
                 <a:gridCol w="2463263">
                   <a:extLst>
                     <a:ext uri="{9D8B030D-6E8A-4147-A177-3AD203B41FA5}">
-                      <a16:colId xmlns:a16="http://schemas.microsoft.com/office/drawing/2014/main" xmlns="" val="20003"/>
+                      <a16:colId xmlns:a16="http://schemas.microsoft.com/office/drawing/2014/main" val="20003"/>
                     </a:ext>
                   </a:extLst>
                 </a:gridCol>
                 <a:gridCol w="2463263">
                   <a:extLst>
                     <a:ext uri="{9D8B030D-6E8A-4147-A177-3AD203B41FA5}">
-                      <a16:colId xmlns:a16="http://schemas.microsoft.com/office/drawing/2014/main" xmlns="" val="20004"/>
+                      <a16:colId xmlns:a16="http://schemas.microsoft.com/office/drawing/2014/main" val="20004"/>
                     </a:ext>
                   </a:extLst>
                 </a:gridCol>
@@ -12223,7 +12234,7 @@
                 </a:tc>
                 <a:extLst>
                   <a:ext uri="{0D108BD9-81ED-4DB2-BD59-A6C34878D82A}">
-                    <a16:rowId xmlns:a16="http://schemas.microsoft.com/office/drawing/2014/main" xmlns="" val="10000"/>
+                    <a16:rowId xmlns:a16="http://schemas.microsoft.com/office/drawing/2014/main" val="10000"/>
                   </a:ext>
                 </a:extLst>
               </a:tr>
@@ -12293,7 +12304,7 @@
                 </a:tc>
                 <a:extLst>
                   <a:ext uri="{0D108BD9-81ED-4DB2-BD59-A6C34878D82A}">
-                    <a16:rowId xmlns:a16="http://schemas.microsoft.com/office/drawing/2014/main" xmlns="" val="10001"/>
+                    <a16:rowId xmlns:a16="http://schemas.microsoft.com/office/drawing/2014/main" val="10001"/>
                   </a:ext>
                 </a:extLst>
               </a:tr>
@@ -12363,7 +12374,7 @@
                 </a:tc>
                 <a:extLst>
                   <a:ext uri="{0D108BD9-81ED-4DB2-BD59-A6C34878D82A}">
-                    <a16:rowId xmlns:a16="http://schemas.microsoft.com/office/drawing/2014/main" xmlns="" val="10002"/>
+                    <a16:rowId xmlns:a16="http://schemas.microsoft.com/office/drawing/2014/main" val="10002"/>
                   </a:ext>
                 </a:extLst>
               </a:tr>
@@ -12438,7 +12449,7 @@
                 </a:tc>
                 <a:extLst>
                   <a:ext uri="{0D108BD9-81ED-4DB2-BD59-A6C34878D82A}">
-                    <a16:rowId xmlns:a16="http://schemas.microsoft.com/office/drawing/2014/main" xmlns="" val="10003"/>
+                    <a16:rowId xmlns:a16="http://schemas.microsoft.com/office/drawing/2014/main" val="10003"/>
                   </a:ext>
                 </a:extLst>
               </a:tr>
@@ -12513,7 +12524,7 @@
                 </a:tc>
                 <a:extLst>
                   <a:ext uri="{0D108BD9-81ED-4DB2-BD59-A6C34878D82A}">
-                    <a16:rowId xmlns:a16="http://schemas.microsoft.com/office/drawing/2014/main" xmlns="" val="10004"/>
+                    <a16:rowId xmlns:a16="http://schemas.microsoft.com/office/drawing/2014/main" val="10004"/>
                   </a:ext>
                 </a:extLst>
               </a:tr>
@@ -12583,7 +12594,7 @@
                 </a:tc>
                 <a:extLst>
                   <a:ext uri="{0D108BD9-81ED-4DB2-BD59-A6C34878D82A}">
-                    <a16:rowId xmlns:a16="http://schemas.microsoft.com/office/drawing/2014/main" xmlns="" val="10005"/>
+                    <a16:rowId xmlns:a16="http://schemas.microsoft.com/office/drawing/2014/main" val="10005"/>
                   </a:ext>
                 </a:extLst>
               </a:tr>
@@ -12657,7 +12668,7 @@
                 </a:tc>
                 <a:extLst>
                   <a:ext uri="{0D108BD9-81ED-4DB2-BD59-A6C34878D82A}">
-                    <a16:rowId xmlns:a16="http://schemas.microsoft.com/office/drawing/2014/main" xmlns="" val="10006"/>
+                    <a16:rowId xmlns:a16="http://schemas.microsoft.com/office/drawing/2014/main" val="10006"/>
                   </a:ext>
                 </a:extLst>
               </a:tr>
@@ -13860,35 +13871,35 @@
                 <a:gridCol w="631698">
                   <a:extLst>
                     <a:ext uri="{9D8B030D-6E8A-4147-A177-3AD203B41FA5}">
-                      <a16:colId xmlns:a16="http://schemas.microsoft.com/office/drawing/2014/main" xmlns="" val="20000"/>
+                      <a16:colId xmlns:a16="http://schemas.microsoft.com/office/drawing/2014/main" val="20000"/>
                     </a:ext>
                   </a:extLst>
                 </a:gridCol>
                 <a:gridCol w="1808247">
                   <a:extLst>
                     <a:ext uri="{9D8B030D-6E8A-4147-A177-3AD203B41FA5}">
-                      <a16:colId xmlns:a16="http://schemas.microsoft.com/office/drawing/2014/main" xmlns="" val="20001"/>
+                      <a16:colId xmlns:a16="http://schemas.microsoft.com/office/drawing/2014/main" val="20001"/>
                     </a:ext>
                   </a:extLst>
                 </a:gridCol>
                 <a:gridCol w="1932953">
                   <a:extLst>
                     <a:ext uri="{9D8B030D-6E8A-4147-A177-3AD203B41FA5}">
-                      <a16:colId xmlns:a16="http://schemas.microsoft.com/office/drawing/2014/main" xmlns="" val="20002"/>
+                      <a16:colId xmlns:a16="http://schemas.microsoft.com/office/drawing/2014/main" val="20002"/>
                     </a:ext>
                   </a:extLst>
                 </a:gridCol>
                 <a:gridCol w="2900170">
                   <a:extLst>
                     <a:ext uri="{9D8B030D-6E8A-4147-A177-3AD203B41FA5}">
-                      <a16:colId xmlns:a16="http://schemas.microsoft.com/office/drawing/2014/main" xmlns="" val="20003"/>
+                      <a16:colId xmlns:a16="http://schemas.microsoft.com/office/drawing/2014/main" val="20003"/>
                     </a:ext>
                   </a:extLst>
                 </a:gridCol>
                 <a:gridCol w="2900170">
                   <a:extLst>
                     <a:ext uri="{9D8B030D-6E8A-4147-A177-3AD203B41FA5}">
-                      <a16:colId xmlns:a16="http://schemas.microsoft.com/office/drawing/2014/main" xmlns="" val="20004"/>
+                      <a16:colId xmlns:a16="http://schemas.microsoft.com/office/drawing/2014/main" val="20004"/>
                     </a:ext>
                   </a:extLst>
                 </a:gridCol>
@@ -13958,7 +13969,7 @@
                 </a:tc>
                 <a:extLst>
                   <a:ext uri="{0D108BD9-81ED-4DB2-BD59-A6C34878D82A}">
-                    <a16:rowId xmlns:a16="http://schemas.microsoft.com/office/drawing/2014/main" xmlns="" val="10000"/>
+                    <a16:rowId xmlns:a16="http://schemas.microsoft.com/office/drawing/2014/main" val="10000"/>
                   </a:ext>
                 </a:extLst>
               </a:tr>
@@ -14024,7 +14035,7 @@
                 </a:tc>
                 <a:extLst>
                   <a:ext uri="{0D108BD9-81ED-4DB2-BD59-A6C34878D82A}">
-                    <a16:rowId xmlns:a16="http://schemas.microsoft.com/office/drawing/2014/main" xmlns="" val="10001"/>
+                    <a16:rowId xmlns:a16="http://schemas.microsoft.com/office/drawing/2014/main" val="10001"/>
                   </a:ext>
                 </a:extLst>
               </a:tr>
@@ -14095,7 +14106,7 @@
                 </a:tc>
                 <a:extLst>
                   <a:ext uri="{0D108BD9-81ED-4DB2-BD59-A6C34878D82A}">
-                    <a16:rowId xmlns:a16="http://schemas.microsoft.com/office/drawing/2014/main" xmlns="" val="10002"/>
+                    <a16:rowId xmlns:a16="http://schemas.microsoft.com/office/drawing/2014/main" val="10002"/>
                   </a:ext>
                 </a:extLst>
               </a:tr>
@@ -14161,7 +14172,7 @@
                 </a:tc>
                 <a:extLst>
                   <a:ext uri="{0D108BD9-81ED-4DB2-BD59-A6C34878D82A}">
-                    <a16:rowId xmlns:a16="http://schemas.microsoft.com/office/drawing/2014/main" xmlns="" val="10003"/>
+                    <a16:rowId xmlns:a16="http://schemas.microsoft.com/office/drawing/2014/main" val="10003"/>
                   </a:ext>
                 </a:extLst>
               </a:tr>
@@ -17992,35 +18003,35 @@
                 <a:gridCol w="631698">
                   <a:extLst>
                     <a:ext uri="{9D8B030D-6E8A-4147-A177-3AD203B41FA5}">
-                      <a16:colId xmlns:a16="http://schemas.microsoft.com/office/drawing/2014/main" xmlns="" val="20000"/>
+                      <a16:colId xmlns:a16="http://schemas.microsoft.com/office/drawing/2014/main" val="20000"/>
                     </a:ext>
                   </a:extLst>
                 </a:gridCol>
                 <a:gridCol w="1808247">
                   <a:extLst>
                     <a:ext uri="{9D8B030D-6E8A-4147-A177-3AD203B41FA5}">
-                      <a16:colId xmlns:a16="http://schemas.microsoft.com/office/drawing/2014/main" xmlns="" val="20001"/>
+                      <a16:colId xmlns:a16="http://schemas.microsoft.com/office/drawing/2014/main" val="20001"/>
                     </a:ext>
                   </a:extLst>
                 </a:gridCol>
                 <a:gridCol w="1932953">
                   <a:extLst>
                     <a:ext uri="{9D8B030D-6E8A-4147-A177-3AD203B41FA5}">
-                      <a16:colId xmlns:a16="http://schemas.microsoft.com/office/drawing/2014/main" xmlns="" val="20002"/>
+                      <a16:colId xmlns:a16="http://schemas.microsoft.com/office/drawing/2014/main" val="20002"/>
                     </a:ext>
                   </a:extLst>
                 </a:gridCol>
                 <a:gridCol w="2900170">
                   <a:extLst>
                     <a:ext uri="{9D8B030D-6E8A-4147-A177-3AD203B41FA5}">
-                      <a16:colId xmlns:a16="http://schemas.microsoft.com/office/drawing/2014/main" xmlns="" val="20003"/>
+                      <a16:colId xmlns:a16="http://schemas.microsoft.com/office/drawing/2014/main" val="20003"/>
                     </a:ext>
                   </a:extLst>
                 </a:gridCol>
                 <a:gridCol w="2900170">
                   <a:extLst>
                     <a:ext uri="{9D8B030D-6E8A-4147-A177-3AD203B41FA5}">
-                      <a16:colId xmlns:a16="http://schemas.microsoft.com/office/drawing/2014/main" xmlns="" val="20004"/>
+                      <a16:colId xmlns:a16="http://schemas.microsoft.com/office/drawing/2014/main" val="20004"/>
                     </a:ext>
                   </a:extLst>
                 </a:gridCol>
@@ -18090,7 +18101,7 @@
                 </a:tc>
                 <a:extLst>
                   <a:ext uri="{0D108BD9-81ED-4DB2-BD59-A6C34878D82A}">
-                    <a16:rowId xmlns:a16="http://schemas.microsoft.com/office/drawing/2014/main" xmlns="" val="10000"/>
+                    <a16:rowId xmlns:a16="http://schemas.microsoft.com/office/drawing/2014/main" val="10000"/>
                   </a:ext>
                 </a:extLst>
               </a:tr>
@@ -18156,7 +18167,7 @@
                 </a:tc>
                 <a:extLst>
                   <a:ext uri="{0D108BD9-81ED-4DB2-BD59-A6C34878D82A}">
-                    <a16:rowId xmlns:a16="http://schemas.microsoft.com/office/drawing/2014/main" xmlns="" val="10001"/>
+                    <a16:rowId xmlns:a16="http://schemas.microsoft.com/office/drawing/2014/main" val="10001"/>
                   </a:ext>
                 </a:extLst>
               </a:tr>
@@ -18227,7 +18238,7 @@
                 </a:tc>
                 <a:extLst>
                   <a:ext uri="{0D108BD9-81ED-4DB2-BD59-A6C34878D82A}">
-                    <a16:rowId xmlns:a16="http://schemas.microsoft.com/office/drawing/2014/main" xmlns="" val="10002"/>
+                    <a16:rowId xmlns:a16="http://schemas.microsoft.com/office/drawing/2014/main" val="10002"/>
                   </a:ext>
                 </a:extLst>
               </a:tr>
@@ -18293,7 +18304,7 @@
                 </a:tc>
                 <a:extLst>
                   <a:ext uri="{0D108BD9-81ED-4DB2-BD59-A6C34878D82A}">
-                    <a16:rowId xmlns:a16="http://schemas.microsoft.com/office/drawing/2014/main" xmlns="" val="10003"/>
+                    <a16:rowId xmlns:a16="http://schemas.microsoft.com/office/drawing/2014/main" val="10003"/>
                   </a:ext>
                 </a:extLst>
               </a:tr>
@@ -19426,35 +19437,35 @@
                 <a:gridCol w="631698">
                   <a:extLst>
                     <a:ext uri="{9D8B030D-6E8A-4147-A177-3AD203B41FA5}">
-                      <a16:colId xmlns:a16="http://schemas.microsoft.com/office/drawing/2014/main" xmlns="" val="20000"/>
+                      <a16:colId xmlns:a16="http://schemas.microsoft.com/office/drawing/2014/main" val="20000"/>
                     </a:ext>
                   </a:extLst>
                 </a:gridCol>
                 <a:gridCol w="1808247">
                   <a:extLst>
                     <a:ext uri="{9D8B030D-6E8A-4147-A177-3AD203B41FA5}">
-                      <a16:colId xmlns:a16="http://schemas.microsoft.com/office/drawing/2014/main" xmlns="" val="20001"/>
+                      <a16:colId xmlns:a16="http://schemas.microsoft.com/office/drawing/2014/main" val="20001"/>
                     </a:ext>
                   </a:extLst>
                 </a:gridCol>
                 <a:gridCol w="1932953">
                   <a:extLst>
                     <a:ext uri="{9D8B030D-6E8A-4147-A177-3AD203B41FA5}">
-                      <a16:colId xmlns:a16="http://schemas.microsoft.com/office/drawing/2014/main" xmlns="" val="20002"/>
+                      <a16:colId xmlns:a16="http://schemas.microsoft.com/office/drawing/2014/main" val="20002"/>
                     </a:ext>
                   </a:extLst>
                 </a:gridCol>
                 <a:gridCol w="2900170">
                   <a:extLst>
                     <a:ext uri="{9D8B030D-6E8A-4147-A177-3AD203B41FA5}">
-                      <a16:colId xmlns:a16="http://schemas.microsoft.com/office/drawing/2014/main" xmlns="" val="20003"/>
+                      <a16:colId xmlns:a16="http://schemas.microsoft.com/office/drawing/2014/main" val="20003"/>
                     </a:ext>
                   </a:extLst>
                 </a:gridCol>
                 <a:gridCol w="2900170">
                   <a:extLst>
                     <a:ext uri="{9D8B030D-6E8A-4147-A177-3AD203B41FA5}">
-                      <a16:colId xmlns:a16="http://schemas.microsoft.com/office/drawing/2014/main" xmlns="" val="20004"/>
+                      <a16:colId xmlns:a16="http://schemas.microsoft.com/office/drawing/2014/main" val="20004"/>
                     </a:ext>
                   </a:extLst>
                 </a:gridCol>
@@ -19524,7 +19535,7 @@
                 </a:tc>
                 <a:extLst>
                   <a:ext uri="{0D108BD9-81ED-4DB2-BD59-A6C34878D82A}">
-                    <a16:rowId xmlns:a16="http://schemas.microsoft.com/office/drawing/2014/main" xmlns="" val="10000"/>
+                    <a16:rowId xmlns:a16="http://schemas.microsoft.com/office/drawing/2014/main" val="10000"/>
                   </a:ext>
                 </a:extLst>
               </a:tr>
@@ -19590,7 +19601,7 @@
                 </a:tc>
                 <a:extLst>
                   <a:ext uri="{0D108BD9-81ED-4DB2-BD59-A6C34878D82A}">
-                    <a16:rowId xmlns:a16="http://schemas.microsoft.com/office/drawing/2014/main" xmlns="" val="10001"/>
+                    <a16:rowId xmlns:a16="http://schemas.microsoft.com/office/drawing/2014/main" val="10001"/>
                   </a:ext>
                 </a:extLst>
               </a:tr>
@@ -19661,7 +19672,7 @@
                 </a:tc>
                 <a:extLst>
                   <a:ext uri="{0D108BD9-81ED-4DB2-BD59-A6C34878D82A}">
-                    <a16:rowId xmlns:a16="http://schemas.microsoft.com/office/drawing/2014/main" xmlns="" val="10002"/>
+                    <a16:rowId xmlns:a16="http://schemas.microsoft.com/office/drawing/2014/main" val="10002"/>
                   </a:ext>
                 </a:extLst>
               </a:tr>
@@ -19727,7 +19738,7 @@
                 </a:tc>
                 <a:extLst>
                   <a:ext uri="{0D108BD9-81ED-4DB2-BD59-A6C34878D82A}">
-                    <a16:rowId xmlns:a16="http://schemas.microsoft.com/office/drawing/2014/main" xmlns="" val="10003"/>
+                    <a16:rowId xmlns:a16="http://schemas.microsoft.com/office/drawing/2014/main" val="10003"/>
                   </a:ext>
                 </a:extLst>
               </a:tr>
@@ -21481,35 +21492,35 @@
                 <a:gridCol w="586838">
                   <a:extLst>
                     <a:ext uri="{9D8B030D-6E8A-4147-A177-3AD203B41FA5}">
-                      <a16:colId xmlns:a16="http://schemas.microsoft.com/office/drawing/2014/main" xmlns="" val="20000"/>
+                      <a16:colId xmlns:a16="http://schemas.microsoft.com/office/drawing/2014/main" val="20000"/>
                     </a:ext>
                   </a:extLst>
                 </a:gridCol>
                 <a:gridCol w="1679832">
                   <a:extLst>
                     <a:ext uri="{9D8B030D-6E8A-4147-A177-3AD203B41FA5}">
-                      <a16:colId xmlns:a16="http://schemas.microsoft.com/office/drawing/2014/main" xmlns="" val="20001"/>
+                      <a16:colId xmlns:a16="http://schemas.microsoft.com/office/drawing/2014/main" val="20001"/>
                     </a:ext>
                   </a:extLst>
                 </a:gridCol>
                 <a:gridCol w="2090660">
                   <a:extLst>
                     <a:ext uri="{9D8B030D-6E8A-4147-A177-3AD203B41FA5}">
-                      <a16:colId xmlns:a16="http://schemas.microsoft.com/office/drawing/2014/main" xmlns="" val="20002"/>
+                      <a16:colId xmlns:a16="http://schemas.microsoft.com/office/drawing/2014/main" val="20002"/>
                     </a:ext>
                   </a:extLst>
                 </a:gridCol>
                 <a:gridCol w="2209822">
                   <a:extLst>
                     <a:ext uri="{9D8B030D-6E8A-4147-A177-3AD203B41FA5}">
-                      <a16:colId xmlns:a16="http://schemas.microsoft.com/office/drawing/2014/main" xmlns="" val="20003"/>
+                      <a16:colId xmlns:a16="http://schemas.microsoft.com/office/drawing/2014/main" val="20003"/>
                     </a:ext>
                   </a:extLst>
                 </a:gridCol>
                 <a:gridCol w="2588654">
                   <a:extLst>
                     <a:ext uri="{9D8B030D-6E8A-4147-A177-3AD203B41FA5}">
-                      <a16:colId xmlns:a16="http://schemas.microsoft.com/office/drawing/2014/main" xmlns="" val="20004"/>
+                      <a16:colId xmlns:a16="http://schemas.microsoft.com/office/drawing/2014/main" val="20004"/>
                     </a:ext>
                   </a:extLst>
                 </a:gridCol>
@@ -21579,7 +21590,7 @@
                 </a:tc>
                 <a:extLst>
                   <a:ext uri="{0D108BD9-81ED-4DB2-BD59-A6C34878D82A}">
-                    <a16:rowId xmlns:a16="http://schemas.microsoft.com/office/drawing/2014/main" xmlns="" val="10000"/>
+                    <a16:rowId xmlns:a16="http://schemas.microsoft.com/office/drawing/2014/main" val="10000"/>
                   </a:ext>
                 </a:extLst>
               </a:tr>
@@ -21648,7 +21659,7 @@
                 </a:tc>
                 <a:extLst>
                   <a:ext uri="{0D108BD9-81ED-4DB2-BD59-A6C34878D82A}">
-                    <a16:rowId xmlns:a16="http://schemas.microsoft.com/office/drawing/2014/main" xmlns="" val="10001"/>
+                    <a16:rowId xmlns:a16="http://schemas.microsoft.com/office/drawing/2014/main" val="10001"/>
                   </a:ext>
                 </a:extLst>
               </a:tr>
@@ -21737,7 +21748,7 @@
                 </a:tc>
                 <a:extLst>
                   <a:ext uri="{0D108BD9-81ED-4DB2-BD59-A6C34878D82A}">
-                    <a16:rowId xmlns:a16="http://schemas.microsoft.com/office/drawing/2014/main" xmlns="" val="10002"/>
+                    <a16:rowId xmlns:a16="http://schemas.microsoft.com/office/drawing/2014/main" val="10002"/>
                   </a:ext>
                 </a:extLst>
               </a:tr>
@@ -21826,7 +21837,7 @@
                 </a:tc>
                 <a:extLst>
                   <a:ext uri="{0D108BD9-81ED-4DB2-BD59-A6C34878D82A}">
-                    <a16:rowId xmlns:a16="http://schemas.microsoft.com/office/drawing/2014/main" xmlns="" val="10003"/>
+                    <a16:rowId xmlns:a16="http://schemas.microsoft.com/office/drawing/2014/main" val="10003"/>
                   </a:ext>
                 </a:extLst>
               </a:tr>
@@ -24274,7 +24285,7 @@
                 </a:solidFill>
                 <a:latin typeface="Bahnschrift" panose="020B0502040204020203" pitchFamily="34" charset="0"/>
               </a:rPr>
-              <a:t>Jogos Cadastrados</a:t>
+              <a:t>Jogos cadastrados</a:t>
             </a:r>
           </a:p>
         </p:txBody>
@@ -24818,10 +24829,9 @@
           <a:p>
             <a:pPr algn="ctr"/>
             <a:r>
-              <a:rPr lang="pt-BR" dirty="0" smtClean="0"/>
+              <a:rPr lang="pt-BR" dirty="0"/>
               <a:t>Apaque a Luz</a:t>
             </a:r>
-            <a:endParaRPr lang="pt-BR" dirty="0"/>
           </a:p>
         </p:txBody>
       </p:sp>
@@ -24834,7 +24844,7 @@
         <p:spPr>
           <a:xfrm>
             <a:off x="1443660" y="2216733"/>
-            <a:ext cx="5382144" cy="386367"/>
+            <a:ext cx="5838086" cy="386367"/>
           </a:xfrm>
           <a:prstGeom prst="roundRect">
             <a:avLst/>
@@ -24887,7 +24897,7 @@
           <a:lstStyle/>
           <a:p>
             <a:r>
-              <a:rPr lang="pt-BR" dirty="0" smtClean="0">
+              <a:rPr lang="pt-BR" dirty="0">
                 <a:solidFill>
                   <a:srgbClr val="447E43"/>
                 </a:solidFill>
@@ -24895,35 +24905,175 @@
               </a:rPr>
               <a:t>Quiz</a:t>
             </a:r>
-            <a:endParaRPr lang="pt-BR" dirty="0">
-              <a:solidFill>
-                <a:srgbClr val="447E43"/>
-              </a:solidFill>
-              <a:latin typeface="Bahnschrift" panose="020B0502040204020203" pitchFamily="34" charset="0"/>
-            </a:endParaRPr>
-          </a:p>
-        </p:txBody>
-      </p:sp>
-      <p:sp>
-        <p:nvSpPr>
-          <p:cNvPr id="62" name="Retângulo 61"/>
+          </a:p>
+        </p:txBody>
+      </p:sp>
+      <p:sp>
+        <p:nvSpPr>
+          <p:cNvPr id="63" name="Retângulo de cantos arredondados 62"/>
           <p:cNvSpPr/>
           <p:nvPr/>
         </p:nvSpPr>
         <p:spPr>
           <a:xfrm>
-            <a:off x="6880967" y="2216732"/>
-            <a:ext cx="388679" cy="371922"/>
+            <a:off x="1443659" y="2631936"/>
+            <a:ext cx="5838085" cy="386367"/>
+          </a:xfrm>
+          <a:prstGeom prst="roundRect">
+            <a:avLst/>
+          </a:prstGeom>
+          <a:noFill/>
+        </p:spPr>
+        <p:style>
+          <a:lnRef idx="2">
+            <a:schemeClr val="accent6"/>
+          </a:lnRef>
+          <a:fillRef idx="1">
+            <a:schemeClr val="lt1"/>
+          </a:fillRef>
+          <a:effectRef idx="0">
+            <a:schemeClr val="accent6"/>
+          </a:effectRef>
+          <a:fontRef idx="minor">
+            <a:schemeClr val="dk1"/>
+          </a:fontRef>
+        </p:style>
+        <p:txBody>
+          <a:bodyPr rtlCol="0" anchor="ctr"/>
+          <a:lstStyle/>
+          <a:p>
+            <a:pPr algn="ctr"/>
+            <a:endParaRPr lang="pt-BR"/>
+          </a:p>
+        </p:txBody>
+      </p:sp>
+      <p:sp>
+        <p:nvSpPr>
+          <p:cNvPr id="65" name="CaixaDeTexto 64"/>
+          <p:cNvSpPr txBox="1"/>
+          <p:nvPr/>
+        </p:nvSpPr>
+        <p:spPr>
+          <a:xfrm>
+            <a:off x="1462362" y="2626661"/>
+            <a:ext cx="4578359" cy="369332"/>
           </a:xfrm>
           <a:prstGeom prst="rect">
             <a:avLst/>
           </a:prstGeom>
+          <a:noFill/>
+        </p:spPr>
+        <p:txBody>
+          <a:bodyPr wrap="square" rtlCol="0">
+            <a:spAutoFit/>
+          </a:bodyPr>
+          <a:lstStyle/>
+          <a:p>
+            <a:r>
+              <a:rPr lang="pt-BR" dirty="0">
+                <a:solidFill>
+                  <a:srgbClr val="447E43"/>
+                </a:solidFill>
+                <a:latin typeface="Bahnschrift" panose="020B0502040204020203" pitchFamily="34" charset="0"/>
+              </a:rPr>
+              <a:t>Jogo da memória</a:t>
+            </a:r>
+          </a:p>
+        </p:txBody>
+      </p:sp>
+      <p:sp>
+        <p:nvSpPr>
+          <p:cNvPr id="66" name="Retângulo de cantos arredondados 65"/>
+          <p:cNvSpPr/>
+          <p:nvPr/>
+        </p:nvSpPr>
+        <p:spPr>
+          <a:xfrm>
+            <a:off x="1443660" y="3067508"/>
+            <a:ext cx="5838084" cy="386367"/>
+          </a:xfrm>
+          <a:prstGeom prst="roundRect">
+            <a:avLst/>
+          </a:prstGeom>
+          <a:noFill/>
+        </p:spPr>
+        <p:style>
+          <a:lnRef idx="2">
+            <a:schemeClr val="accent6"/>
+          </a:lnRef>
+          <a:fillRef idx="1">
+            <a:schemeClr val="lt1"/>
+          </a:fillRef>
+          <a:effectRef idx="0">
+            <a:schemeClr val="accent6"/>
+          </a:effectRef>
+          <a:fontRef idx="minor">
+            <a:schemeClr val="dk1"/>
+          </a:fontRef>
+        </p:style>
+        <p:txBody>
+          <a:bodyPr rtlCol="0" anchor="ctr"/>
+          <a:lstStyle/>
+          <a:p>
+            <a:pPr algn="ctr"/>
+            <a:endParaRPr lang="pt-BR"/>
+          </a:p>
+        </p:txBody>
+      </p:sp>
+      <p:sp>
+        <p:nvSpPr>
+          <p:cNvPr id="68" name="CaixaDeTexto 67"/>
+          <p:cNvSpPr txBox="1"/>
+          <p:nvPr/>
+        </p:nvSpPr>
+        <p:spPr>
+          <a:xfrm>
+            <a:off x="1462362" y="3062233"/>
+            <a:ext cx="4578359" cy="369332"/>
+          </a:xfrm>
+          <a:prstGeom prst="rect">
+            <a:avLst/>
+          </a:prstGeom>
+          <a:noFill/>
+        </p:spPr>
+        <p:txBody>
+          <a:bodyPr wrap="square" rtlCol="0">
+            <a:spAutoFit/>
+          </a:bodyPr>
+          <a:lstStyle/>
+          <a:p>
+            <a:r>
+              <a:rPr lang="pt-BR" dirty="0">
+                <a:solidFill>
+                  <a:srgbClr val="447E43"/>
+                </a:solidFill>
+                <a:latin typeface="Bahnschrift" panose="020B0502040204020203" pitchFamily="34" charset="0"/>
+              </a:rPr>
+              <a:t>Apague a luz</a:t>
+            </a:r>
+          </a:p>
+        </p:txBody>
+      </p:sp>
+      <p:sp>
+        <p:nvSpPr>
+          <p:cNvPr id="46" name="Retângulo 45"/>
+          <p:cNvSpPr/>
+          <p:nvPr/>
+        </p:nvSpPr>
+        <p:spPr>
+          <a:xfrm>
+            <a:off x="5461686" y="5488650"/>
+            <a:ext cx="1724725" cy="399022"/>
+          </a:xfrm>
+          <a:prstGeom prst="rect">
+            <a:avLst/>
+          </a:prstGeom>
           <a:solidFill>
-            <a:srgbClr val="FF0000"/>
+            <a:srgbClr val="73D54A"/>
           </a:solidFill>
           <a:ln>
             <a:solidFill>
-              <a:srgbClr val="FF0000"/>
+              <a:srgbClr val="73D54A"/>
             </a:solidFill>
           </a:ln>
           <a:effectLst>
@@ -24957,71 +25107,32 @@
           <a:p>
             <a:pPr algn="ctr"/>
             <a:r>
-              <a:rPr lang="pt-BR" sz="2800" b="1" dirty="0"/>
-              <a:t>x</a:t>
+              <a:rPr lang="pt-BR" dirty="0"/>
+              <a:t>Iniciar rodada</a:t>
             </a:r>
           </a:p>
         </p:txBody>
       </p:sp>
       <p:sp>
         <p:nvSpPr>
-          <p:cNvPr id="63" name="Retângulo de cantos arredondados 62"/>
+          <p:cNvPr id="70" name="Retângulo 69"/>
           <p:cNvSpPr/>
           <p:nvPr/>
         </p:nvSpPr>
         <p:spPr>
           <a:xfrm>
-            <a:off x="1443660" y="2631936"/>
-            <a:ext cx="5382144" cy="386367"/>
-          </a:xfrm>
-          <a:prstGeom prst="roundRect">
-            <a:avLst/>
-          </a:prstGeom>
-          <a:noFill/>
-        </p:spPr>
-        <p:style>
-          <a:lnRef idx="2">
-            <a:schemeClr val="accent6"/>
-          </a:lnRef>
-          <a:fillRef idx="1">
-            <a:schemeClr val="lt1"/>
-          </a:fillRef>
-          <a:effectRef idx="0">
-            <a:schemeClr val="accent6"/>
-          </a:effectRef>
-          <a:fontRef idx="minor">
-            <a:schemeClr val="dk1"/>
-          </a:fontRef>
-        </p:style>
-        <p:txBody>
-          <a:bodyPr rtlCol="0" anchor="ctr"/>
-          <a:lstStyle/>
-          <a:p>
-            <a:pPr algn="ctr"/>
-            <a:endParaRPr lang="pt-BR"/>
-          </a:p>
-        </p:txBody>
-      </p:sp>
-      <p:sp>
-        <p:nvSpPr>
-          <p:cNvPr id="64" name="Retângulo 63"/>
-          <p:cNvSpPr/>
-          <p:nvPr/>
-        </p:nvSpPr>
-        <p:spPr>
-          <a:xfrm>
-            <a:off x="6880797" y="2651741"/>
-            <a:ext cx="388679" cy="371922"/>
+            <a:off x="8162399" y="2204078"/>
+            <a:ext cx="2057243" cy="399022"/>
           </a:xfrm>
           <a:prstGeom prst="rect">
             <a:avLst/>
           </a:prstGeom>
           <a:solidFill>
-            <a:srgbClr val="FF0000"/>
+            <a:srgbClr val="73D54A"/>
           </a:solidFill>
           <a:ln>
             <a:solidFill>
-              <a:srgbClr val="FF0000"/>
+              <a:srgbClr val="73D54A"/>
             </a:solidFill>
           </a:ln>
           <a:effectLst>
@@ -25055,111 +25166,32 @@
           <a:p>
             <a:pPr algn="ctr"/>
             <a:r>
-              <a:rPr lang="pt-BR" sz="2800" b="1" dirty="0"/>
-              <a:t>x</a:t>
+              <a:rPr lang="pt-BR" dirty="0"/>
+              <a:t>Adicionar perguntas</a:t>
             </a:r>
           </a:p>
         </p:txBody>
       </p:sp>
       <p:sp>
         <p:nvSpPr>
-          <p:cNvPr id="65" name="CaixaDeTexto 64"/>
-          <p:cNvSpPr txBox="1"/>
-          <p:nvPr/>
-        </p:nvSpPr>
-        <p:spPr>
-          <a:xfrm>
-            <a:off x="1462362" y="2626661"/>
-            <a:ext cx="4578359" cy="369332"/>
+          <p:cNvPr id="72" name="Retângulo 71"/>
+          <p:cNvSpPr/>
+          <p:nvPr/>
+        </p:nvSpPr>
+        <p:spPr>
+          <a:xfrm>
+            <a:off x="7961454" y="3904181"/>
+            <a:ext cx="2462837" cy="517732"/>
           </a:xfrm>
           <a:prstGeom prst="rect">
             <a:avLst/>
           </a:prstGeom>
-          <a:noFill/>
-        </p:spPr>
-        <p:txBody>
-          <a:bodyPr wrap="square" rtlCol="0">
-            <a:spAutoFit/>
-          </a:bodyPr>
-          <a:lstStyle/>
-          <a:p>
-            <a:r>
-              <a:rPr lang="pt-BR" dirty="0" smtClean="0">
-                <a:solidFill>
-                  <a:srgbClr val="447E43"/>
-                </a:solidFill>
-                <a:latin typeface="Bahnschrift" panose="020B0502040204020203" pitchFamily="34" charset="0"/>
-              </a:rPr>
-              <a:t>Jogo da memória</a:t>
-            </a:r>
-            <a:endParaRPr lang="pt-BR" dirty="0">
-              <a:solidFill>
-                <a:srgbClr val="447E43"/>
-              </a:solidFill>
-              <a:latin typeface="Bahnschrift" panose="020B0502040204020203" pitchFamily="34" charset="0"/>
-            </a:endParaRPr>
-          </a:p>
-        </p:txBody>
-      </p:sp>
-      <p:sp>
-        <p:nvSpPr>
-          <p:cNvPr id="66" name="Retângulo de cantos arredondados 65"/>
-          <p:cNvSpPr/>
-          <p:nvPr/>
-        </p:nvSpPr>
-        <p:spPr>
-          <a:xfrm>
-            <a:off x="1443660" y="3067508"/>
-            <a:ext cx="5382144" cy="386367"/>
-          </a:xfrm>
-          <a:prstGeom prst="roundRect">
-            <a:avLst/>
-          </a:prstGeom>
-          <a:noFill/>
-        </p:spPr>
-        <p:style>
-          <a:lnRef idx="2">
-            <a:schemeClr val="accent6"/>
-          </a:lnRef>
-          <a:fillRef idx="1">
-            <a:schemeClr val="lt1"/>
-          </a:fillRef>
-          <a:effectRef idx="0">
-            <a:schemeClr val="accent6"/>
-          </a:effectRef>
-          <a:fontRef idx="minor">
-            <a:schemeClr val="dk1"/>
-          </a:fontRef>
-        </p:style>
-        <p:txBody>
-          <a:bodyPr rtlCol="0" anchor="ctr"/>
-          <a:lstStyle/>
-          <a:p>
-            <a:pPr algn="ctr"/>
-            <a:endParaRPr lang="pt-BR"/>
-          </a:p>
-        </p:txBody>
-      </p:sp>
-      <p:sp>
-        <p:nvSpPr>
-          <p:cNvPr id="67" name="Retângulo 66"/>
-          <p:cNvSpPr/>
-          <p:nvPr/>
-        </p:nvSpPr>
-        <p:spPr>
-          <a:xfrm>
-            <a:off x="6880797" y="3087313"/>
-            <a:ext cx="388679" cy="371922"/>
-          </a:xfrm>
-          <a:prstGeom prst="rect">
-            <a:avLst/>
-          </a:prstGeom>
           <a:solidFill>
-            <a:srgbClr val="FF0000"/>
+            <a:srgbClr val="73D54A"/>
           </a:solidFill>
           <a:ln>
             <a:solidFill>
-              <a:srgbClr val="FF0000"/>
+              <a:srgbClr val="73D54A"/>
             </a:solidFill>
           </a:ln>
           <a:effectLst>
@@ -25193,62 +25225,22 @@
           <a:p>
             <a:pPr algn="ctr"/>
             <a:r>
-              <a:rPr lang="pt-BR" sz="2800" b="1" dirty="0"/>
-              <a:t>x</a:t>
+              <a:rPr lang="pt-BR" dirty="0"/>
+              <a:t>Adicionar Jogo da Memória</a:t>
             </a:r>
           </a:p>
         </p:txBody>
       </p:sp>
       <p:sp>
         <p:nvSpPr>
-          <p:cNvPr id="68" name="CaixaDeTexto 67"/>
-          <p:cNvSpPr txBox="1"/>
-          <p:nvPr/>
-        </p:nvSpPr>
-        <p:spPr>
-          <a:xfrm>
-            <a:off x="1462362" y="3062233"/>
-            <a:ext cx="4578359" cy="369332"/>
-          </a:xfrm>
-          <a:prstGeom prst="rect">
-            <a:avLst/>
-          </a:prstGeom>
-          <a:noFill/>
-        </p:spPr>
-        <p:txBody>
-          <a:bodyPr wrap="square" rtlCol="0">
-            <a:spAutoFit/>
-          </a:bodyPr>
-          <a:lstStyle/>
-          <a:p>
-            <a:r>
-              <a:rPr lang="pt-BR" dirty="0" smtClean="0">
-                <a:solidFill>
-                  <a:srgbClr val="447E43"/>
-                </a:solidFill>
-                <a:latin typeface="Bahnschrift" panose="020B0502040204020203" pitchFamily="34" charset="0"/>
-              </a:rPr>
-              <a:t>Acerte o alvo</a:t>
-            </a:r>
-            <a:endParaRPr lang="pt-BR" dirty="0">
-              <a:solidFill>
-                <a:srgbClr val="447E43"/>
-              </a:solidFill>
-              <a:latin typeface="Bahnschrift" panose="020B0502040204020203" pitchFamily="34" charset="0"/>
-            </a:endParaRPr>
-          </a:p>
-        </p:txBody>
-      </p:sp>
-      <p:sp>
-        <p:nvSpPr>
-          <p:cNvPr id="46" name="Retângulo 45"/>
+          <p:cNvPr id="73" name="Retângulo 72"/>
           <p:cNvSpPr/>
           <p:nvPr/>
         </p:nvSpPr>
         <p:spPr>
           <a:xfrm>
-            <a:off x="5461686" y="5488650"/>
-            <a:ext cx="1724725" cy="399022"/>
+            <a:off x="7961454" y="5377029"/>
+            <a:ext cx="2459134" cy="399022"/>
           </a:xfrm>
           <a:prstGeom prst="rect">
             <a:avLst/>
@@ -25292,23 +25284,28 @@
           <a:p>
             <a:pPr algn="ctr"/>
             <a:r>
-              <a:rPr lang="pt-BR" dirty="0" smtClean="0"/>
-              <a:t>Iniciar rodada</a:t>
+              <a:rPr lang="pt-BR" dirty="0"/>
+              <a:t>Adicionar Apague a Luz</a:t>
             </a:r>
-            <a:endParaRPr lang="pt-BR" dirty="0"/>
-          </a:p>
-        </p:txBody>
-      </p:sp>
-      <p:sp>
-        <p:nvSpPr>
-          <p:cNvPr id="70" name="Retângulo 69"/>
+          </a:p>
+        </p:txBody>
+      </p:sp>
+      <p:sp>
+        <p:nvSpPr>
+          <p:cNvPr id="35" name="Retângulo 34">
+            <a:extLst>
+              <a:ext uri="{FF2B5EF4-FFF2-40B4-BE49-F238E27FC236}">
+                <a16:creationId xmlns:a16="http://schemas.microsoft.com/office/drawing/2014/main" id="{579B470E-A950-473D-9224-F36D0EB57231}"/>
+              </a:ext>
+            </a:extLst>
+          </p:cNvPr>
           <p:cNvSpPr/>
           <p:nvPr/>
         </p:nvSpPr>
         <p:spPr>
           <a:xfrm>
-            <a:off x="8230963" y="2128096"/>
-            <a:ext cx="2057243" cy="399022"/>
+            <a:off x="1462362" y="5289211"/>
+            <a:ext cx="1724725" cy="596570"/>
           </a:xfrm>
           <a:prstGeom prst="rect">
             <a:avLst/>
@@ -25352,130 +25349,9 @@
           <a:p>
             <a:pPr algn="ctr"/>
             <a:r>
-              <a:rPr lang="pt-BR" dirty="0" smtClean="0"/>
-              <a:t>Escolher pergunta</a:t>
+              <a:rPr lang="pt-BR" dirty="0"/>
+              <a:t>Remover último jogo</a:t>
             </a:r>
-            <a:endParaRPr lang="pt-BR" dirty="0"/>
-          </a:p>
-        </p:txBody>
-      </p:sp>
-      <p:sp>
-        <p:nvSpPr>
-          <p:cNvPr id="72" name="Retângulo 71"/>
-          <p:cNvSpPr/>
-          <p:nvPr/>
-        </p:nvSpPr>
-        <p:spPr>
-          <a:xfrm>
-            <a:off x="7957751" y="3856560"/>
-            <a:ext cx="2462837" cy="517732"/>
-          </a:xfrm>
-          <a:prstGeom prst="rect">
-            <a:avLst/>
-          </a:prstGeom>
-          <a:solidFill>
-            <a:srgbClr val="73D54A"/>
-          </a:solidFill>
-          <a:ln>
-            <a:solidFill>
-              <a:srgbClr val="73D54A"/>
-            </a:solidFill>
-          </a:ln>
-          <a:effectLst>
-            <a:outerShdw blurRad="50800" dist="38100" dir="2700000" algn="tl" rotWithShape="0">
-              <a:prstClr val="black">
-                <a:alpha val="40000"/>
-              </a:prstClr>
-            </a:outerShdw>
-            <a:softEdge rad="0"/>
-          </a:effectLst>
-        </p:spPr>
-        <p:style>
-          <a:lnRef idx="2">
-            <a:schemeClr val="accent1">
-              <a:shade val="50000"/>
-            </a:schemeClr>
-          </a:lnRef>
-          <a:fillRef idx="1">
-            <a:schemeClr val="accent1"/>
-          </a:fillRef>
-          <a:effectRef idx="0">
-            <a:schemeClr val="accent1"/>
-          </a:effectRef>
-          <a:fontRef idx="minor">
-            <a:schemeClr val="lt1"/>
-          </a:fontRef>
-        </p:style>
-        <p:txBody>
-          <a:bodyPr rtlCol="0" anchor="ctr"/>
-          <a:lstStyle/>
-          <a:p>
-            <a:pPr algn="ctr"/>
-            <a:r>
-              <a:rPr lang="pt-BR" dirty="0" smtClean="0"/>
-              <a:t>Adicionar Jogo da Memória</a:t>
-            </a:r>
-            <a:endParaRPr lang="pt-BR" dirty="0"/>
-          </a:p>
-        </p:txBody>
-      </p:sp>
-      <p:sp>
-        <p:nvSpPr>
-          <p:cNvPr id="73" name="Retângulo 72"/>
-          <p:cNvSpPr/>
-          <p:nvPr/>
-        </p:nvSpPr>
-        <p:spPr>
-          <a:xfrm>
-            <a:off x="7961454" y="5289211"/>
-            <a:ext cx="2459134" cy="399022"/>
-          </a:xfrm>
-          <a:prstGeom prst="rect">
-            <a:avLst/>
-          </a:prstGeom>
-          <a:solidFill>
-            <a:srgbClr val="73D54A"/>
-          </a:solidFill>
-          <a:ln>
-            <a:solidFill>
-              <a:srgbClr val="73D54A"/>
-            </a:solidFill>
-          </a:ln>
-          <a:effectLst>
-            <a:outerShdw blurRad="50800" dist="38100" dir="2700000" algn="tl" rotWithShape="0">
-              <a:prstClr val="black">
-                <a:alpha val="40000"/>
-              </a:prstClr>
-            </a:outerShdw>
-            <a:softEdge rad="0"/>
-          </a:effectLst>
-        </p:spPr>
-        <p:style>
-          <a:lnRef idx="2">
-            <a:schemeClr val="accent1">
-              <a:shade val="50000"/>
-            </a:schemeClr>
-          </a:lnRef>
-          <a:fillRef idx="1">
-            <a:schemeClr val="accent1"/>
-          </a:fillRef>
-          <a:effectRef idx="0">
-            <a:schemeClr val="accent1"/>
-          </a:effectRef>
-          <a:fontRef idx="minor">
-            <a:schemeClr val="lt1"/>
-          </a:fontRef>
-        </p:style>
-        <p:txBody>
-          <a:bodyPr rtlCol="0" anchor="ctr"/>
-          <a:lstStyle/>
-          <a:p>
-            <a:pPr algn="ctr"/>
-            <a:r>
-              <a:rPr lang="pt-BR" dirty="0" smtClean="0"/>
-              <a:t>Adicionar Apague a Luz</a:t>
-            </a:r>
-            <a:endParaRPr lang="pt-BR" dirty="0"/>
           </a:p>
         </p:txBody>
       </p:sp>
@@ -25528,13 +25404,8 @@
           <a:p>
             <a:r>
               <a:rPr lang="pt-BR" sz="3200" dirty="0"/>
-              <a:t>Tabela de Elementos – Tela </a:t>
+              <a:t>Tabela de Elementos – Tela Nova Rodada</a:t>
             </a:r>
-            <a:r>
-              <a:rPr lang="pt-BR" sz="3200" dirty="0" smtClean="0"/>
-              <a:t>Nova Rodada</a:t>
-            </a:r>
-            <a:endParaRPr lang="pt-BR" sz="3200" dirty="0"/>
           </a:p>
         </p:txBody>
       </p:sp>
@@ -25567,35 +25438,35 @@
                 <a:gridCol w="569322">
                   <a:extLst>
                     <a:ext uri="{9D8B030D-6E8A-4147-A177-3AD203B41FA5}">
-                      <a16:colId xmlns:a16="http://schemas.microsoft.com/office/drawing/2014/main" xmlns="" val="20000"/>
+                      <a16:colId xmlns:a16="http://schemas.microsoft.com/office/drawing/2014/main" val="20000"/>
                     </a:ext>
                   </a:extLst>
                 </a:gridCol>
                 <a:gridCol w="1629692">
                   <a:extLst>
                     <a:ext uri="{9D8B030D-6E8A-4147-A177-3AD203B41FA5}">
-                      <a16:colId xmlns:a16="http://schemas.microsoft.com/office/drawing/2014/main" xmlns="" val="20001"/>
+                      <a16:colId xmlns:a16="http://schemas.microsoft.com/office/drawing/2014/main" val="20001"/>
                     </a:ext>
                   </a:extLst>
                 </a:gridCol>
                 <a:gridCol w="1742084">
                   <a:extLst>
                     <a:ext uri="{9D8B030D-6E8A-4147-A177-3AD203B41FA5}">
-                      <a16:colId xmlns:a16="http://schemas.microsoft.com/office/drawing/2014/main" xmlns="" val="20002"/>
+                      <a16:colId xmlns:a16="http://schemas.microsoft.com/office/drawing/2014/main" val="20002"/>
                     </a:ext>
                   </a:extLst>
                 </a:gridCol>
                 <a:gridCol w="2942571">
                   <a:extLst>
                     <a:ext uri="{9D8B030D-6E8A-4147-A177-3AD203B41FA5}">
-                      <a16:colId xmlns:a16="http://schemas.microsoft.com/office/drawing/2014/main" xmlns="" val="20003"/>
+                      <a16:colId xmlns:a16="http://schemas.microsoft.com/office/drawing/2014/main" val="20003"/>
                     </a:ext>
                   </a:extLst>
                 </a:gridCol>
                 <a:gridCol w="2285016">
                   <a:extLst>
                     <a:ext uri="{9D8B030D-6E8A-4147-A177-3AD203B41FA5}">
-                      <a16:colId xmlns:a16="http://schemas.microsoft.com/office/drawing/2014/main" xmlns="" val="20004"/>
+                      <a16:colId xmlns:a16="http://schemas.microsoft.com/office/drawing/2014/main" val="20004"/>
                     </a:ext>
                   </a:extLst>
                 </a:gridCol>
@@ -25665,7 +25536,7 @@
                 </a:tc>
                 <a:extLst>
                   <a:ext uri="{0D108BD9-81ED-4DB2-BD59-A6C34878D82A}">
-                    <a16:rowId xmlns:a16="http://schemas.microsoft.com/office/drawing/2014/main" xmlns="" val="10000"/>
+                    <a16:rowId xmlns:a16="http://schemas.microsoft.com/office/drawing/2014/main" val="10000"/>
                   </a:ext>
                 </a:extLst>
               </a:tr>
@@ -25739,7 +25610,7 @@
                 </a:tc>
                 <a:extLst>
                   <a:ext uri="{0D108BD9-81ED-4DB2-BD59-A6C34878D82A}">
-                    <a16:rowId xmlns:a16="http://schemas.microsoft.com/office/drawing/2014/main" xmlns="" val="10001"/>
+                    <a16:rowId xmlns:a16="http://schemas.microsoft.com/office/drawing/2014/main" val="10001"/>
                   </a:ext>
                 </a:extLst>
               </a:tr>
@@ -25816,7 +25687,7 @@
                 </a:tc>
                 <a:extLst>
                   <a:ext uri="{0D108BD9-81ED-4DB2-BD59-A6C34878D82A}">
-                    <a16:rowId xmlns:a16="http://schemas.microsoft.com/office/drawing/2014/main" xmlns="" val="10002"/>
+                    <a16:rowId xmlns:a16="http://schemas.microsoft.com/office/drawing/2014/main" val="10002"/>
                   </a:ext>
                 </a:extLst>
               </a:tr>
@@ -25885,7 +25756,7 @@
                 </a:tc>
                 <a:extLst>
                   <a:ext uri="{0D108BD9-81ED-4DB2-BD59-A6C34878D82A}">
-                    <a16:rowId xmlns:a16="http://schemas.microsoft.com/office/drawing/2014/main" xmlns="" val="10003"/>
+                    <a16:rowId xmlns:a16="http://schemas.microsoft.com/office/drawing/2014/main" val="10003"/>
                   </a:ext>
                 </a:extLst>
               </a:tr>
@@ -25959,7 +25830,7 @@
                 </a:tc>
                 <a:extLst>
                   <a:ext uri="{0D108BD9-81ED-4DB2-BD59-A6C34878D82A}">
-                    <a16:rowId xmlns:a16="http://schemas.microsoft.com/office/drawing/2014/main" xmlns="" val="10004"/>
+                    <a16:rowId xmlns:a16="http://schemas.microsoft.com/office/drawing/2014/main" val="10004"/>
                   </a:ext>
                 </a:extLst>
               </a:tr>
@@ -26002,7 +25873,7 @@
           <p:cNvPr id="28" name="Retângulo 27">
             <a:extLst>
               <a:ext uri="{FF2B5EF4-FFF2-40B4-BE49-F238E27FC236}">
-                <a16:creationId xmlns:a16="http://schemas.microsoft.com/office/drawing/2014/main" xmlns="" id="{5F32A0B6-C48F-43EE-A5D8-7308B54BD125}"/>
+                <a16:creationId xmlns:a16="http://schemas.microsoft.com/office/drawing/2014/main" id="{5F32A0B6-C48F-43EE-A5D8-7308B54BD125}"/>
               </a:ext>
             </a:extLst>
           </p:cNvPr>
@@ -26060,7 +25931,7 @@
           <p:cNvPr id="29" name="Imagem 28">
             <a:extLst>
               <a:ext uri="{FF2B5EF4-FFF2-40B4-BE49-F238E27FC236}">
-                <a16:creationId xmlns:a16="http://schemas.microsoft.com/office/drawing/2014/main" xmlns="" id="{FB65D69D-FD79-4510-9B62-EF95225475B4}"/>
+                <a16:creationId xmlns:a16="http://schemas.microsoft.com/office/drawing/2014/main" id="{FB65D69D-FD79-4510-9B62-EF95225475B4}"/>
               </a:ext>
             </a:extLst>
           </p:cNvPr>
@@ -26095,7 +25966,7 @@
           <p:cNvPr id="30" name="Retângulo 29">
             <a:extLst>
               <a:ext uri="{FF2B5EF4-FFF2-40B4-BE49-F238E27FC236}">
-                <a16:creationId xmlns:a16="http://schemas.microsoft.com/office/drawing/2014/main" xmlns="" id="{69F39E0A-ADF3-4786-AADD-1590DEF8ACD5}"/>
+                <a16:creationId xmlns:a16="http://schemas.microsoft.com/office/drawing/2014/main" id="{69F39E0A-ADF3-4786-AADD-1590DEF8ACD5}"/>
               </a:ext>
             </a:extLst>
           </p:cNvPr>
@@ -26149,7 +26020,7 @@
           <p:cNvPr id="31" name="Retângulo de cantos arredondados 15">
             <a:extLst>
               <a:ext uri="{FF2B5EF4-FFF2-40B4-BE49-F238E27FC236}">
-                <a16:creationId xmlns:a16="http://schemas.microsoft.com/office/drawing/2014/main" xmlns="" id="{A8F89069-7CD4-49CA-8349-13E28CB0199B}"/>
+                <a16:creationId xmlns:a16="http://schemas.microsoft.com/office/drawing/2014/main" id="{A8F89069-7CD4-49CA-8349-13E28CB0199B}"/>
               </a:ext>
             </a:extLst>
           </p:cNvPr>
@@ -26196,7 +26067,7 @@
           <p:cNvPr id="32" name="Retângulo 31">
             <a:extLst>
               <a:ext uri="{FF2B5EF4-FFF2-40B4-BE49-F238E27FC236}">
-                <a16:creationId xmlns:a16="http://schemas.microsoft.com/office/drawing/2014/main" xmlns="" id="{FB98B605-AF2E-47B3-A046-9DBA0B0C6DF0}"/>
+                <a16:creationId xmlns:a16="http://schemas.microsoft.com/office/drawing/2014/main" id="{FB98B605-AF2E-47B3-A046-9DBA0B0C6DF0}"/>
               </a:ext>
             </a:extLst>
           </p:cNvPr>
@@ -26265,7 +26136,7 @@
           <p:cNvPr id="33" name="Retângulo 32">
             <a:extLst>
               <a:ext uri="{FF2B5EF4-FFF2-40B4-BE49-F238E27FC236}">
-                <a16:creationId xmlns:a16="http://schemas.microsoft.com/office/drawing/2014/main" xmlns="" id="{C58BEB00-D0CF-4119-A679-797E80547B05}"/>
+                <a16:creationId xmlns:a16="http://schemas.microsoft.com/office/drawing/2014/main" id="{C58BEB00-D0CF-4119-A679-797E80547B05}"/>
               </a:ext>
             </a:extLst>
           </p:cNvPr>
@@ -26334,7 +26205,7 @@
           <p:cNvPr id="34" name="Retângulo 33">
             <a:extLst>
               <a:ext uri="{FF2B5EF4-FFF2-40B4-BE49-F238E27FC236}">
-                <a16:creationId xmlns:a16="http://schemas.microsoft.com/office/drawing/2014/main" xmlns="" id="{B89DBC78-F9B4-4606-9E15-BA606BC8461C}"/>
+                <a16:creationId xmlns:a16="http://schemas.microsoft.com/office/drawing/2014/main" id="{B89DBC78-F9B4-4606-9E15-BA606BC8461C}"/>
               </a:ext>
             </a:extLst>
           </p:cNvPr>
@@ -26403,7 +26274,7 @@
           <p:cNvPr id="35" name="Retângulo 34">
             <a:extLst>
               <a:ext uri="{FF2B5EF4-FFF2-40B4-BE49-F238E27FC236}">
-                <a16:creationId xmlns:a16="http://schemas.microsoft.com/office/drawing/2014/main" xmlns="" id="{0B9D6A87-571A-41B7-8B3A-068B4D3A1265}"/>
+                <a16:creationId xmlns:a16="http://schemas.microsoft.com/office/drawing/2014/main" id="{0B9D6A87-571A-41B7-8B3A-068B4D3A1265}"/>
               </a:ext>
             </a:extLst>
           </p:cNvPr>
@@ -26472,7 +26343,7 @@
           <p:cNvPr id="36" name="CaixaDeTexto 35">
             <a:extLst>
               <a:ext uri="{FF2B5EF4-FFF2-40B4-BE49-F238E27FC236}">
-                <a16:creationId xmlns:a16="http://schemas.microsoft.com/office/drawing/2014/main" xmlns="" id="{37A1CC55-461A-40B6-BDC2-2D9791E94584}"/>
+                <a16:creationId xmlns:a16="http://schemas.microsoft.com/office/drawing/2014/main" id="{37A1CC55-461A-40B6-BDC2-2D9791E94584}"/>
               </a:ext>
             </a:extLst>
           </p:cNvPr>
@@ -26512,7 +26383,7 @@
           <p:cNvPr id="37" name="Retângulo de cantos arredondados 12">
             <a:extLst>
               <a:ext uri="{FF2B5EF4-FFF2-40B4-BE49-F238E27FC236}">
-                <a16:creationId xmlns:a16="http://schemas.microsoft.com/office/drawing/2014/main" xmlns="" id="{152A2D14-D488-49A7-9950-4E3295F94DFB}"/>
+                <a16:creationId xmlns:a16="http://schemas.microsoft.com/office/drawing/2014/main" id="{152A2D14-D488-49A7-9950-4E3295F94DFB}"/>
               </a:ext>
             </a:extLst>
           </p:cNvPr>
@@ -26575,7 +26446,7 @@
           <p:cNvPr id="38" name="Imagem 37">
             <a:extLst>
               <a:ext uri="{FF2B5EF4-FFF2-40B4-BE49-F238E27FC236}">
-                <a16:creationId xmlns:a16="http://schemas.microsoft.com/office/drawing/2014/main" xmlns="" id="{F2BF6BE9-45DE-458A-9408-5C7903B7295F}"/>
+                <a16:creationId xmlns:a16="http://schemas.microsoft.com/office/drawing/2014/main" id="{F2BF6BE9-45DE-458A-9408-5C7903B7295F}"/>
               </a:ext>
             </a:extLst>
           </p:cNvPr>
@@ -26624,7 +26495,7 @@
           <p:cNvPr id="39" name="Imagem 38">
             <a:extLst>
               <a:ext uri="{FF2B5EF4-FFF2-40B4-BE49-F238E27FC236}">
-                <a16:creationId xmlns:a16="http://schemas.microsoft.com/office/drawing/2014/main" xmlns="" id="{D89D9DA9-AD65-4970-90D0-0D6997AF6D21}"/>
+                <a16:creationId xmlns:a16="http://schemas.microsoft.com/office/drawing/2014/main" id="{D89D9DA9-AD65-4970-90D0-0D6997AF6D21}"/>
               </a:ext>
             </a:extLst>
           </p:cNvPr>
@@ -26667,7 +26538,7 @@
           <p:cNvPr id="41" name="Imagem 40">
             <a:extLst>
               <a:ext uri="{FF2B5EF4-FFF2-40B4-BE49-F238E27FC236}">
-                <a16:creationId xmlns:a16="http://schemas.microsoft.com/office/drawing/2014/main" xmlns="" id="{CEA260CB-8F16-4F6F-B5F3-2A53C9DA9FF2}"/>
+                <a16:creationId xmlns:a16="http://schemas.microsoft.com/office/drawing/2014/main" id="{CEA260CB-8F16-4F6F-B5F3-2A53C9DA9FF2}"/>
               </a:ext>
             </a:extLst>
           </p:cNvPr>
@@ -26705,40 +26576,6 @@
           </a:prstGeom>
         </p:spPr>
       </p:pic>
-      <p:sp>
-        <p:nvSpPr>
-          <p:cNvPr id="40" name="CaixaDeTexto 39"/>
-          <p:cNvSpPr txBox="1"/>
-          <p:nvPr/>
-        </p:nvSpPr>
-        <p:spPr>
-          <a:xfrm>
-            <a:off x="1577068" y="505291"/>
-            <a:ext cx="4578359" cy="646331"/>
-          </a:xfrm>
-          <a:prstGeom prst="rect">
-            <a:avLst/>
-          </a:prstGeom>
-          <a:noFill/>
-        </p:spPr>
-        <p:txBody>
-          <a:bodyPr wrap="square" rtlCol="0">
-            <a:spAutoFit/>
-          </a:bodyPr>
-          <a:lstStyle/>
-          <a:p>
-            <a:r>
-              <a:rPr lang="pt-BR" sz="3600" dirty="0">
-                <a:solidFill>
-                  <a:schemeClr val="bg1"/>
-                </a:solidFill>
-                <a:latin typeface="Bahnschrift" panose="020B0502040204020203" pitchFamily="34" charset="0"/>
-              </a:rPr>
-              <a:t>Salas</a:t>
-            </a:r>
-          </a:p>
-        </p:txBody>
-      </p:sp>
       <p:sp>
         <p:nvSpPr>
           <p:cNvPr id="22" name="Retângulo de cantos arredondados 21"/>
@@ -27043,35 +26880,35 @@
                 <a:gridCol w="586838">
                   <a:extLst>
                     <a:ext uri="{9D8B030D-6E8A-4147-A177-3AD203B41FA5}">
-                      <a16:colId xmlns:a16="http://schemas.microsoft.com/office/drawing/2014/main" xmlns="" val="20000"/>
+                      <a16:colId xmlns:a16="http://schemas.microsoft.com/office/drawing/2014/main" val="20000"/>
                     </a:ext>
                   </a:extLst>
                 </a:gridCol>
                 <a:gridCol w="1679832">
                   <a:extLst>
                     <a:ext uri="{9D8B030D-6E8A-4147-A177-3AD203B41FA5}">
-                      <a16:colId xmlns:a16="http://schemas.microsoft.com/office/drawing/2014/main" xmlns="" val="20001"/>
+                      <a16:colId xmlns:a16="http://schemas.microsoft.com/office/drawing/2014/main" val="20001"/>
                     </a:ext>
                   </a:extLst>
                 </a:gridCol>
                 <a:gridCol w="2090660">
                   <a:extLst>
                     <a:ext uri="{9D8B030D-6E8A-4147-A177-3AD203B41FA5}">
-                      <a16:colId xmlns:a16="http://schemas.microsoft.com/office/drawing/2014/main" xmlns="" val="20002"/>
+                      <a16:colId xmlns:a16="http://schemas.microsoft.com/office/drawing/2014/main" val="20002"/>
                     </a:ext>
                   </a:extLst>
                 </a:gridCol>
                 <a:gridCol w="2209822">
                   <a:extLst>
                     <a:ext uri="{9D8B030D-6E8A-4147-A177-3AD203B41FA5}">
-                      <a16:colId xmlns:a16="http://schemas.microsoft.com/office/drawing/2014/main" xmlns="" val="20003"/>
+                      <a16:colId xmlns:a16="http://schemas.microsoft.com/office/drawing/2014/main" val="20003"/>
                     </a:ext>
                   </a:extLst>
                 </a:gridCol>
                 <a:gridCol w="2588654">
                   <a:extLst>
                     <a:ext uri="{9D8B030D-6E8A-4147-A177-3AD203B41FA5}">
-                      <a16:colId xmlns:a16="http://schemas.microsoft.com/office/drawing/2014/main" xmlns="" val="20004"/>
+                      <a16:colId xmlns:a16="http://schemas.microsoft.com/office/drawing/2014/main" val="20004"/>
                     </a:ext>
                   </a:extLst>
                 </a:gridCol>
@@ -27141,7 +26978,7 @@
                 </a:tc>
                 <a:extLst>
                   <a:ext uri="{0D108BD9-81ED-4DB2-BD59-A6C34878D82A}">
-                    <a16:rowId xmlns:a16="http://schemas.microsoft.com/office/drawing/2014/main" xmlns="" val="10000"/>
+                    <a16:rowId xmlns:a16="http://schemas.microsoft.com/office/drawing/2014/main" val="10000"/>
                   </a:ext>
                 </a:extLst>
               </a:tr>
@@ -27213,7 +27050,7 @@
                 </a:tc>
                 <a:extLst>
                   <a:ext uri="{0D108BD9-81ED-4DB2-BD59-A6C34878D82A}">
-                    <a16:rowId xmlns:a16="http://schemas.microsoft.com/office/drawing/2014/main" xmlns="" val="10001"/>
+                    <a16:rowId xmlns:a16="http://schemas.microsoft.com/office/drawing/2014/main" val="10001"/>
                   </a:ext>
                 </a:extLst>
               </a:tr>
@@ -27290,7 +27127,7 @@
                 </a:tc>
                 <a:extLst>
                   <a:ext uri="{0D108BD9-81ED-4DB2-BD59-A6C34878D82A}">
-                    <a16:rowId xmlns:a16="http://schemas.microsoft.com/office/drawing/2014/main" xmlns="" val="10002"/>
+                    <a16:rowId xmlns:a16="http://schemas.microsoft.com/office/drawing/2014/main" val="10002"/>
                   </a:ext>
                 </a:extLst>
               </a:tr>
@@ -27389,35 +27226,35 @@
                 <a:gridCol w="554127">
                   <a:extLst>
                     <a:ext uri="{9D8B030D-6E8A-4147-A177-3AD203B41FA5}">
-                      <a16:colId xmlns:a16="http://schemas.microsoft.com/office/drawing/2014/main" xmlns="" val="20000"/>
+                      <a16:colId xmlns:a16="http://schemas.microsoft.com/office/drawing/2014/main" val="20000"/>
                     </a:ext>
                   </a:extLst>
                 </a:gridCol>
                 <a:gridCol w="1586198">
                   <a:extLst>
                     <a:ext uri="{9D8B030D-6E8A-4147-A177-3AD203B41FA5}">
-                      <a16:colId xmlns:a16="http://schemas.microsoft.com/office/drawing/2014/main" xmlns="" val="20001"/>
+                      <a16:colId xmlns:a16="http://schemas.microsoft.com/office/drawing/2014/main" val="20001"/>
                     </a:ext>
                   </a:extLst>
                 </a:gridCol>
                 <a:gridCol w="1695590">
                   <a:extLst>
                     <a:ext uri="{9D8B030D-6E8A-4147-A177-3AD203B41FA5}">
-                      <a16:colId xmlns:a16="http://schemas.microsoft.com/office/drawing/2014/main" xmlns="" val="20002"/>
+                      <a16:colId xmlns:a16="http://schemas.microsoft.com/office/drawing/2014/main" val="20002"/>
                     </a:ext>
                   </a:extLst>
                 </a:gridCol>
                 <a:gridCol w="2544035">
                   <a:extLst>
                     <a:ext uri="{9D8B030D-6E8A-4147-A177-3AD203B41FA5}">
-                      <a16:colId xmlns:a16="http://schemas.microsoft.com/office/drawing/2014/main" xmlns="" val="20003"/>
+                      <a16:colId xmlns:a16="http://schemas.microsoft.com/office/drawing/2014/main" val="20003"/>
                     </a:ext>
                   </a:extLst>
                 </a:gridCol>
                 <a:gridCol w="2544035">
                   <a:extLst>
                     <a:ext uri="{9D8B030D-6E8A-4147-A177-3AD203B41FA5}">
-                      <a16:colId xmlns:a16="http://schemas.microsoft.com/office/drawing/2014/main" xmlns="" val="20004"/>
+                      <a16:colId xmlns:a16="http://schemas.microsoft.com/office/drawing/2014/main" val="20004"/>
                     </a:ext>
                   </a:extLst>
                 </a:gridCol>
@@ -27487,7 +27324,7 @@
                 </a:tc>
                 <a:extLst>
                   <a:ext uri="{0D108BD9-81ED-4DB2-BD59-A6C34878D82A}">
-                    <a16:rowId xmlns:a16="http://schemas.microsoft.com/office/drawing/2014/main" xmlns="" val="10000"/>
+                    <a16:rowId xmlns:a16="http://schemas.microsoft.com/office/drawing/2014/main" val="10000"/>
                   </a:ext>
                 </a:extLst>
               </a:tr>
@@ -27558,7 +27395,7 @@
                 </a:tc>
                 <a:extLst>
                   <a:ext uri="{0D108BD9-81ED-4DB2-BD59-A6C34878D82A}">
-                    <a16:rowId xmlns:a16="http://schemas.microsoft.com/office/drawing/2014/main" xmlns="" val="10001"/>
+                    <a16:rowId xmlns:a16="http://schemas.microsoft.com/office/drawing/2014/main" val="10001"/>
                   </a:ext>
                 </a:extLst>
               </a:tr>
@@ -27628,7 +27465,7 @@
                 </a:tc>
                 <a:extLst>
                   <a:ext uri="{0D108BD9-81ED-4DB2-BD59-A6C34878D82A}">
-                    <a16:rowId xmlns:a16="http://schemas.microsoft.com/office/drawing/2014/main" xmlns="" val="10002"/>
+                    <a16:rowId xmlns:a16="http://schemas.microsoft.com/office/drawing/2014/main" val="10002"/>
                   </a:ext>
                 </a:extLst>
               </a:tr>
@@ -27697,7 +27534,7 @@
                 </a:tc>
                 <a:extLst>
                   <a:ext uri="{0D108BD9-81ED-4DB2-BD59-A6C34878D82A}">
-                    <a16:rowId xmlns:a16="http://schemas.microsoft.com/office/drawing/2014/main" xmlns="" val="10003"/>
+                    <a16:rowId xmlns:a16="http://schemas.microsoft.com/office/drawing/2014/main" val="10003"/>
                   </a:ext>
                 </a:extLst>
               </a:tr>
@@ -28458,35 +28295,35 @@
                 <a:gridCol w="578919">
                   <a:extLst>
                     <a:ext uri="{9D8B030D-6E8A-4147-A177-3AD203B41FA5}">
-                      <a16:colId xmlns:a16="http://schemas.microsoft.com/office/drawing/2014/main" xmlns="" val="20000"/>
+                      <a16:colId xmlns:a16="http://schemas.microsoft.com/office/drawing/2014/main" val="20000"/>
                     </a:ext>
                   </a:extLst>
                 </a:gridCol>
                 <a:gridCol w="1657161">
                   <a:extLst>
                     <a:ext uri="{9D8B030D-6E8A-4147-A177-3AD203B41FA5}">
-                      <a16:colId xmlns:a16="http://schemas.microsoft.com/office/drawing/2014/main" xmlns="" val="20001"/>
+                      <a16:colId xmlns:a16="http://schemas.microsoft.com/office/drawing/2014/main" val="20001"/>
                     </a:ext>
                   </a:extLst>
                 </a:gridCol>
                 <a:gridCol w="1771448">
                   <a:extLst>
                     <a:ext uri="{9D8B030D-6E8A-4147-A177-3AD203B41FA5}">
-                      <a16:colId xmlns:a16="http://schemas.microsoft.com/office/drawing/2014/main" xmlns="" val="20002"/>
+                      <a16:colId xmlns:a16="http://schemas.microsoft.com/office/drawing/2014/main" val="20002"/>
                     </a:ext>
                   </a:extLst>
                 </a:gridCol>
                 <a:gridCol w="2657852">
                   <a:extLst>
                     <a:ext uri="{9D8B030D-6E8A-4147-A177-3AD203B41FA5}">
-                      <a16:colId xmlns:a16="http://schemas.microsoft.com/office/drawing/2014/main" xmlns="" val="20003"/>
+                      <a16:colId xmlns:a16="http://schemas.microsoft.com/office/drawing/2014/main" val="20003"/>
                     </a:ext>
                   </a:extLst>
                 </a:gridCol>
                 <a:gridCol w="2657852">
                   <a:extLst>
                     <a:ext uri="{9D8B030D-6E8A-4147-A177-3AD203B41FA5}">
-                      <a16:colId xmlns:a16="http://schemas.microsoft.com/office/drawing/2014/main" xmlns="" val="20004"/>
+                      <a16:colId xmlns:a16="http://schemas.microsoft.com/office/drawing/2014/main" val="20004"/>
                     </a:ext>
                   </a:extLst>
                 </a:gridCol>
@@ -28556,7 +28393,7 @@
                 </a:tc>
                 <a:extLst>
                   <a:ext uri="{0D108BD9-81ED-4DB2-BD59-A6C34878D82A}">
-                    <a16:rowId xmlns:a16="http://schemas.microsoft.com/office/drawing/2014/main" xmlns="" val="10000"/>
+                    <a16:rowId xmlns:a16="http://schemas.microsoft.com/office/drawing/2014/main" val="10000"/>
                   </a:ext>
                 </a:extLst>
               </a:tr>
@@ -28627,7 +28464,7 @@
                 </a:tc>
                 <a:extLst>
                   <a:ext uri="{0D108BD9-81ED-4DB2-BD59-A6C34878D82A}">
-                    <a16:rowId xmlns:a16="http://schemas.microsoft.com/office/drawing/2014/main" xmlns="" val="10001"/>
+                    <a16:rowId xmlns:a16="http://schemas.microsoft.com/office/drawing/2014/main" val="10001"/>
                   </a:ext>
                 </a:extLst>
               </a:tr>
@@ -28697,7 +28534,7 @@
                 </a:tc>
                 <a:extLst>
                   <a:ext uri="{0D108BD9-81ED-4DB2-BD59-A6C34878D82A}">
-                    <a16:rowId xmlns:a16="http://schemas.microsoft.com/office/drawing/2014/main" xmlns="" val="10002"/>
+                    <a16:rowId xmlns:a16="http://schemas.microsoft.com/office/drawing/2014/main" val="10002"/>
                   </a:ext>
                 </a:extLst>
               </a:tr>
@@ -28786,7 +28623,7 @@
                 </a:tc>
                 <a:extLst>
                   <a:ext uri="{0D108BD9-81ED-4DB2-BD59-A6C34878D82A}">
-                    <a16:rowId xmlns:a16="http://schemas.microsoft.com/office/drawing/2014/main" xmlns="" val="10003"/>
+                    <a16:rowId xmlns:a16="http://schemas.microsoft.com/office/drawing/2014/main" val="10003"/>
                   </a:ext>
                 </a:extLst>
               </a:tr>
@@ -28860,7 +28697,7 @@
                 </a:tc>
                 <a:extLst>
                   <a:ext uri="{0D108BD9-81ED-4DB2-BD59-A6C34878D82A}">
-                    <a16:rowId xmlns:a16="http://schemas.microsoft.com/office/drawing/2014/main" xmlns="" val="10004"/>
+                    <a16:rowId xmlns:a16="http://schemas.microsoft.com/office/drawing/2014/main" val="10004"/>
                   </a:ext>
                 </a:extLst>
               </a:tr>
@@ -29652,35 +29489,35 @@
                 <a:gridCol w="542932">
                   <a:extLst>
                     <a:ext uri="{9D8B030D-6E8A-4147-A177-3AD203B41FA5}">
-                      <a16:colId xmlns:a16="http://schemas.microsoft.com/office/drawing/2014/main" xmlns="" val="20000"/>
+                      <a16:colId xmlns:a16="http://schemas.microsoft.com/office/drawing/2014/main" val="20000"/>
                     </a:ext>
                   </a:extLst>
                 </a:gridCol>
                 <a:gridCol w="1554149">
                   <a:extLst>
                     <a:ext uri="{9D8B030D-6E8A-4147-A177-3AD203B41FA5}">
-                      <a16:colId xmlns:a16="http://schemas.microsoft.com/office/drawing/2014/main" xmlns="" val="20001"/>
+                      <a16:colId xmlns:a16="http://schemas.microsoft.com/office/drawing/2014/main" val="20001"/>
                     </a:ext>
                   </a:extLst>
                 </a:gridCol>
                 <a:gridCol w="1661332">
                   <a:extLst>
                     <a:ext uri="{9D8B030D-6E8A-4147-A177-3AD203B41FA5}">
-                      <a16:colId xmlns:a16="http://schemas.microsoft.com/office/drawing/2014/main" xmlns="" val="20002"/>
+                      <a16:colId xmlns:a16="http://schemas.microsoft.com/office/drawing/2014/main" val="20002"/>
                     </a:ext>
                   </a:extLst>
                 </a:gridCol>
                 <a:gridCol w="2492635">
                   <a:extLst>
                     <a:ext uri="{9D8B030D-6E8A-4147-A177-3AD203B41FA5}">
-                      <a16:colId xmlns:a16="http://schemas.microsoft.com/office/drawing/2014/main" xmlns="" val="20003"/>
+                      <a16:colId xmlns:a16="http://schemas.microsoft.com/office/drawing/2014/main" val="20003"/>
                     </a:ext>
                   </a:extLst>
                 </a:gridCol>
                 <a:gridCol w="2492635">
                   <a:extLst>
                     <a:ext uri="{9D8B030D-6E8A-4147-A177-3AD203B41FA5}">
-                      <a16:colId xmlns:a16="http://schemas.microsoft.com/office/drawing/2014/main" xmlns="" val="20004"/>
+                      <a16:colId xmlns:a16="http://schemas.microsoft.com/office/drawing/2014/main" val="20004"/>
                     </a:ext>
                   </a:extLst>
                 </a:gridCol>
@@ -29750,7 +29587,7 @@
                 </a:tc>
                 <a:extLst>
                   <a:ext uri="{0D108BD9-81ED-4DB2-BD59-A6C34878D82A}">
-                    <a16:rowId xmlns:a16="http://schemas.microsoft.com/office/drawing/2014/main" xmlns="" val="10000"/>
+                    <a16:rowId xmlns:a16="http://schemas.microsoft.com/office/drawing/2014/main" val="10000"/>
                   </a:ext>
                 </a:extLst>
               </a:tr>
@@ -29821,7 +29658,7 @@
                 </a:tc>
                 <a:extLst>
                   <a:ext uri="{0D108BD9-81ED-4DB2-BD59-A6C34878D82A}">
-                    <a16:rowId xmlns:a16="http://schemas.microsoft.com/office/drawing/2014/main" xmlns="" val="10001"/>
+                    <a16:rowId xmlns:a16="http://schemas.microsoft.com/office/drawing/2014/main" val="10001"/>
                   </a:ext>
                 </a:extLst>
               </a:tr>
@@ -29891,7 +29728,7 @@
                 </a:tc>
                 <a:extLst>
                   <a:ext uri="{0D108BD9-81ED-4DB2-BD59-A6C34878D82A}">
-                    <a16:rowId xmlns:a16="http://schemas.microsoft.com/office/drawing/2014/main" xmlns="" val="10002"/>
+                    <a16:rowId xmlns:a16="http://schemas.microsoft.com/office/drawing/2014/main" val="10002"/>
                   </a:ext>
                 </a:extLst>
               </a:tr>
@@ -29961,7 +29798,7 @@
                 </a:tc>
                 <a:extLst>
                   <a:ext uri="{0D108BD9-81ED-4DB2-BD59-A6C34878D82A}">
-                    <a16:rowId xmlns:a16="http://schemas.microsoft.com/office/drawing/2014/main" xmlns="" val="10003"/>
+                    <a16:rowId xmlns:a16="http://schemas.microsoft.com/office/drawing/2014/main" val="10003"/>
                   </a:ext>
                 </a:extLst>
               </a:tr>
@@ -30030,7 +29867,7 @@
                 </a:tc>
                 <a:extLst>
                   <a:ext uri="{0D108BD9-81ED-4DB2-BD59-A6C34878D82A}">
-                    <a16:rowId xmlns:a16="http://schemas.microsoft.com/office/drawing/2014/main" xmlns="" val="10004"/>
+                    <a16:rowId xmlns:a16="http://schemas.microsoft.com/office/drawing/2014/main" val="10004"/>
                   </a:ext>
                 </a:extLst>
               </a:tr>
@@ -31000,7 +30837,7 @@
   <a:extraClrSchemeLst/>
   <a:extLst>
     <a:ext uri="{05A4C25C-085E-4340-85A3-A5531E510DB2}">
-      <thm15:themeFamily xmlns:thm15="http://schemas.microsoft.com/office/thememl/2012/main" xmlns="" name="Office Theme" id="{62F939B6-93AF-4DB8-9C6B-D6C7DFDC589F}" vid="{4A3C46E8-61CC-4603-A589-7422A47A8E4A}"/>
+      <thm15:themeFamily xmlns:thm15="http://schemas.microsoft.com/office/thememl/2012/main" name="Office Theme" id="{62F939B6-93AF-4DB8-9C6B-D6C7DFDC589F}" vid="{4A3C46E8-61CC-4603-A589-7422A47A8E4A}"/>
     </a:ext>
   </a:extLst>
 </a:theme>

</xml_diff>

<commit_message>
I've created all the cases on the board
</commit_message>
<xml_diff>
--- a/DocumentacaoProjeto/Protótipo_Visual.pptx
+++ b/DocumentacaoProjeto/Protótipo_Visual.pptx
@@ -39,7 +39,10 @@
     <p:sldId id="268" r:id="rId33"/>
     <p:sldId id="287" r:id="rId34"/>
     <p:sldId id="274" r:id="rId35"/>
-    <p:sldId id="291" r:id="rId36"/>
+    <p:sldId id="297" r:id="rId36"/>
+    <p:sldId id="299" r:id="rId37"/>
+    <p:sldId id="298" r:id="rId38"/>
+    <p:sldId id="291" r:id="rId39"/>
   </p:sldIdLst>
   <p:sldSz cx="12192000" cy="6858000"/>
   <p:notesSz cx="6858000" cy="9144000"/>
@@ -286,7 +289,7 @@
           <a:p>
             <a:fld id="{ED8D6B47-35E8-4B74-A8BC-163E56BA4F07}" type="datetimeFigureOut">
               <a:rPr lang="pt-BR" smtClean="0"/>
-              <a:t>25/06/2020</a:t>
+              <a:t>28/06/2020</a:t>
             </a:fld>
             <a:endParaRPr lang="pt-BR"/>
           </a:p>
@@ -454,7 +457,7 @@
           <a:p>
             <a:fld id="{ED8D6B47-35E8-4B74-A8BC-163E56BA4F07}" type="datetimeFigureOut">
               <a:rPr lang="pt-BR" smtClean="0"/>
-              <a:t>25/06/2020</a:t>
+              <a:t>28/06/2020</a:t>
             </a:fld>
             <a:endParaRPr lang="pt-BR"/>
           </a:p>
@@ -632,7 +635,7 @@
           <a:p>
             <a:fld id="{ED8D6B47-35E8-4B74-A8BC-163E56BA4F07}" type="datetimeFigureOut">
               <a:rPr lang="pt-BR" smtClean="0"/>
-              <a:t>25/06/2020</a:t>
+              <a:t>28/06/2020</a:t>
             </a:fld>
             <a:endParaRPr lang="pt-BR"/>
           </a:p>
@@ -800,7 +803,7 @@
           <a:p>
             <a:fld id="{ED8D6B47-35E8-4B74-A8BC-163E56BA4F07}" type="datetimeFigureOut">
               <a:rPr lang="pt-BR" smtClean="0"/>
-              <a:t>25/06/2020</a:t>
+              <a:t>28/06/2020</a:t>
             </a:fld>
             <a:endParaRPr lang="pt-BR"/>
           </a:p>
@@ -1045,7 +1048,7 @@
           <a:p>
             <a:fld id="{ED8D6B47-35E8-4B74-A8BC-163E56BA4F07}" type="datetimeFigureOut">
               <a:rPr lang="pt-BR" smtClean="0"/>
-              <a:t>25/06/2020</a:t>
+              <a:t>28/06/2020</a:t>
             </a:fld>
             <a:endParaRPr lang="pt-BR"/>
           </a:p>
@@ -1274,7 +1277,7 @@
           <a:p>
             <a:fld id="{ED8D6B47-35E8-4B74-A8BC-163E56BA4F07}" type="datetimeFigureOut">
               <a:rPr lang="pt-BR" smtClean="0"/>
-              <a:t>25/06/2020</a:t>
+              <a:t>28/06/2020</a:t>
             </a:fld>
             <a:endParaRPr lang="pt-BR"/>
           </a:p>
@@ -1638,7 +1641,7 @@
           <a:p>
             <a:fld id="{ED8D6B47-35E8-4B74-A8BC-163E56BA4F07}" type="datetimeFigureOut">
               <a:rPr lang="pt-BR" smtClean="0"/>
-              <a:t>25/06/2020</a:t>
+              <a:t>28/06/2020</a:t>
             </a:fld>
             <a:endParaRPr lang="pt-BR"/>
           </a:p>
@@ -1755,7 +1758,7 @@
           <a:p>
             <a:fld id="{ED8D6B47-35E8-4B74-A8BC-163E56BA4F07}" type="datetimeFigureOut">
               <a:rPr lang="pt-BR" smtClean="0"/>
-              <a:t>25/06/2020</a:t>
+              <a:t>28/06/2020</a:t>
             </a:fld>
             <a:endParaRPr lang="pt-BR"/>
           </a:p>
@@ -1850,7 +1853,7 @@
           <a:p>
             <a:fld id="{ED8D6B47-35E8-4B74-A8BC-163E56BA4F07}" type="datetimeFigureOut">
               <a:rPr lang="pt-BR" smtClean="0"/>
-              <a:t>25/06/2020</a:t>
+              <a:t>28/06/2020</a:t>
             </a:fld>
             <a:endParaRPr lang="pt-BR"/>
           </a:p>
@@ -2125,7 +2128,7 @@
           <a:p>
             <a:fld id="{ED8D6B47-35E8-4B74-A8BC-163E56BA4F07}" type="datetimeFigureOut">
               <a:rPr lang="pt-BR" smtClean="0"/>
-              <a:t>25/06/2020</a:t>
+              <a:t>28/06/2020</a:t>
             </a:fld>
             <a:endParaRPr lang="pt-BR"/>
           </a:p>
@@ -2377,7 +2380,7 @@
           <a:p>
             <a:fld id="{ED8D6B47-35E8-4B74-A8BC-163E56BA4F07}" type="datetimeFigureOut">
               <a:rPr lang="pt-BR" smtClean="0"/>
-              <a:t>25/06/2020</a:t>
+              <a:t>28/06/2020</a:t>
             </a:fld>
             <a:endParaRPr lang="pt-BR"/>
           </a:p>
@@ -2588,7 +2591,7 @@
           <a:p>
             <a:fld id="{ED8D6B47-35E8-4B74-A8BC-163E56BA4F07}" type="datetimeFigureOut">
               <a:rPr lang="pt-BR" smtClean="0"/>
-              <a:t>25/06/2020</a:t>
+              <a:t>28/06/2020</a:t>
             </a:fld>
             <a:endParaRPr lang="pt-BR"/>
           </a:p>
@@ -3531,35 +3534,35 @@
                 <a:gridCol w="574120">
                   <a:extLst>
                     <a:ext uri="{9D8B030D-6E8A-4147-A177-3AD203B41FA5}">
-                      <a16:colId xmlns:a16="http://schemas.microsoft.com/office/drawing/2014/main" val="20000"/>
+                      <a16:colId xmlns:a16="http://schemas.microsoft.com/office/drawing/2014/main" xmlns="" val="20000"/>
                     </a:ext>
                   </a:extLst>
                 </a:gridCol>
                 <a:gridCol w="1643427">
                   <a:extLst>
                     <a:ext uri="{9D8B030D-6E8A-4147-A177-3AD203B41FA5}">
-                      <a16:colId xmlns:a16="http://schemas.microsoft.com/office/drawing/2014/main" val="20001"/>
+                      <a16:colId xmlns:a16="http://schemas.microsoft.com/office/drawing/2014/main" xmlns="" val="20001"/>
                     </a:ext>
                   </a:extLst>
                 </a:gridCol>
                 <a:gridCol w="1756766">
                   <a:extLst>
                     <a:ext uri="{9D8B030D-6E8A-4147-A177-3AD203B41FA5}">
-                      <a16:colId xmlns:a16="http://schemas.microsoft.com/office/drawing/2014/main" val="20002"/>
+                      <a16:colId xmlns:a16="http://schemas.microsoft.com/office/drawing/2014/main" xmlns="" val="20002"/>
                     </a:ext>
                   </a:extLst>
                 </a:gridCol>
                 <a:gridCol w="2635823">
                   <a:extLst>
                     <a:ext uri="{9D8B030D-6E8A-4147-A177-3AD203B41FA5}">
-                      <a16:colId xmlns:a16="http://schemas.microsoft.com/office/drawing/2014/main" val="20003"/>
+                      <a16:colId xmlns:a16="http://schemas.microsoft.com/office/drawing/2014/main" xmlns="" val="20003"/>
                     </a:ext>
                   </a:extLst>
                 </a:gridCol>
                 <a:gridCol w="2635823">
                   <a:extLst>
                     <a:ext uri="{9D8B030D-6E8A-4147-A177-3AD203B41FA5}">
-                      <a16:colId xmlns:a16="http://schemas.microsoft.com/office/drawing/2014/main" val="20004"/>
+                      <a16:colId xmlns:a16="http://schemas.microsoft.com/office/drawing/2014/main" xmlns="" val="20004"/>
                     </a:ext>
                   </a:extLst>
                 </a:gridCol>
@@ -3629,7 +3632,7 @@
                 </a:tc>
                 <a:extLst>
                   <a:ext uri="{0D108BD9-81ED-4DB2-BD59-A6C34878D82A}">
-                    <a16:rowId xmlns:a16="http://schemas.microsoft.com/office/drawing/2014/main" val="10000"/>
+                    <a16:rowId xmlns:a16="http://schemas.microsoft.com/office/drawing/2014/main" xmlns="" val="10000"/>
                   </a:ext>
                 </a:extLst>
               </a:tr>
@@ -3698,7 +3701,7 @@
                 </a:tc>
                 <a:extLst>
                   <a:ext uri="{0D108BD9-81ED-4DB2-BD59-A6C34878D82A}">
-                    <a16:rowId xmlns:a16="http://schemas.microsoft.com/office/drawing/2014/main" val="10001"/>
+                    <a16:rowId xmlns:a16="http://schemas.microsoft.com/office/drawing/2014/main" xmlns="" val="10001"/>
                   </a:ext>
                 </a:extLst>
               </a:tr>
@@ -3792,7 +3795,7 @@
                 </a:tc>
                 <a:extLst>
                   <a:ext uri="{0D108BD9-81ED-4DB2-BD59-A6C34878D82A}">
-                    <a16:rowId xmlns:a16="http://schemas.microsoft.com/office/drawing/2014/main" val="10002"/>
+                    <a16:rowId xmlns:a16="http://schemas.microsoft.com/office/drawing/2014/main" xmlns="" val="10002"/>
                   </a:ext>
                 </a:extLst>
               </a:tr>
@@ -3881,7 +3884,7 @@
                 </a:tc>
                 <a:extLst>
                   <a:ext uri="{0D108BD9-81ED-4DB2-BD59-A6C34878D82A}">
-                    <a16:rowId xmlns:a16="http://schemas.microsoft.com/office/drawing/2014/main" val="10003"/>
+                    <a16:rowId xmlns:a16="http://schemas.microsoft.com/office/drawing/2014/main" xmlns="" val="10003"/>
                   </a:ext>
                 </a:extLst>
               </a:tr>
@@ -3970,7 +3973,7 @@
                 </a:tc>
                 <a:extLst>
                   <a:ext uri="{0D108BD9-81ED-4DB2-BD59-A6C34878D82A}">
-                    <a16:rowId xmlns:a16="http://schemas.microsoft.com/office/drawing/2014/main" val="10004"/>
+                    <a16:rowId xmlns:a16="http://schemas.microsoft.com/office/drawing/2014/main" xmlns="" val="10004"/>
                   </a:ext>
                 </a:extLst>
               </a:tr>
@@ -4056,7 +4059,7 @@
                 </a:tc>
                 <a:extLst>
                   <a:ext uri="{0D108BD9-81ED-4DB2-BD59-A6C34878D82A}">
-                    <a16:rowId xmlns:a16="http://schemas.microsoft.com/office/drawing/2014/main" val="10005"/>
+                    <a16:rowId xmlns:a16="http://schemas.microsoft.com/office/drawing/2014/main" xmlns="" val="10005"/>
                   </a:ext>
                 </a:extLst>
               </a:tr>
@@ -4139,7 +4142,7 @@
                 </a:tc>
                 <a:extLst>
                   <a:ext uri="{0D108BD9-81ED-4DB2-BD59-A6C34878D82A}">
-                    <a16:rowId xmlns:a16="http://schemas.microsoft.com/office/drawing/2014/main" val="10006"/>
+                    <a16:rowId xmlns:a16="http://schemas.microsoft.com/office/drawing/2014/main" xmlns="" val="10006"/>
                   </a:ext>
                 </a:extLst>
               </a:tr>
@@ -4998,35 +5001,35 @@
                 <a:gridCol w="490951">
                   <a:extLst>
                     <a:ext uri="{9D8B030D-6E8A-4147-A177-3AD203B41FA5}">
-                      <a16:colId xmlns:a16="http://schemas.microsoft.com/office/drawing/2014/main" val="20000"/>
+                      <a16:colId xmlns:a16="http://schemas.microsoft.com/office/drawing/2014/main" xmlns="" val="20000"/>
                     </a:ext>
                   </a:extLst>
                 </a:gridCol>
                 <a:gridCol w="1405354">
                   <a:extLst>
                     <a:ext uri="{9D8B030D-6E8A-4147-A177-3AD203B41FA5}">
-                      <a16:colId xmlns:a16="http://schemas.microsoft.com/office/drawing/2014/main" val="20001"/>
+                      <a16:colId xmlns:a16="http://schemas.microsoft.com/office/drawing/2014/main" xmlns="" val="20001"/>
                     </a:ext>
                   </a:extLst>
                 </a:gridCol>
                 <a:gridCol w="1502275">
                   <a:extLst>
                     <a:ext uri="{9D8B030D-6E8A-4147-A177-3AD203B41FA5}">
-                      <a16:colId xmlns:a16="http://schemas.microsoft.com/office/drawing/2014/main" val="20002"/>
+                      <a16:colId xmlns:a16="http://schemas.microsoft.com/office/drawing/2014/main" xmlns="" val="20002"/>
                     </a:ext>
                   </a:extLst>
                 </a:gridCol>
                 <a:gridCol w="2253988">
                   <a:extLst>
                     <a:ext uri="{9D8B030D-6E8A-4147-A177-3AD203B41FA5}">
-                      <a16:colId xmlns:a16="http://schemas.microsoft.com/office/drawing/2014/main" val="20003"/>
+                      <a16:colId xmlns:a16="http://schemas.microsoft.com/office/drawing/2014/main" xmlns="" val="20003"/>
                     </a:ext>
                   </a:extLst>
                 </a:gridCol>
                 <a:gridCol w="2253988">
                   <a:extLst>
                     <a:ext uri="{9D8B030D-6E8A-4147-A177-3AD203B41FA5}">
-                      <a16:colId xmlns:a16="http://schemas.microsoft.com/office/drawing/2014/main" val="20004"/>
+                      <a16:colId xmlns:a16="http://schemas.microsoft.com/office/drawing/2014/main" xmlns="" val="20004"/>
                     </a:ext>
                   </a:extLst>
                 </a:gridCol>
@@ -5096,7 +5099,7 @@
                 </a:tc>
                 <a:extLst>
                   <a:ext uri="{0D108BD9-81ED-4DB2-BD59-A6C34878D82A}">
-                    <a16:rowId xmlns:a16="http://schemas.microsoft.com/office/drawing/2014/main" val="10000"/>
+                    <a16:rowId xmlns:a16="http://schemas.microsoft.com/office/drawing/2014/main" xmlns="" val="10000"/>
                   </a:ext>
                 </a:extLst>
               </a:tr>
@@ -5170,7 +5173,7 @@
                 </a:tc>
                 <a:extLst>
                   <a:ext uri="{0D108BD9-81ED-4DB2-BD59-A6C34878D82A}">
-                    <a16:rowId xmlns:a16="http://schemas.microsoft.com/office/drawing/2014/main" val="10001"/>
+                    <a16:rowId xmlns:a16="http://schemas.microsoft.com/office/drawing/2014/main" xmlns="" val="10001"/>
                   </a:ext>
                 </a:extLst>
               </a:tr>
@@ -5244,7 +5247,7 @@
                 </a:tc>
                 <a:extLst>
                   <a:ext uri="{0D108BD9-81ED-4DB2-BD59-A6C34878D82A}">
-                    <a16:rowId xmlns:a16="http://schemas.microsoft.com/office/drawing/2014/main" val="10002"/>
+                    <a16:rowId xmlns:a16="http://schemas.microsoft.com/office/drawing/2014/main" xmlns="" val="10002"/>
                   </a:ext>
                 </a:extLst>
               </a:tr>
@@ -5313,7 +5316,7 @@
                 </a:tc>
                 <a:extLst>
                   <a:ext uri="{0D108BD9-81ED-4DB2-BD59-A6C34878D82A}">
-                    <a16:rowId xmlns:a16="http://schemas.microsoft.com/office/drawing/2014/main" val="10003"/>
+                    <a16:rowId xmlns:a16="http://schemas.microsoft.com/office/drawing/2014/main" xmlns="" val="10003"/>
                   </a:ext>
                 </a:extLst>
               </a:tr>
@@ -5387,7 +5390,7 @@
                 </a:tc>
                 <a:extLst>
                   <a:ext uri="{0D108BD9-81ED-4DB2-BD59-A6C34878D82A}">
-                    <a16:rowId xmlns:a16="http://schemas.microsoft.com/office/drawing/2014/main" val="10004"/>
+                    <a16:rowId xmlns:a16="http://schemas.microsoft.com/office/drawing/2014/main" xmlns="" val="10004"/>
                   </a:ext>
                 </a:extLst>
               </a:tr>
@@ -5473,7 +5476,7 @@
                 </a:tc>
                 <a:extLst>
                   <a:ext uri="{0D108BD9-81ED-4DB2-BD59-A6C34878D82A}">
-                    <a16:rowId xmlns:a16="http://schemas.microsoft.com/office/drawing/2014/main" val="10005"/>
+                    <a16:rowId xmlns:a16="http://schemas.microsoft.com/office/drawing/2014/main" xmlns="" val="10005"/>
                   </a:ext>
                 </a:extLst>
               </a:tr>
@@ -5559,7 +5562,7 @@
                 </a:tc>
                 <a:extLst>
                   <a:ext uri="{0D108BD9-81ED-4DB2-BD59-A6C34878D82A}">
-                    <a16:rowId xmlns:a16="http://schemas.microsoft.com/office/drawing/2014/main" val="10006"/>
+                    <a16:rowId xmlns:a16="http://schemas.microsoft.com/office/drawing/2014/main" xmlns="" val="10006"/>
                   </a:ext>
                 </a:extLst>
               </a:tr>
@@ -6637,35 +6640,35 @@
                 <a:gridCol w="546130">
                   <a:extLst>
                     <a:ext uri="{9D8B030D-6E8A-4147-A177-3AD203B41FA5}">
-                      <a16:colId xmlns:a16="http://schemas.microsoft.com/office/drawing/2014/main" val="20000"/>
+                      <a16:colId xmlns:a16="http://schemas.microsoft.com/office/drawing/2014/main" xmlns="" val="20000"/>
                     </a:ext>
                   </a:extLst>
                 </a:gridCol>
                 <a:gridCol w="1563306">
                   <a:extLst>
                     <a:ext uri="{9D8B030D-6E8A-4147-A177-3AD203B41FA5}">
-                      <a16:colId xmlns:a16="http://schemas.microsoft.com/office/drawing/2014/main" val="20001"/>
+                      <a16:colId xmlns:a16="http://schemas.microsoft.com/office/drawing/2014/main" xmlns="" val="20001"/>
                     </a:ext>
                   </a:extLst>
                 </a:gridCol>
                 <a:gridCol w="1671120">
                   <a:extLst>
                     <a:ext uri="{9D8B030D-6E8A-4147-A177-3AD203B41FA5}">
-                      <a16:colId xmlns:a16="http://schemas.microsoft.com/office/drawing/2014/main" val="20002"/>
+                      <a16:colId xmlns:a16="http://schemas.microsoft.com/office/drawing/2014/main" xmlns="" val="20002"/>
                     </a:ext>
                   </a:extLst>
                 </a:gridCol>
                 <a:gridCol w="2507320">
                   <a:extLst>
                     <a:ext uri="{9D8B030D-6E8A-4147-A177-3AD203B41FA5}">
-                      <a16:colId xmlns:a16="http://schemas.microsoft.com/office/drawing/2014/main" val="20003"/>
+                      <a16:colId xmlns:a16="http://schemas.microsoft.com/office/drawing/2014/main" xmlns="" val="20003"/>
                     </a:ext>
                   </a:extLst>
                 </a:gridCol>
                 <a:gridCol w="2507320">
                   <a:extLst>
                     <a:ext uri="{9D8B030D-6E8A-4147-A177-3AD203B41FA5}">
-                      <a16:colId xmlns:a16="http://schemas.microsoft.com/office/drawing/2014/main" val="20004"/>
+                      <a16:colId xmlns:a16="http://schemas.microsoft.com/office/drawing/2014/main" xmlns="" val="20004"/>
                     </a:ext>
                   </a:extLst>
                 </a:gridCol>
@@ -6735,7 +6738,7 @@
                 </a:tc>
                 <a:extLst>
                   <a:ext uri="{0D108BD9-81ED-4DB2-BD59-A6C34878D82A}">
-                    <a16:rowId xmlns:a16="http://schemas.microsoft.com/office/drawing/2014/main" val="10000"/>
+                    <a16:rowId xmlns:a16="http://schemas.microsoft.com/office/drawing/2014/main" xmlns="" val="10000"/>
                   </a:ext>
                 </a:extLst>
               </a:tr>
@@ -6805,7 +6808,7 @@
                 </a:tc>
                 <a:extLst>
                   <a:ext uri="{0D108BD9-81ED-4DB2-BD59-A6C34878D82A}">
-                    <a16:rowId xmlns:a16="http://schemas.microsoft.com/office/drawing/2014/main" val="10001"/>
+                    <a16:rowId xmlns:a16="http://schemas.microsoft.com/office/drawing/2014/main" xmlns="" val="10001"/>
                   </a:ext>
                 </a:extLst>
               </a:tr>
@@ -6874,7 +6877,7 @@
                 </a:tc>
                 <a:extLst>
                   <a:ext uri="{0D108BD9-81ED-4DB2-BD59-A6C34878D82A}">
-                    <a16:rowId xmlns:a16="http://schemas.microsoft.com/office/drawing/2014/main" val="10002"/>
+                    <a16:rowId xmlns:a16="http://schemas.microsoft.com/office/drawing/2014/main" xmlns="" val="10002"/>
                   </a:ext>
                 </a:extLst>
               </a:tr>
@@ -7923,35 +7926,35 @@
                 <a:gridCol w="559725">
                   <a:extLst>
                     <a:ext uri="{9D8B030D-6E8A-4147-A177-3AD203B41FA5}">
-                      <a16:colId xmlns:a16="http://schemas.microsoft.com/office/drawing/2014/main" val="20000"/>
+                      <a16:colId xmlns:a16="http://schemas.microsoft.com/office/drawing/2014/main" xmlns="" val="20000"/>
                     </a:ext>
                   </a:extLst>
                 </a:gridCol>
                 <a:gridCol w="1602222">
                   <a:extLst>
                     <a:ext uri="{9D8B030D-6E8A-4147-A177-3AD203B41FA5}">
-                      <a16:colId xmlns:a16="http://schemas.microsoft.com/office/drawing/2014/main" val="20001"/>
+                      <a16:colId xmlns:a16="http://schemas.microsoft.com/office/drawing/2014/main" xmlns="" val="20001"/>
                     </a:ext>
                   </a:extLst>
                 </a:gridCol>
                 <a:gridCol w="1712720">
                   <a:extLst>
                     <a:ext uri="{9D8B030D-6E8A-4147-A177-3AD203B41FA5}">
-                      <a16:colId xmlns:a16="http://schemas.microsoft.com/office/drawing/2014/main" val="20002"/>
+                      <a16:colId xmlns:a16="http://schemas.microsoft.com/office/drawing/2014/main" xmlns="" val="20002"/>
                     </a:ext>
                   </a:extLst>
                 </a:gridCol>
                 <a:gridCol w="2569736">
                   <a:extLst>
                     <a:ext uri="{9D8B030D-6E8A-4147-A177-3AD203B41FA5}">
-                      <a16:colId xmlns:a16="http://schemas.microsoft.com/office/drawing/2014/main" val="20003"/>
+                      <a16:colId xmlns:a16="http://schemas.microsoft.com/office/drawing/2014/main" xmlns="" val="20003"/>
                     </a:ext>
                   </a:extLst>
                 </a:gridCol>
                 <a:gridCol w="2569736">
                   <a:extLst>
                     <a:ext uri="{9D8B030D-6E8A-4147-A177-3AD203B41FA5}">
-                      <a16:colId xmlns:a16="http://schemas.microsoft.com/office/drawing/2014/main" val="20004"/>
+                      <a16:colId xmlns:a16="http://schemas.microsoft.com/office/drawing/2014/main" xmlns="" val="20004"/>
                     </a:ext>
                   </a:extLst>
                 </a:gridCol>
@@ -8021,7 +8024,7 @@
                 </a:tc>
                 <a:extLst>
                   <a:ext uri="{0D108BD9-81ED-4DB2-BD59-A6C34878D82A}">
-                    <a16:rowId xmlns:a16="http://schemas.microsoft.com/office/drawing/2014/main" val="10000"/>
+                    <a16:rowId xmlns:a16="http://schemas.microsoft.com/office/drawing/2014/main" xmlns="" val="10000"/>
                   </a:ext>
                 </a:extLst>
               </a:tr>
@@ -8090,7 +8093,7 @@
                 </a:tc>
                 <a:extLst>
                   <a:ext uri="{0D108BD9-81ED-4DB2-BD59-A6C34878D82A}">
-                    <a16:rowId xmlns:a16="http://schemas.microsoft.com/office/drawing/2014/main" val="10001"/>
+                    <a16:rowId xmlns:a16="http://schemas.microsoft.com/office/drawing/2014/main" xmlns="" val="10001"/>
                   </a:ext>
                 </a:extLst>
               </a:tr>
@@ -8179,7 +8182,7 @@
                 </a:tc>
                 <a:extLst>
                   <a:ext uri="{0D108BD9-81ED-4DB2-BD59-A6C34878D82A}">
-                    <a16:rowId xmlns:a16="http://schemas.microsoft.com/office/drawing/2014/main" val="10002"/>
+                    <a16:rowId xmlns:a16="http://schemas.microsoft.com/office/drawing/2014/main" xmlns="" val="10002"/>
                   </a:ext>
                 </a:extLst>
               </a:tr>
@@ -8268,7 +8271,7 @@
                 </a:tc>
                 <a:extLst>
                   <a:ext uri="{0D108BD9-81ED-4DB2-BD59-A6C34878D82A}">
-                    <a16:rowId xmlns:a16="http://schemas.microsoft.com/office/drawing/2014/main" val="10003"/>
+                    <a16:rowId xmlns:a16="http://schemas.microsoft.com/office/drawing/2014/main" xmlns="" val="10003"/>
                   </a:ext>
                 </a:extLst>
               </a:tr>
@@ -9612,35 +9615,35 @@
                 <a:gridCol w="490951">
                   <a:extLst>
                     <a:ext uri="{9D8B030D-6E8A-4147-A177-3AD203B41FA5}">
-                      <a16:colId xmlns:a16="http://schemas.microsoft.com/office/drawing/2014/main" val="20000"/>
+                      <a16:colId xmlns:a16="http://schemas.microsoft.com/office/drawing/2014/main" xmlns="" val="20000"/>
                     </a:ext>
                   </a:extLst>
                 </a:gridCol>
                 <a:gridCol w="1405354">
                   <a:extLst>
                     <a:ext uri="{9D8B030D-6E8A-4147-A177-3AD203B41FA5}">
-                      <a16:colId xmlns:a16="http://schemas.microsoft.com/office/drawing/2014/main" val="20001"/>
+                      <a16:colId xmlns:a16="http://schemas.microsoft.com/office/drawing/2014/main" xmlns="" val="20001"/>
                     </a:ext>
                   </a:extLst>
                 </a:gridCol>
                 <a:gridCol w="1502275">
                   <a:extLst>
                     <a:ext uri="{9D8B030D-6E8A-4147-A177-3AD203B41FA5}">
-                      <a16:colId xmlns:a16="http://schemas.microsoft.com/office/drawing/2014/main" val="20002"/>
+                      <a16:colId xmlns:a16="http://schemas.microsoft.com/office/drawing/2014/main" xmlns="" val="20002"/>
                     </a:ext>
                   </a:extLst>
                 </a:gridCol>
                 <a:gridCol w="2253988">
                   <a:extLst>
                     <a:ext uri="{9D8B030D-6E8A-4147-A177-3AD203B41FA5}">
-                      <a16:colId xmlns:a16="http://schemas.microsoft.com/office/drawing/2014/main" val="20003"/>
+                      <a16:colId xmlns:a16="http://schemas.microsoft.com/office/drawing/2014/main" xmlns="" val="20003"/>
                     </a:ext>
                   </a:extLst>
                 </a:gridCol>
                 <a:gridCol w="2253988">
                   <a:extLst>
                     <a:ext uri="{9D8B030D-6E8A-4147-A177-3AD203B41FA5}">
-                      <a16:colId xmlns:a16="http://schemas.microsoft.com/office/drawing/2014/main" val="20004"/>
+                      <a16:colId xmlns:a16="http://schemas.microsoft.com/office/drawing/2014/main" xmlns="" val="20004"/>
                     </a:ext>
                   </a:extLst>
                 </a:gridCol>
@@ -9710,7 +9713,7 @@
                 </a:tc>
                 <a:extLst>
                   <a:ext uri="{0D108BD9-81ED-4DB2-BD59-A6C34878D82A}">
-                    <a16:rowId xmlns:a16="http://schemas.microsoft.com/office/drawing/2014/main" val="10000"/>
+                    <a16:rowId xmlns:a16="http://schemas.microsoft.com/office/drawing/2014/main" xmlns="" val="10000"/>
                   </a:ext>
                 </a:extLst>
               </a:tr>
@@ -9784,7 +9787,7 @@
                 </a:tc>
                 <a:extLst>
                   <a:ext uri="{0D108BD9-81ED-4DB2-BD59-A6C34878D82A}">
-                    <a16:rowId xmlns:a16="http://schemas.microsoft.com/office/drawing/2014/main" val="10001"/>
+                    <a16:rowId xmlns:a16="http://schemas.microsoft.com/office/drawing/2014/main" xmlns="" val="10001"/>
                   </a:ext>
                 </a:extLst>
               </a:tr>
@@ -9853,7 +9856,7 @@
                 </a:tc>
                 <a:extLst>
                   <a:ext uri="{0D108BD9-81ED-4DB2-BD59-A6C34878D82A}">
-                    <a16:rowId xmlns:a16="http://schemas.microsoft.com/office/drawing/2014/main" val="10002"/>
+                    <a16:rowId xmlns:a16="http://schemas.microsoft.com/office/drawing/2014/main" xmlns="" val="10002"/>
                   </a:ext>
                 </a:extLst>
               </a:tr>
@@ -9922,7 +9925,7 @@
                 </a:tc>
                 <a:extLst>
                   <a:ext uri="{0D108BD9-81ED-4DB2-BD59-A6C34878D82A}">
-                    <a16:rowId xmlns:a16="http://schemas.microsoft.com/office/drawing/2014/main" val="10003"/>
+                    <a16:rowId xmlns:a16="http://schemas.microsoft.com/office/drawing/2014/main" xmlns="" val="10003"/>
                   </a:ext>
                 </a:extLst>
               </a:tr>
@@ -11306,7 +11309,7 @@
         </p:nvSpPr>
         <p:spPr>
           <a:xfrm>
-            <a:off x="6901711" y="5766259"/>
+            <a:off x="6901711" y="5484284"/>
             <a:ext cx="1235388" cy="378657"/>
           </a:xfrm>
           <a:prstGeom prst="rect">
@@ -11607,79 +11610,6 @@
           <a:p>
             <a:pPr algn="ctr"/>
             <a:endParaRPr lang="pt-BR"/>
-          </a:p>
-        </p:txBody>
-      </p:sp>
-      <p:sp>
-        <p:nvSpPr>
-          <p:cNvPr id="52" name="Retângulo de cantos arredondados 51"/>
-          <p:cNvSpPr/>
-          <p:nvPr/>
-        </p:nvSpPr>
-        <p:spPr>
-          <a:xfrm>
-            <a:off x="3322893" y="5647474"/>
-            <a:ext cx="711498" cy="367158"/>
-          </a:xfrm>
-          <a:prstGeom prst="roundRect">
-            <a:avLst/>
-          </a:prstGeom>
-          <a:noFill/>
-        </p:spPr>
-        <p:style>
-          <a:lnRef idx="2">
-            <a:schemeClr val="accent6"/>
-          </a:lnRef>
-          <a:fillRef idx="1">
-            <a:schemeClr val="lt1"/>
-          </a:fillRef>
-          <a:effectRef idx="0">
-            <a:schemeClr val="accent6"/>
-          </a:effectRef>
-          <a:fontRef idx="minor">
-            <a:schemeClr val="dk1"/>
-          </a:fontRef>
-        </p:style>
-        <p:txBody>
-          <a:bodyPr rtlCol="0" anchor="ctr"/>
-          <a:lstStyle/>
-          <a:p>
-            <a:pPr algn="ctr"/>
-            <a:endParaRPr lang="pt-BR"/>
-          </a:p>
-        </p:txBody>
-      </p:sp>
-      <p:sp>
-        <p:nvSpPr>
-          <p:cNvPr id="53" name="CaixaDeTexto 52"/>
-          <p:cNvSpPr txBox="1"/>
-          <p:nvPr/>
-        </p:nvSpPr>
-        <p:spPr>
-          <a:xfrm>
-            <a:off x="2894373" y="5323813"/>
-            <a:ext cx="4578359" cy="338554"/>
-          </a:xfrm>
-          <a:prstGeom prst="rect">
-            <a:avLst/>
-          </a:prstGeom>
-          <a:noFill/>
-        </p:spPr>
-        <p:txBody>
-          <a:bodyPr wrap="square" rtlCol="0">
-            <a:spAutoFit/>
-          </a:bodyPr>
-          <a:lstStyle/>
-          <a:p>
-            <a:r>
-              <a:rPr lang="pt-BR" sz="1600" dirty="0">
-                <a:solidFill>
-                  <a:srgbClr val="447E43"/>
-                </a:solidFill>
-                <a:latin typeface="Bahnschrift" panose="020B0502040204020203" pitchFamily="34" charset="0"/>
-              </a:rPr>
-              <a:t>Nº alternativa correta</a:t>
-            </a:r>
           </a:p>
         </p:txBody>
       </p:sp>
@@ -11766,35 +11696,35 @@
                 <a:gridCol w="490951">
                   <a:extLst>
                     <a:ext uri="{9D8B030D-6E8A-4147-A177-3AD203B41FA5}">
-                      <a16:colId xmlns:a16="http://schemas.microsoft.com/office/drawing/2014/main" val="20000"/>
+                      <a16:colId xmlns:a16="http://schemas.microsoft.com/office/drawing/2014/main" xmlns="" val="20000"/>
                     </a:ext>
                   </a:extLst>
                 </a:gridCol>
                 <a:gridCol w="1405354">
                   <a:extLst>
                     <a:ext uri="{9D8B030D-6E8A-4147-A177-3AD203B41FA5}">
-                      <a16:colId xmlns:a16="http://schemas.microsoft.com/office/drawing/2014/main" val="20001"/>
+                      <a16:colId xmlns:a16="http://schemas.microsoft.com/office/drawing/2014/main" xmlns="" val="20001"/>
                     </a:ext>
                   </a:extLst>
                 </a:gridCol>
                 <a:gridCol w="1502275">
                   <a:extLst>
                     <a:ext uri="{9D8B030D-6E8A-4147-A177-3AD203B41FA5}">
-                      <a16:colId xmlns:a16="http://schemas.microsoft.com/office/drawing/2014/main" val="20002"/>
+                      <a16:colId xmlns:a16="http://schemas.microsoft.com/office/drawing/2014/main" xmlns="" val="20002"/>
                     </a:ext>
                   </a:extLst>
                 </a:gridCol>
                 <a:gridCol w="2253988">
                   <a:extLst>
                     <a:ext uri="{9D8B030D-6E8A-4147-A177-3AD203B41FA5}">
-                      <a16:colId xmlns:a16="http://schemas.microsoft.com/office/drawing/2014/main" val="20003"/>
+                      <a16:colId xmlns:a16="http://schemas.microsoft.com/office/drawing/2014/main" xmlns="" val="20003"/>
                     </a:ext>
                   </a:extLst>
                 </a:gridCol>
                 <a:gridCol w="2253988">
                   <a:extLst>
                     <a:ext uri="{9D8B030D-6E8A-4147-A177-3AD203B41FA5}">
-                      <a16:colId xmlns:a16="http://schemas.microsoft.com/office/drawing/2014/main" val="20004"/>
+                      <a16:colId xmlns:a16="http://schemas.microsoft.com/office/drawing/2014/main" xmlns="" val="20004"/>
                     </a:ext>
                   </a:extLst>
                 </a:gridCol>
@@ -11864,7 +11794,7 @@
                 </a:tc>
                 <a:extLst>
                   <a:ext uri="{0D108BD9-81ED-4DB2-BD59-A6C34878D82A}">
-                    <a16:rowId xmlns:a16="http://schemas.microsoft.com/office/drawing/2014/main" val="10000"/>
+                    <a16:rowId xmlns:a16="http://schemas.microsoft.com/office/drawing/2014/main" xmlns="" val="10000"/>
                   </a:ext>
                 </a:extLst>
               </a:tr>
@@ -11946,7 +11876,7 @@
                 </a:tc>
                 <a:extLst>
                   <a:ext uri="{0D108BD9-81ED-4DB2-BD59-A6C34878D82A}">
-                    <a16:rowId xmlns:a16="http://schemas.microsoft.com/office/drawing/2014/main" val="10001"/>
+                    <a16:rowId xmlns:a16="http://schemas.microsoft.com/office/drawing/2014/main" xmlns="" val="10001"/>
                   </a:ext>
                 </a:extLst>
               </a:tr>
@@ -12045,7 +11975,7 @@
                 </a:tc>
                 <a:extLst>
                   <a:ext uri="{0D108BD9-81ED-4DB2-BD59-A6C34878D82A}">
-                    <a16:rowId xmlns:a16="http://schemas.microsoft.com/office/drawing/2014/main" val="10002"/>
+                    <a16:rowId xmlns:a16="http://schemas.microsoft.com/office/drawing/2014/main" xmlns="" val="10002"/>
                   </a:ext>
                 </a:extLst>
               </a:tr>
@@ -12136,35 +12066,35 @@
                 <a:gridCol w="536534">
                   <a:extLst>
                     <a:ext uri="{9D8B030D-6E8A-4147-A177-3AD203B41FA5}">
-                      <a16:colId xmlns:a16="http://schemas.microsoft.com/office/drawing/2014/main" val="20000"/>
+                      <a16:colId xmlns:a16="http://schemas.microsoft.com/office/drawing/2014/main" xmlns="" val="20000"/>
                     </a:ext>
                   </a:extLst>
                 </a:gridCol>
                 <a:gridCol w="1535836">
                   <a:extLst>
                     <a:ext uri="{9D8B030D-6E8A-4147-A177-3AD203B41FA5}">
-                      <a16:colId xmlns:a16="http://schemas.microsoft.com/office/drawing/2014/main" val="20001"/>
+                      <a16:colId xmlns:a16="http://schemas.microsoft.com/office/drawing/2014/main" xmlns="" val="20001"/>
                     </a:ext>
                   </a:extLst>
                 </a:gridCol>
                 <a:gridCol w="1641756">
                   <a:extLst>
                     <a:ext uri="{9D8B030D-6E8A-4147-A177-3AD203B41FA5}">
-                      <a16:colId xmlns:a16="http://schemas.microsoft.com/office/drawing/2014/main" val="20002"/>
+                      <a16:colId xmlns:a16="http://schemas.microsoft.com/office/drawing/2014/main" xmlns="" val="20002"/>
                     </a:ext>
                   </a:extLst>
                 </a:gridCol>
                 <a:gridCol w="2463263">
                   <a:extLst>
                     <a:ext uri="{9D8B030D-6E8A-4147-A177-3AD203B41FA5}">
-                      <a16:colId xmlns:a16="http://schemas.microsoft.com/office/drawing/2014/main" val="20003"/>
+                      <a16:colId xmlns:a16="http://schemas.microsoft.com/office/drawing/2014/main" xmlns="" val="20003"/>
                     </a:ext>
                   </a:extLst>
                 </a:gridCol>
                 <a:gridCol w="2463263">
                   <a:extLst>
                     <a:ext uri="{9D8B030D-6E8A-4147-A177-3AD203B41FA5}">
-                      <a16:colId xmlns:a16="http://schemas.microsoft.com/office/drawing/2014/main" val="20004"/>
+                      <a16:colId xmlns:a16="http://schemas.microsoft.com/office/drawing/2014/main" xmlns="" val="20004"/>
                     </a:ext>
                   </a:extLst>
                 </a:gridCol>
@@ -12234,7 +12164,7 @@
                 </a:tc>
                 <a:extLst>
                   <a:ext uri="{0D108BD9-81ED-4DB2-BD59-A6C34878D82A}">
-                    <a16:rowId xmlns:a16="http://schemas.microsoft.com/office/drawing/2014/main" val="10000"/>
+                    <a16:rowId xmlns:a16="http://schemas.microsoft.com/office/drawing/2014/main" xmlns="" val="10000"/>
                   </a:ext>
                 </a:extLst>
               </a:tr>
@@ -12304,7 +12234,7 @@
                 </a:tc>
                 <a:extLst>
                   <a:ext uri="{0D108BD9-81ED-4DB2-BD59-A6C34878D82A}">
-                    <a16:rowId xmlns:a16="http://schemas.microsoft.com/office/drawing/2014/main" val="10001"/>
+                    <a16:rowId xmlns:a16="http://schemas.microsoft.com/office/drawing/2014/main" xmlns="" val="10001"/>
                   </a:ext>
                 </a:extLst>
               </a:tr>
@@ -12374,7 +12304,7 @@
                 </a:tc>
                 <a:extLst>
                   <a:ext uri="{0D108BD9-81ED-4DB2-BD59-A6C34878D82A}">
-                    <a16:rowId xmlns:a16="http://schemas.microsoft.com/office/drawing/2014/main" val="10002"/>
+                    <a16:rowId xmlns:a16="http://schemas.microsoft.com/office/drawing/2014/main" xmlns="" val="10002"/>
                   </a:ext>
                 </a:extLst>
               </a:tr>
@@ -12449,7 +12379,7 @@
                 </a:tc>
                 <a:extLst>
                   <a:ext uri="{0D108BD9-81ED-4DB2-BD59-A6C34878D82A}">
-                    <a16:rowId xmlns:a16="http://schemas.microsoft.com/office/drawing/2014/main" val="10003"/>
+                    <a16:rowId xmlns:a16="http://schemas.microsoft.com/office/drawing/2014/main" xmlns="" val="10003"/>
                   </a:ext>
                 </a:extLst>
               </a:tr>
@@ -12524,7 +12454,7 @@
                 </a:tc>
                 <a:extLst>
                   <a:ext uri="{0D108BD9-81ED-4DB2-BD59-A6C34878D82A}">
-                    <a16:rowId xmlns:a16="http://schemas.microsoft.com/office/drawing/2014/main" val="10004"/>
+                    <a16:rowId xmlns:a16="http://schemas.microsoft.com/office/drawing/2014/main" xmlns="" val="10004"/>
                   </a:ext>
                 </a:extLst>
               </a:tr>
@@ -12594,7 +12524,7 @@
                 </a:tc>
                 <a:extLst>
                   <a:ext uri="{0D108BD9-81ED-4DB2-BD59-A6C34878D82A}">
-                    <a16:rowId xmlns:a16="http://schemas.microsoft.com/office/drawing/2014/main" val="10005"/>
+                    <a16:rowId xmlns:a16="http://schemas.microsoft.com/office/drawing/2014/main" xmlns="" val="10005"/>
                   </a:ext>
                 </a:extLst>
               </a:tr>
@@ -12668,7 +12598,7 @@
                 </a:tc>
                 <a:extLst>
                   <a:ext uri="{0D108BD9-81ED-4DB2-BD59-A6C34878D82A}">
-                    <a16:rowId xmlns:a16="http://schemas.microsoft.com/office/drawing/2014/main" val="10006"/>
+                    <a16:rowId xmlns:a16="http://schemas.microsoft.com/office/drawing/2014/main" xmlns="" val="10006"/>
                   </a:ext>
                 </a:extLst>
               </a:tr>
@@ -13871,35 +13801,35 @@
                 <a:gridCol w="631698">
                   <a:extLst>
                     <a:ext uri="{9D8B030D-6E8A-4147-A177-3AD203B41FA5}">
-                      <a16:colId xmlns:a16="http://schemas.microsoft.com/office/drawing/2014/main" val="20000"/>
+                      <a16:colId xmlns:a16="http://schemas.microsoft.com/office/drawing/2014/main" xmlns="" val="20000"/>
                     </a:ext>
                   </a:extLst>
                 </a:gridCol>
                 <a:gridCol w="1808247">
                   <a:extLst>
                     <a:ext uri="{9D8B030D-6E8A-4147-A177-3AD203B41FA5}">
-                      <a16:colId xmlns:a16="http://schemas.microsoft.com/office/drawing/2014/main" val="20001"/>
+                      <a16:colId xmlns:a16="http://schemas.microsoft.com/office/drawing/2014/main" xmlns="" val="20001"/>
                     </a:ext>
                   </a:extLst>
                 </a:gridCol>
                 <a:gridCol w="1932953">
                   <a:extLst>
                     <a:ext uri="{9D8B030D-6E8A-4147-A177-3AD203B41FA5}">
-                      <a16:colId xmlns:a16="http://schemas.microsoft.com/office/drawing/2014/main" val="20002"/>
+                      <a16:colId xmlns:a16="http://schemas.microsoft.com/office/drawing/2014/main" xmlns="" val="20002"/>
                     </a:ext>
                   </a:extLst>
                 </a:gridCol>
                 <a:gridCol w="2900170">
                   <a:extLst>
                     <a:ext uri="{9D8B030D-6E8A-4147-A177-3AD203B41FA5}">
-                      <a16:colId xmlns:a16="http://schemas.microsoft.com/office/drawing/2014/main" val="20003"/>
+                      <a16:colId xmlns:a16="http://schemas.microsoft.com/office/drawing/2014/main" xmlns="" val="20003"/>
                     </a:ext>
                   </a:extLst>
                 </a:gridCol>
                 <a:gridCol w="2900170">
                   <a:extLst>
                     <a:ext uri="{9D8B030D-6E8A-4147-A177-3AD203B41FA5}">
-                      <a16:colId xmlns:a16="http://schemas.microsoft.com/office/drawing/2014/main" val="20004"/>
+                      <a16:colId xmlns:a16="http://schemas.microsoft.com/office/drawing/2014/main" xmlns="" val="20004"/>
                     </a:ext>
                   </a:extLst>
                 </a:gridCol>
@@ -13969,7 +13899,7 @@
                 </a:tc>
                 <a:extLst>
                   <a:ext uri="{0D108BD9-81ED-4DB2-BD59-A6C34878D82A}">
-                    <a16:rowId xmlns:a16="http://schemas.microsoft.com/office/drawing/2014/main" val="10000"/>
+                    <a16:rowId xmlns:a16="http://schemas.microsoft.com/office/drawing/2014/main" xmlns="" val="10000"/>
                   </a:ext>
                 </a:extLst>
               </a:tr>
@@ -14035,7 +13965,7 @@
                 </a:tc>
                 <a:extLst>
                   <a:ext uri="{0D108BD9-81ED-4DB2-BD59-A6C34878D82A}">
-                    <a16:rowId xmlns:a16="http://schemas.microsoft.com/office/drawing/2014/main" val="10001"/>
+                    <a16:rowId xmlns:a16="http://schemas.microsoft.com/office/drawing/2014/main" xmlns="" val="10001"/>
                   </a:ext>
                 </a:extLst>
               </a:tr>
@@ -14106,7 +14036,7 @@
                 </a:tc>
                 <a:extLst>
                   <a:ext uri="{0D108BD9-81ED-4DB2-BD59-A6C34878D82A}">
-                    <a16:rowId xmlns:a16="http://schemas.microsoft.com/office/drawing/2014/main" val="10002"/>
+                    <a16:rowId xmlns:a16="http://schemas.microsoft.com/office/drawing/2014/main" xmlns="" val="10002"/>
                   </a:ext>
                 </a:extLst>
               </a:tr>
@@ -14172,7 +14102,7 @@
                 </a:tc>
                 <a:extLst>
                   <a:ext uri="{0D108BD9-81ED-4DB2-BD59-A6C34878D82A}">
-                    <a16:rowId xmlns:a16="http://schemas.microsoft.com/office/drawing/2014/main" val="10003"/>
+                    <a16:rowId xmlns:a16="http://schemas.microsoft.com/office/drawing/2014/main" xmlns="" val="10003"/>
                   </a:ext>
                 </a:extLst>
               </a:tr>
@@ -18003,35 +17933,35 @@
                 <a:gridCol w="631698">
                   <a:extLst>
                     <a:ext uri="{9D8B030D-6E8A-4147-A177-3AD203B41FA5}">
-                      <a16:colId xmlns:a16="http://schemas.microsoft.com/office/drawing/2014/main" val="20000"/>
+                      <a16:colId xmlns:a16="http://schemas.microsoft.com/office/drawing/2014/main" xmlns="" val="20000"/>
                     </a:ext>
                   </a:extLst>
                 </a:gridCol>
                 <a:gridCol w="1808247">
                   <a:extLst>
                     <a:ext uri="{9D8B030D-6E8A-4147-A177-3AD203B41FA5}">
-                      <a16:colId xmlns:a16="http://schemas.microsoft.com/office/drawing/2014/main" val="20001"/>
+                      <a16:colId xmlns:a16="http://schemas.microsoft.com/office/drawing/2014/main" xmlns="" val="20001"/>
                     </a:ext>
                   </a:extLst>
                 </a:gridCol>
                 <a:gridCol w="1932953">
                   <a:extLst>
                     <a:ext uri="{9D8B030D-6E8A-4147-A177-3AD203B41FA5}">
-                      <a16:colId xmlns:a16="http://schemas.microsoft.com/office/drawing/2014/main" val="20002"/>
+                      <a16:colId xmlns:a16="http://schemas.microsoft.com/office/drawing/2014/main" xmlns="" val="20002"/>
                     </a:ext>
                   </a:extLst>
                 </a:gridCol>
                 <a:gridCol w="2900170">
                   <a:extLst>
                     <a:ext uri="{9D8B030D-6E8A-4147-A177-3AD203B41FA5}">
-                      <a16:colId xmlns:a16="http://schemas.microsoft.com/office/drawing/2014/main" val="20003"/>
+                      <a16:colId xmlns:a16="http://schemas.microsoft.com/office/drawing/2014/main" xmlns="" val="20003"/>
                     </a:ext>
                   </a:extLst>
                 </a:gridCol>
                 <a:gridCol w="2900170">
                   <a:extLst>
                     <a:ext uri="{9D8B030D-6E8A-4147-A177-3AD203B41FA5}">
-                      <a16:colId xmlns:a16="http://schemas.microsoft.com/office/drawing/2014/main" val="20004"/>
+                      <a16:colId xmlns:a16="http://schemas.microsoft.com/office/drawing/2014/main" xmlns="" val="20004"/>
                     </a:ext>
                   </a:extLst>
                 </a:gridCol>
@@ -18101,7 +18031,7 @@
                 </a:tc>
                 <a:extLst>
                   <a:ext uri="{0D108BD9-81ED-4DB2-BD59-A6C34878D82A}">
-                    <a16:rowId xmlns:a16="http://schemas.microsoft.com/office/drawing/2014/main" val="10000"/>
+                    <a16:rowId xmlns:a16="http://schemas.microsoft.com/office/drawing/2014/main" xmlns="" val="10000"/>
                   </a:ext>
                 </a:extLst>
               </a:tr>
@@ -18167,7 +18097,7 @@
                 </a:tc>
                 <a:extLst>
                   <a:ext uri="{0D108BD9-81ED-4DB2-BD59-A6C34878D82A}">
-                    <a16:rowId xmlns:a16="http://schemas.microsoft.com/office/drawing/2014/main" val="10001"/>
+                    <a16:rowId xmlns:a16="http://schemas.microsoft.com/office/drawing/2014/main" xmlns="" val="10001"/>
                   </a:ext>
                 </a:extLst>
               </a:tr>
@@ -18238,7 +18168,7 @@
                 </a:tc>
                 <a:extLst>
                   <a:ext uri="{0D108BD9-81ED-4DB2-BD59-A6C34878D82A}">
-                    <a16:rowId xmlns:a16="http://schemas.microsoft.com/office/drawing/2014/main" val="10002"/>
+                    <a16:rowId xmlns:a16="http://schemas.microsoft.com/office/drawing/2014/main" xmlns="" val="10002"/>
                   </a:ext>
                 </a:extLst>
               </a:tr>
@@ -18304,7 +18234,7 @@
                 </a:tc>
                 <a:extLst>
                   <a:ext uri="{0D108BD9-81ED-4DB2-BD59-A6C34878D82A}">
-                    <a16:rowId xmlns:a16="http://schemas.microsoft.com/office/drawing/2014/main" val="10003"/>
+                    <a16:rowId xmlns:a16="http://schemas.microsoft.com/office/drawing/2014/main" xmlns="" val="10003"/>
                   </a:ext>
                 </a:extLst>
               </a:tr>
@@ -19437,35 +19367,35 @@
                 <a:gridCol w="631698">
                   <a:extLst>
                     <a:ext uri="{9D8B030D-6E8A-4147-A177-3AD203B41FA5}">
-                      <a16:colId xmlns:a16="http://schemas.microsoft.com/office/drawing/2014/main" val="20000"/>
+                      <a16:colId xmlns:a16="http://schemas.microsoft.com/office/drawing/2014/main" xmlns="" val="20000"/>
                     </a:ext>
                   </a:extLst>
                 </a:gridCol>
                 <a:gridCol w="1808247">
                   <a:extLst>
                     <a:ext uri="{9D8B030D-6E8A-4147-A177-3AD203B41FA5}">
-                      <a16:colId xmlns:a16="http://schemas.microsoft.com/office/drawing/2014/main" val="20001"/>
+                      <a16:colId xmlns:a16="http://schemas.microsoft.com/office/drawing/2014/main" xmlns="" val="20001"/>
                     </a:ext>
                   </a:extLst>
                 </a:gridCol>
                 <a:gridCol w="1932953">
                   <a:extLst>
                     <a:ext uri="{9D8B030D-6E8A-4147-A177-3AD203B41FA5}">
-                      <a16:colId xmlns:a16="http://schemas.microsoft.com/office/drawing/2014/main" val="20002"/>
+                      <a16:colId xmlns:a16="http://schemas.microsoft.com/office/drawing/2014/main" xmlns="" val="20002"/>
                     </a:ext>
                   </a:extLst>
                 </a:gridCol>
                 <a:gridCol w="2900170">
                   <a:extLst>
                     <a:ext uri="{9D8B030D-6E8A-4147-A177-3AD203B41FA5}">
-                      <a16:colId xmlns:a16="http://schemas.microsoft.com/office/drawing/2014/main" val="20003"/>
+                      <a16:colId xmlns:a16="http://schemas.microsoft.com/office/drawing/2014/main" xmlns="" val="20003"/>
                     </a:ext>
                   </a:extLst>
                 </a:gridCol>
                 <a:gridCol w="2900170">
                   <a:extLst>
                     <a:ext uri="{9D8B030D-6E8A-4147-A177-3AD203B41FA5}">
-                      <a16:colId xmlns:a16="http://schemas.microsoft.com/office/drawing/2014/main" val="20004"/>
+                      <a16:colId xmlns:a16="http://schemas.microsoft.com/office/drawing/2014/main" xmlns="" val="20004"/>
                     </a:ext>
                   </a:extLst>
                 </a:gridCol>
@@ -19535,7 +19465,7 @@
                 </a:tc>
                 <a:extLst>
                   <a:ext uri="{0D108BD9-81ED-4DB2-BD59-A6C34878D82A}">
-                    <a16:rowId xmlns:a16="http://schemas.microsoft.com/office/drawing/2014/main" val="10000"/>
+                    <a16:rowId xmlns:a16="http://schemas.microsoft.com/office/drawing/2014/main" xmlns="" val="10000"/>
                   </a:ext>
                 </a:extLst>
               </a:tr>
@@ -19601,7 +19531,7 @@
                 </a:tc>
                 <a:extLst>
                   <a:ext uri="{0D108BD9-81ED-4DB2-BD59-A6C34878D82A}">
-                    <a16:rowId xmlns:a16="http://schemas.microsoft.com/office/drawing/2014/main" val="10001"/>
+                    <a16:rowId xmlns:a16="http://schemas.microsoft.com/office/drawing/2014/main" xmlns="" val="10001"/>
                   </a:ext>
                 </a:extLst>
               </a:tr>
@@ -19672,7 +19602,7 @@
                 </a:tc>
                 <a:extLst>
                   <a:ext uri="{0D108BD9-81ED-4DB2-BD59-A6C34878D82A}">
-                    <a16:rowId xmlns:a16="http://schemas.microsoft.com/office/drawing/2014/main" val="10002"/>
+                    <a16:rowId xmlns:a16="http://schemas.microsoft.com/office/drawing/2014/main" xmlns="" val="10002"/>
                   </a:ext>
                 </a:extLst>
               </a:tr>
@@ -19738,7 +19668,7 @@
                 </a:tc>
                 <a:extLst>
                   <a:ext uri="{0D108BD9-81ED-4DB2-BD59-A6C34878D82A}">
-                    <a16:rowId xmlns:a16="http://schemas.microsoft.com/office/drawing/2014/main" val="10003"/>
+                    <a16:rowId xmlns:a16="http://schemas.microsoft.com/office/drawing/2014/main" xmlns="" val="10003"/>
                   </a:ext>
                 </a:extLst>
               </a:tr>
@@ -21492,35 +21422,35 @@
                 <a:gridCol w="586838">
                   <a:extLst>
                     <a:ext uri="{9D8B030D-6E8A-4147-A177-3AD203B41FA5}">
-                      <a16:colId xmlns:a16="http://schemas.microsoft.com/office/drawing/2014/main" val="20000"/>
+                      <a16:colId xmlns:a16="http://schemas.microsoft.com/office/drawing/2014/main" xmlns="" val="20000"/>
                     </a:ext>
                   </a:extLst>
                 </a:gridCol>
                 <a:gridCol w="1679832">
                   <a:extLst>
                     <a:ext uri="{9D8B030D-6E8A-4147-A177-3AD203B41FA5}">
-                      <a16:colId xmlns:a16="http://schemas.microsoft.com/office/drawing/2014/main" val="20001"/>
+                      <a16:colId xmlns:a16="http://schemas.microsoft.com/office/drawing/2014/main" xmlns="" val="20001"/>
                     </a:ext>
                   </a:extLst>
                 </a:gridCol>
                 <a:gridCol w="2090660">
                   <a:extLst>
                     <a:ext uri="{9D8B030D-6E8A-4147-A177-3AD203B41FA5}">
-                      <a16:colId xmlns:a16="http://schemas.microsoft.com/office/drawing/2014/main" val="20002"/>
+                      <a16:colId xmlns:a16="http://schemas.microsoft.com/office/drawing/2014/main" xmlns="" val="20002"/>
                     </a:ext>
                   </a:extLst>
                 </a:gridCol>
                 <a:gridCol w="2209822">
                   <a:extLst>
                     <a:ext uri="{9D8B030D-6E8A-4147-A177-3AD203B41FA5}">
-                      <a16:colId xmlns:a16="http://schemas.microsoft.com/office/drawing/2014/main" val="20003"/>
+                      <a16:colId xmlns:a16="http://schemas.microsoft.com/office/drawing/2014/main" xmlns="" val="20003"/>
                     </a:ext>
                   </a:extLst>
                 </a:gridCol>
                 <a:gridCol w="2588654">
                   <a:extLst>
                     <a:ext uri="{9D8B030D-6E8A-4147-A177-3AD203B41FA5}">
-                      <a16:colId xmlns:a16="http://schemas.microsoft.com/office/drawing/2014/main" val="20004"/>
+                      <a16:colId xmlns:a16="http://schemas.microsoft.com/office/drawing/2014/main" xmlns="" val="20004"/>
                     </a:ext>
                   </a:extLst>
                 </a:gridCol>
@@ -21590,7 +21520,7 @@
                 </a:tc>
                 <a:extLst>
                   <a:ext uri="{0D108BD9-81ED-4DB2-BD59-A6C34878D82A}">
-                    <a16:rowId xmlns:a16="http://schemas.microsoft.com/office/drawing/2014/main" val="10000"/>
+                    <a16:rowId xmlns:a16="http://schemas.microsoft.com/office/drawing/2014/main" xmlns="" val="10000"/>
                   </a:ext>
                 </a:extLst>
               </a:tr>
@@ -21659,7 +21589,7 @@
                 </a:tc>
                 <a:extLst>
                   <a:ext uri="{0D108BD9-81ED-4DB2-BD59-A6C34878D82A}">
-                    <a16:rowId xmlns:a16="http://schemas.microsoft.com/office/drawing/2014/main" val="10001"/>
+                    <a16:rowId xmlns:a16="http://schemas.microsoft.com/office/drawing/2014/main" xmlns="" val="10001"/>
                   </a:ext>
                 </a:extLst>
               </a:tr>
@@ -21748,7 +21678,7 @@
                 </a:tc>
                 <a:extLst>
                   <a:ext uri="{0D108BD9-81ED-4DB2-BD59-A6C34878D82A}">
-                    <a16:rowId xmlns:a16="http://schemas.microsoft.com/office/drawing/2014/main" val="10002"/>
+                    <a16:rowId xmlns:a16="http://schemas.microsoft.com/office/drawing/2014/main" xmlns="" val="10002"/>
                   </a:ext>
                 </a:extLst>
               </a:tr>
@@ -21837,7 +21767,7 @@
                 </a:tc>
                 <a:extLst>
                   <a:ext uri="{0D108BD9-81ED-4DB2-BD59-A6C34878D82A}">
-                    <a16:rowId xmlns:a16="http://schemas.microsoft.com/office/drawing/2014/main" val="10003"/>
+                    <a16:rowId xmlns:a16="http://schemas.microsoft.com/office/drawing/2014/main" xmlns="" val="10003"/>
                   </a:ext>
                 </a:extLst>
               </a:tr>
@@ -25295,7 +25225,7 @@
           <p:cNvPr id="35" name="Retângulo 34">
             <a:extLst>
               <a:ext uri="{FF2B5EF4-FFF2-40B4-BE49-F238E27FC236}">
-                <a16:creationId xmlns:a16="http://schemas.microsoft.com/office/drawing/2014/main" id="{579B470E-A950-473D-9224-F36D0EB57231}"/>
+                <a16:creationId xmlns:a16="http://schemas.microsoft.com/office/drawing/2014/main" xmlns="" id="{579B470E-A950-473D-9224-F36D0EB57231}"/>
               </a:ext>
             </a:extLst>
           </p:cNvPr>
@@ -25438,35 +25368,35 @@
                 <a:gridCol w="569322">
                   <a:extLst>
                     <a:ext uri="{9D8B030D-6E8A-4147-A177-3AD203B41FA5}">
-                      <a16:colId xmlns:a16="http://schemas.microsoft.com/office/drawing/2014/main" val="20000"/>
+                      <a16:colId xmlns:a16="http://schemas.microsoft.com/office/drawing/2014/main" xmlns="" val="20000"/>
                     </a:ext>
                   </a:extLst>
                 </a:gridCol>
                 <a:gridCol w="1629692">
                   <a:extLst>
                     <a:ext uri="{9D8B030D-6E8A-4147-A177-3AD203B41FA5}">
-                      <a16:colId xmlns:a16="http://schemas.microsoft.com/office/drawing/2014/main" val="20001"/>
+                      <a16:colId xmlns:a16="http://schemas.microsoft.com/office/drawing/2014/main" xmlns="" val="20001"/>
                     </a:ext>
                   </a:extLst>
                 </a:gridCol>
                 <a:gridCol w="1742084">
                   <a:extLst>
                     <a:ext uri="{9D8B030D-6E8A-4147-A177-3AD203B41FA5}">
-                      <a16:colId xmlns:a16="http://schemas.microsoft.com/office/drawing/2014/main" val="20002"/>
+                      <a16:colId xmlns:a16="http://schemas.microsoft.com/office/drawing/2014/main" xmlns="" val="20002"/>
                     </a:ext>
                   </a:extLst>
                 </a:gridCol>
                 <a:gridCol w="2942571">
                   <a:extLst>
                     <a:ext uri="{9D8B030D-6E8A-4147-A177-3AD203B41FA5}">
-                      <a16:colId xmlns:a16="http://schemas.microsoft.com/office/drawing/2014/main" val="20003"/>
+                      <a16:colId xmlns:a16="http://schemas.microsoft.com/office/drawing/2014/main" xmlns="" val="20003"/>
                     </a:ext>
                   </a:extLst>
                 </a:gridCol>
                 <a:gridCol w="2285016">
                   <a:extLst>
                     <a:ext uri="{9D8B030D-6E8A-4147-A177-3AD203B41FA5}">
-                      <a16:colId xmlns:a16="http://schemas.microsoft.com/office/drawing/2014/main" val="20004"/>
+                      <a16:colId xmlns:a16="http://schemas.microsoft.com/office/drawing/2014/main" xmlns="" val="20004"/>
                     </a:ext>
                   </a:extLst>
                 </a:gridCol>
@@ -25536,7 +25466,7 @@
                 </a:tc>
                 <a:extLst>
                   <a:ext uri="{0D108BD9-81ED-4DB2-BD59-A6C34878D82A}">
-                    <a16:rowId xmlns:a16="http://schemas.microsoft.com/office/drawing/2014/main" val="10000"/>
+                    <a16:rowId xmlns:a16="http://schemas.microsoft.com/office/drawing/2014/main" xmlns="" val="10000"/>
                   </a:ext>
                 </a:extLst>
               </a:tr>
@@ -25610,7 +25540,7 @@
                 </a:tc>
                 <a:extLst>
                   <a:ext uri="{0D108BD9-81ED-4DB2-BD59-A6C34878D82A}">
-                    <a16:rowId xmlns:a16="http://schemas.microsoft.com/office/drawing/2014/main" val="10001"/>
+                    <a16:rowId xmlns:a16="http://schemas.microsoft.com/office/drawing/2014/main" xmlns="" val="10001"/>
                   </a:ext>
                 </a:extLst>
               </a:tr>
@@ -25687,7 +25617,7 @@
                 </a:tc>
                 <a:extLst>
                   <a:ext uri="{0D108BD9-81ED-4DB2-BD59-A6C34878D82A}">
-                    <a16:rowId xmlns:a16="http://schemas.microsoft.com/office/drawing/2014/main" val="10002"/>
+                    <a16:rowId xmlns:a16="http://schemas.microsoft.com/office/drawing/2014/main" xmlns="" val="10002"/>
                   </a:ext>
                 </a:extLst>
               </a:tr>
@@ -25756,7 +25686,7 @@
                 </a:tc>
                 <a:extLst>
                   <a:ext uri="{0D108BD9-81ED-4DB2-BD59-A6C34878D82A}">
-                    <a16:rowId xmlns:a16="http://schemas.microsoft.com/office/drawing/2014/main" val="10003"/>
+                    <a16:rowId xmlns:a16="http://schemas.microsoft.com/office/drawing/2014/main" xmlns="" val="10003"/>
                   </a:ext>
                 </a:extLst>
               </a:tr>
@@ -25830,7 +25760,7 @@
                 </a:tc>
                 <a:extLst>
                   <a:ext uri="{0D108BD9-81ED-4DB2-BD59-A6C34878D82A}">
-                    <a16:rowId xmlns:a16="http://schemas.microsoft.com/office/drawing/2014/main" val="10004"/>
+                    <a16:rowId xmlns:a16="http://schemas.microsoft.com/office/drawing/2014/main" xmlns="" val="10004"/>
                   </a:ext>
                 </a:extLst>
               </a:tr>
@@ -25873,7 +25803,7 @@
           <p:cNvPr id="28" name="Retângulo 27">
             <a:extLst>
               <a:ext uri="{FF2B5EF4-FFF2-40B4-BE49-F238E27FC236}">
-                <a16:creationId xmlns:a16="http://schemas.microsoft.com/office/drawing/2014/main" id="{5F32A0B6-C48F-43EE-A5D8-7308B54BD125}"/>
+                <a16:creationId xmlns:a16="http://schemas.microsoft.com/office/drawing/2014/main" xmlns="" id="{5F32A0B6-C48F-43EE-A5D8-7308B54BD125}"/>
               </a:ext>
             </a:extLst>
           </p:cNvPr>
@@ -25931,7 +25861,7 @@
           <p:cNvPr id="29" name="Imagem 28">
             <a:extLst>
               <a:ext uri="{FF2B5EF4-FFF2-40B4-BE49-F238E27FC236}">
-                <a16:creationId xmlns:a16="http://schemas.microsoft.com/office/drawing/2014/main" id="{FB65D69D-FD79-4510-9B62-EF95225475B4}"/>
+                <a16:creationId xmlns:a16="http://schemas.microsoft.com/office/drawing/2014/main" xmlns="" id="{FB65D69D-FD79-4510-9B62-EF95225475B4}"/>
               </a:ext>
             </a:extLst>
           </p:cNvPr>
@@ -25966,7 +25896,7 @@
           <p:cNvPr id="30" name="Retângulo 29">
             <a:extLst>
               <a:ext uri="{FF2B5EF4-FFF2-40B4-BE49-F238E27FC236}">
-                <a16:creationId xmlns:a16="http://schemas.microsoft.com/office/drawing/2014/main" id="{69F39E0A-ADF3-4786-AADD-1590DEF8ACD5}"/>
+                <a16:creationId xmlns:a16="http://schemas.microsoft.com/office/drawing/2014/main" xmlns="" id="{69F39E0A-ADF3-4786-AADD-1590DEF8ACD5}"/>
               </a:ext>
             </a:extLst>
           </p:cNvPr>
@@ -26020,7 +25950,7 @@
           <p:cNvPr id="31" name="Retângulo de cantos arredondados 15">
             <a:extLst>
               <a:ext uri="{FF2B5EF4-FFF2-40B4-BE49-F238E27FC236}">
-                <a16:creationId xmlns:a16="http://schemas.microsoft.com/office/drawing/2014/main" id="{A8F89069-7CD4-49CA-8349-13E28CB0199B}"/>
+                <a16:creationId xmlns:a16="http://schemas.microsoft.com/office/drawing/2014/main" xmlns="" id="{A8F89069-7CD4-49CA-8349-13E28CB0199B}"/>
               </a:ext>
             </a:extLst>
           </p:cNvPr>
@@ -26067,7 +25997,7 @@
           <p:cNvPr id="32" name="Retângulo 31">
             <a:extLst>
               <a:ext uri="{FF2B5EF4-FFF2-40B4-BE49-F238E27FC236}">
-                <a16:creationId xmlns:a16="http://schemas.microsoft.com/office/drawing/2014/main" id="{FB98B605-AF2E-47B3-A046-9DBA0B0C6DF0}"/>
+                <a16:creationId xmlns:a16="http://schemas.microsoft.com/office/drawing/2014/main" xmlns="" id="{FB98B605-AF2E-47B3-A046-9DBA0B0C6DF0}"/>
               </a:ext>
             </a:extLst>
           </p:cNvPr>
@@ -26136,7 +26066,7 @@
           <p:cNvPr id="33" name="Retângulo 32">
             <a:extLst>
               <a:ext uri="{FF2B5EF4-FFF2-40B4-BE49-F238E27FC236}">
-                <a16:creationId xmlns:a16="http://schemas.microsoft.com/office/drawing/2014/main" id="{C58BEB00-D0CF-4119-A679-797E80547B05}"/>
+                <a16:creationId xmlns:a16="http://schemas.microsoft.com/office/drawing/2014/main" xmlns="" id="{C58BEB00-D0CF-4119-A679-797E80547B05}"/>
               </a:ext>
             </a:extLst>
           </p:cNvPr>
@@ -26205,7 +26135,7 @@
           <p:cNvPr id="34" name="Retângulo 33">
             <a:extLst>
               <a:ext uri="{FF2B5EF4-FFF2-40B4-BE49-F238E27FC236}">
-                <a16:creationId xmlns:a16="http://schemas.microsoft.com/office/drawing/2014/main" id="{B89DBC78-F9B4-4606-9E15-BA606BC8461C}"/>
+                <a16:creationId xmlns:a16="http://schemas.microsoft.com/office/drawing/2014/main" xmlns="" id="{B89DBC78-F9B4-4606-9E15-BA606BC8461C}"/>
               </a:ext>
             </a:extLst>
           </p:cNvPr>
@@ -26274,7 +26204,7 @@
           <p:cNvPr id="35" name="Retângulo 34">
             <a:extLst>
               <a:ext uri="{FF2B5EF4-FFF2-40B4-BE49-F238E27FC236}">
-                <a16:creationId xmlns:a16="http://schemas.microsoft.com/office/drawing/2014/main" id="{0B9D6A87-571A-41B7-8B3A-068B4D3A1265}"/>
+                <a16:creationId xmlns:a16="http://schemas.microsoft.com/office/drawing/2014/main" xmlns="" id="{0B9D6A87-571A-41B7-8B3A-068B4D3A1265}"/>
               </a:ext>
             </a:extLst>
           </p:cNvPr>
@@ -26343,7 +26273,7 @@
           <p:cNvPr id="36" name="CaixaDeTexto 35">
             <a:extLst>
               <a:ext uri="{FF2B5EF4-FFF2-40B4-BE49-F238E27FC236}">
-                <a16:creationId xmlns:a16="http://schemas.microsoft.com/office/drawing/2014/main" id="{37A1CC55-461A-40B6-BDC2-2D9791E94584}"/>
+                <a16:creationId xmlns:a16="http://schemas.microsoft.com/office/drawing/2014/main" xmlns="" id="{37A1CC55-461A-40B6-BDC2-2D9791E94584}"/>
               </a:ext>
             </a:extLst>
           </p:cNvPr>
@@ -26383,7 +26313,7 @@
           <p:cNvPr id="37" name="Retângulo de cantos arredondados 12">
             <a:extLst>
               <a:ext uri="{FF2B5EF4-FFF2-40B4-BE49-F238E27FC236}">
-                <a16:creationId xmlns:a16="http://schemas.microsoft.com/office/drawing/2014/main" id="{152A2D14-D488-49A7-9950-4E3295F94DFB}"/>
+                <a16:creationId xmlns:a16="http://schemas.microsoft.com/office/drawing/2014/main" xmlns="" id="{152A2D14-D488-49A7-9950-4E3295F94DFB}"/>
               </a:ext>
             </a:extLst>
           </p:cNvPr>
@@ -26446,7 +26376,7 @@
           <p:cNvPr id="38" name="Imagem 37">
             <a:extLst>
               <a:ext uri="{FF2B5EF4-FFF2-40B4-BE49-F238E27FC236}">
-                <a16:creationId xmlns:a16="http://schemas.microsoft.com/office/drawing/2014/main" id="{F2BF6BE9-45DE-458A-9408-5C7903B7295F}"/>
+                <a16:creationId xmlns:a16="http://schemas.microsoft.com/office/drawing/2014/main" xmlns="" id="{F2BF6BE9-45DE-458A-9408-5C7903B7295F}"/>
               </a:ext>
             </a:extLst>
           </p:cNvPr>
@@ -26495,7 +26425,7 @@
           <p:cNvPr id="39" name="Imagem 38">
             <a:extLst>
               <a:ext uri="{FF2B5EF4-FFF2-40B4-BE49-F238E27FC236}">
-                <a16:creationId xmlns:a16="http://schemas.microsoft.com/office/drawing/2014/main" id="{D89D9DA9-AD65-4970-90D0-0D6997AF6D21}"/>
+                <a16:creationId xmlns:a16="http://schemas.microsoft.com/office/drawing/2014/main" xmlns="" id="{D89D9DA9-AD65-4970-90D0-0D6997AF6D21}"/>
               </a:ext>
             </a:extLst>
           </p:cNvPr>
@@ -26538,7 +26468,7 @@
           <p:cNvPr id="41" name="Imagem 40">
             <a:extLst>
               <a:ext uri="{FF2B5EF4-FFF2-40B4-BE49-F238E27FC236}">
-                <a16:creationId xmlns:a16="http://schemas.microsoft.com/office/drawing/2014/main" id="{CEA260CB-8F16-4F6F-B5F3-2A53C9DA9FF2}"/>
+                <a16:creationId xmlns:a16="http://schemas.microsoft.com/office/drawing/2014/main" xmlns="" id="{CEA260CB-8F16-4F6F-B5F3-2A53C9DA9FF2}"/>
               </a:ext>
             </a:extLst>
           </p:cNvPr>
@@ -26829,6 +26759,1132 @@
       </p:grpSpPr>
       <p:sp>
         <p:nvSpPr>
+          <p:cNvPr id="4" name="Retângulo 3"/>
+          <p:cNvSpPr/>
+          <p:nvPr/>
+        </p:nvSpPr>
+        <p:spPr>
+          <a:xfrm>
+            <a:off x="1117279" y="445761"/>
+            <a:ext cx="9787944" cy="5911402"/>
+          </a:xfrm>
+          <a:prstGeom prst="rect">
+            <a:avLst/>
+          </a:prstGeom>
+          <a:solidFill>
+            <a:srgbClr val="A5CA97"/>
+          </a:solidFill>
+          <a:ln>
+            <a:solidFill>
+              <a:schemeClr val="accent6">
+                <a:lumMod val="60000"/>
+                <a:lumOff val="40000"/>
+              </a:schemeClr>
+            </a:solidFill>
+          </a:ln>
+          <a:effectLst/>
+        </p:spPr>
+        <p:style>
+          <a:lnRef idx="2">
+            <a:schemeClr val="accent1">
+              <a:shade val="50000"/>
+            </a:schemeClr>
+          </a:lnRef>
+          <a:fillRef idx="1">
+            <a:schemeClr val="accent1"/>
+          </a:fillRef>
+          <a:effectRef idx="0">
+            <a:schemeClr val="accent1"/>
+          </a:effectRef>
+          <a:fontRef idx="minor">
+            <a:schemeClr val="lt1"/>
+          </a:fontRef>
+        </p:style>
+        <p:txBody>
+          <a:bodyPr rtlCol="0" anchor="ctr"/>
+          <a:lstStyle/>
+          <a:p>
+            <a:pPr algn="ctr"/>
+            <a:endParaRPr lang="pt-BR"/>
+          </a:p>
+        </p:txBody>
+      </p:sp>
+      <p:sp>
+        <p:nvSpPr>
+          <p:cNvPr id="15" name="Retângulo 14"/>
+          <p:cNvSpPr/>
+          <p:nvPr/>
+        </p:nvSpPr>
+        <p:spPr>
+          <a:xfrm>
+            <a:off x="1146749" y="445761"/>
+            <a:ext cx="9787944" cy="764853"/>
+          </a:xfrm>
+          <a:prstGeom prst="rect">
+            <a:avLst/>
+          </a:prstGeom>
+          <a:solidFill>
+            <a:srgbClr val="8DBA62"/>
+          </a:solidFill>
+          <a:ln>
+            <a:noFill/>
+          </a:ln>
+        </p:spPr>
+        <p:style>
+          <a:lnRef idx="2">
+            <a:schemeClr val="accent1">
+              <a:shade val="50000"/>
+            </a:schemeClr>
+          </a:lnRef>
+          <a:fillRef idx="1">
+            <a:schemeClr val="accent1"/>
+          </a:fillRef>
+          <a:effectRef idx="0">
+            <a:schemeClr val="accent1"/>
+          </a:effectRef>
+          <a:fontRef idx="minor">
+            <a:schemeClr val="lt1"/>
+          </a:fontRef>
+        </p:style>
+        <p:txBody>
+          <a:bodyPr rtlCol="0" anchor="ctr"/>
+          <a:lstStyle/>
+          <a:p>
+            <a:pPr algn="ctr"/>
+            <a:endParaRPr lang="pt-BR"/>
+          </a:p>
+        </p:txBody>
+      </p:sp>
+      <p:sp>
+        <p:nvSpPr>
+          <p:cNvPr id="40" name="CaixaDeTexto 39"/>
+          <p:cNvSpPr txBox="1"/>
+          <p:nvPr/>
+        </p:nvSpPr>
+        <p:spPr>
+          <a:xfrm>
+            <a:off x="1146749" y="487727"/>
+            <a:ext cx="4578359" cy="646331"/>
+          </a:xfrm>
+          <a:prstGeom prst="rect">
+            <a:avLst/>
+          </a:prstGeom>
+          <a:noFill/>
+        </p:spPr>
+        <p:txBody>
+          <a:bodyPr wrap="square" rtlCol="0">
+            <a:spAutoFit/>
+          </a:bodyPr>
+          <a:lstStyle/>
+          <a:p>
+            <a:r>
+              <a:rPr lang="pt-BR" sz="3600" dirty="0" smtClean="0">
+                <a:solidFill>
+                  <a:schemeClr val="bg1"/>
+                </a:solidFill>
+                <a:latin typeface="Bahnschrift" panose="020B0502040204020203" pitchFamily="34" charset="0"/>
+              </a:rPr>
+              <a:t>ENTRAR NA SALA</a:t>
+            </a:r>
+            <a:endParaRPr lang="pt-BR" sz="3600" dirty="0">
+              <a:solidFill>
+                <a:schemeClr val="bg1"/>
+              </a:solidFill>
+              <a:latin typeface="Bahnschrift" panose="020B0502040204020203" pitchFamily="34" charset="0"/>
+            </a:endParaRPr>
+          </a:p>
+        </p:txBody>
+      </p:sp>
+      <p:grpSp>
+        <p:nvGrpSpPr>
+          <p:cNvPr id="47" name="Grupo 46"/>
+          <p:cNvGrpSpPr/>
+          <p:nvPr/>
+        </p:nvGrpSpPr>
+        <p:grpSpPr>
+          <a:xfrm>
+            <a:off x="1711215" y="1429557"/>
+            <a:ext cx="8104155" cy="4773631"/>
+            <a:chOff x="3303102" y="1578846"/>
+            <a:chExt cx="7132734" cy="4364070"/>
+          </a:xfrm>
+        </p:grpSpPr>
+        <p:sp>
+          <p:nvSpPr>
+            <p:cNvPr id="50" name="Retângulo 49"/>
+            <p:cNvSpPr/>
+            <p:nvPr/>
+          </p:nvSpPr>
+          <p:spPr>
+            <a:xfrm>
+              <a:off x="3303102" y="1578846"/>
+              <a:ext cx="7132734" cy="4364070"/>
+            </a:xfrm>
+            <a:prstGeom prst="rect">
+              <a:avLst/>
+            </a:prstGeom>
+            <a:solidFill>
+              <a:srgbClr val="8DBA62"/>
+            </a:solidFill>
+            <a:ln>
+              <a:solidFill>
+                <a:srgbClr val="8DBA62"/>
+              </a:solidFill>
+            </a:ln>
+          </p:spPr>
+          <p:style>
+            <a:lnRef idx="2">
+              <a:schemeClr val="accent1">
+                <a:shade val="50000"/>
+              </a:schemeClr>
+            </a:lnRef>
+            <a:fillRef idx="1">
+              <a:schemeClr val="accent1"/>
+            </a:fillRef>
+            <a:effectRef idx="0">
+              <a:schemeClr val="accent1"/>
+            </a:effectRef>
+            <a:fontRef idx="minor">
+              <a:schemeClr val="lt1"/>
+            </a:fontRef>
+          </p:style>
+          <p:txBody>
+            <a:bodyPr rtlCol="0" anchor="ctr"/>
+            <a:lstStyle/>
+            <a:p>
+              <a:pPr algn="ctr"/>
+              <a:endParaRPr lang="pt-BR"/>
+            </a:p>
+          </p:txBody>
+        </p:sp>
+        <p:sp>
+          <p:nvSpPr>
+            <p:cNvPr id="58" name="Retângulo de cantos arredondados 57"/>
+            <p:cNvSpPr/>
+            <p:nvPr/>
+          </p:nvSpPr>
+          <p:spPr>
+            <a:xfrm>
+              <a:off x="3400023" y="1674254"/>
+              <a:ext cx="6941711" cy="4172754"/>
+            </a:xfrm>
+            <a:prstGeom prst="roundRect">
+              <a:avLst>
+                <a:gd name="adj" fmla="val 0"/>
+              </a:avLst>
+            </a:prstGeom>
+            <a:solidFill>
+              <a:srgbClr val="FDEBC7"/>
+            </a:solidFill>
+            <a:ln>
+              <a:solidFill>
+                <a:srgbClr val="8DBA62"/>
+              </a:solidFill>
+            </a:ln>
+          </p:spPr>
+          <p:style>
+            <a:lnRef idx="2">
+              <a:schemeClr val="accent6"/>
+            </a:lnRef>
+            <a:fillRef idx="1">
+              <a:schemeClr val="lt1"/>
+            </a:fillRef>
+            <a:effectRef idx="0">
+              <a:schemeClr val="accent6"/>
+            </a:effectRef>
+            <a:fontRef idx="minor">
+              <a:schemeClr val="dk1"/>
+            </a:fontRef>
+          </p:style>
+          <p:txBody>
+            <a:bodyPr rtlCol="0" anchor="ctr"/>
+            <a:lstStyle/>
+            <a:p>
+              <a:pPr algn="ctr"/>
+              <a:endParaRPr lang="pt-BR"/>
+            </a:p>
+          </p:txBody>
+        </p:sp>
+      </p:grpSp>
+      <p:sp>
+        <p:nvSpPr>
+          <p:cNvPr id="9" name="Retângulo de cantos arredondados 8"/>
+          <p:cNvSpPr/>
+          <p:nvPr/>
+        </p:nvSpPr>
+        <p:spPr>
+          <a:xfrm>
+            <a:off x="2145794" y="2048456"/>
+            <a:ext cx="2284540" cy="321257"/>
+          </a:xfrm>
+          <a:prstGeom prst="roundRect">
+            <a:avLst/>
+          </a:prstGeom>
+          <a:noFill/>
+        </p:spPr>
+        <p:style>
+          <a:lnRef idx="2">
+            <a:schemeClr val="accent6"/>
+          </a:lnRef>
+          <a:fillRef idx="1">
+            <a:schemeClr val="lt1"/>
+          </a:fillRef>
+          <a:effectRef idx="0">
+            <a:schemeClr val="accent6"/>
+          </a:effectRef>
+          <a:fontRef idx="minor">
+            <a:schemeClr val="dk1"/>
+          </a:fontRef>
+        </p:style>
+        <p:txBody>
+          <a:bodyPr rtlCol="0" anchor="ctr"/>
+          <a:lstStyle/>
+          <a:p>
+            <a:pPr algn="ctr"/>
+            <a:endParaRPr lang="pt-BR"/>
+          </a:p>
+        </p:txBody>
+      </p:sp>
+      <p:sp>
+        <p:nvSpPr>
+          <p:cNvPr id="10" name="CaixaDeTexto 9"/>
+          <p:cNvSpPr txBox="1"/>
+          <p:nvPr/>
+        </p:nvSpPr>
+        <p:spPr>
+          <a:xfrm>
+            <a:off x="2141154" y="1709902"/>
+            <a:ext cx="4578359" cy="338554"/>
+          </a:xfrm>
+          <a:prstGeom prst="rect">
+            <a:avLst/>
+          </a:prstGeom>
+          <a:noFill/>
+        </p:spPr>
+        <p:txBody>
+          <a:bodyPr wrap="square" rtlCol="0">
+            <a:spAutoFit/>
+          </a:bodyPr>
+          <a:lstStyle/>
+          <a:p>
+            <a:r>
+              <a:rPr lang="pt-BR" sz="1600" dirty="0" smtClean="0">
+                <a:solidFill>
+                  <a:srgbClr val="447E43"/>
+                </a:solidFill>
+                <a:latin typeface="Bahnschrift" panose="020B0502040204020203" pitchFamily="34" charset="0"/>
+              </a:rPr>
+              <a:t>Digite o código da sala</a:t>
+            </a:r>
+            <a:endParaRPr lang="pt-BR" sz="1600" dirty="0">
+              <a:solidFill>
+                <a:srgbClr val="447E43"/>
+              </a:solidFill>
+              <a:latin typeface="Bahnschrift" panose="020B0502040204020203" pitchFamily="34" charset="0"/>
+            </a:endParaRPr>
+          </a:p>
+        </p:txBody>
+      </p:sp>
+      <p:sp>
+        <p:nvSpPr>
+          <p:cNvPr id="11" name="Retângulo 10"/>
+          <p:cNvSpPr/>
+          <p:nvPr/>
+        </p:nvSpPr>
+        <p:spPr>
+          <a:xfrm>
+            <a:off x="4699486" y="1991056"/>
+            <a:ext cx="1662677" cy="378657"/>
+          </a:xfrm>
+          <a:prstGeom prst="rect">
+            <a:avLst/>
+          </a:prstGeom>
+          <a:solidFill>
+            <a:srgbClr val="73D54A"/>
+          </a:solidFill>
+          <a:ln>
+            <a:solidFill>
+              <a:srgbClr val="73D54A"/>
+            </a:solidFill>
+          </a:ln>
+          <a:effectLst>
+            <a:outerShdw blurRad="50800" dist="38100" dir="2700000" algn="tl" rotWithShape="0">
+              <a:prstClr val="black">
+                <a:alpha val="40000"/>
+              </a:prstClr>
+            </a:outerShdw>
+            <a:softEdge rad="0"/>
+          </a:effectLst>
+        </p:spPr>
+        <p:style>
+          <a:lnRef idx="2">
+            <a:schemeClr val="accent1">
+              <a:shade val="50000"/>
+            </a:schemeClr>
+          </a:lnRef>
+          <a:fillRef idx="1">
+            <a:schemeClr val="accent1"/>
+          </a:fillRef>
+          <a:effectRef idx="0">
+            <a:schemeClr val="accent1"/>
+          </a:effectRef>
+          <a:fontRef idx="minor">
+            <a:schemeClr val="lt1"/>
+          </a:fontRef>
+        </p:style>
+        <p:txBody>
+          <a:bodyPr rtlCol="0" anchor="ctr"/>
+          <a:lstStyle/>
+          <a:p>
+            <a:pPr algn="ctr"/>
+            <a:r>
+              <a:rPr lang="pt-BR" dirty="0" smtClean="0"/>
+              <a:t>Entrar na sala</a:t>
+            </a:r>
+            <a:endParaRPr lang="pt-BR" dirty="0"/>
+          </a:p>
+        </p:txBody>
+      </p:sp>
+    </p:spTree>
+    <p:extLst>
+      <p:ext uri="{BB962C8B-B14F-4D97-AF65-F5344CB8AC3E}">
+        <p14:creationId xmlns:p14="http://schemas.microsoft.com/office/powerpoint/2010/main" val="178012295"/>
+      </p:ext>
+    </p:extLst>
+  </p:cSld>
+  <p:clrMapOvr>
+    <a:masterClrMapping/>
+  </p:clrMapOvr>
+</p:sld>
+</file>
+
+<file path=ppt/slides/slide36.xml><?xml version="1.0" encoding="utf-8"?>
+<p:sld xmlns:a="http://schemas.openxmlformats.org/drawingml/2006/main" xmlns:r="http://schemas.openxmlformats.org/officeDocument/2006/relationships" xmlns:p="http://schemas.openxmlformats.org/presentationml/2006/main">
+  <p:cSld>
+    <p:spTree>
+      <p:nvGrpSpPr>
+        <p:cNvPr id="1" name=""/>
+        <p:cNvGrpSpPr/>
+        <p:nvPr/>
+      </p:nvGrpSpPr>
+      <p:grpSpPr>
+        <a:xfrm>
+          <a:off x="0" y="0"/>
+          <a:ext cx="0" cy="0"/>
+          <a:chOff x="0" y="0"/>
+          <a:chExt cx="0" cy="0"/>
+        </a:xfrm>
+      </p:grpSpPr>
+      <p:sp>
+        <p:nvSpPr>
+          <p:cNvPr id="4" name="Retângulo 3"/>
+          <p:cNvSpPr/>
+          <p:nvPr/>
+        </p:nvSpPr>
+        <p:spPr>
+          <a:xfrm>
+            <a:off x="1117279" y="445761"/>
+            <a:ext cx="9787944" cy="5911402"/>
+          </a:xfrm>
+          <a:prstGeom prst="rect">
+            <a:avLst/>
+          </a:prstGeom>
+          <a:solidFill>
+            <a:srgbClr val="A5CA97"/>
+          </a:solidFill>
+          <a:ln>
+            <a:solidFill>
+              <a:schemeClr val="accent6">
+                <a:lumMod val="60000"/>
+                <a:lumOff val="40000"/>
+              </a:schemeClr>
+            </a:solidFill>
+          </a:ln>
+          <a:effectLst/>
+        </p:spPr>
+        <p:style>
+          <a:lnRef idx="2">
+            <a:schemeClr val="accent1">
+              <a:shade val="50000"/>
+            </a:schemeClr>
+          </a:lnRef>
+          <a:fillRef idx="1">
+            <a:schemeClr val="accent1"/>
+          </a:fillRef>
+          <a:effectRef idx="0">
+            <a:schemeClr val="accent1"/>
+          </a:effectRef>
+          <a:fontRef idx="minor">
+            <a:schemeClr val="lt1"/>
+          </a:fontRef>
+        </p:style>
+        <p:txBody>
+          <a:bodyPr rtlCol="0" anchor="ctr"/>
+          <a:lstStyle/>
+          <a:p>
+            <a:pPr algn="ctr"/>
+            <a:endParaRPr lang="pt-BR"/>
+          </a:p>
+        </p:txBody>
+      </p:sp>
+      <p:sp>
+        <p:nvSpPr>
+          <p:cNvPr id="15" name="Retângulo 14"/>
+          <p:cNvSpPr/>
+          <p:nvPr/>
+        </p:nvSpPr>
+        <p:spPr>
+          <a:xfrm>
+            <a:off x="1146749" y="445761"/>
+            <a:ext cx="9787944" cy="764853"/>
+          </a:xfrm>
+          <a:prstGeom prst="rect">
+            <a:avLst/>
+          </a:prstGeom>
+          <a:solidFill>
+            <a:srgbClr val="8DBA62"/>
+          </a:solidFill>
+          <a:ln>
+            <a:noFill/>
+          </a:ln>
+        </p:spPr>
+        <p:style>
+          <a:lnRef idx="2">
+            <a:schemeClr val="accent1">
+              <a:shade val="50000"/>
+            </a:schemeClr>
+          </a:lnRef>
+          <a:fillRef idx="1">
+            <a:schemeClr val="accent1"/>
+          </a:fillRef>
+          <a:effectRef idx="0">
+            <a:schemeClr val="accent1"/>
+          </a:effectRef>
+          <a:fontRef idx="minor">
+            <a:schemeClr val="lt1"/>
+          </a:fontRef>
+        </p:style>
+        <p:txBody>
+          <a:bodyPr rtlCol="0" anchor="ctr"/>
+          <a:lstStyle/>
+          <a:p>
+            <a:pPr algn="ctr"/>
+            <a:endParaRPr lang="pt-BR"/>
+          </a:p>
+        </p:txBody>
+      </p:sp>
+      <p:sp>
+        <p:nvSpPr>
+          <p:cNvPr id="40" name="CaixaDeTexto 39"/>
+          <p:cNvSpPr txBox="1"/>
+          <p:nvPr/>
+        </p:nvSpPr>
+        <p:spPr>
+          <a:xfrm>
+            <a:off x="1184933" y="512242"/>
+            <a:ext cx="4578359" cy="646331"/>
+          </a:xfrm>
+          <a:prstGeom prst="rect">
+            <a:avLst/>
+          </a:prstGeom>
+          <a:noFill/>
+        </p:spPr>
+        <p:txBody>
+          <a:bodyPr wrap="square" rtlCol="0">
+            <a:spAutoFit/>
+          </a:bodyPr>
+          <a:lstStyle/>
+          <a:p>
+            <a:r>
+              <a:rPr lang="pt-BR" sz="3600" dirty="0" smtClean="0">
+                <a:solidFill>
+                  <a:schemeClr val="bg1"/>
+                </a:solidFill>
+                <a:latin typeface="Bahnschrift" panose="020B0502040204020203" pitchFamily="34" charset="0"/>
+              </a:rPr>
+              <a:t>SALA</a:t>
+            </a:r>
+            <a:endParaRPr lang="pt-BR" sz="3600" dirty="0">
+              <a:solidFill>
+                <a:schemeClr val="bg1"/>
+              </a:solidFill>
+              <a:latin typeface="Bahnschrift" panose="020B0502040204020203" pitchFamily="34" charset="0"/>
+            </a:endParaRPr>
+          </a:p>
+        </p:txBody>
+      </p:sp>
+      <p:grpSp>
+        <p:nvGrpSpPr>
+          <p:cNvPr id="47" name="Grupo 46"/>
+          <p:cNvGrpSpPr/>
+          <p:nvPr/>
+        </p:nvGrpSpPr>
+        <p:grpSpPr>
+          <a:xfrm>
+            <a:off x="1711215" y="1429557"/>
+            <a:ext cx="8104155" cy="4773631"/>
+            <a:chOff x="3303102" y="1578846"/>
+            <a:chExt cx="7132734" cy="4364070"/>
+          </a:xfrm>
+        </p:grpSpPr>
+        <p:sp>
+          <p:nvSpPr>
+            <p:cNvPr id="50" name="Retângulo 49"/>
+            <p:cNvSpPr/>
+            <p:nvPr/>
+          </p:nvSpPr>
+          <p:spPr>
+            <a:xfrm>
+              <a:off x="3303102" y="1578846"/>
+              <a:ext cx="7132734" cy="4364070"/>
+            </a:xfrm>
+            <a:prstGeom prst="rect">
+              <a:avLst/>
+            </a:prstGeom>
+            <a:solidFill>
+              <a:srgbClr val="8DBA62"/>
+            </a:solidFill>
+            <a:ln>
+              <a:solidFill>
+                <a:srgbClr val="8DBA62"/>
+              </a:solidFill>
+            </a:ln>
+          </p:spPr>
+          <p:style>
+            <a:lnRef idx="2">
+              <a:schemeClr val="accent1">
+                <a:shade val="50000"/>
+              </a:schemeClr>
+            </a:lnRef>
+            <a:fillRef idx="1">
+              <a:schemeClr val="accent1"/>
+            </a:fillRef>
+            <a:effectRef idx="0">
+              <a:schemeClr val="accent1"/>
+            </a:effectRef>
+            <a:fontRef idx="minor">
+              <a:schemeClr val="lt1"/>
+            </a:fontRef>
+          </p:style>
+          <p:txBody>
+            <a:bodyPr rtlCol="0" anchor="ctr"/>
+            <a:lstStyle/>
+            <a:p>
+              <a:pPr algn="ctr"/>
+              <a:endParaRPr lang="pt-BR"/>
+            </a:p>
+          </p:txBody>
+        </p:sp>
+        <p:sp>
+          <p:nvSpPr>
+            <p:cNvPr id="58" name="Retângulo de cantos arredondados 57"/>
+            <p:cNvSpPr/>
+            <p:nvPr/>
+          </p:nvSpPr>
+          <p:spPr>
+            <a:xfrm>
+              <a:off x="3400023" y="1674254"/>
+              <a:ext cx="6941711" cy="4172754"/>
+            </a:xfrm>
+            <a:prstGeom prst="roundRect">
+              <a:avLst>
+                <a:gd name="adj" fmla="val 0"/>
+              </a:avLst>
+            </a:prstGeom>
+            <a:solidFill>
+              <a:srgbClr val="FDEBC7"/>
+            </a:solidFill>
+            <a:ln>
+              <a:solidFill>
+                <a:srgbClr val="8DBA62"/>
+              </a:solidFill>
+            </a:ln>
+          </p:spPr>
+          <p:style>
+            <a:lnRef idx="2">
+              <a:schemeClr val="accent6"/>
+            </a:lnRef>
+            <a:fillRef idx="1">
+              <a:schemeClr val="lt1"/>
+            </a:fillRef>
+            <a:effectRef idx="0">
+              <a:schemeClr val="accent6"/>
+            </a:effectRef>
+            <a:fontRef idx="minor">
+              <a:schemeClr val="dk1"/>
+            </a:fontRef>
+          </p:style>
+          <p:txBody>
+            <a:bodyPr rtlCol="0" anchor="ctr"/>
+            <a:lstStyle/>
+            <a:p>
+              <a:pPr algn="ctr"/>
+              <a:endParaRPr lang="pt-BR"/>
+            </a:p>
+          </p:txBody>
+        </p:sp>
+      </p:grpSp>
+      <p:sp>
+        <p:nvSpPr>
+          <p:cNvPr id="11" name="Retângulo 10"/>
+          <p:cNvSpPr/>
+          <p:nvPr/>
+        </p:nvSpPr>
+        <p:spPr>
+          <a:xfrm>
+            <a:off x="7421960" y="1952420"/>
+            <a:ext cx="1958891" cy="378657"/>
+          </a:xfrm>
+          <a:prstGeom prst="rect">
+            <a:avLst/>
+          </a:prstGeom>
+          <a:solidFill>
+            <a:srgbClr val="73D54A"/>
+          </a:solidFill>
+          <a:ln>
+            <a:solidFill>
+              <a:srgbClr val="73D54A"/>
+            </a:solidFill>
+          </a:ln>
+          <a:effectLst>
+            <a:outerShdw blurRad="50800" dist="38100" dir="2700000" algn="tl" rotWithShape="0">
+              <a:prstClr val="black">
+                <a:alpha val="40000"/>
+              </a:prstClr>
+            </a:outerShdw>
+            <a:softEdge rad="0"/>
+          </a:effectLst>
+        </p:spPr>
+        <p:style>
+          <a:lnRef idx="2">
+            <a:schemeClr val="accent1">
+              <a:shade val="50000"/>
+            </a:schemeClr>
+          </a:lnRef>
+          <a:fillRef idx="1">
+            <a:schemeClr val="accent1"/>
+          </a:fillRef>
+          <a:effectRef idx="0">
+            <a:schemeClr val="accent1"/>
+          </a:effectRef>
+          <a:fontRef idx="minor">
+            <a:schemeClr val="lt1"/>
+          </a:fontRef>
+        </p:style>
+        <p:txBody>
+          <a:bodyPr rtlCol="0" anchor="ctr"/>
+          <a:lstStyle/>
+          <a:p>
+            <a:pPr algn="ctr"/>
+            <a:r>
+              <a:rPr lang="pt-BR" dirty="0" smtClean="0"/>
+              <a:t>Adicionar Rodada</a:t>
+            </a:r>
+            <a:endParaRPr lang="pt-BR" dirty="0"/>
+          </a:p>
+        </p:txBody>
+      </p:sp>
+    </p:spTree>
+    <p:extLst>
+      <p:ext uri="{BB962C8B-B14F-4D97-AF65-F5344CB8AC3E}">
+        <p14:creationId xmlns:p14="http://schemas.microsoft.com/office/powerpoint/2010/main" val="1377177600"/>
+      </p:ext>
+    </p:extLst>
+  </p:cSld>
+  <p:clrMapOvr>
+    <a:masterClrMapping/>
+  </p:clrMapOvr>
+</p:sld>
+</file>
+
+<file path=ppt/slides/slide37.xml><?xml version="1.0" encoding="utf-8"?>
+<p:sld xmlns:a="http://schemas.openxmlformats.org/drawingml/2006/main" xmlns:r="http://schemas.openxmlformats.org/officeDocument/2006/relationships" xmlns:p="http://schemas.openxmlformats.org/presentationml/2006/main">
+  <p:cSld>
+    <p:spTree>
+      <p:nvGrpSpPr>
+        <p:cNvPr id="1" name=""/>
+        <p:cNvGrpSpPr/>
+        <p:nvPr/>
+      </p:nvGrpSpPr>
+      <p:grpSpPr>
+        <a:xfrm>
+          <a:off x="0" y="0"/>
+          <a:ext cx="0" cy="0"/>
+          <a:chOff x="0" y="0"/>
+          <a:chExt cx="0" cy="0"/>
+        </a:xfrm>
+      </p:grpSpPr>
+      <p:sp>
+        <p:nvSpPr>
+          <p:cNvPr id="4" name="Retângulo 3"/>
+          <p:cNvSpPr/>
+          <p:nvPr/>
+        </p:nvSpPr>
+        <p:spPr>
+          <a:xfrm>
+            <a:off x="1117279" y="445761"/>
+            <a:ext cx="9787944" cy="5911402"/>
+          </a:xfrm>
+          <a:prstGeom prst="rect">
+            <a:avLst/>
+          </a:prstGeom>
+          <a:solidFill>
+            <a:srgbClr val="A5CA97"/>
+          </a:solidFill>
+          <a:ln>
+            <a:solidFill>
+              <a:schemeClr val="accent6">
+                <a:lumMod val="60000"/>
+                <a:lumOff val="40000"/>
+              </a:schemeClr>
+            </a:solidFill>
+          </a:ln>
+          <a:effectLst/>
+        </p:spPr>
+        <p:style>
+          <a:lnRef idx="2">
+            <a:schemeClr val="accent1">
+              <a:shade val="50000"/>
+            </a:schemeClr>
+          </a:lnRef>
+          <a:fillRef idx="1">
+            <a:schemeClr val="accent1"/>
+          </a:fillRef>
+          <a:effectRef idx="0">
+            <a:schemeClr val="accent1"/>
+          </a:effectRef>
+          <a:fontRef idx="minor">
+            <a:schemeClr val="lt1"/>
+          </a:fontRef>
+        </p:style>
+        <p:txBody>
+          <a:bodyPr rtlCol="0" anchor="ctr"/>
+          <a:lstStyle/>
+          <a:p>
+            <a:pPr algn="ctr"/>
+            <a:endParaRPr lang="pt-BR"/>
+          </a:p>
+        </p:txBody>
+      </p:sp>
+      <p:sp>
+        <p:nvSpPr>
+          <p:cNvPr id="15" name="Retângulo 14"/>
+          <p:cNvSpPr/>
+          <p:nvPr/>
+        </p:nvSpPr>
+        <p:spPr>
+          <a:xfrm>
+            <a:off x="1146749" y="445761"/>
+            <a:ext cx="9787944" cy="764853"/>
+          </a:xfrm>
+          <a:prstGeom prst="rect">
+            <a:avLst/>
+          </a:prstGeom>
+          <a:solidFill>
+            <a:srgbClr val="8DBA62"/>
+          </a:solidFill>
+          <a:ln>
+            <a:noFill/>
+          </a:ln>
+        </p:spPr>
+        <p:style>
+          <a:lnRef idx="2">
+            <a:schemeClr val="accent1">
+              <a:shade val="50000"/>
+            </a:schemeClr>
+          </a:lnRef>
+          <a:fillRef idx="1">
+            <a:schemeClr val="accent1"/>
+          </a:fillRef>
+          <a:effectRef idx="0">
+            <a:schemeClr val="accent1"/>
+          </a:effectRef>
+          <a:fontRef idx="minor">
+            <a:schemeClr val="lt1"/>
+          </a:fontRef>
+        </p:style>
+        <p:txBody>
+          <a:bodyPr rtlCol="0" anchor="ctr"/>
+          <a:lstStyle/>
+          <a:p>
+            <a:pPr algn="ctr"/>
+            <a:endParaRPr lang="pt-BR"/>
+          </a:p>
+        </p:txBody>
+      </p:sp>
+      <p:sp>
+        <p:nvSpPr>
+          <p:cNvPr id="40" name="CaixaDeTexto 39"/>
+          <p:cNvSpPr txBox="1"/>
+          <p:nvPr/>
+        </p:nvSpPr>
+        <p:spPr>
+          <a:xfrm>
+            <a:off x="1146749" y="487727"/>
+            <a:ext cx="4578359" cy="646331"/>
+          </a:xfrm>
+          <a:prstGeom prst="rect">
+            <a:avLst/>
+          </a:prstGeom>
+          <a:noFill/>
+        </p:spPr>
+        <p:txBody>
+          <a:bodyPr wrap="square" rtlCol="0">
+            <a:spAutoFit/>
+          </a:bodyPr>
+          <a:lstStyle/>
+          <a:p>
+            <a:r>
+              <a:rPr lang="pt-BR" sz="3600" dirty="0" smtClean="0">
+                <a:solidFill>
+                  <a:schemeClr val="bg1"/>
+                </a:solidFill>
+                <a:latin typeface="Bahnschrift" panose="020B0502040204020203" pitchFamily="34" charset="0"/>
+              </a:rPr>
+              <a:t>TELA DE ESPERA</a:t>
+            </a:r>
+            <a:endParaRPr lang="pt-BR" sz="3600" dirty="0">
+              <a:solidFill>
+                <a:schemeClr val="bg1"/>
+              </a:solidFill>
+              <a:latin typeface="Bahnschrift" panose="020B0502040204020203" pitchFamily="34" charset="0"/>
+            </a:endParaRPr>
+          </a:p>
+        </p:txBody>
+      </p:sp>
+      <p:grpSp>
+        <p:nvGrpSpPr>
+          <p:cNvPr id="47" name="Grupo 46"/>
+          <p:cNvGrpSpPr/>
+          <p:nvPr/>
+        </p:nvGrpSpPr>
+        <p:grpSpPr>
+          <a:xfrm>
+            <a:off x="1711215" y="1429557"/>
+            <a:ext cx="8104155" cy="4773631"/>
+            <a:chOff x="3303102" y="1578846"/>
+            <a:chExt cx="7132734" cy="4364070"/>
+          </a:xfrm>
+        </p:grpSpPr>
+        <p:sp>
+          <p:nvSpPr>
+            <p:cNvPr id="50" name="Retângulo 49"/>
+            <p:cNvSpPr/>
+            <p:nvPr/>
+          </p:nvSpPr>
+          <p:spPr>
+            <a:xfrm>
+              <a:off x="3303102" y="1578846"/>
+              <a:ext cx="7132734" cy="4364070"/>
+            </a:xfrm>
+            <a:prstGeom prst="rect">
+              <a:avLst/>
+            </a:prstGeom>
+            <a:solidFill>
+              <a:srgbClr val="8DBA62"/>
+            </a:solidFill>
+            <a:ln>
+              <a:solidFill>
+                <a:srgbClr val="8DBA62"/>
+              </a:solidFill>
+            </a:ln>
+          </p:spPr>
+          <p:style>
+            <a:lnRef idx="2">
+              <a:schemeClr val="accent1">
+                <a:shade val="50000"/>
+              </a:schemeClr>
+            </a:lnRef>
+            <a:fillRef idx="1">
+              <a:schemeClr val="accent1"/>
+            </a:fillRef>
+            <a:effectRef idx="0">
+              <a:schemeClr val="accent1"/>
+            </a:effectRef>
+            <a:fontRef idx="minor">
+              <a:schemeClr val="lt1"/>
+            </a:fontRef>
+          </p:style>
+          <p:txBody>
+            <a:bodyPr rtlCol="0" anchor="ctr"/>
+            <a:lstStyle/>
+            <a:p>
+              <a:pPr algn="ctr"/>
+              <a:endParaRPr lang="pt-BR"/>
+            </a:p>
+          </p:txBody>
+        </p:sp>
+        <p:sp>
+          <p:nvSpPr>
+            <p:cNvPr id="58" name="Retângulo de cantos arredondados 57"/>
+            <p:cNvSpPr/>
+            <p:nvPr/>
+          </p:nvSpPr>
+          <p:spPr>
+            <a:xfrm>
+              <a:off x="3400023" y="1674254"/>
+              <a:ext cx="6941711" cy="4172754"/>
+            </a:xfrm>
+            <a:prstGeom prst="roundRect">
+              <a:avLst>
+                <a:gd name="adj" fmla="val 0"/>
+              </a:avLst>
+            </a:prstGeom>
+            <a:solidFill>
+              <a:srgbClr val="FDEBC7"/>
+            </a:solidFill>
+            <a:ln>
+              <a:solidFill>
+                <a:srgbClr val="8DBA62"/>
+              </a:solidFill>
+            </a:ln>
+          </p:spPr>
+          <p:style>
+            <a:lnRef idx="2">
+              <a:schemeClr val="accent6"/>
+            </a:lnRef>
+            <a:fillRef idx="1">
+              <a:schemeClr val="lt1"/>
+            </a:fillRef>
+            <a:effectRef idx="0">
+              <a:schemeClr val="accent6"/>
+            </a:effectRef>
+            <a:fontRef idx="minor">
+              <a:schemeClr val="dk1"/>
+            </a:fontRef>
+          </p:style>
+          <p:txBody>
+            <a:bodyPr rtlCol="0" anchor="ctr"/>
+            <a:lstStyle/>
+            <a:p>
+              <a:pPr algn="ctr"/>
+              <a:endParaRPr lang="pt-BR"/>
+            </a:p>
+          </p:txBody>
+        </p:sp>
+      </p:grpSp>
+      <p:sp>
+        <p:nvSpPr>
+          <p:cNvPr id="11" name="Retângulo 10"/>
+          <p:cNvSpPr/>
+          <p:nvPr/>
+        </p:nvSpPr>
+        <p:spPr>
+          <a:xfrm>
+            <a:off x="4275782" y="5114216"/>
+            <a:ext cx="2975020" cy="378657"/>
+          </a:xfrm>
+          <a:prstGeom prst="rect">
+            <a:avLst/>
+          </a:prstGeom>
+          <a:solidFill>
+            <a:srgbClr val="73D54A"/>
+          </a:solidFill>
+          <a:ln>
+            <a:solidFill>
+              <a:srgbClr val="73D54A"/>
+            </a:solidFill>
+          </a:ln>
+          <a:effectLst>
+            <a:outerShdw blurRad="50800" dist="38100" dir="2700000" algn="tl" rotWithShape="0">
+              <a:prstClr val="black">
+                <a:alpha val="40000"/>
+              </a:prstClr>
+            </a:outerShdw>
+            <a:softEdge rad="0"/>
+          </a:effectLst>
+        </p:spPr>
+        <p:style>
+          <a:lnRef idx="2">
+            <a:schemeClr val="accent1">
+              <a:shade val="50000"/>
+            </a:schemeClr>
+          </a:lnRef>
+          <a:fillRef idx="1">
+            <a:schemeClr val="accent1"/>
+          </a:fillRef>
+          <a:effectRef idx="0">
+            <a:schemeClr val="accent1"/>
+          </a:effectRef>
+          <a:fontRef idx="minor">
+            <a:schemeClr val="lt1"/>
+          </a:fontRef>
+        </p:style>
+        <p:txBody>
+          <a:bodyPr rtlCol="0" anchor="ctr"/>
+          <a:lstStyle/>
+          <a:p>
+            <a:pPr algn="ctr"/>
+            <a:r>
+              <a:rPr lang="pt-BR" dirty="0" smtClean="0"/>
+              <a:t>Pronto !</a:t>
+            </a:r>
+            <a:endParaRPr lang="pt-BR" dirty="0"/>
+          </a:p>
+        </p:txBody>
+      </p:sp>
+      <p:pic>
+        <p:nvPicPr>
+          <p:cNvPr id="2" name="Imagem 1"/>
+          <p:cNvPicPr>
+            <a:picLocks noChangeAspect="1"/>
+          </p:cNvPicPr>
+          <p:nvPr/>
+        </p:nvPicPr>
+        <p:blipFill>
+          <a:blip r:embed="rId2">
+            <a:extLst>
+              <a:ext uri="{28A0092B-C50C-407E-A947-70E740481C1C}">
+                <a14:useLocalDpi xmlns:a14="http://schemas.microsoft.com/office/drawing/2010/main" val="0"/>
+              </a:ext>
+            </a:extLst>
+          </a:blip>
+          <a:stretch>
+            <a:fillRect/>
+          </a:stretch>
+        </p:blipFill>
+        <p:spPr>
+          <a:xfrm>
+            <a:off x="3648902" y="1915586"/>
+            <a:ext cx="3962511" cy="2971883"/>
+          </a:xfrm>
+          <a:prstGeom prst="rect">
+            <a:avLst/>
+          </a:prstGeom>
+        </p:spPr>
+      </p:pic>
+    </p:spTree>
+    <p:extLst>
+      <p:ext uri="{BB962C8B-B14F-4D97-AF65-F5344CB8AC3E}">
+        <p14:creationId xmlns:p14="http://schemas.microsoft.com/office/powerpoint/2010/main" val="1861770829"/>
+      </p:ext>
+    </p:extLst>
+  </p:cSld>
+  <p:clrMapOvr>
+    <a:masterClrMapping/>
+  </p:clrMapOvr>
+</p:sld>
+</file>
+
+<file path=ppt/slides/slide38.xml><?xml version="1.0" encoding="utf-8"?>
+<p:sld xmlns:a="http://schemas.openxmlformats.org/drawingml/2006/main" xmlns:r="http://schemas.openxmlformats.org/officeDocument/2006/relationships" xmlns:p="http://schemas.openxmlformats.org/presentationml/2006/main">
+  <p:cSld>
+    <p:spTree>
+      <p:nvGrpSpPr>
+        <p:cNvPr id="1" name=""/>
+        <p:cNvGrpSpPr/>
+        <p:nvPr/>
+      </p:nvGrpSpPr>
+      <p:grpSpPr>
+        <a:xfrm>
+          <a:off x="0" y="0"/>
+          <a:ext cx="0" cy="0"/>
+          <a:chOff x="0" y="0"/>
+          <a:chExt cx="0" cy="0"/>
+        </a:xfrm>
+      </p:grpSpPr>
+      <p:sp>
+        <p:nvSpPr>
           <p:cNvPr id="2" name="Título 1"/>
           <p:cNvSpPr>
             <a:spLocks noGrp="1"/>
@@ -26880,35 +27936,35 @@
                 <a:gridCol w="586838">
                   <a:extLst>
                     <a:ext uri="{9D8B030D-6E8A-4147-A177-3AD203B41FA5}">
-                      <a16:colId xmlns:a16="http://schemas.microsoft.com/office/drawing/2014/main" val="20000"/>
+                      <a16:colId xmlns:a16="http://schemas.microsoft.com/office/drawing/2014/main" xmlns="" val="20000"/>
                     </a:ext>
                   </a:extLst>
                 </a:gridCol>
                 <a:gridCol w="1679832">
                   <a:extLst>
                     <a:ext uri="{9D8B030D-6E8A-4147-A177-3AD203B41FA5}">
-                      <a16:colId xmlns:a16="http://schemas.microsoft.com/office/drawing/2014/main" val="20001"/>
+                      <a16:colId xmlns:a16="http://schemas.microsoft.com/office/drawing/2014/main" xmlns="" val="20001"/>
                     </a:ext>
                   </a:extLst>
                 </a:gridCol>
                 <a:gridCol w="2090660">
                   <a:extLst>
                     <a:ext uri="{9D8B030D-6E8A-4147-A177-3AD203B41FA5}">
-                      <a16:colId xmlns:a16="http://schemas.microsoft.com/office/drawing/2014/main" val="20002"/>
+                      <a16:colId xmlns:a16="http://schemas.microsoft.com/office/drawing/2014/main" xmlns="" val="20002"/>
                     </a:ext>
                   </a:extLst>
                 </a:gridCol>
                 <a:gridCol w="2209822">
                   <a:extLst>
                     <a:ext uri="{9D8B030D-6E8A-4147-A177-3AD203B41FA5}">
-                      <a16:colId xmlns:a16="http://schemas.microsoft.com/office/drawing/2014/main" val="20003"/>
+                      <a16:colId xmlns:a16="http://schemas.microsoft.com/office/drawing/2014/main" xmlns="" val="20003"/>
                     </a:ext>
                   </a:extLst>
                 </a:gridCol>
                 <a:gridCol w="2588654">
                   <a:extLst>
                     <a:ext uri="{9D8B030D-6E8A-4147-A177-3AD203B41FA5}">
-                      <a16:colId xmlns:a16="http://schemas.microsoft.com/office/drawing/2014/main" val="20004"/>
+                      <a16:colId xmlns:a16="http://schemas.microsoft.com/office/drawing/2014/main" xmlns="" val="20004"/>
                     </a:ext>
                   </a:extLst>
                 </a:gridCol>
@@ -26978,7 +28034,7 @@
                 </a:tc>
                 <a:extLst>
                   <a:ext uri="{0D108BD9-81ED-4DB2-BD59-A6C34878D82A}">
-                    <a16:rowId xmlns:a16="http://schemas.microsoft.com/office/drawing/2014/main" val="10000"/>
+                    <a16:rowId xmlns:a16="http://schemas.microsoft.com/office/drawing/2014/main" xmlns="" val="10000"/>
                   </a:ext>
                 </a:extLst>
               </a:tr>
@@ -27050,7 +28106,7 @@
                 </a:tc>
                 <a:extLst>
                   <a:ext uri="{0D108BD9-81ED-4DB2-BD59-A6C34878D82A}">
-                    <a16:rowId xmlns:a16="http://schemas.microsoft.com/office/drawing/2014/main" val="10001"/>
+                    <a16:rowId xmlns:a16="http://schemas.microsoft.com/office/drawing/2014/main" xmlns="" val="10001"/>
                   </a:ext>
                 </a:extLst>
               </a:tr>
@@ -27127,7 +28183,7 @@
                 </a:tc>
                 <a:extLst>
                   <a:ext uri="{0D108BD9-81ED-4DB2-BD59-A6C34878D82A}">
-                    <a16:rowId xmlns:a16="http://schemas.microsoft.com/office/drawing/2014/main" val="10002"/>
+                    <a16:rowId xmlns:a16="http://schemas.microsoft.com/office/drawing/2014/main" xmlns="" val="10002"/>
                   </a:ext>
                 </a:extLst>
               </a:tr>
@@ -27226,35 +28282,35 @@
                 <a:gridCol w="554127">
                   <a:extLst>
                     <a:ext uri="{9D8B030D-6E8A-4147-A177-3AD203B41FA5}">
-                      <a16:colId xmlns:a16="http://schemas.microsoft.com/office/drawing/2014/main" val="20000"/>
+                      <a16:colId xmlns:a16="http://schemas.microsoft.com/office/drawing/2014/main" xmlns="" val="20000"/>
                     </a:ext>
                   </a:extLst>
                 </a:gridCol>
                 <a:gridCol w="1586198">
                   <a:extLst>
                     <a:ext uri="{9D8B030D-6E8A-4147-A177-3AD203B41FA5}">
-                      <a16:colId xmlns:a16="http://schemas.microsoft.com/office/drawing/2014/main" val="20001"/>
+                      <a16:colId xmlns:a16="http://schemas.microsoft.com/office/drawing/2014/main" xmlns="" val="20001"/>
                     </a:ext>
                   </a:extLst>
                 </a:gridCol>
                 <a:gridCol w="1695590">
                   <a:extLst>
                     <a:ext uri="{9D8B030D-6E8A-4147-A177-3AD203B41FA5}">
-                      <a16:colId xmlns:a16="http://schemas.microsoft.com/office/drawing/2014/main" val="20002"/>
+                      <a16:colId xmlns:a16="http://schemas.microsoft.com/office/drawing/2014/main" xmlns="" val="20002"/>
                     </a:ext>
                   </a:extLst>
                 </a:gridCol>
                 <a:gridCol w="2544035">
                   <a:extLst>
                     <a:ext uri="{9D8B030D-6E8A-4147-A177-3AD203B41FA5}">
-                      <a16:colId xmlns:a16="http://schemas.microsoft.com/office/drawing/2014/main" val="20003"/>
+                      <a16:colId xmlns:a16="http://schemas.microsoft.com/office/drawing/2014/main" xmlns="" val="20003"/>
                     </a:ext>
                   </a:extLst>
                 </a:gridCol>
                 <a:gridCol w="2544035">
                   <a:extLst>
                     <a:ext uri="{9D8B030D-6E8A-4147-A177-3AD203B41FA5}">
-                      <a16:colId xmlns:a16="http://schemas.microsoft.com/office/drawing/2014/main" val="20004"/>
+                      <a16:colId xmlns:a16="http://schemas.microsoft.com/office/drawing/2014/main" xmlns="" val="20004"/>
                     </a:ext>
                   </a:extLst>
                 </a:gridCol>
@@ -27324,7 +28380,7 @@
                 </a:tc>
                 <a:extLst>
                   <a:ext uri="{0D108BD9-81ED-4DB2-BD59-A6C34878D82A}">
-                    <a16:rowId xmlns:a16="http://schemas.microsoft.com/office/drawing/2014/main" val="10000"/>
+                    <a16:rowId xmlns:a16="http://schemas.microsoft.com/office/drawing/2014/main" xmlns="" val="10000"/>
                   </a:ext>
                 </a:extLst>
               </a:tr>
@@ -27395,7 +28451,7 @@
                 </a:tc>
                 <a:extLst>
                   <a:ext uri="{0D108BD9-81ED-4DB2-BD59-A6C34878D82A}">
-                    <a16:rowId xmlns:a16="http://schemas.microsoft.com/office/drawing/2014/main" val="10001"/>
+                    <a16:rowId xmlns:a16="http://schemas.microsoft.com/office/drawing/2014/main" xmlns="" val="10001"/>
                   </a:ext>
                 </a:extLst>
               </a:tr>
@@ -27465,7 +28521,7 @@
                 </a:tc>
                 <a:extLst>
                   <a:ext uri="{0D108BD9-81ED-4DB2-BD59-A6C34878D82A}">
-                    <a16:rowId xmlns:a16="http://schemas.microsoft.com/office/drawing/2014/main" val="10002"/>
+                    <a16:rowId xmlns:a16="http://schemas.microsoft.com/office/drawing/2014/main" xmlns="" val="10002"/>
                   </a:ext>
                 </a:extLst>
               </a:tr>
@@ -27534,7 +28590,7 @@
                 </a:tc>
                 <a:extLst>
                   <a:ext uri="{0D108BD9-81ED-4DB2-BD59-A6C34878D82A}">
-                    <a16:rowId xmlns:a16="http://schemas.microsoft.com/office/drawing/2014/main" val="10003"/>
+                    <a16:rowId xmlns:a16="http://schemas.microsoft.com/office/drawing/2014/main" xmlns="" val="10003"/>
                   </a:ext>
                 </a:extLst>
               </a:tr>
@@ -28295,35 +29351,35 @@
                 <a:gridCol w="578919">
                   <a:extLst>
                     <a:ext uri="{9D8B030D-6E8A-4147-A177-3AD203B41FA5}">
-                      <a16:colId xmlns:a16="http://schemas.microsoft.com/office/drawing/2014/main" val="20000"/>
+                      <a16:colId xmlns:a16="http://schemas.microsoft.com/office/drawing/2014/main" xmlns="" val="20000"/>
                     </a:ext>
                   </a:extLst>
                 </a:gridCol>
                 <a:gridCol w="1657161">
                   <a:extLst>
                     <a:ext uri="{9D8B030D-6E8A-4147-A177-3AD203B41FA5}">
-                      <a16:colId xmlns:a16="http://schemas.microsoft.com/office/drawing/2014/main" val="20001"/>
+                      <a16:colId xmlns:a16="http://schemas.microsoft.com/office/drawing/2014/main" xmlns="" val="20001"/>
                     </a:ext>
                   </a:extLst>
                 </a:gridCol>
                 <a:gridCol w="1771448">
                   <a:extLst>
                     <a:ext uri="{9D8B030D-6E8A-4147-A177-3AD203B41FA5}">
-                      <a16:colId xmlns:a16="http://schemas.microsoft.com/office/drawing/2014/main" val="20002"/>
+                      <a16:colId xmlns:a16="http://schemas.microsoft.com/office/drawing/2014/main" xmlns="" val="20002"/>
                     </a:ext>
                   </a:extLst>
                 </a:gridCol>
                 <a:gridCol w="2657852">
                   <a:extLst>
                     <a:ext uri="{9D8B030D-6E8A-4147-A177-3AD203B41FA5}">
-                      <a16:colId xmlns:a16="http://schemas.microsoft.com/office/drawing/2014/main" val="20003"/>
+                      <a16:colId xmlns:a16="http://schemas.microsoft.com/office/drawing/2014/main" xmlns="" val="20003"/>
                     </a:ext>
                   </a:extLst>
                 </a:gridCol>
                 <a:gridCol w="2657852">
                   <a:extLst>
                     <a:ext uri="{9D8B030D-6E8A-4147-A177-3AD203B41FA5}">
-                      <a16:colId xmlns:a16="http://schemas.microsoft.com/office/drawing/2014/main" val="20004"/>
+                      <a16:colId xmlns:a16="http://schemas.microsoft.com/office/drawing/2014/main" xmlns="" val="20004"/>
                     </a:ext>
                   </a:extLst>
                 </a:gridCol>
@@ -28393,7 +29449,7 @@
                 </a:tc>
                 <a:extLst>
                   <a:ext uri="{0D108BD9-81ED-4DB2-BD59-A6C34878D82A}">
-                    <a16:rowId xmlns:a16="http://schemas.microsoft.com/office/drawing/2014/main" val="10000"/>
+                    <a16:rowId xmlns:a16="http://schemas.microsoft.com/office/drawing/2014/main" xmlns="" val="10000"/>
                   </a:ext>
                 </a:extLst>
               </a:tr>
@@ -28464,7 +29520,7 @@
                 </a:tc>
                 <a:extLst>
                   <a:ext uri="{0D108BD9-81ED-4DB2-BD59-A6C34878D82A}">
-                    <a16:rowId xmlns:a16="http://schemas.microsoft.com/office/drawing/2014/main" val="10001"/>
+                    <a16:rowId xmlns:a16="http://schemas.microsoft.com/office/drawing/2014/main" xmlns="" val="10001"/>
                   </a:ext>
                 </a:extLst>
               </a:tr>
@@ -28534,7 +29590,7 @@
                 </a:tc>
                 <a:extLst>
                   <a:ext uri="{0D108BD9-81ED-4DB2-BD59-A6C34878D82A}">
-                    <a16:rowId xmlns:a16="http://schemas.microsoft.com/office/drawing/2014/main" val="10002"/>
+                    <a16:rowId xmlns:a16="http://schemas.microsoft.com/office/drawing/2014/main" xmlns="" val="10002"/>
                   </a:ext>
                 </a:extLst>
               </a:tr>
@@ -28623,7 +29679,7 @@
                 </a:tc>
                 <a:extLst>
                   <a:ext uri="{0D108BD9-81ED-4DB2-BD59-A6C34878D82A}">
-                    <a16:rowId xmlns:a16="http://schemas.microsoft.com/office/drawing/2014/main" val="10003"/>
+                    <a16:rowId xmlns:a16="http://schemas.microsoft.com/office/drawing/2014/main" xmlns="" val="10003"/>
                   </a:ext>
                 </a:extLst>
               </a:tr>
@@ -28697,7 +29753,7 @@
                 </a:tc>
                 <a:extLst>
                   <a:ext uri="{0D108BD9-81ED-4DB2-BD59-A6C34878D82A}">
-                    <a16:rowId xmlns:a16="http://schemas.microsoft.com/office/drawing/2014/main" val="10004"/>
+                    <a16:rowId xmlns:a16="http://schemas.microsoft.com/office/drawing/2014/main" xmlns="" val="10004"/>
                   </a:ext>
                 </a:extLst>
               </a:tr>
@@ -29489,35 +30545,35 @@
                 <a:gridCol w="542932">
                   <a:extLst>
                     <a:ext uri="{9D8B030D-6E8A-4147-A177-3AD203B41FA5}">
-                      <a16:colId xmlns:a16="http://schemas.microsoft.com/office/drawing/2014/main" val="20000"/>
+                      <a16:colId xmlns:a16="http://schemas.microsoft.com/office/drawing/2014/main" xmlns="" val="20000"/>
                     </a:ext>
                   </a:extLst>
                 </a:gridCol>
                 <a:gridCol w="1554149">
                   <a:extLst>
                     <a:ext uri="{9D8B030D-6E8A-4147-A177-3AD203B41FA5}">
-                      <a16:colId xmlns:a16="http://schemas.microsoft.com/office/drawing/2014/main" val="20001"/>
+                      <a16:colId xmlns:a16="http://schemas.microsoft.com/office/drawing/2014/main" xmlns="" val="20001"/>
                     </a:ext>
                   </a:extLst>
                 </a:gridCol>
                 <a:gridCol w="1661332">
                   <a:extLst>
                     <a:ext uri="{9D8B030D-6E8A-4147-A177-3AD203B41FA5}">
-                      <a16:colId xmlns:a16="http://schemas.microsoft.com/office/drawing/2014/main" val="20002"/>
+                      <a16:colId xmlns:a16="http://schemas.microsoft.com/office/drawing/2014/main" xmlns="" val="20002"/>
                     </a:ext>
                   </a:extLst>
                 </a:gridCol>
                 <a:gridCol w="2492635">
                   <a:extLst>
                     <a:ext uri="{9D8B030D-6E8A-4147-A177-3AD203B41FA5}">
-                      <a16:colId xmlns:a16="http://schemas.microsoft.com/office/drawing/2014/main" val="20003"/>
+                      <a16:colId xmlns:a16="http://schemas.microsoft.com/office/drawing/2014/main" xmlns="" val="20003"/>
                     </a:ext>
                   </a:extLst>
                 </a:gridCol>
                 <a:gridCol w="2492635">
                   <a:extLst>
                     <a:ext uri="{9D8B030D-6E8A-4147-A177-3AD203B41FA5}">
-                      <a16:colId xmlns:a16="http://schemas.microsoft.com/office/drawing/2014/main" val="20004"/>
+                      <a16:colId xmlns:a16="http://schemas.microsoft.com/office/drawing/2014/main" xmlns="" val="20004"/>
                     </a:ext>
                   </a:extLst>
                 </a:gridCol>
@@ -29587,7 +30643,7 @@
                 </a:tc>
                 <a:extLst>
                   <a:ext uri="{0D108BD9-81ED-4DB2-BD59-A6C34878D82A}">
-                    <a16:rowId xmlns:a16="http://schemas.microsoft.com/office/drawing/2014/main" val="10000"/>
+                    <a16:rowId xmlns:a16="http://schemas.microsoft.com/office/drawing/2014/main" xmlns="" val="10000"/>
                   </a:ext>
                 </a:extLst>
               </a:tr>
@@ -29658,7 +30714,7 @@
                 </a:tc>
                 <a:extLst>
                   <a:ext uri="{0D108BD9-81ED-4DB2-BD59-A6C34878D82A}">
-                    <a16:rowId xmlns:a16="http://schemas.microsoft.com/office/drawing/2014/main" val="10001"/>
+                    <a16:rowId xmlns:a16="http://schemas.microsoft.com/office/drawing/2014/main" xmlns="" val="10001"/>
                   </a:ext>
                 </a:extLst>
               </a:tr>
@@ -29728,7 +30784,7 @@
                 </a:tc>
                 <a:extLst>
                   <a:ext uri="{0D108BD9-81ED-4DB2-BD59-A6C34878D82A}">
-                    <a16:rowId xmlns:a16="http://schemas.microsoft.com/office/drawing/2014/main" val="10002"/>
+                    <a16:rowId xmlns:a16="http://schemas.microsoft.com/office/drawing/2014/main" xmlns="" val="10002"/>
                   </a:ext>
                 </a:extLst>
               </a:tr>
@@ -29798,7 +30854,7 @@
                 </a:tc>
                 <a:extLst>
                   <a:ext uri="{0D108BD9-81ED-4DB2-BD59-A6C34878D82A}">
-                    <a16:rowId xmlns:a16="http://schemas.microsoft.com/office/drawing/2014/main" val="10003"/>
+                    <a16:rowId xmlns:a16="http://schemas.microsoft.com/office/drawing/2014/main" xmlns="" val="10003"/>
                   </a:ext>
                 </a:extLst>
               </a:tr>
@@ -29867,7 +30923,7 @@
                 </a:tc>
                 <a:extLst>
                   <a:ext uri="{0D108BD9-81ED-4DB2-BD59-A6C34878D82A}">
-                    <a16:rowId xmlns:a16="http://schemas.microsoft.com/office/drawing/2014/main" val="10004"/>
+                    <a16:rowId xmlns:a16="http://schemas.microsoft.com/office/drawing/2014/main" xmlns="" val="10004"/>
                   </a:ext>
                 </a:extLst>
               </a:tr>

</xml_diff>